<commit_message>
Update reconcile with more details
</commit_message>
<xml_diff>
--- a/docs/design/Arion - State Reconciliation.pptx
+++ b/docs/design/Arion - State Reconciliation.pptx
@@ -19,8 +19,8 @@
     <p:sldId id="270" r:id="rId13"/>
     <p:sldId id="259" r:id="rId14"/>
     <p:sldId id="260" r:id="rId15"/>
-    <p:sldId id="267" r:id="rId16"/>
-    <p:sldId id="273" r:id="rId17"/>
+    <p:sldId id="273" r:id="rId16"/>
+    <p:sldId id="267" r:id="rId17"/>
     <p:sldId id="279" r:id="rId18"/>
     <p:sldId id="281" r:id="rId19"/>
     <p:sldId id="282" r:id="rId20"/>
@@ -146,14 +146,14 @@
   <p1510:revLst>
     <p1510:client id="{74C4598A-A2B3-4135-858D-A2ED4DF598A7}" v="748" vWet="752" dt="2022-09-13T21:48:03.230"/>
     <p1510:client id="{7D4F7EB4-D853-4E48-AA9A-E80CA53CED3B}" vWet="2" dt="2022-09-14T00:53:27.499"/>
-    <p1510:client id="{809F7682-8634-4D1E-9951-227E47637BCA}" v="2434" dt="2022-09-14T04:14:22.567"/>
+    <p1510:client id="{809F7682-8634-4D1E-9951-227E47637BCA}" v="3640" dt="2022-09-14T22:37:39.149"/>
   </p1510:revLst>
 </p1510:revInfo>
 </file>
 
 <file path=ppt/comments/modernComment_102_8DFAEFD1.xml><?xml version="1.0" encoding="utf-8"?>
 <p188:cmLst xmlns:a="http://schemas.openxmlformats.org/drawingml/2006/main" xmlns:r="http://schemas.openxmlformats.org/officeDocument/2006/relationships" xmlns:p188="http://schemas.microsoft.com/office/powerpoint/2018/8/main">
-  <p188:cm id="{F05FE77F-48F4-4819-AD75-5F103F9DFEA7}" authorId="{3666BA98-6DB4-47CA-27ED-68554259095C}" created="2022-09-13T16:41:54.113">
+  <p188:cm id="{F05FE77F-48F4-4819-AD75-5F103F9DFEA7}" authorId="{3666BA98-6DB4-47CA-27ED-68554259095C}" status="resolved" created="2022-09-13T16:41:54.113" complete="100000">
     <ac:txMkLst xmlns:ac="http://schemas.microsoft.com/office/drawing/2013/main/command">
       <pc:docMk xmlns:pc="http://schemas.microsoft.com/office/powerpoint/2013/main/command"/>
       <pc:sldMk xmlns:pc="http://schemas.microsoft.com/office/powerpoint/2013/main/command" cId="2382032849" sldId="258"/>
@@ -163,6 +163,21 @@
       </ac:txMk>
     </ac:txMkLst>
     <p188:pos x="2956143" y="611993"/>
+    <p188:replyLst>
+      <p188:reply id="{6F5ECDDC-80EE-4C22-8A63-78DAC48C22AE}" authorId="{3666BA98-6DB4-47CA-27ED-68554259095C}" created="2022-09-14T17:46:48.622">
+        <p188:txBody>
+          <a:bodyPr/>
+          <a:lstStyle/>
+          <a:p>
+            <a:r>
+              <a:rPr lang="en-US"/>
+              <a:t>1. if need to ensure strict order GoalState pushing, then this is the Tx
+2. if out of order GoalState pushing is allowed, then Tx can be further broke down to (getVersion) and (insertToDb), and will further accelerate the server processing speed</a:t>
+            </a:r>
+          </a:p>
+        </p188:txBody>
+      </p188:reply>
+    </p188:replyLst>
     <p188:txBody>
       <a:bodyPr/>
       <a:lstStyle/>
@@ -179,7 +194,7 @@
 
 <file path=ppt/comments/modernComment_111_C34C7FD3.xml><?xml version="1.0" encoding="utf-8"?>
 <p188:cmLst xmlns:a="http://schemas.openxmlformats.org/drawingml/2006/main" xmlns:r="http://schemas.openxmlformats.org/officeDocument/2006/relationships" xmlns:p188="http://schemas.microsoft.com/office/powerpoint/2018/8/main">
-  <p188:cm id="{F58A23D2-A8E8-4F9A-AFDE-F7461C539E30}" authorId="{3666BA98-6DB4-47CA-27ED-68554259095C}" created="2022-09-13T01:44:32.138">
+  <p188:cm id="{F58A23D2-A8E8-4F9A-AFDE-F7461C539E30}" authorId="{3666BA98-6DB4-47CA-27ED-68554259095C}" status="resolved" created="2022-09-13T01:44:32.138" complete="100000">
     <pc:sldMkLst xmlns:pc="http://schemas.microsoft.com/office/powerpoint/2013/main/command">
       <pc:docMk/>
       <pc:sldMk cId="3276570579" sldId="273"/>
@@ -301,7 +316,7 @@
           <a:p>
             <a:fld id="{A86F7C5E-7CBC-4A2C-88FC-655B3F7411DD}" type="datetimeFigureOut">
               <a:rPr lang="en-US" smtClean="0"/>
-              <a:t>9/13/2022</a:t>
+              <a:t>9/14/2022</a:t>
             </a:fld>
             <a:endParaRPr lang="en-US"/>
           </a:p>
@@ -696,48 +711,7 @@
           <a:bodyPr/>
           <a:lstStyle/>
           <a:p>
-            <a:r>
-              <a:rPr lang="en-US"/>
-              <a:t>There are 2 ways to solve the ordering issue: </a:t>
-            </a:r>
-          </a:p>
-          <a:p>
-            <a:pPr marL="228600" indent="-228600">
-              <a:buAutoNum type="arabicPeriod"/>
-            </a:pPr>
-            <a:r>
-              <a:rPr lang="en-US"/>
-              <a:t>Execution queues (and a set of queues make up a thread pool) that requires hashing on key. The disadvantages are mainly two</a:t>
-            </a:r>
-          </a:p>
-          <a:p>
-            <a:pPr marL="685800" lvl="1" indent="-228600">
-              <a:buFont typeface="+mj-lt"/>
-              <a:buAutoNum type="arabicParenR"/>
-            </a:pPr>
-            <a:r>
-              <a:rPr lang="en-US"/>
-              <a:t>Threading capabilities may not be very well balanced</a:t>
-            </a:r>
-          </a:p>
-          <a:p>
-            <a:pPr marL="685800" lvl="1" indent="-228600">
-              <a:buFont typeface="+mj-lt"/>
-              <a:buAutoNum type="arabicParenR"/>
-            </a:pPr>
-            <a:r>
-              <a:rPr lang="en-US"/>
-              <a:t>Batch/bulk retry, with order. What to do with 6 failed and then execute 8, may need a status tracking cache for each key anyway. That is very close to solution #2</a:t>
-            </a:r>
-          </a:p>
-          <a:p>
-            <a:pPr marL="228600" indent="-228600">
-              <a:buAutoNum type="arabicPeriod"/>
-            </a:pPr>
-            <a:r>
-              <a:rPr lang="en-US"/>
-              <a:t>Do not put strict order on sequential tasks (as long as each task has entire states, that doesn’t require previous delta changes to be done in strict order), but let them compete</a:t>
-            </a:r>
+            <a:endParaRPr lang="en-US"/>
           </a:p>
         </p:txBody>
       </p:sp>
@@ -767,7 +741,7 @@
     </p:spTree>
     <p:extLst>
       <p:ext uri="{BB962C8B-B14F-4D97-AF65-F5344CB8AC3E}">
-        <p14:creationId xmlns:p14="http://schemas.microsoft.com/office/powerpoint/2010/main" val="3967796804"/>
+        <p14:creationId xmlns:p14="http://schemas.microsoft.com/office/powerpoint/2010/main" val="2711280477"/>
       </p:ext>
     </p:extLst>
   </p:cSld>
@@ -821,7 +795,48 @@
           <a:bodyPr/>
           <a:lstStyle/>
           <a:p>
-            <a:endParaRPr lang="en-US"/>
+            <a:r>
+              <a:rPr lang="en-US"/>
+              <a:t>There are 2 ways to solve the ordering issue: </a:t>
+            </a:r>
+          </a:p>
+          <a:p>
+            <a:pPr marL="228600" indent="-228600">
+              <a:buAutoNum type="arabicPeriod"/>
+            </a:pPr>
+            <a:r>
+              <a:rPr lang="en-US"/>
+              <a:t>Execution queues (and a set of queues make up a thread pool) that requires hashing on key. The disadvantages are mainly two</a:t>
+            </a:r>
+          </a:p>
+          <a:p>
+            <a:pPr marL="685800" lvl="1" indent="-228600">
+              <a:buFont typeface="+mj-lt"/>
+              <a:buAutoNum type="arabicParenR"/>
+            </a:pPr>
+            <a:r>
+              <a:rPr lang="en-US"/>
+              <a:t>Threading capabilities may not be very well balanced</a:t>
+            </a:r>
+          </a:p>
+          <a:p>
+            <a:pPr marL="685800" lvl="1" indent="-228600">
+              <a:buFont typeface="+mj-lt"/>
+              <a:buAutoNum type="arabicParenR"/>
+            </a:pPr>
+            <a:r>
+              <a:rPr lang="en-US"/>
+              <a:t>Batch/bulk retry, with order. What to do with 6 failed and then execute 8, may need a status tracking cache for each key anyway. That is very close to solution #2</a:t>
+            </a:r>
+          </a:p>
+          <a:p>
+            <a:pPr marL="228600" indent="-228600">
+              <a:buAutoNum type="arabicPeriod"/>
+            </a:pPr>
+            <a:r>
+              <a:rPr lang="en-US"/>
+              <a:t>Do not put strict order on sequential tasks (as long as each task has entire states, that doesn’t require previous delta changes to be done in strict order), but let them compete</a:t>
+            </a:r>
           </a:p>
         </p:txBody>
       </p:sp>
@@ -851,7 +866,7 @@
     </p:spTree>
     <p:extLst>
       <p:ext uri="{BB962C8B-B14F-4D97-AF65-F5344CB8AC3E}">
-        <p14:creationId xmlns:p14="http://schemas.microsoft.com/office/powerpoint/2010/main" val="2711280477"/>
+        <p14:creationId xmlns:p14="http://schemas.microsoft.com/office/powerpoint/2010/main" val="3967796804"/>
       </p:ext>
     </p:extLst>
   </p:cSld>
@@ -1260,7 +1275,7 @@
           <a:p>
             <a:fld id="{4313DBB7-0233-4735-A383-51E67FFBC23A}" type="datetimeFigureOut">
               <a:rPr lang="en-US" smtClean="0"/>
-              <a:t>9/13/2022</a:t>
+              <a:t>9/14/2022</a:t>
             </a:fld>
             <a:endParaRPr lang="en-US"/>
           </a:p>
@@ -1458,7 +1473,7 @@
           <a:p>
             <a:fld id="{4313DBB7-0233-4735-A383-51E67FFBC23A}" type="datetimeFigureOut">
               <a:rPr lang="en-US" smtClean="0"/>
-              <a:t>9/13/2022</a:t>
+              <a:t>9/14/2022</a:t>
             </a:fld>
             <a:endParaRPr lang="en-US"/>
           </a:p>
@@ -1666,7 +1681,7 @@
           <a:p>
             <a:fld id="{4313DBB7-0233-4735-A383-51E67FFBC23A}" type="datetimeFigureOut">
               <a:rPr lang="en-US" smtClean="0"/>
-              <a:t>9/13/2022</a:t>
+              <a:t>9/14/2022</a:t>
             </a:fld>
             <a:endParaRPr lang="en-US"/>
           </a:p>
@@ -1864,7 +1879,7 @@
           <a:p>
             <a:fld id="{4313DBB7-0233-4735-A383-51E67FFBC23A}" type="datetimeFigureOut">
               <a:rPr lang="en-US" smtClean="0"/>
-              <a:t>9/13/2022</a:t>
+              <a:t>9/14/2022</a:t>
             </a:fld>
             <a:endParaRPr lang="en-US"/>
           </a:p>
@@ -2139,7 +2154,7 @@
           <a:p>
             <a:fld id="{4313DBB7-0233-4735-A383-51E67FFBC23A}" type="datetimeFigureOut">
               <a:rPr lang="en-US" smtClean="0"/>
-              <a:t>9/13/2022</a:t>
+              <a:t>9/14/2022</a:t>
             </a:fld>
             <a:endParaRPr lang="en-US"/>
           </a:p>
@@ -2404,7 +2419,7 @@
           <a:p>
             <a:fld id="{4313DBB7-0233-4735-A383-51E67FFBC23A}" type="datetimeFigureOut">
               <a:rPr lang="en-US" smtClean="0"/>
-              <a:t>9/13/2022</a:t>
+              <a:t>9/14/2022</a:t>
             </a:fld>
             <a:endParaRPr lang="en-US"/>
           </a:p>
@@ -2816,7 +2831,7 @@
           <a:p>
             <a:fld id="{4313DBB7-0233-4735-A383-51E67FFBC23A}" type="datetimeFigureOut">
               <a:rPr lang="en-US" smtClean="0"/>
-              <a:t>9/13/2022</a:t>
+              <a:t>9/14/2022</a:t>
             </a:fld>
             <a:endParaRPr lang="en-US"/>
           </a:p>
@@ -2957,7 +2972,7 @@
           <a:p>
             <a:fld id="{4313DBB7-0233-4735-A383-51E67FFBC23A}" type="datetimeFigureOut">
               <a:rPr lang="en-US" smtClean="0"/>
-              <a:t>9/13/2022</a:t>
+              <a:t>9/14/2022</a:t>
             </a:fld>
             <a:endParaRPr lang="en-US"/>
           </a:p>
@@ -3070,7 +3085,7 @@
           <a:p>
             <a:fld id="{4313DBB7-0233-4735-A383-51E67FFBC23A}" type="datetimeFigureOut">
               <a:rPr lang="en-US" smtClean="0"/>
-              <a:t>9/13/2022</a:t>
+              <a:t>9/14/2022</a:t>
             </a:fld>
             <a:endParaRPr lang="en-US"/>
           </a:p>
@@ -3381,7 +3396,7 @@
           <a:p>
             <a:fld id="{4313DBB7-0233-4735-A383-51E67FFBC23A}" type="datetimeFigureOut">
               <a:rPr lang="en-US" smtClean="0"/>
-              <a:t>9/13/2022</a:t>
+              <a:t>9/14/2022</a:t>
             </a:fld>
             <a:endParaRPr lang="en-US"/>
           </a:p>
@@ -3669,7 +3684,7 @@
           <a:p>
             <a:fld id="{4313DBB7-0233-4735-A383-51E67FFBC23A}" type="datetimeFigureOut">
               <a:rPr lang="en-US" smtClean="0"/>
-              <a:t>9/13/2022</a:t>
+              <a:t>9/14/2022</a:t>
             </a:fld>
             <a:endParaRPr lang="en-US"/>
           </a:p>
@@ -3910,7 +3925,7 @@
           <a:p>
             <a:fld id="{4313DBB7-0233-4735-A383-51E67FFBC23A}" type="datetimeFigureOut">
               <a:rPr lang="en-US" smtClean="0"/>
-              <a:t>9/13/2022</a:t>
+              <a:t>9/14/2022</a:t>
             </a:fld>
             <a:endParaRPr lang="en-US"/>
           </a:p>
@@ -4971,7 +4986,7 @@
           <a:p>
             <a:pPr algn="ctr"/>
             <a:r>
-              <a:rPr lang="en-US" sz="800" dirty="0">
+              <a:rPr lang="en-US" sz="800">
                 <a:solidFill>
                   <a:schemeClr val="tx1"/>
                 </a:solidFill>
@@ -4982,7 +4997,7 @@
           <a:p>
             <a:pPr algn="ctr"/>
             <a:r>
-              <a:rPr lang="en-US" sz="800" dirty="0">
+              <a:rPr lang="en-US" sz="800">
                 <a:solidFill>
                   <a:schemeClr val="tx1"/>
                 </a:solidFill>
@@ -5495,22 +5510,22 @@
           <a:p>
             <a:pPr algn="ctr"/>
             <a:r>
-              <a:rPr lang="en-US" sz="1000" dirty="0"/>
+              <a:rPr lang="en-US" sz="1000"/>
               <a:t>DB </a:t>
             </a:r>
             <a:r>
-              <a:rPr lang="en-US" sz="900" dirty="0"/>
+              <a:rPr lang="en-US" sz="900"/>
               <a:t>background</a:t>
             </a:r>
-            <a:endParaRPr lang="en-US" sz="1000" dirty="0"/>
+            <a:endParaRPr lang="en-US" sz="1000"/>
           </a:p>
           <a:p>
             <a:pPr algn="ctr"/>
             <a:r>
-              <a:rPr lang="en-US" sz="1000" dirty="0"/>
+              <a:rPr lang="en-US" sz="1000"/>
               <a:t>worker</a:t>
             </a:r>
-            <a:endParaRPr lang="en-US" sz="1100" dirty="0"/>
+            <a:endParaRPr lang="en-US" sz="1100"/>
           </a:p>
         </p:txBody>
       </p:sp>
@@ -6893,7 +6908,7 @@
           <a:lstStyle/>
           <a:p>
             <a:r>
-              <a:rPr lang="en-US" sz="900" dirty="0">
+              <a:rPr lang="en-US" sz="900">
                 <a:solidFill>
                   <a:schemeClr val="tx1"/>
                 </a:solidFill>
@@ -6906,7 +6921,7 @@
               <a:buAutoNum type="arabicPeriod"/>
             </a:pPr>
             <a:r>
-              <a:rPr lang="en-US" sz="900" dirty="0" err="1">
+              <a:rPr lang="en-US" sz="900" err="1">
                 <a:solidFill>
                   <a:schemeClr val="tx1"/>
                 </a:solidFill>
@@ -6914,7 +6929,7 @@
               <a:t>syncly</a:t>
             </a:r>
             <a:r>
-              <a:rPr lang="en-US" sz="900" dirty="0">
+              <a:rPr lang="en-US" sz="900">
                 <a:solidFill>
                   <a:schemeClr val="tx1"/>
                 </a:solidFill>
@@ -6927,7 +6942,7 @@
               <a:buAutoNum type="arabicPeriod"/>
             </a:pPr>
             <a:r>
-              <a:rPr lang="en-US" sz="900" dirty="0">
+              <a:rPr lang="en-US" sz="900">
                 <a:solidFill>
                   <a:schemeClr val="tx1"/>
                 </a:solidFill>
@@ -6940,7 +6955,7 @@
               <a:buAutoNum type="arabicPeriod"/>
             </a:pPr>
             <a:r>
-              <a:rPr lang="en-US" sz="900" dirty="0" err="1">
+              <a:rPr lang="en-US" sz="900" err="1">
                 <a:solidFill>
                   <a:schemeClr val="tx1"/>
                 </a:solidFill>
@@ -6948,7 +6963,7 @@
               <a:t>syncly</a:t>
             </a:r>
             <a:r>
-              <a:rPr lang="en-US" sz="900" dirty="0">
+              <a:rPr lang="en-US" sz="900">
                 <a:solidFill>
                   <a:schemeClr val="tx1"/>
                 </a:solidFill>
@@ -6956,7 +6971,7 @@
               <a:t> invoke </a:t>
             </a:r>
             <a:r>
-              <a:rPr lang="en-US" sz="900" dirty="0" err="1">
+              <a:rPr lang="en-US" sz="900" err="1">
                 <a:solidFill>
                   <a:schemeClr val="tx1"/>
                 </a:solidFill>
@@ -6964,7 +6979,7 @@
               <a:t>eBPF</a:t>
             </a:r>
             <a:r>
-              <a:rPr lang="en-US" sz="900" dirty="0">
+              <a:rPr lang="en-US" sz="900">
                 <a:solidFill>
                   <a:schemeClr val="tx1"/>
                 </a:solidFill>
@@ -6972,7 +6987,7 @@
               <a:t> </a:t>
             </a:r>
             <a:r>
-              <a:rPr lang="en-US" sz="900" dirty="0" err="1">
+              <a:rPr lang="en-US" sz="900" err="1">
                 <a:solidFill>
                   <a:schemeClr val="tx1"/>
                 </a:solidFill>
@@ -6980,7 +6995,7 @@
               <a:t>syscall</a:t>
             </a:r>
             <a:r>
-              <a:rPr lang="en-US" sz="900" dirty="0">
+              <a:rPr lang="en-US" sz="900">
                 <a:solidFill>
                   <a:schemeClr val="tx1"/>
                 </a:solidFill>
@@ -6993,7 +7008,7 @@
               <a:buAutoNum type="arabicPeriod"/>
             </a:pPr>
             <a:r>
-              <a:rPr lang="en-US" sz="900" dirty="0">
+              <a:rPr lang="en-US" sz="900">
                 <a:solidFill>
                   <a:schemeClr val="tx1"/>
                 </a:solidFill>
@@ -7243,7 +7258,7 @@
           <a:p>
             <a:pPr algn="ctr"/>
             <a:r>
-              <a:rPr lang="en-US" sz="900" dirty="0"/>
+              <a:rPr lang="en-US" sz="900"/>
               <a:t>Concurrent HashMap</a:t>
             </a:r>
           </a:p>
@@ -8606,124 +8621,10 @@
       </p:grpSpPr>
       <p:sp>
         <p:nvSpPr>
-          <p:cNvPr id="2" name="Title 1">
-            <a:extLst>
-              <a:ext uri="{FF2B5EF4-FFF2-40B4-BE49-F238E27FC236}">
-                <a16:creationId xmlns:a16="http://schemas.microsoft.com/office/drawing/2014/main" id="{38C38483-E53A-E2BF-11E0-AFF957EF5D6A}"/>
-              </a:ext>
-            </a:extLst>
-          </p:cNvPr>
-          <p:cNvSpPr>
-            <a:spLocks noGrp="1"/>
-          </p:cNvSpPr>
-          <p:nvPr>
-            <p:ph type="title"/>
-          </p:nvPr>
-        </p:nvSpPr>
-        <p:spPr>
-          <a:xfrm>
-            <a:off x="530247" y="96746"/>
-            <a:ext cx="10515600" cy="1325563"/>
-          </a:xfrm>
-        </p:spPr>
-        <p:txBody>
-          <a:bodyPr/>
-          <a:lstStyle/>
-          <a:p>
-            <a:r>
-              <a:rPr lang="en-US"/>
-              <a:t>Concurrency and race condition</a:t>
-            </a:r>
-          </a:p>
-        </p:txBody>
-      </p:sp>
-      <p:sp>
-        <p:nvSpPr>
-          <p:cNvPr id="72" name="TextBox 71">
-            <a:extLst>
-              <a:ext uri="{FF2B5EF4-FFF2-40B4-BE49-F238E27FC236}">
-                <a16:creationId xmlns:a16="http://schemas.microsoft.com/office/drawing/2014/main" id="{9A268795-8737-CCFB-AB89-69ACA13738F7}"/>
-              </a:ext>
-            </a:extLst>
-          </p:cNvPr>
-          <p:cNvSpPr txBox="1"/>
-          <p:nvPr/>
-        </p:nvSpPr>
-        <p:spPr>
-          <a:xfrm>
-            <a:off x="7278700" y="3258365"/>
-            <a:ext cx="4172436" cy="1908215"/>
-          </a:xfrm>
-          <a:prstGeom prst="rect">
-            <a:avLst/>
-          </a:prstGeom>
-          <a:noFill/>
-        </p:spPr>
-        <p:txBody>
-          <a:bodyPr wrap="square" rtlCol="0">
-            <a:spAutoFit/>
-          </a:bodyPr>
-          <a:lstStyle/>
-          <a:p>
-            <a:r>
-              <a:rPr lang="en-US" sz="1400"/>
-              <a:t>Memory cache: lock (competition) scope, per key (means resource identifier, and for neighbor it is  VNI + </a:t>
-            </a:r>
-            <a:r>
-              <a:rPr lang="en-US" sz="1400" err="1"/>
-              <a:t>vpc_ip</a:t>
-            </a:r>
-            <a:r>
-              <a:rPr lang="en-US" sz="1400"/>
-              <a:t>)</a:t>
-            </a:r>
-          </a:p>
-          <a:p>
-            <a:pPr lvl="1"/>
-            <a:r>
-              <a:rPr lang="en-US" sz="1400">
-                <a:hlinkClick r:id="rId3"/>
-              </a:rPr>
-              <a:t>https://github.com/facebook/folly/blob/main/folly/docs/AtomicHashMap.md</a:t>
-            </a:r>
-            <a:r>
-              <a:rPr lang="en-US" sz="1400"/>
-              <a:t> </a:t>
-            </a:r>
-          </a:p>
-          <a:p>
-            <a:pPr marL="685800" lvl="1" indent="-228600">
-              <a:buFont typeface="+mj-lt"/>
-              <a:buAutoNum type="arabicPeriod"/>
-            </a:pPr>
-            <a:r>
-              <a:rPr lang="en-US" sz="1200"/>
-              <a:t>find and iteration are wait-free, insert has key-level lock granularity</a:t>
-            </a:r>
-          </a:p>
-          <a:p>
-            <a:pPr marL="685800" lvl="1" indent="-228600">
-              <a:buFont typeface="+mj-lt"/>
-              <a:buAutoNum type="arabicPeriod"/>
-            </a:pPr>
-            <a:r>
-              <a:rPr lang="en-US" sz="1200"/>
-              <a:t>only supports 32 or 64 bit keys - this is because they must be atomically compare-and-</a:t>
-            </a:r>
-            <a:r>
-              <a:rPr lang="en-US" sz="1200" err="1"/>
-              <a:t>swaped</a:t>
-            </a:r>
-            <a:endParaRPr lang="en-US" sz="1200"/>
-          </a:p>
-        </p:txBody>
-      </p:sp>
-      <p:sp>
-        <p:nvSpPr>
-          <p:cNvPr id="14" name="Rectangle: Rounded Corners 13">
-            <a:extLst>
-              <a:ext uri="{FF2B5EF4-FFF2-40B4-BE49-F238E27FC236}">
-                <a16:creationId xmlns:a16="http://schemas.microsoft.com/office/drawing/2014/main" id="{0EFAD92F-E102-0827-413A-4A9683148DAC}"/>
+          <p:cNvPr id="5" name="Rectangle: Rounded Corners 4">
+            <a:extLst>
+              <a:ext uri="{FF2B5EF4-FFF2-40B4-BE49-F238E27FC236}">
+                <a16:creationId xmlns:a16="http://schemas.microsoft.com/office/drawing/2014/main" id="{44C2F6E4-68E8-7BD3-9AA0-3FC6A0F86D05}"/>
               </a:ext>
             </a:extLst>
           </p:cNvPr>
@@ -8732,8 +8633,8 @@
         </p:nvSpPr>
         <p:spPr>
           <a:xfrm>
-            <a:off x="164461" y="2727510"/>
-            <a:ext cx="6541140" cy="4033744"/>
+            <a:off x="107311" y="2727510"/>
+            <a:ext cx="6369690" cy="4033744"/>
           </a:xfrm>
           <a:prstGeom prst="roundRect">
             <a:avLst/>
@@ -8918,10 +8819,10 @@
       </p:sp>
       <p:sp>
         <p:nvSpPr>
-          <p:cNvPr id="17" name="Rectangle: Rounded Corners 16">
-            <a:extLst>
-              <a:ext uri="{FF2B5EF4-FFF2-40B4-BE49-F238E27FC236}">
-                <a16:creationId xmlns:a16="http://schemas.microsoft.com/office/drawing/2014/main" id="{042EA16B-B4AC-B87F-77A1-3AE13CDAB5B9}"/>
+          <p:cNvPr id="7" name="Rectangle: Rounded Corners 6">
+            <a:extLst>
+              <a:ext uri="{FF2B5EF4-FFF2-40B4-BE49-F238E27FC236}">
+                <a16:creationId xmlns:a16="http://schemas.microsoft.com/office/drawing/2014/main" id="{958AB707-D515-1EAF-A3C9-6C726169C230}"/>
               </a:ext>
             </a:extLst>
           </p:cNvPr>
@@ -8930,8 +8831,8 @@
         </p:nvSpPr>
         <p:spPr>
           <a:xfrm>
-            <a:off x="340716" y="2727509"/>
-            <a:ext cx="6212484" cy="3195009"/>
+            <a:off x="283566" y="2727509"/>
+            <a:ext cx="6000953" cy="3195009"/>
           </a:xfrm>
           <a:prstGeom prst="roundRect">
             <a:avLst/>
@@ -9068,10 +8969,10 @@
       </p:sp>
       <p:sp>
         <p:nvSpPr>
-          <p:cNvPr id="22" name="Rectangle: Rounded Corners 21">
-            <a:extLst>
-              <a:ext uri="{FF2B5EF4-FFF2-40B4-BE49-F238E27FC236}">
-                <a16:creationId xmlns:a16="http://schemas.microsoft.com/office/drawing/2014/main" id="{7FD54D54-FD94-014F-4DA9-A90DACF52365}"/>
+          <p:cNvPr id="8" name="Rectangle: Rounded Corners 7">
+            <a:extLst>
+              <a:ext uri="{FF2B5EF4-FFF2-40B4-BE49-F238E27FC236}">
+                <a16:creationId xmlns:a16="http://schemas.microsoft.com/office/drawing/2014/main" id="{E9479206-2B6F-61B5-11FD-2AEA536AB0F8}"/>
               </a:ext>
             </a:extLst>
           </p:cNvPr>
@@ -9080,7 +8981,7 @@
         </p:nvSpPr>
         <p:spPr>
           <a:xfrm>
-            <a:off x="1600399" y="6252383"/>
+            <a:off x="1543249" y="6252383"/>
             <a:ext cx="898618" cy="295271"/>
           </a:xfrm>
           <a:prstGeom prst="roundRect">
@@ -9132,10 +9033,10 @@
       </p:sp>
       <p:sp>
         <p:nvSpPr>
-          <p:cNvPr id="23" name="Cylinder 22">
-            <a:extLst>
-              <a:ext uri="{FF2B5EF4-FFF2-40B4-BE49-F238E27FC236}">
-                <a16:creationId xmlns:a16="http://schemas.microsoft.com/office/drawing/2014/main" id="{C2CE633F-782B-6076-54E0-8C50CEF41A4A}"/>
+          <p:cNvPr id="13" name="Cylinder 12">
+            <a:extLst>
+              <a:ext uri="{FF2B5EF4-FFF2-40B4-BE49-F238E27FC236}">
+                <a16:creationId xmlns:a16="http://schemas.microsoft.com/office/drawing/2014/main" id="{195748CA-E231-A0B8-1080-B97D02CFDBC8}"/>
               </a:ext>
             </a:extLst>
           </p:cNvPr>
@@ -9144,7 +9045,7 @@
         </p:nvSpPr>
         <p:spPr>
           <a:xfrm>
-            <a:off x="4926194" y="6217790"/>
+            <a:off x="4869044" y="6217790"/>
             <a:ext cx="1307067" cy="364459"/>
           </a:xfrm>
           <a:prstGeom prst="can">
@@ -9196,10 +9097,10 @@
       </p:sp>
       <p:sp>
         <p:nvSpPr>
-          <p:cNvPr id="24" name="Oval 23">
-            <a:extLst>
-              <a:ext uri="{FF2B5EF4-FFF2-40B4-BE49-F238E27FC236}">
-                <a16:creationId xmlns:a16="http://schemas.microsoft.com/office/drawing/2014/main" id="{94C0A6A7-1A8F-ED07-669C-0EB3544C5C75}"/>
+          <p:cNvPr id="14" name="Oval 13">
+            <a:extLst>
+              <a:ext uri="{FF2B5EF4-FFF2-40B4-BE49-F238E27FC236}">
+                <a16:creationId xmlns:a16="http://schemas.microsoft.com/office/drawing/2014/main" id="{58119580-8723-C375-DABE-F80474FD1677}"/>
               </a:ext>
             </a:extLst>
           </p:cNvPr>
@@ -9208,7 +9109,7 @@
         </p:nvSpPr>
         <p:spPr>
           <a:xfrm>
-            <a:off x="863342" y="3830773"/>
+            <a:off x="806192" y="3830773"/>
             <a:ext cx="716856" cy="605600"/>
           </a:xfrm>
           <a:prstGeom prst="ellipse">
@@ -9266,10 +9167,10 @@
       </p:sp>
       <p:sp>
         <p:nvSpPr>
-          <p:cNvPr id="25" name="Oval 24">
-            <a:extLst>
-              <a:ext uri="{FF2B5EF4-FFF2-40B4-BE49-F238E27FC236}">
-                <a16:creationId xmlns:a16="http://schemas.microsoft.com/office/drawing/2014/main" id="{58A64855-BB00-BC84-E8E4-9ED9605A78CB}"/>
+          <p:cNvPr id="15" name="Oval 14">
+            <a:extLst>
+              <a:ext uri="{FF2B5EF4-FFF2-40B4-BE49-F238E27FC236}">
+                <a16:creationId xmlns:a16="http://schemas.microsoft.com/office/drawing/2014/main" id="{77CBCC49-35DC-9D18-7EF6-70E1016EAF0E}"/>
               </a:ext>
             </a:extLst>
           </p:cNvPr>
@@ -9278,7 +9179,7 @@
         </p:nvSpPr>
         <p:spPr>
           <a:xfrm>
-            <a:off x="3681571" y="2821640"/>
+            <a:off x="3624421" y="2821640"/>
             <a:ext cx="1046319" cy="517864"/>
           </a:xfrm>
           <a:prstGeom prst="ellipse">
@@ -9318,10 +9219,10 @@
       </p:sp>
       <p:sp>
         <p:nvSpPr>
-          <p:cNvPr id="26" name="Rectangle 25">
-            <a:extLst>
-              <a:ext uri="{FF2B5EF4-FFF2-40B4-BE49-F238E27FC236}">
-                <a16:creationId xmlns:a16="http://schemas.microsoft.com/office/drawing/2014/main" id="{93E39FAF-82BF-40AB-25DF-4C339661D5D6}"/>
+          <p:cNvPr id="16" name="Rectangle 15">
+            <a:extLst>
+              <a:ext uri="{FF2B5EF4-FFF2-40B4-BE49-F238E27FC236}">
+                <a16:creationId xmlns:a16="http://schemas.microsoft.com/office/drawing/2014/main" id="{34830680-9E8D-005F-C442-A64F289322A2}"/>
               </a:ext>
             </a:extLst>
           </p:cNvPr>
@@ -9330,7 +9231,7 @@
         </p:nvSpPr>
         <p:spPr>
           <a:xfrm>
-            <a:off x="4416910" y="5341671"/>
+            <a:off x="4359760" y="5341671"/>
             <a:ext cx="129654" cy="141761"/>
           </a:xfrm>
           <a:prstGeom prst="rect">
@@ -9367,10 +9268,10 @@
       </p:sp>
       <p:sp>
         <p:nvSpPr>
-          <p:cNvPr id="27" name="Rectangle 26">
-            <a:extLst>
-              <a:ext uri="{FF2B5EF4-FFF2-40B4-BE49-F238E27FC236}">
-                <a16:creationId xmlns:a16="http://schemas.microsoft.com/office/drawing/2014/main" id="{96C6BD28-E3ED-E606-2636-54842BAF2108}"/>
+          <p:cNvPr id="17" name="Rectangle 16">
+            <a:extLst>
+              <a:ext uri="{FF2B5EF4-FFF2-40B4-BE49-F238E27FC236}">
+                <a16:creationId xmlns:a16="http://schemas.microsoft.com/office/drawing/2014/main" id="{ED4A1AB3-E634-CB2C-E4F0-5D24D6961E7D}"/>
               </a:ext>
             </a:extLst>
           </p:cNvPr>
@@ -9379,7 +9280,7 @@
         </p:nvSpPr>
         <p:spPr>
           <a:xfrm>
-            <a:off x="4546564" y="5341671"/>
+            <a:off x="4489414" y="5341671"/>
             <a:ext cx="129654" cy="141761"/>
           </a:xfrm>
           <a:prstGeom prst="rect">
@@ -9416,10 +9317,10 @@
       </p:sp>
       <p:sp>
         <p:nvSpPr>
-          <p:cNvPr id="28" name="Rectangle 27">
-            <a:extLst>
-              <a:ext uri="{FF2B5EF4-FFF2-40B4-BE49-F238E27FC236}">
-                <a16:creationId xmlns:a16="http://schemas.microsoft.com/office/drawing/2014/main" id="{C1383AD6-D9A4-FEE6-5675-A5F6156A3593}"/>
+          <p:cNvPr id="18" name="Rectangle 17">
+            <a:extLst>
+              <a:ext uri="{FF2B5EF4-FFF2-40B4-BE49-F238E27FC236}">
+                <a16:creationId xmlns:a16="http://schemas.microsoft.com/office/drawing/2014/main" id="{FBF62025-8990-CE38-CE37-2B444E58DE2C}"/>
               </a:ext>
             </a:extLst>
           </p:cNvPr>
@@ -9428,7 +9329,7 @@
         </p:nvSpPr>
         <p:spPr>
           <a:xfrm>
-            <a:off x="4673938" y="5341671"/>
+            <a:off x="4616788" y="5341671"/>
             <a:ext cx="129654" cy="141761"/>
           </a:xfrm>
           <a:prstGeom prst="rect">
@@ -9465,10 +9366,10 @@
       </p:sp>
       <p:sp>
         <p:nvSpPr>
-          <p:cNvPr id="29" name="Rectangle 28">
-            <a:extLst>
-              <a:ext uri="{FF2B5EF4-FFF2-40B4-BE49-F238E27FC236}">
-                <a16:creationId xmlns:a16="http://schemas.microsoft.com/office/drawing/2014/main" id="{CDF40F64-A0F2-4F82-4616-58C67582C6F2}"/>
+          <p:cNvPr id="19" name="Rectangle 18">
+            <a:extLst>
+              <a:ext uri="{FF2B5EF4-FFF2-40B4-BE49-F238E27FC236}">
+                <a16:creationId xmlns:a16="http://schemas.microsoft.com/office/drawing/2014/main" id="{091FB807-EE18-CE4A-64BC-5388F12BFB63}"/>
               </a:ext>
             </a:extLst>
           </p:cNvPr>
@@ -9477,7 +9378,7 @@
         </p:nvSpPr>
         <p:spPr>
           <a:xfrm>
-            <a:off x="4797900" y="5341671"/>
+            <a:off x="4740750" y="5341671"/>
             <a:ext cx="129654" cy="141761"/>
           </a:xfrm>
           <a:prstGeom prst="rect">
@@ -9514,10 +9415,10 @@
       </p:sp>
       <p:sp>
         <p:nvSpPr>
-          <p:cNvPr id="30" name="Rectangle 29">
-            <a:extLst>
-              <a:ext uri="{FF2B5EF4-FFF2-40B4-BE49-F238E27FC236}">
-                <a16:creationId xmlns:a16="http://schemas.microsoft.com/office/drawing/2014/main" id="{7A328CF4-7F2D-B190-E0AE-D5967785561B}"/>
+          <p:cNvPr id="20" name="Rectangle 19">
+            <a:extLst>
+              <a:ext uri="{FF2B5EF4-FFF2-40B4-BE49-F238E27FC236}">
+                <a16:creationId xmlns:a16="http://schemas.microsoft.com/office/drawing/2014/main" id="{632D6467-1E25-4D57-3654-6D2A91BA92C6}"/>
               </a:ext>
             </a:extLst>
           </p:cNvPr>
@@ -9526,7 +9427,7 @@
         </p:nvSpPr>
         <p:spPr>
           <a:xfrm>
-            <a:off x="4926701" y="5341671"/>
+            <a:off x="4869551" y="5341671"/>
             <a:ext cx="129654" cy="141761"/>
           </a:xfrm>
           <a:prstGeom prst="rect">
@@ -9563,10 +9464,10 @@
       </p:sp>
       <p:sp>
         <p:nvSpPr>
-          <p:cNvPr id="31" name="Rectangle 30">
-            <a:extLst>
-              <a:ext uri="{FF2B5EF4-FFF2-40B4-BE49-F238E27FC236}">
-                <a16:creationId xmlns:a16="http://schemas.microsoft.com/office/drawing/2014/main" id="{0243E3A7-6EF7-20D8-4F3C-AD44D8D2F6BC}"/>
+          <p:cNvPr id="21" name="Rectangle 20">
+            <a:extLst>
+              <a:ext uri="{FF2B5EF4-FFF2-40B4-BE49-F238E27FC236}">
+                <a16:creationId xmlns:a16="http://schemas.microsoft.com/office/drawing/2014/main" id="{33FD66D4-39C6-6AF6-8FC6-9C2DBAFFA5E5}"/>
               </a:ext>
             </a:extLst>
           </p:cNvPr>
@@ -9575,7 +9476,7 @@
         </p:nvSpPr>
         <p:spPr>
           <a:xfrm>
-            <a:off x="5055786" y="5341671"/>
+            <a:off x="4998636" y="5341671"/>
             <a:ext cx="129654" cy="141761"/>
           </a:xfrm>
           <a:prstGeom prst="rect">
@@ -9612,10 +9513,10 @@
       </p:sp>
       <p:sp>
         <p:nvSpPr>
-          <p:cNvPr id="33" name="Rectangle: Rounded Corners 32">
-            <a:extLst>
-              <a:ext uri="{FF2B5EF4-FFF2-40B4-BE49-F238E27FC236}">
-                <a16:creationId xmlns:a16="http://schemas.microsoft.com/office/drawing/2014/main" id="{DF956A12-D5F4-605B-F973-3B7492069539}"/>
+          <p:cNvPr id="22" name="Rectangle: Rounded Corners 21">
+            <a:extLst>
+              <a:ext uri="{FF2B5EF4-FFF2-40B4-BE49-F238E27FC236}">
+                <a16:creationId xmlns:a16="http://schemas.microsoft.com/office/drawing/2014/main" id="{3C9FEA34-87F7-ED32-B550-F43CEFD3ADA2}"/>
               </a:ext>
             </a:extLst>
           </p:cNvPr>
@@ -9624,7 +9525,7 @@
         </p:nvSpPr>
         <p:spPr>
           <a:xfrm>
-            <a:off x="3243868" y="1680753"/>
+            <a:off x="3186718" y="1680753"/>
             <a:ext cx="1914077" cy="525465"/>
           </a:xfrm>
           <a:prstGeom prst="roundRect">
@@ -9671,10 +9572,10 @@
       </p:sp>
       <p:sp>
         <p:nvSpPr>
-          <p:cNvPr id="35" name="Oval 34">
-            <a:extLst>
-              <a:ext uri="{FF2B5EF4-FFF2-40B4-BE49-F238E27FC236}">
-                <a16:creationId xmlns:a16="http://schemas.microsoft.com/office/drawing/2014/main" id="{07074D8F-0A83-651C-E258-8CB36E167CA8}"/>
+          <p:cNvPr id="23" name="Oval 22">
+            <a:extLst>
+              <a:ext uri="{FF2B5EF4-FFF2-40B4-BE49-F238E27FC236}">
+                <a16:creationId xmlns:a16="http://schemas.microsoft.com/office/drawing/2014/main" id="{E44C7003-DB9D-C142-0BBB-8C1FAC84E43B}"/>
               </a:ext>
             </a:extLst>
           </p:cNvPr>
@@ -9683,7 +9584,7 @@
         </p:nvSpPr>
         <p:spPr>
           <a:xfrm>
-            <a:off x="3842505" y="2595957"/>
+            <a:off x="3785355" y="2595957"/>
             <a:ext cx="240512" cy="179637"/>
           </a:xfrm>
           <a:prstGeom prst="ellipse">
@@ -9723,10 +9624,10 @@
       </p:sp>
       <p:sp>
         <p:nvSpPr>
-          <p:cNvPr id="37" name="Oval 36">
-            <a:extLst>
-              <a:ext uri="{FF2B5EF4-FFF2-40B4-BE49-F238E27FC236}">
-                <a16:creationId xmlns:a16="http://schemas.microsoft.com/office/drawing/2014/main" id="{23C6675F-2A94-D9C7-BE69-6CFC8DFA99E3}"/>
+          <p:cNvPr id="24" name="Oval 23">
+            <a:extLst>
+              <a:ext uri="{FF2B5EF4-FFF2-40B4-BE49-F238E27FC236}">
+                <a16:creationId xmlns:a16="http://schemas.microsoft.com/office/drawing/2014/main" id="{0AEACA3F-51A8-EEBB-2128-389907F0B379}"/>
               </a:ext>
             </a:extLst>
           </p:cNvPr>
@@ -9735,7 +9636,7 @@
         </p:nvSpPr>
         <p:spPr>
           <a:xfrm>
-            <a:off x="5092091" y="5037437"/>
+            <a:off x="5034941" y="5037437"/>
             <a:ext cx="1047562" cy="775514"/>
           </a:xfrm>
           <a:prstGeom prst="ellipse">
@@ -9788,10 +9689,10 @@
       </p:sp>
       <p:sp>
         <p:nvSpPr>
-          <p:cNvPr id="38" name="Rectangle 37">
-            <a:extLst>
-              <a:ext uri="{FF2B5EF4-FFF2-40B4-BE49-F238E27FC236}">
-                <a16:creationId xmlns:a16="http://schemas.microsoft.com/office/drawing/2014/main" id="{1D9ED6A7-9759-A88D-7F62-644B4B17733A}"/>
+          <p:cNvPr id="25" name="Rectangle 24">
+            <a:extLst>
+              <a:ext uri="{FF2B5EF4-FFF2-40B4-BE49-F238E27FC236}">
+                <a16:creationId xmlns:a16="http://schemas.microsoft.com/office/drawing/2014/main" id="{DD007557-97DE-F72A-CB08-8B4D12B1869C}"/>
               </a:ext>
             </a:extLst>
           </p:cNvPr>
@@ -9800,7 +9701,7 @@
         </p:nvSpPr>
         <p:spPr>
           <a:xfrm>
-            <a:off x="2209267" y="3511775"/>
+            <a:off x="2152117" y="3511775"/>
             <a:ext cx="129654" cy="141761"/>
           </a:xfrm>
           <a:prstGeom prst="rect">
@@ -9837,10 +9738,10 @@
       </p:sp>
       <p:sp>
         <p:nvSpPr>
-          <p:cNvPr id="39" name="Rectangle 38">
-            <a:extLst>
-              <a:ext uri="{FF2B5EF4-FFF2-40B4-BE49-F238E27FC236}">
-                <a16:creationId xmlns:a16="http://schemas.microsoft.com/office/drawing/2014/main" id="{AAD23C9F-8560-A83D-92E3-61230B903CF4}"/>
+          <p:cNvPr id="26" name="Rectangle 25">
+            <a:extLst>
+              <a:ext uri="{FF2B5EF4-FFF2-40B4-BE49-F238E27FC236}">
+                <a16:creationId xmlns:a16="http://schemas.microsoft.com/office/drawing/2014/main" id="{416DEFE2-55F4-FA38-8D46-C259E8CF8B55}"/>
               </a:ext>
             </a:extLst>
           </p:cNvPr>
@@ -9849,7 +9750,7 @@
         </p:nvSpPr>
         <p:spPr>
           <a:xfrm>
-            <a:off x="2338921" y="3511775"/>
+            <a:off x="2281771" y="3511775"/>
             <a:ext cx="129654" cy="141761"/>
           </a:xfrm>
           <a:prstGeom prst="rect">
@@ -9886,10 +9787,10 @@
       </p:sp>
       <p:sp>
         <p:nvSpPr>
-          <p:cNvPr id="40" name="Rectangle 39">
-            <a:extLst>
-              <a:ext uri="{FF2B5EF4-FFF2-40B4-BE49-F238E27FC236}">
-                <a16:creationId xmlns:a16="http://schemas.microsoft.com/office/drawing/2014/main" id="{D55433D1-233A-8D0A-8E89-0ED7CF2DCAD3}"/>
+          <p:cNvPr id="27" name="Rectangle 26">
+            <a:extLst>
+              <a:ext uri="{FF2B5EF4-FFF2-40B4-BE49-F238E27FC236}">
+                <a16:creationId xmlns:a16="http://schemas.microsoft.com/office/drawing/2014/main" id="{3321F7FA-6BAD-AFF6-4534-648F680A505B}"/>
               </a:ext>
             </a:extLst>
           </p:cNvPr>
@@ -9898,7 +9799,7 @@
         </p:nvSpPr>
         <p:spPr>
           <a:xfrm>
-            <a:off x="2466295" y="3511775"/>
+            <a:off x="2409145" y="3511775"/>
             <a:ext cx="129654" cy="141761"/>
           </a:xfrm>
           <a:prstGeom prst="rect">
@@ -9935,10 +9836,10 @@
       </p:sp>
       <p:sp>
         <p:nvSpPr>
-          <p:cNvPr id="41" name="Rectangle 40">
-            <a:extLst>
-              <a:ext uri="{FF2B5EF4-FFF2-40B4-BE49-F238E27FC236}">
-                <a16:creationId xmlns:a16="http://schemas.microsoft.com/office/drawing/2014/main" id="{5940950F-5CD2-7A2F-FADD-00B46B542E2F}"/>
+          <p:cNvPr id="28" name="Rectangle 27">
+            <a:extLst>
+              <a:ext uri="{FF2B5EF4-FFF2-40B4-BE49-F238E27FC236}">
+                <a16:creationId xmlns:a16="http://schemas.microsoft.com/office/drawing/2014/main" id="{6ABC7C86-7C59-C986-B005-7B26D26A4262}"/>
               </a:ext>
             </a:extLst>
           </p:cNvPr>
@@ -9947,7 +9848,7 @@
         </p:nvSpPr>
         <p:spPr>
           <a:xfrm>
-            <a:off x="2597081" y="3511775"/>
+            <a:off x="2539931" y="3511775"/>
             <a:ext cx="129654" cy="141761"/>
           </a:xfrm>
           <a:prstGeom prst="rect">
@@ -9984,10 +9885,10 @@
       </p:sp>
       <p:sp>
         <p:nvSpPr>
-          <p:cNvPr id="42" name="Rectangle 41">
-            <a:extLst>
-              <a:ext uri="{FF2B5EF4-FFF2-40B4-BE49-F238E27FC236}">
-                <a16:creationId xmlns:a16="http://schemas.microsoft.com/office/drawing/2014/main" id="{210F4086-9188-36F0-1E9D-DF83511F6DD7}"/>
+          <p:cNvPr id="29" name="Rectangle 28">
+            <a:extLst>
+              <a:ext uri="{FF2B5EF4-FFF2-40B4-BE49-F238E27FC236}">
+                <a16:creationId xmlns:a16="http://schemas.microsoft.com/office/drawing/2014/main" id="{61E4B796-5243-A652-C05F-3F78649CF87E}"/>
               </a:ext>
             </a:extLst>
           </p:cNvPr>
@@ -9996,7 +9897,7 @@
         </p:nvSpPr>
         <p:spPr>
           <a:xfrm>
-            <a:off x="2725882" y="3511775"/>
+            <a:off x="2668732" y="3511775"/>
             <a:ext cx="129654" cy="141761"/>
           </a:xfrm>
           <a:prstGeom prst="rect">
@@ -10033,10 +9934,10 @@
       </p:sp>
       <p:sp>
         <p:nvSpPr>
-          <p:cNvPr id="43" name="Rectangle 42">
-            <a:extLst>
-              <a:ext uri="{FF2B5EF4-FFF2-40B4-BE49-F238E27FC236}">
-                <a16:creationId xmlns:a16="http://schemas.microsoft.com/office/drawing/2014/main" id="{49FD9561-A974-24A1-B44F-A8A9B3FE527A}"/>
+          <p:cNvPr id="30" name="Rectangle 29">
+            <a:extLst>
+              <a:ext uri="{FF2B5EF4-FFF2-40B4-BE49-F238E27FC236}">
+                <a16:creationId xmlns:a16="http://schemas.microsoft.com/office/drawing/2014/main" id="{82E7E3DD-9654-DB19-8E5A-31802A51439B}"/>
               </a:ext>
             </a:extLst>
           </p:cNvPr>
@@ -10045,7 +9946,7 @@
         </p:nvSpPr>
         <p:spPr>
           <a:xfrm>
-            <a:off x="2854967" y="3511775"/>
+            <a:off x="2797817" y="3511775"/>
             <a:ext cx="129654" cy="141761"/>
           </a:xfrm>
           <a:prstGeom prst="rect">
@@ -10082,23 +9983,23 @@
       </p:sp>
       <p:cxnSp>
         <p:nvCxnSpPr>
-          <p:cNvPr id="48" name="Connector: Curved 47">
-            <a:extLst>
-              <a:ext uri="{FF2B5EF4-FFF2-40B4-BE49-F238E27FC236}">
-                <a16:creationId xmlns:a16="http://schemas.microsoft.com/office/drawing/2014/main" id="{ABCCE4A8-71C8-B2AF-BB6A-8192CCB30578}"/>
+          <p:cNvPr id="35" name="Connector: Curved 34">
+            <a:extLst>
+              <a:ext uri="{FF2B5EF4-FFF2-40B4-BE49-F238E27FC236}">
+                <a16:creationId xmlns:a16="http://schemas.microsoft.com/office/drawing/2014/main" id="{75AC238C-9DB7-1CAC-992A-D69E944B6929}"/>
               </a:ext>
             </a:extLst>
           </p:cNvPr>
           <p:cNvCxnSpPr>
             <a:cxnSpLocks/>
-            <a:stCxn id="43" idx="3"/>
-            <a:endCxn id="55" idx="7"/>
+            <a:stCxn id="30" idx="3"/>
+            <a:endCxn id="40" idx="7"/>
           </p:cNvCxnSpPr>
           <p:nvPr/>
         </p:nvCxnSpPr>
         <p:spPr>
           <a:xfrm flipH="1">
-            <a:off x="2153297" y="3582656"/>
+            <a:off x="2096147" y="3582656"/>
             <a:ext cx="831324" cy="341364"/>
           </a:xfrm>
           <a:prstGeom prst="curvedConnector4">
@@ -10128,10 +10029,10 @@
       </p:cxnSp>
       <p:sp>
         <p:nvSpPr>
-          <p:cNvPr id="54" name="TextBox 53">
-            <a:extLst>
-              <a:ext uri="{FF2B5EF4-FFF2-40B4-BE49-F238E27FC236}">
-                <a16:creationId xmlns:a16="http://schemas.microsoft.com/office/drawing/2014/main" id="{795D1CDB-97CC-E8CF-174E-2B92542DF915}"/>
+          <p:cNvPr id="39" name="TextBox 38">
+            <a:extLst>
+              <a:ext uri="{FF2B5EF4-FFF2-40B4-BE49-F238E27FC236}">
+                <a16:creationId xmlns:a16="http://schemas.microsoft.com/office/drawing/2014/main" id="{44685D72-24A5-076E-76C0-058258D5C108}"/>
               </a:ext>
             </a:extLst>
           </p:cNvPr>
@@ -10140,7 +10041,7 @@
         </p:nvSpPr>
         <p:spPr>
           <a:xfrm>
-            <a:off x="1980057" y="3272496"/>
+            <a:off x="1922907" y="3272496"/>
             <a:ext cx="1532792" cy="261610"/>
           </a:xfrm>
           <a:prstGeom prst="rect">
@@ -10163,10 +10064,10 @@
       </p:sp>
       <p:sp>
         <p:nvSpPr>
-          <p:cNvPr id="55" name="Oval 54">
-            <a:extLst>
-              <a:ext uri="{FF2B5EF4-FFF2-40B4-BE49-F238E27FC236}">
-                <a16:creationId xmlns:a16="http://schemas.microsoft.com/office/drawing/2014/main" id="{76DA817B-7DAB-F1C0-CAAD-3052432F068B}"/>
+          <p:cNvPr id="40" name="Oval 39">
+            <a:extLst>
+              <a:ext uri="{FF2B5EF4-FFF2-40B4-BE49-F238E27FC236}">
+                <a16:creationId xmlns:a16="http://schemas.microsoft.com/office/drawing/2014/main" id="{3F0A6773-0413-9B27-ABAC-CBEAFF455EC6}"/>
               </a:ext>
             </a:extLst>
           </p:cNvPr>
@@ -10175,7 +10076,7 @@
         </p:nvSpPr>
         <p:spPr>
           <a:xfrm>
-            <a:off x="1541422" y="3837221"/>
+            <a:off x="1484272" y="3837221"/>
             <a:ext cx="716856" cy="592704"/>
           </a:xfrm>
           <a:prstGeom prst="ellipse">
@@ -10233,23 +10134,23 @@
       </p:sp>
       <p:cxnSp>
         <p:nvCxnSpPr>
-          <p:cNvPr id="58" name="Connector: Curved 57">
-            <a:extLst>
-              <a:ext uri="{FF2B5EF4-FFF2-40B4-BE49-F238E27FC236}">
-                <a16:creationId xmlns:a16="http://schemas.microsoft.com/office/drawing/2014/main" id="{0F115B42-0A77-4E83-1D0A-4BE37C14FF98}"/>
+          <p:cNvPr id="43" name="Connector: Curved 42">
+            <a:extLst>
+              <a:ext uri="{FF2B5EF4-FFF2-40B4-BE49-F238E27FC236}">
+                <a16:creationId xmlns:a16="http://schemas.microsoft.com/office/drawing/2014/main" id="{CCD051D7-0E60-9379-9295-BE7175E43099}"/>
               </a:ext>
             </a:extLst>
           </p:cNvPr>
           <p:cNvCxnSpPr>
             <a:cxnSpLocks/>
-            <a:stCxn id="64" idx="3"/>
-            <a:endCxn id="22" idx="0"/>
+            <a:stCxn id="49" idx="3"/>
+            <a:endCxn id="8" idx="0"/>
           </p:cNvCxnSpPr>
           <p:nvPr/>
         </p:nvCxnSpPr>
         <p:spPr>
           <a:xfrm flipH="1">
-            <a:off x="2049708" y="5010660"/>
+            <a:off x="1992558" y="5010660"/>
             <a:ext cx="1194160" cy="1241723"/>
           </a:xfrm>
           <a:prstGeom prst="curvedConnector4">
@@ -10280,22 +10181,22 @@
       </p:cxnSp>
       <p:cxnSp>
         <p:nvCxnSpPr>
-          <p:cNvPr id="59" name="Straight Arrow Connector 58">
-            <a:extLst>
-              <a:ext uri="{FF2B5EF4-FFF2-40B4-BE49-F238E27FC236}">
-                <a16:creationId xmlns:a16="http://schemas.microsoft.com/office/drawing/2014/main" id="{AC579D30-D0D2-758A-4C82-754891336E0B}"/>
+          <p:cNvPr id="44" name="Straight Arrow Connector 43">
+            <a:extLst>
+              <a:ext uri="{FF2B5EF4-FFF2-40B4-BE49-F238E27FC236}">
+                <a16:creationId xmlns:a16="http://schemas.microsoft.com/office/drawing/2014/main" id="{8601FF43-4FC5-0D87-904B-D57B10E7C3E5}"/>
               </a:ext>
             </a:extLst>
           </p:cNvPr>
           <p:cNvCxnSpPr>
-            <a:stCxn id="33" idx="2"/>
-            <a:endCxn id="25" idx="0"/>
+            <a:stCxn id="22" idx="2"/>
+            <a:endCxn id="15" idx="0"/>
           </p:cNvCxnSpPr>
           <p:nvPr/>
         </p:nvCxnSpPr>
         <p:spPr>
           <a:xfrm>
-            <a:off x="4200907" y="2206218"/>
+            <a:off x="4143757" y="2206218"/>
             <a:ext cx="3824" cy="615422"/>
           </a:xfrm>
           <a:prstGeom prst="straightConnector1">
@@ -10322,10 +10223,10 @@
       </p:cxnSp>
       <p:sp>
         <p:nvSpPr>
-          <p:cNvPr id="60" name="Oval 59">
-            <a:extLst>
-              <a:ext uri="{FF2B5EF4-FFF2-40B4-BE49-F238E27FC236}">
-                <a16:creationId xmlns:a16="http://schemas.microsoft.com/office/drawing/2014/main" id="{FAF2F02A-0BB7-8A22-E728-184CA7A121D4}"/>
+          <p:cNvPr id="45" name="Oval 44">
+            <a:extLst>
+              <a:ext uri="{FF2B5EF4-FFF2-40B4-BE49-F238E27FC236}">
+                <a16:creationId xmlns:a16="http://schemas.microsoft.com/office/drawing/2014/main" id="{DD3543BE-5730-B0B8-1A6C-CCFD7625A87E}"/>
               </a:ext>
             </a:extLst>
           </p:cNvPr>
@@ -10334,7 +10235,7 @@
         </p:nvSpPr>
         <p:spPr>
           <a:xfrm>
-            <a:off x="3882118" y="2443931"/>
+            <a:off x="3824968" y="2443931"/>
             <a:ext cx="240512" cy="179637"/>
           </a:xfrm>
           <a:prstGeom prst="ellipse">
@@ -10374,10 +10275,10 @@
       </p:sp>
       <p:sp>
         <p:nvSpPr>
-          <p:cNvPr id="61" name="Oval 60">
-            <a:extLst>
-              <a:ext uri="{FF2B5EF4-FFF2-40B4-BE49-F238E27FC236}">
-                <a16:creationId xmlns:a16="http://schemas.microsoft.com/office/drawing/2014/main" id="{9FD3FB3C-928D-0F9E-54E8-5BC00EE7C632}"/>
+          <p:cNvPr id="46" name="Oval 45">
+            <a:extLst>
+              <a:ext uri="{FF2B5EF4-FFF2-40B4-BE49-F238E27FC236}">
+                <a16:creationId xmlns:a16="http://schemas.microsoft.com/office/drawing/2014/main" id="{BC839444-C3A9-8E70-D46B-E4758B551D87}"/>
               </a:ext>
             </a:extLst>
           </p:cNvPr>
@@ -10386,7 +10287,7 @@
         </p:nvSpPr>
         <p:spPr>
           <a:xfrm>
-            <a:off x="3916612" y="2290895"/>
+            <a:off x="3859462" y="2290895"/>
             <a:ext cx="240512" cy="179637"/>
           </a:xfrm>
           <a:prstGeom prst="ellipse">
@@ -10426,22 +10327,22 @@
       </p:sp>
       <p:cxnSp>
         <p:nvCxnSpPr>
-          <p:cNvPr id="62" name="Connector: Curved 61">
-            <a:extLst>
-              <a:ext uri="{FF2B5EF4-FFF2-40B4-BE49-F238E27FC236}">
-                <a16:creationId xmlns:a16="http://schemas.microsoft.com/office/drawing/2014/main" id="{F077AB1D-979F-ACE1-00F4-1A1CEAF9B7BA}"/>
+          <p:cNvPr id="47" name="Connector: Curved 46">
+            <a:extLst>
+              <a:ext uri="{FF2B5EF4-FFF2-40B4-BE49-F238E27FC236}">
+                <a16:creationId xmlns:a16="http://schemas.microsoft.com/office/drawing/2014/main" id="{0449F6E4-91E3-3C53-4639-9ADCCFB51DB3}"/>
               </a:ext>
             </a:extLst>
           </p:cNvPr>
           <p:cNvCxnSpPr>
-            <a:stCxn id="25" idx="2"/>
-            <a:endCxn id="38" idx="1"/>
+            <a:stCxn id="15" idx="2"/>
+            <a:endCxn id="25" idx="1"/>
           </p:cNvCxnSpPr>
           <p:nvPr/>
         </p:nvCxnSpPr>
         <p:spPr>
           <a:xfrm rot="10800000" flipV="1">
-            <a:off x="2209267" y="3080572"/>
+            <a:off x="2152117" y="3080572"/>
             <a:ext cx="1472304" cy="502084"/>
           </a:xfrm>
           <a:prstGeom prst="curvedConnector3">
@@ -10470,23 +10371,23 @@
       </p:cxnSp>
       <p:cxnSp>
         <p:nvCxnSpPr>
-          <p:cNvPr id="63" name="Connector: Curved 62">
-            <a:extLst>
-              <a:ext uri="{FF2B5EF4-FFF2-40B4-BE49-F238E27FC236}">
-                <a16:creationId xmlns:a16="http://schemas.microsoft.com/office/drawing/2014/main" id="{7C100FD8-0F8D-444E-F691-D32CA47DB732}"/>
+          <p:cNvPr id="48" name="Connector: Curved 47">
+            <a:extLst>
+              <a:ext uri="{FF2B5EF4-FFF2-40B4-BE49-F238E27FC236}">
+                <a16:creationId xmlns:a16="http://schemas.microsoft.com/office/drawing/2014/main" id="{C5ABA387-F7C1-5A65-89FC-84D86BCF6531}"/>
               </a:ext>
             </a:extLst>
           </p:cNvPr>
           <p:cNvCxnSpPr>
             <a:cxnSpLocks/>
-            <a:stCxn id="43" idx="3"/>
-            <a:endCxn id="24" idx="7"/>
+            <a:stCxn id="30" idx="3"/>
+            <a:endCxn id="14" idx="7"/>
           </p:cNvCxnSpPr>
           <p:nvPr/>
         </p:nvCxnSpPr>
         <p:spPr>
           <a:xfrm flipH="1">
-            <a:off x="1475217" y="3582656"/>
+            <a:off x="1418067" y="3582656"/>
             <a:ext cx="1509404" cy="336805"/>
           </a:xfrm>
           <a:prstGeom prst="curvedConnector4">
@@ -10516,10 +10417,10 @@
       </p:cxnSp>
       <p:sp>
         <p:nvSpPr>
-          <p:cNvPr id="64" name="Rectangle 63">
-            <a:extLst>
-              <a:ext uri="{FF2B5EF4-FFF2-40B4-BE49-F238E27FC236}">
-                <a16:creationId xmlns:a16="http://schemas.microsoft.com/office/drawing/2014/main" id="{7E695E0A-800C-AA61-516A-14819BDF8478}"/>
+          <p:cNvPr id="49" name="Rectangle 48">
+            <a:extLst>
+              <a:ext uri="{FF2B5EF4-FFF2-40B4-BE49-F238E27FC236}">
+                <a16:creationId xmlns:a16="http://schemas.microsoft.com/office/drawing/2014/main" id="{34AB941A-9263-0640-DBCE-A683A1D05375}"/>
               </a:ext>
             </a:extLst>
           </p:cNvPr>
@@ -10528,7 +10429,7 @@
         </p:nvSpPr>
         <p:spPr>
           <a:xfrm>
-            <a:off x="1334585" y="4307628"/>
+            <a:off x="1277435" y="4307628"/>
             <a:ext cx="1909283" cy="1406063"/>
           </a:xfrm>
           <a:prstGeom prst="rect">
@@ -10671,10 +10572,10 @@
       </p:sp>
       <p:sp>
         <p:nvSpPr>
-          <p:cNvPr id="65" name="TextBox 64">
-            <a:extLst>
-              <a:ext uri="{FF2B5EF4-FFF2-40B4-BE49-F238E27FC236}">
-                <a16:creationId xmlns:a16="http://schemas.microsoft.com/office/drawing/2014/main" id="{3A531704-C51D-ACC5-7184-D9C93A5A0BE9}"/>
+          <p:cNvPr id="50" name="TextBox 49">
+            <a:extLst>
+              <a:ext uri="{FF2B5EF4-FFF2-40B4-BE49-F238E27FC236}">
+                <a16:creationId xmlns:a16="http://schemas.microsoft.com/office/drawing/2014/main" id="{23F661E7-B374-3DD0-2883-C7FC85A09D2D}"/>
               </a:ext>
             </a:extLst>
           </p:cNvPr>
@@ -10683,7 +10584,7 @@
         </p:nvSpPr>
         <p:spPr>
           <a:xfrm>
-            <a:off x="3448734" y="5482410"/>
+            <a:off x="3391584" y="5482410"/>
             <a:ext cx="256802" cy="261610"/>
           </a:xfrm>
           <a:prstGeom prst="rect">
@@ -10706,23 +10607,23 @@
       </p:sp>
       <p:cxnSp>
         <p:nvCxnSpPr>
-          <p:cNvPr id="66" name="Connector: Curved 65">
-            <a:extLst>
-              <a:ext uri="{FF2B5EF4-FFF2-40B4-BE49-F238E27FC236}">
-                <a16:creationId xmlns:a16="http://schemas.microsoft.com/office/drawing/2014/main" id="{BDA2F6BF-DBE8-309C-2FCC-85468D97840B}"/>
+          <p:cNvPr id="51" name="Connector: Curved 50">
+            <a:extLst>
+              <a:ext uri="{FF2B5EF4-FFF2-40B4-BE49-F238E27FC236}">
+                <a16:creationId xmlns:a16="http://schemas.microsoft.com/office/drawing/2014/main" id="{A80CF137-5861-F4A9-49C0-64CA4E5D9BBC}"/>
               </a:ext>
             </a:extLst>
           </p:cNvPr>
           <p:cNvCxnSpPr>
             <a:cxnSpLocks/>
-            <a:stCxn id="64" idx="3"/>
-            <a:endCxn id="26" idx="1"/>
+            <a:stCxn id="49" idx="3"/>
+            <a:endCxn id="16" idx="1"/>
           </p:cNvCxnSpPr>
           <p:nvPr/>
         </p:nvCxnSpPr>
         <p:spPr>
           <a:xfrm>
-            <a:off x="3243868" y="5010660"/>
+            <a:off x="3186718" y="5010660"/>
             <a:ext cx="1173042" cy="401892"/>
           </a:xfrm>
           <a:prstGeom prst="curvedConnector3">
@@ -10751,10 +10652,10 @@
       </p:cxnSp>
       <p:sp>
         <p:nvSpPr>
-          <p:cNvPr id="67" name="TextBox 66">
-            <a:extLst>
-              <a:ext uri="{FF2B5EF4-FFF2-40B4-BE49-F238E27FC236}">
-                <a16:creationId xmlns:a16="http://schemas.microsoft.com/office/drawing/2014/main" id="{6580D0F4-FD16-DD22-8CF4-67404C70C485}"/>
+          <p:cNvPr id="52" name="TextBox 51">
+            <a:extLst>
+              <a:ext uri="{FF2B5EF4-FFF2-40B4-BE49-F238E27FC236}">
+                <a16:creationId xmlns:a16="http://schemas.microsoft.com/office/drawing/2014/main" id="{828F0798-F80D-F744-9C01-ECAEB4061997}"/>
               </a:ext>
             </a:extLst>
           </p:cNvPr>
@@ -10763,7 +10664,7 @@
         </p:nvSpPr>
         <p:spPr>
           <a:xfrm>
-            <a:off x="3890397" y="5150941"/>
+            <a:off x="3833247" y="5150941"/>
             <a:ext cx="489236" cy="261610"/>
           </a:xfrm>
           <a:prstGeom prst="rect">
@@ -10786,10 +10687,10 @@
       </p:sp>
       <p:sp>
         <p:nvSpPr>
-          <p:cNvPr id="68" name="TextBox 67">
-            <a:extLst>
-              <a:ext uri="{FF2B5EF4-FFF2-40B4-BE49-F238E27FC236}">
-                <a16:creationId xmlns:a16="http://schemas.microsoft.com/office/drawing/2014/main" id="{2FF727E2-6CED-A527-9DDB-2DFD8C0A9894}"/>
+          <p:cNvPr id="53" name="TextBox 52">
+            <a:extLst>
+              <a:ext uri="{FF2B5EF4-FFF2-40B4-BE49-F238E27FC236}">
+                <a16:creationId xmlns:a16="http://schemas.microsoft.com/office/drawing/2014/main" id="{12FB3562-9CAD-F8C5-7E0C-D9F48F296EA0}"/>
               </a:ext>
             </a:extLst>
           </p:cNvPr>
@@ -10798,7 +10699,7 @@
         </p:nvSpPr>
         <p:spPr>
           <a:xfrm>
-            <a:off x="5725487" y="5870648"/>
+            <a:off x="5668337" y="5870648"/>
             <a:ext cx="256802" cy="261610"/>
           </a:xfrm>
           <a:prstGeom prst="rect">
@@ -10821,10 +10722,10 @@
       </p:sp>
       <p:sp>
         <p:nvSpPr>
-          <p:cNvPr id="69" name="TextBox 68">
-            <a:extLst>
-              <a:ext uri="{FF2B5EF4-FFF2-40B4-BE49-F238E27FC236}">
-                <a16:creationId xmlns:a16="http://schemas.microsoft.com/office/drawing/2014/main" id="{DE12DFDA-DAE6-DC03-A8CF-B826737B0C7F}"/>
+          <p:cNvPr id="54" name="TextBox 53">
+            <a:extLst>
+              <a:ext uri="{FF2B5EF4-FFF2-40B4-BE49-F238E27FC236}">
+                <a16:creationId xmlns:a16="http://schemas.microsoft.com/office/drawing/2014/main" id="{E0BA4F46-097B-C80F-7282-FD2CD4412318}"/>
               </a:ext>
             </a:extLst>
           </p:cNvPr>
@@ -10833,7 +10734,7 @@
         </p:nvSpPr>
         <p:spPr>
           <a:xfrm>
-            <a:off x="5261531" y="5874758"/>
+            <a:off x="5204381" y="5874758"/>
             <a:ext cx="256802" cy="261610"/>
           </a:xfrm>
           <a:prstGeom prst="rect">
@@ -10856,10 +10757,10 @@
       </p:sp>
       <p:sp>
         <p:nvSpPr>
-          <p:cNvPr id="70" name="Rectangle: Single Corner Snipped 69">
-            <a:extLst>
-              <a:ext uri="{FF2B5EF4-FFF2-40B4-BE49-F238E27FC236}">
-                <a16:creationId xmlns:a16="http://schemas.microsoft.com/office/drawing/2014/main" id="{463FADC6-3FAA-605A-0221-95614C304F1D}"/>
+          <p:cNvPr id="55" name="Rectangle: Single Corner Snipped 54">
+            <a:extLst>
+              <a:ext uri="{FF2B5EF4-FFF2-40B4-BE49-F238E27FC236}">
+                <a16:creationId xmlns:a16="http://schemas.microsoft.com/office/drawing/2014/main" id="{55996D6F-BC15-CF59-8EFC-BE3D55309AB6}"/>
               </a:ext>
             </a:extLst>
           </p:cNvPr>
@@ -10868,7 +10769,7 @@
         </p:nvSpPr>
         <p:spPr>
           <a:xfrm>
-            <a:off x="4481737" y="4429925"/>
+            <a:off x="4424587" y="4429925"/>
             <a:ext cx="826166" cy="441422"/>
           </a:xfrm>
           <a:prstGeom prst="snip1Rect">
@@ -10917,10 +10818,10 @@
       </p:sp>
       <p:cxnSp>
         <p:nvCxnSpPr>
-          <p:cNvPr id="73" name="Straight Arrow Connector 72">
-            <a:extLst>
-              <a:ext uri="{FF2B5EF4-FFF2-40B4-BE49-F238E27FC236}">
-                <a16:creationId xmlns:a16="http://schemas.microsoft.com/office/drawing/2014/main" id="{5AD9DA09-1C98-C634-C54D-78F47678EB12}"/>
+          <p:cNvPr id="56" name="Straight Arrow Connector 55">
+            <a:extLst>
+              <a:ext uri="{FF2B5EF4-FFF2-40B4-BE49-F238E27FC236}">
+                <a16:creationId xmlns:a16="http://schemas.microsoft.com/office/drawing/2014/main" id="{BFF30045-A49C-639A-980D-2D608D62B7E0}"/>
               </a:ext>
             </a:extLst>
           </p:cNvPr>
@@ -10929,7 +10830,7 @@
         </p:nvCxnSpPr>
         <p:spPr>
           <a:xfrm>
-            <a:off x="3243868" y="4574743"/>
+            <a:off x="3186718" y="4574743"/>
             <a:ext cx="1237869" cy="0"/>
           </a:xfrm>
           <a:prstGeom prst="straightConnector1">
@@ -10957,10 +10858,10 @@
       </p:cxnSp>
       <p:sp>
         <p:nvSpPr>
-          <p:cNvPr id="75" name="TextBox 74">
-            <a:extLst>
-              <a:ext uri="{FF2B5EF4-FFF2-40B4-BE49-F238E27FC236}">
-                <a16:creationId xmlns:a16="http://schemas.microsoft.com/office/drawing/2014/main" id="{2541A754-6808-E278-D922-FF2C592BA4AC}"/>
+          <p:cNvPr id="57" name="TextBox 56">
+            <a:extLst>
+              <a:ext uri="{FF2B5EF4-FFF2-40B4-BE49-F238E27FC236}">
+                <a16:creationId xmlns:a16="http://schemas.microsoft.com/office/drawing/2014/main" id="{248DB0C5-737D-41B1-FBCD-A3F6139519DB}"/>
               </a:ext>
             </a:extLst>
           </p:cNvPr>
@@ -10969,7 +10870,7 @@
         </p:nvSpPr>
         <p:spPr>
           <a:xfrm>
-            <a:off x="3762256" y="4336678"/>
+            <a:off x="3705106" y="4336678"/>
             <a:ext cx="256802" cy="261610"/>
           </a:xfrm>
           <a:prstGeom prst="rect">
@@ -10992,21 +10893,21 @@
       </p:sp>
       <p:cxnSp>
         <p:nvCxnSpPr>
-          <p:cNvPr id="76" name="Straight Arrow Connector 75">
-            <a:extLst>
-              <a:ext uri="{FF2B5EF4-FFF2-40B4-BE49-F238E27FC236}">
-                <a16:creationId xmlns:a16="http://schemas.microsoft.com/office/drawing/2014/main" id="{7A08338C-626E-F947-840A-505BA182D7B4}"/>
+          <p:cNvPr id="58" name="Straight Arrow Connector 57">
+            <a:extLst>
+              <a:ext uri="{FF2B5EF4-FFF2-40B4-BE49-F238E27FC236}">
+                <a16:creationId xmlns:a16="http://schemas.microsoft.com/office/drawing/2014/main" id="{6BFFE055-F2D3-C266-10EC-8FDFC013EF69}"/>
               </a:ext>
             </a:extLst>
           </p:cNvPr>
           <p:cNvCxnSpPr>
-            <a:stCxn id="37" idx="4"/>
+            <a:stCxn id="24" idx="4"/>
           </p:cNvCxnSpPr>
           <p:nvPr/>
         </p:nvCxnSpPr>
         <p:spPr>
           <a:xfrm flipH="1">
-            <a:off x="5314480" y="5812951"/>
+            <a:off x="5257330" y="5812951"/>
             <a:ext cx="301392" cy="404839"/>
           </a:xfrm>
           <a:prstGeom prst="straightConnector1">
@@ -11033,21 +10934,21 @@
       </p:cxnSp>
       <p:cxnSp>
         <p:nvCxnSpPr>
-          <p:cNvPr id="77" name="Straight Arrow Connector 76">
-            <a:extLst>
-              <a:ext uri="{FF2B5EF4-FFF2-40B4-BE49-F238E27FC236}">
-                <a16:creationId xmlns:a16="http://schemas.microsoft.com/office/drawing/2014/main" id="{15D45433-743C-4AAB-7E28-BC62EE540204}"/>
+          <p:cNvPr id="59" name="Straight Arrow Connector 58">
+            <a:extLst>
+              <a:ext uri="{FF2B5EF4-FFF2-40B4-BE49-F238E27FC236}">
+                <a16:creationId xmlns:a16="http://schemas.microsoft.com/office/drawing/2014/main" id="{910F64F4-0708-EA76-8C1F-A7A7E6A6FBF5}"/>
               </a:ext>
             </a:extLst>
           </p:cNvPr>
           <p:cNvCxnSpPr>
-            <a:stCxn id="37" idx="4"/>
+            <a:stCxn id="24" idx="4"/>
           </p:cNvCxnSpPr>
           <p:nvPr/>
         </p:nvCxnSpPr>
         <p:spPr>
           <a:xfrm>
-            <a:off x="5615872" y="5812951"/>
+            <a:off x="5558722" y="5812951"/>
             <a:ext cx="274676" cy="404839"/>
           </a:xfrm>
           <a:prstGeom prst="straightConnector1">
@@ -11072,16 +10973,583 @@
           </a:fontRef>
         </p:style>
       </p:cxnSp>
+      <p:sp>
+        <p:nvSpPr>
+          <p:cNvPr id="60" name="TextBox 59">
+            <a:extLst>
+              <a:ext uri="{FF2B5EF4-FFF2-40B4-BE49-F238E27FC236}">
+                <a16:creationId xmlns:a16="http://schemas.microsoft.com/office/drawing/2014/main" id="{003F762F-D027-3BC9-86ED-C99581E64A15}"/>
+              </a:ext>
+            </a:extLst>
+          </p:cNvPr>
+          <p:cNvSpPr txBox="1"/>
+          <p:nvPr/>
+        </p:nvSpPr>
+        <p:spPr>
+          <a:xfrm>
+            <a:off x="6538589" y="0"/>
+            <a:ext cx="5601498" cy="7201972"/>
+          </a:xfrm>
+          <a:prstGeom prst="rect">
+            <a:avLst/>
+          </a:prstGeom>
+          <a:noFill/>
+        </p:spPr>
+        <p:txBody>
+          <a:bodyPr wrap="square" rtlCol="0">
+            <a:spAutoFit/>
+          </a:bodyPr>
+          <a:lstStyle/>
+          <a:p>
+            <a:r>
+              <a:rPr lang="en-US" sz="1200"/>
+              <a:t>Race condition #1:  step #1 in the job</a:t>
+            </a:r>
+          </a:p>
+          <a:p>
+            <a:endParaRPr lang="en-US" sz="1200"/>
+          </a:p>
+          <a:p>
+            <a:r>
+              <a:rPr lang="en-US" sz="1200"/>
+              <a:t>Same neighbor’s different revisions (1, 6, 8) may be invoked at the same time, or latter ones may be completed first. </a:t>
+            </a:r>
+          </a:p>
+          <a:p>
+            <a:r>
+              <a:rPr lang="en-US" sz="1200"/>
+              <a:t>As long as the pushed states are target states (can finish programming with this version of state only, doesn’t need previous actions executed in strict order), latter revision can be executed first and doesn’t cause harm and may save some resource</a:t>
+            </a:r>
+          </a:p>
+          <a:p>
+            <a:pPr marL="171450" indent="-171450">
+              <a:buFont typeface="Arial" panose="020B0604020202020204" pitchFamily="34" charset="0"/>
+              <a:buChar char="•"/>
+            </a:pPr>
+            <a:endParaRPr lang="en-US" sz="1200"/>
+          </a:p>
+          <a:p>
+            <a:pPr marL="171450" indent="-171450">
+              <a:buFont typeface="Arial" panose="020B0604020202020204" pitchFamily="34" charset="0"/>
+              <a:buChar char="•"/>
+            </a:pPr>
+            <a:r>
+              <a:rPr lang="en-US" sz="1200"/>
+              <a:t>Case 1: 1 -&gt; 6 -&gt; 8</a:t>
+            </a:r>
+          </a:p>
+          <a:p>
+            <a:pPr marL="171450" indent="-171450">
+              <a:buFont typeface="Arial" panose="020B0604020202020204" pitchFamily="34" charset="0"/>
+              <a:buChar char="•"/>
+            </a:pPr>
+            <a:r>
+              <a:rPr lang="en-US" sz="1200"/>
+              <a:t>Case 2: 6 -&gt; 8 -&gt; 1</a:t>
+            </a:r>
+          </a:p>
+          <a:p>
+            <a:pPr marL="628650" lvl="1" indent="-171450">
+              <a:buFont typeface="Arial" panose="020B0604020202020204" pitchFamily="34" charset="0"/>
+              <a:buChar char="•"/>
+            </a:pPr>
+            <a:r>
+              <a:rPr lang="en-US" sz="1100"/>
+              <a:t>Ver 6 first</a:t>
+            </a:r>
+          </a:p>
+          <a:p>
+            <a:pPr marL="1085850" lvl="2" indent="-171450">
+              <a:buFont typeface="Arial" panose="020B0604020202020204" pitchFamily="34" charset="0"/>
+              <a:buChar char="•"/>
+            </a:pPr>
+            <a:r>
+              <a:rPr lang="en-US" sz="1100"/>
+              <a:t>Not found in </a:t>
+            </a:r>
+            <a:r>
+              <a:rPr lang="en-US" sz="1100" err="1"/>
+              <a:t>hashmap</a:t>
+            </a:r>
+            <a:r>
+              <a:rPr lang="en-US" sz="1100"/>
+              <a:t>, thus insert key with </a:t>
+            </a:r>
+            <a:r>
+              <a:rPr lang="en-US" sz="1100" err="1"/>
+              <a:t>ver</a:t>
+            </a:r>
+            <a:r>
+              <a:rPr lang="en-US" sz="1100"/>
+              <a:t> 6</a:t>
+            </a:r>
+          </a:p>
+          <a:p>
+            <a:pPr marL="1085850" lvl="2" indent="-171450">
+              <a:buFont typeface="Arial" panose="020B0604020202020204" pitchFamily="34" charset="0"/>
+              <a:buChar char="•"/>
+            </a:pPr>
+            <a:r>
+              <a:rPr lang="en-US" sz="1100"/>
+              <a:t>Async write to </a:t>
+            </a:r>
+            <a:r>
+              <a:rPr lang="en-US" sz="1100" err="1"/>
+              <a:t>db</a:t>
+            </a:r>
+            <a:r>
+              <a:rPr lang="en-US" sz="1100"/>
+              <a:t> table1</a:t>
+            </a:r>
+          </a:p>
+          <a:p>
+            <a:pPr marL="1085850" lvl="2" indent="-171450">
+              <a:buFont typeface="Arial" panose="020B0604020202020204" pitchFamily="34" charset="0"/>
+              <a:buChar char="•"/>
+            </a:pPr>
+            <a:r>
+              <a:rPr lang="en-US" sz="1100" err="1"/>
+              <a:t>eBPF</a:t>
+            </a:r>
+            <a:r>
+              <a:rPr lang="en-US" sz="1100"/>
+              <a:t> </a:t>
+            </a:r>
+            <a:r>
+              <a:rPr lang="en-US" sz="1100" err="1"/>
+              <a:t>syscall</a:t>
+            </a:r>
+            <a:r>
+              <a:rPr lang="en-US" sz="1100"/>
+              <a:t> is add if not found, or update if found</a:t>
+            </a:r>
+          </a:p>
+          <a:p>
+            <a:pPr marL="1085850" lvl="2" indent="-171450">
+              <a:buFont typeface="Arial" panose="020B0604020202020204" pitchFamily="34" charset="0"/>
+              <a:buChar char="•"/>
+            </a:pPr>
+            <a:r>
+              <a:rPr lang="en-US" sz="1100"/>
+              <a:t>Async write to </a:t>
+            </a:r>
+            <a:r>
+              <a:rPr lang="en-US" sz="1100" err="1"/>
+              <a:t>db</a:t>
+            </a:r>
+            <a:r>
+              <a:rPr lang="en-US" sz="1100"/>
+              <a:t> table2 if above succeeds</a:t>
+            </a:r>
+          </a:p>
+          <a:p>
+            <a:pPr marL="628650" lvl="1" indent="-171450">
+              <a:buFont typeface="Arial" panose="020B0604020202020204" pitchFamily="34" charset="0"/>
+              <a:buChar char="•"/>
+            </a:pPr>
+            <a:r>
+              <a:rPr lang="en-US" sz="1100"/>
+              <a:t>Ver 8 is to delete it</a:t>
+            </a:r>
+          </a:p>
+          <a:p>
+            <a:pPr marL="1085850" lvl="2" indent="-171450">
+              <a:buFont typeface="Arial" panose="020B0604020202020204" pitchFamily="34" charset="0"/>
+              <a:buChar char="•"/>
+            </a:pPr>
+            <a:r>
+              <a:rPr lang="en-US" sz="1100"/>
+              <a:t>Found </a:t>
+            </a:r>
+            <a:r>
+              <a:rPr lang="en-US" sz="1100" err="1"/>
+              <a:t>ver</a:t>
+            </a:r>
+            <a:r>
+              <a:rPr lang="en-US" sz="1100"/>
+              <a:t> 6 in </a:t>
+            </a:r>
+            <a:r>
+              <a:rPr lang="en-US" sz="1100" err="1"/>
+              <a:t>hashmap</a:t>
+            </a:r>
+            <a:r>
+              <a:rPr lang="en-US" sz="1100"/>
+              <a:t>, since 8 &gt; 6, update with </a:t>
+            </a:r>
+            <a:r>
+              <a:rPr lang="en-US" sz="1100" err="1"/>
+              <a:t>ver</a:t>
+            </a:r>
+            <a:r>
+              <a:rPr lang="en-US" sz="1100"/>
+              <a:t> 8</a:t>
+            </a:r>
+          </a:p>
+          <a:p>
+            <a:pPr marL="1085850" lvl="2" indent="-171450">
+              <a:buFont typeface="Arial" panose="020B0604020202020204" pitchFamily="34" charset="0"/>
+              <a:buChar char="•"/>
+            </a:pPr>
+            <a:r>
+              <a:rPr lang="en-US" sz="1100"/>
+              <a:t>Since in table1 </a:t>
+            </a:r>
+            <a:r>
+              <a:rPr lang="en-US" sz="1100" err="1"/>
+              <a:t>cur_ver</a:t>
+            </a:r>
+            <a:r>
+              <a:rPr lang="en-US" sz="1100"/>
+              <a:t> 8 &gt; </a:t>
+            </a:r>
+            <a:r>
+              <a:rPr lang="en-US" sz="1100" err="1"/>
+              <a:t>fetch_ver</a:t>
+            </a:r>
+            <a:r>
+              <a:rPr lang="en-US" sz="1100"/>
+              <a:t> 6, update</a:t>
+            </a:r>
+          </a:p>
+          <a:p>
+            <a:pPr marL="1085850" lvl="2" indent="-171450">
+              <a:buFont typeface="Arial" panose="020B0604020202020204" pitchFamily="34" charset="0"/>
+              <a:buChar char="•"/>
+            </a:pPr>
+            <a:r>
+              <a:rPr lang="en-US" sz="1100"/>
+              <a:t>delete from </a:t>
+            </a:r>
+            <a:r>
+              <a:rPr lang="en-US" sz="1100" err="1"/>
+              <a:t>eBPF</a:t>
+            </a:r>
+            <a:r>
+              <a:rPr lang="en-US" sz="1100"/>
+              <a:t> map and update table 2</a:t>
+            </a:r>
+          </a:p>
+          <a:p>
+            <a:pPr marL="628650" lvl="1" indent="-171450">
+              <a:buFont typeface="Arial" panose="020B0604020202020204" pitchFamily="34" charset="0"/>
+              <a:buChar char="•"/>
+            </a:pPr>
+            <a:r>
+              <a:rPr lang="en-US" sz="1100"/>
+              <a:t>Ver 1 at last</a:t>
+            </a:r>
+          </a:p>
+          <a:p>
+            <a:pPr marL="1085850" lvl="2" indent="-171450">
+              <a:buFont typeface="Arial" panose="020B0604020202020204" pitchFamily="34" charset="0"/>
+              <a:buChar char="•"/>
+            </a:pPr>
+            <a:r>
+              <a:rPr lang="en-US" sz="1100"/>
+              <a:t>Found </a:t>
+            </a:r>
+            <a:r>
+              <a:rPr lang="en-US" sz="1100" err="1"/>
+              <a:t>ver</a:t>
+            </a:r>
+            <a:r>
+              <a:rPr lang="en-US" sz="1100"/>
+              <a:t> 8 from </a:t>
+            </a:r>
+            <a:r>
+              <a:rPr lang="en-US" sz="1100" err="1"/>
+              <a:t>hashmap</a:t>
+            </a:r>
+            <a:r>
+              <a:rPr lang="en-US" sz="1100"/>
+              <a:t>, since 1 &lt; 8 simply ignore </a:t>
+            </a:r>
+            <a:r>
+              <a:rPr lang="en-US" sz="1100" err="1"/>
+              <a:t>eBPF</a:t>
+            </a:r>
+            <a:r>
+              <a:rPr lang="en-US" sz="1100"/>
+              <a:t> programming</a:t>
+            </a:r>
+          </a:p>
+          <a:p>
+            <a:pPr marL="1085850" lvl="2" indent="-171450">
+              <a:buFont typeface="Arial" panose="020B0604020202020204" pitchFamily="34" charset="0"/>
+              <a:buChar char="•"/>
+            </a:pPr>
+            <a:r>
+              <a:rPr lang="en-US" sz="1100"/>
+              <a:t>In table1, since 1 &lt; 8, also ignore updating</a:t>
+            </a:r>
+          </a:p>
+          <a:p>
+            <a:pPr marL="1085850" lvl="2" indent="-171450">
+              <a:buFont typeface="Arial" panose="020B0604020202020204" pitchFamily="34" charset="0"/>
+              <a:buChar char="•"/>
+            </a:pPr>
+            <a:r>
+              <a:rPr lang="en-US" sz="1100"/>
+              <a:t>Update table2</a:t>
+            </a:r>
+          </a:p>
+          <a:p>
+            <a:pPr marL="171450" indent="-171450">
+              <a:buFont typeface="Arial" panose="020B0604020202020204" pitchFamily="34" charset="0"/>
+              <a:buChar char="•"/>
+            </a:pPr>
+            <a:r>
+              <a:rPr lang="en-US" sz="1200"/>
+              <a:t>Case 3: 8 -&gt; 6 -&gt; 1 or 8 -&gt; 1 -&gt; 6</a:t>
+            </a:r>
+          </a:p>
+          <a:p>
+            <a:pPr marL="628650" lvl="1" indent="-171450">
+              <a:buFont typeface="Arial" panose="020B0604020202020204" pitchFamily="34" charset="0"/>
+              <a:buChar char="•"/>
+            </a:pPr>
+            <a:r>
+              <a:rPr lang="en-US" sz="1100"/>
+              <a:t>Ver 8 (deletion) first</a:t>
+            </a:r>
+          </a:p>
+          <a:p>
+            <a:pPr marL="1085850" lvl="2" indent="-171450">
+              <a:buFont typeface="Arial" panose="020B0604020202020204" pitchFamily="34" charset="0"/>
+              <a:buChar char="•"/>
+            </a:pPr>
+            <a:r>
+              <a:rPr lang="en-US" sz="1100"/>
+              <a:t>Not found in </a:t>
+            </a:r>
+            <a:r>
+              <a:rPr lang="en-US" sz="1100" err="1"/>
+              <a:t>hashmap</a:t>
+            </a:r>
+            <a:r>
+              <a:rPr lang="en-US" sz="1100"/>
+              <a:t>, thus insert key with </a:t>
+            </a:r>
+            <a:r>
+              <a:rPr lang="en-US" sz="1100" err="1"/>
+              <a:t>ver</a:t>
+            </a:r>
+            <a:r>
+              <a:rPr lang="en-US" sz="1100"/>
+              <a:t> 8</a:t>
+            </a:r>
+          </a:p>
+          <a:p>
+            <a:pPr marL="1085850" lvl="2" indent="-171450">
+              <a:buFont typeface="Arial" panose="020B0604020202020204" pitchFamily="34" charset="0"/>
+              <a:buChar char="•"/>
+            </a:pPr>
+            <a:r>
+              <a:rPr lang="en-US" sz="1100" err="1"/>
+              <a:t>eBPF</a:t>
+            </a:r>
+            <a:r>
+              <a:rPr lang="en-US" sz="1100"/>
+              <a:t> </a:t>
+            </a:r>
+            <a:r>
+              <a:rPr lang="en-US" sz="1100" err="1"/>
+              <a:t>syscall</a:t>
+            </a:r>
+            <a:r>
+              <a:rPr lang="en-US" sz="1100"/>
+              <a:t> is if found delete, if not found do nothing</a:t>
+            </a:r>
+          </a:p>
+          <a:p>
+            <a:pPr marL="1085850" lvl="2" indent="-171450">
+              <a:buFont typeface="Arial" panose="020B0604020202020204" pitchFamily="34" charset="0"/>
+              <a:buChar char="•"/>
+            </a:pPr>
+            <a:r>
+              <a:rPr lang="en-US" sz="1100"/>
+              <a:t>Update table1 and 2</a:t>
+            </a:r>
+          </a:p>
+          <a:p>
+            <a:pPr marL="628650" lvl="1" indent="-171450">
+              <a:buFont typeface="Arial" panose="020B0604020202020204" pitchFamily="34" charset="0"/>
+              <a:buChar char="•"/>
+            </a:pPr>
+            <a:r>
+              <a:rPr lang="en-US" sz="1100"/>
+              <a:t>Then </a:t>
+            </a:r>
+            <a:r>
+              <a:rPr lang="en-US" sz="1100" err="1"/>
+              <a:t>ver</a:t>
+            </a:r>
+            <a:r>
+              <a:rPr lang="en-US" sz="1100"/>
+              <a:t> 1 or </a:t>
+            </a:r>
+            <a:r>
+              <a:rPr lang="en-US" sz="1100" err="1"/>
+              <a:t>ver</a:t>
+            </a:r>
+            <a:r>
+              <a:rPr lang="en-US" sz="1100"/>
+              <a:t> 6</a:t>
+            </a:r>
+          </a:p>
+          <a:p>
+            <a:pPr marL="1085850" lvl="2" indent="-171450">
+              <a:buFont typeface="Arial" panose="020B0604020202020204" pitchFamily="34" charset="0"/>
+              <a:buChar char="•"/>
+            </a:pPr>
+            <a:r>
+              <a:rPr lang="en-US" sz="1100"/>
+              <a:t>Found </a:t>
+            </a:r>
+            <a:r>
+              <a:rPr lang="en-US" sz="1100" err="1"/>
+              <a:t>ver</a:t>
+            </a:r>
+            <a:r>
+              <a:rPr lang="en-US" sz="1100"/>
+              <a:t> 8 from </a:t>
+            </a:r>
+            <a:r>
+              <a:rPr lang="en-US" sz="1100" err="1"/>
+              <a:t>hashmap</a:t>
+            </a:r>
+            <a:r>
+              <a:rPr lang="en-US" sz="1100"/>
+              <a:t>, simply ignore </a:t>
+            </a:r>
+            <a:r>
+              <a:rPr lang="en-US" sz="1100" err="1"/>
+              <a:t>eBPF</a:t>
+            </a:r>
+            <a:r>
+              <a:rPr lang="en-US" sz="1100"/>
+              <a:t> programming but update table2</a:t>
+            </a:r>
+          </a:p>
+          <a:p>
+            <a:pPr marL="1085850" lvl="2" indent="-171450">
+              <a:buFont typeface="Arial" panose="020B0604020202020204" pitchFamily="34" charset="0"/>
+              <a:buChar char="•"/>
+            </a:pPr>
+            <a:r>
+              <a:rPr lang="en-US" sz="1100"/>
+              <a:t>In table1, since 1 or 6 &lt; 8, ignore updating</a:t>
+            </a:r>
+          </a:p>
+          <a:p>
+            <a:endParaRPr lang="en-US" sz="1100"/>
+          </a:p>
+          <a:p>
+            <a:r>
+              <a:rPr lang="en-US" sz="1100"/>
+              <a:t>Observation/philosophy:  </a:t>
+            </a:r>
+          </a:p>
+          <a:p>
+            <a:pPr marL="285750" indent="-285750">
+              <a:buFont typeface="Arial" panose="020B0604020202020204" pitchFamily="34" charset="0"/>
+              <a:buChar char="•"/>
+            </a:pPr>
+            <a:r>
+              <a:rPr lang="en-US" sz="1100"/>
+              <a:t>Concurrent HashMap and table1 (may combine later), update condition is increasing version</a:t>
+            </a:r>
+          </a:p>
+          <a:p>
+            <a:pPr marL="285750" indent="-285750">
+              <a:buFont typeface="Arial" panose="020B0604020202020204" pitchFamily="34" charset="0"/>
+              <a:buChar char="•"/>
+            </a:pPr>
+            <a:r>
+              <a:rPr lang="en-US" sz="1100"/>
+              <a:t>table2</a:t>
+            </a:r>
+          </a:p>
+          <a:p>
+            <a:pPr marL="742950" lvl="1" indent="-285750">
+              <a:buFont typeface="Courier New" panose="02070309020205020404" pitchFamily="49" charset="0"/>
+              <a:buChar char="o"/>
+            </a:pPr>
+            <a:r>
+              <a:rPr lang="en-US" sz="1100"/>
+              <a:t>programming done (succeeded + intended ignore) log to table2</a:t>
+            </a:r>
+          </a:p>
+          <a:p>
+            <a:pPr marL="742950" lvl="1" indent="-285750">
+              <a:buFont typeface="Courier New" panose="02070309020205020404" pitchFamily="49" charset="0"/>
+              <a:buChar char="o"/>
+            </a:pPr>
+            <a:r>
+              <a:rPr lang="en-US" sz="1100"/>
+              <a:t>programming failed do not log to table2</a:t>
+            </a:r>
+            <a:endParaRPr lang="en-US" sz="1400"/>
+          </a:p>
+          <a:p>
+            <a:pPr lvl="2"/>
+            <a:endParaRPr lang="en-US" sz="1100"/>
+          </a:p>
+          <a:p>
+            <a:pPr lvl="2"/>
+            <a:endParaRPr lang="en-US" sz="1100"/>
+          </a:p>
+        </p:txBody>
+      </p:sp>
+      <p:sp>
+        <p:nvSpPr>
+          <p:cNvPr id="10" name="Title 1">
+            <a:extLst>
+              <a:ext uri="{FF2B5EF4-FFF2-40B4-BE49-F238E27FC236}">
+                <a16:creationId xmlns:a16="http://schemas.microsoft.com/office/drawing/2014/main" id="{3E4AC56D-1D77-363D-CCF1-0F8577F445F9}"/>
+              </a:ext>
+            </a:extLst>
+          </p:cNvPr>
+          <p:cNvSpPr>
+            <a:spLocks noGrp="1"/>
+          </p:cNvSpPr>
+          <p:nvPr>
+            <p:ph type="title"/>
+          </p:nvPr>
+        </p:nvSpPr>
+        <p:spPr>
+          <a:xfrm>
+            <a:off x="838200" y="365125"/>
+            <a:ext cx="10515600" cy="1325563"/>
+          </a:xfrm>
+        </p:spPr>
+        <p:txBody>
+          <a:bodyPr/>
+          <a:lstStyle/>
+          <a:p>
+            <a:r>
+              <a:rPr lang="en-US"/>
+              <a:t>Race conditions</a:t>
+            </a:r>
+          </a:p>
+        </p:txBody>
+      </p:sp>
     </p:spTree>
     <p:extLst>
       <p:ext uri="{BB962C8B-B14F-4D97-AF65-F5344CB8AC3E}">
-        <p14:creationId xmlns:p14="http://schemas.microsoft.com/office/powerpoint/2010/main" val="3178622597"/>
+        <p14:creationId xmlns:p14="http://schemas.microsoft.com/office/powerpoint/2010/main" val="3276570579"/>
       </p:ext>
     </p:extLst>
   </p:cSld>
   <p:clrMapOvr>
     <a:masterClrMapping/>
   </p:clrMapOvr>
+  <p:extLst>
+    <p:ext uri="{6950BFC3-D8DA-4A85-94F7-54DA5524770B}">
+      <p188:commentRel xmlns:p188="http://schemas.microsoft.com/office/powerpoint/2018/8/main" r:id="rId3"/>
+    </p:ext>
+  </p:extLst>
 </p:sld>
 </file>
 
@@ -11104,10 +11572,265 @@
       </p:grpSpPr>
       <p:sp>
         <p:nvSpPr>
-          <p:cNvPr id="5" name="Rectangle: Rounded Corners 4">
-            <a:extLst>
-              <a:ext uri="{FF2B5EF4-FFF2-40B4-BE49-F238E27FC236}">
-                <a16:creationId xmlns:a16="http://schemas.microsoft.com/office/drawing/2014/main" id="{44C2F6E4-68E8-7BD3-9AA0-3FC6A0F86D05}"/>
+          <p:cNvPr id="72" name="TextBox 71">
+            <a:extLst>
+              <a:ext uri="{FF2B5EF4-FFF2-40B4-BE49-F238E27FC236}">
+                <a16:creationId xmlns:a16="http://schemas.microsoft.com/office/drawing/2014/main" id="{9A268795-8737-CCFB-AB89-69ACA13738F7}"/>
+              </a:ext>
+            </a:extLst>
+          </p:cNvPr>
+          <p:cNvSpPr txBox="1"/>
+          <p:nvPr/>
+        </p:nvSpPr>
+        <p:spPr>
+          <a:xfrm>
+            <a:off x="7032062" y="591159"/>
+            <a:ext cx="4618161" cy="6124754"/>
+          </a:xfrm>
+          <a:prstGeom prst="rect">
+            <a:avLst/>
+          </a:prstGeom>
+          <a:noFill/>
+        </p:spPr>
+        <p:txBody>
+          <a:bodyPr wrap="square" rtlCol="0">
+            <a:spAutoFit/>
+          </a:bodyPr>
+          <a:lstStyle/>
+          <a:p>
+            <a:r>
+              <a:rPr lang="en-US" sz="1400"/>
+              <a:t>Race condition #2: </a:t>
+            </a:r>
+            <a:r>
+              <a:rPr lang="en-US" altLang="zh-CN" sz="1200"/>
+              <a:t>step 1 &amp; 3 needs to be protected in one transaction/critical-section, otherwise step 3 may not reflect the step 1’s strict version control per </a:t>
+            </a:r>
+            <a:r>
+              <a:rPr lang="en-US" altLang="zh-CN" sz="1200" err="1"/>
+              <a:t>resource_id</a:t>
+            </a:r>
+            <a:r>
+              <a:rPr lang="en-US" altLang="zh-CN" sz="1200"/>
+              <a:t> (per key)</a:t>
+            </a:r>
+          </a:p>
+          <a:p>
+            <a:endParaRPr lang="en-US" sz="1200"/>
+          </a:p>
+          <a:p>
+            <a:r>
+              <a:rPr lang="en-US" sz="1200"/>
+              <a:t>Although competition of version control only happens in key granularity, it is not recommended to choose a non-concurrent </a:t>
+            </a:r>
+            <a:r>
+              <a:rPr lang="en-US" sz="1200" err="1"/>
+              <a:t>hashmap</a:t>
+            </a:r>
+            <a:r>
+              <a:rPr lang="en-US" sz="1200"/>
+              <a:t> and let different </a:t>
+            </a:r>
+            <a:r>
+              <a:rPr lang="en-US" sz="1200" err="1"/>
+              <a:t>kv</a:t>
+            </a:r>
+            <a:r>
+              <a:rPr lang="en-US" sz="1200"/>
+              <a:t> elements to be processed by multi threads at the same time without protection. </a:t>
+            </a:r>
+          </a:p>
+          <a:p>
+            <a:endParaRPr lang="en-US" sz="1200"/>
+          </a:p>
+          <a:p>
+            <a:r>
+              <a:rPr lang="en-US" sz="1200"/>
+              <a:t>So we still choose a concurrent </a:t>
+            </a:r>
+            <a:r>
+              <a:rPr lang="en-US" sz="1200" err="1"/>
+              <a:t>hashmap</a:t>
+            </a:r>
+            <a:r>
+              <a:rPr lang="en-US" sz="1200"/>
+              <a:t>, plus a key level obj lock for our own purpose: </a:t>
+            </a:r>
+          </a:p>
+          <a:p>
+            <a:pPr marL="342900" indent="-342900">
+              <a:buFont typeface="+mj-lt"/>
+              <a:buAutoNum type="arabicPeriod"/>
+            </a:pPr>
+            <a:endParaRPr lang="en-US" sz="1400"/>
+          </a:p>
+          <a:p>
+            <a:pPr marL="342900" indent="-342900">
+              <a:buFont typeface="+mj-lt"/>
+              <a:buAutoNum type="arabicPeriod"/>
+            </a:pPr>
+            <a:r>
+              <a:rPr lang="en-US" sz="1400"/>
+              <a:t>Concurrent hash map</a:t>
+            </a:r>
+          </a:p>
+          <a:p>
+            <a:pPr marL="800100" lvl="1" indent="-342900">
+              <a:buFont typeface="Arial" panose="020B0604020202020204" pitchFamily="34" charset="0"/>
+              <a:buChar char="•"/>
+            </a:pPr>
+            <a:r>
+              <a:rPr lang="en-US" sz="1200">
+                <a:hlinkClick r:id="rId3">
+                  <a:extLst>
+                    <a:ext uri="{A12FA001-AC4F-418D-AE19-62706E023703}">
+                      <ahyp:hlinkClr xmlns:ahyp="http://schemas.microsoft.com/office/drawing/2018/hyperlinkcolor" val="tx"/>
+                    </a:ext>
+                  </a:extLst>
+                </a:hlinkClick>
+              </a:rPr>
+              <a:t>https://github.com/facebook/folly/blob/main/folly/docs/AtomicHashMap.md</a:t>
+            </a:r>
+            <a:r>
+              <a:rPr lang="en-US" sz="1200"/>
+              <a:t>  </a:t>
+            </a:r>
+          </a:p>
+          <a:p>
+            <a:pPr marL="800100" lvl="1" indent="-342900">
+              <a:buFont typeface="Arial" panose="020B0604020202020204" pitchFamily="34" charset="0"/>
+              <a:buChar char="•"/>
+            </a:pPr>
+            <a:r>
+              <a:rPr lang="en-US" sz="1200"/>
+              <a:t>find and iteration are wait-free, insert has key-level lock granularity</a:t>
+            </a:r>
+          </a:p>
+          <a:p>
+            <a:pPr marL="800100" lvl="1" indent="-342900">
+              <a:buFont typeface="Arial" panose="020B0604020202020204" pitchFamily="34" charset="0"/>
+              <a:buChar char="•"/>
+            </a:pPr>
+            <a:r>
+              <a:rPr lang="en-US" sz="1200"/>
+              <a:t>only supports 32 or 64 bit keys - this is because they must be atomically compare-and-</a:t>
+            </a:r>
+            <a:r>
+              <a:rPr lang="en-US" sz="1200" err="1"/>
+              <a:t>swaped</a:t>
+            </a:r>
+            <a:endParaRPr lang="en-US" sz="1200"/>
+          </a:p>
+          <a:p>
+            <a:pPr marL="342900" indent="-342900">
+              <a:buFont typeface="+mj-lt"/>
+              <a:buAutoNum type="arabicPeriod"/>
+            </a:pPr>
+            <a:r>
+              <a:rPr lang="en-US" sz="1400"/>
+              <a:t>K and V are</a:t>
+            </a:r>
+          </a:p>
+          <a:p>
+            <a:pPr marL="800100" lvl="1" indent="-342900">
+              <a:buFont typeface="Arial" panose="020B0604020202020204" pitchFamily="34" charset="0"/>
+              <a:buChar char="•"/>
+            </a:pPr>
+            <a:r>
+              <a:rPr lang="en-US" sz="1200"/>
+              <a:t>Key – long int that encoded from </a:t>
+            </a:r>
+            <a:r>
+              <a:rPr lang="en-US" sz="1200" err="1"/>
+              <a:t>resource_id</a:t>
+            </a:r>
+            <a:r>
+              <a:rPr lang="en-US" sz="1200"/>
+              <a:t> (in neighbor case, it is    VNI + </a:t>
+            </a:r>
+            <a:r>
+              <a:rPr lang="en-US" sz="1200" err="1"/>
+              <a:t>vpc_ip</a:t>
+            </a:r>
+            <a:r>
+              <a:rPr lang="en-US" sz="1200"/>
+              <a:t>)</a:t>
+            </a:r>
+          </a:p>
+          <a:p>
+            <a:pPr marL="800100" lvl="1" indent="-342900">
+              <a:buFont typeface="Arial" panose="020B0604020202020204" pitchFamily="34" charset="0"/>
+              <a:buChar char="•"/>
+            </a:pPr>
+            <a:r>
+              <a:rPr lang="en-US" sz="1200"/>
+              <a:t>Value – 2 tuples element</a:t>
+            </a:r>
+          </a:p>
+          <a:p>
+            <a:pPr marL="1257300" lvl="2" indent="-342900">
+              <a:buFont typeface="Courier New" panose="02070309020205020404" pitchFamily="49" charset="0"/>
+              <a:buChar char="o"/>
+            </a:pPr>
+            <a:r>
+              <a:rPr lang="en-US" sz="1200"/>
+              <a:t>1st tuple is Version object (or int value if locking is feasible) that assigned per neighbor key</a:t>
+            </a:r>
+          </a:p>
+          <a:p>
+            <a:pPr marL="1714500" lvl="3" indent="-342900">
+              <a:buFont typeface="Wingdings" panose="05000000000000000000" pitchFamily="2" charset="2"/>
+              <a:buChar char="q"/>
+            </a:pPr>
+            <a:r>
+              <a:rPr lang="en-US" sz="1200"/>
+              <a:t>for critical section of (step 1-3) protection and the protection granularity is per key</a:t>
+            </a:r>
+          </a:p>
+          <a:p>
+            <a:pPr marL="1714500" lvl="3" indent="-342900">
+              <a:buFont typeface="Wingdings" panose="05000000000000000000" pitchFamily="2" charset="2"/>
+              <a:buChar char="q"/>
+            </a:pPr>
+            <a:r>
+              <a:rPr lang="en-US" sz="1200"/>
+              <a:t>to store the version for the atomic operation above</a:t>
+            </a:r>
+          </a:p>
+          <a:p>
+            <a:pPr marL="1257300" lvl="2" indent="-342900">
+              <a:buFont typeface="Courier New" panose="02070309020205020404" pitchFamily="49" charset="0"/>
+              <a:buChar char="o"/>
+            </a:pPr>
+            <a:r>
+              <a:rPr lang="en-US" sz="1200"/>
+              <a:t>2nd tuple is of course the metadata of this goal state, for Neighbor case it contains </a:t>
+            </a:r>
+            <a:r>
+              <a:rPr lang="en-US" sz="1200" err="1"/>
+              <a:t>HostIP</a:t>
+            </a:r>
+            <a:r>
+              <a:rPr lang="en-US" sz="1200"/>
+              <a:t>, </a:t>
+            </a:r>
+            <a:r>
+              <a:rPr lang="en-US" sz="1200" err="1"/>
+              <a:t>HostMac</a:t>
+            </a:r>
+            <a:r>
+              <a:rPr lang="en-US" sz="1200"/>
+              <a:t> etc. </a:t>
+            </a:r>
+          </a:p>
+        </p:txBody>
+      </p:sp>
+      <p:sp>
+        <p:nvSpPr>
+          <p:cNvPr id="14" name="Rectangle: Rounded Corners 13">
+            <a:extLst>
+              <a:ext uri="{FF2B5EF4-FFF2-40B4-BE49-F238E27FC236}">
+                <a16:creationId xmlns:a16="http://schemas.microsoft.com/office/drawing/2014/main" id="{0EFAD92F-E102-0827-413A-4A9683148DAC}"/>
               </a:ext>
             </a:extLst>
           </p:cNvPr>
@@ -11116,8 +11839,8 @@
         </p:nvSpPr>
         <p:spPr>
           <a:xfrm>
-            <a:off x="107311" y="2727510"/>
-            <a:ext cx="6369690" cy="4033744"/>
+            <a:off x="164461" y="2727510"/>
+            <a:ext cx="6541140" cy="4033744"/>
           </a:xfrm>
           <a:prstGeom prst="roundRect">
             <a:avLst/>
@@ -11302,10 +12025,10 @@
       </p:sp>
       <p:sp>
         <p:nvSpPr>
-          <p:cNvPr id="7" name="Rectangle: Rounded Corners 6">
-            <a:extLst>
-              <a:ext uri="{FF2B5EF4-FFF2-40B4-BE49-F238E27FC236}">
-                <a16:creationId xmlns:a16="http://schemas.microsoft.com/office/drawing/2014/main" id="{958AB707-D515-1EAF-A3C9-6C726169C230}"/>
+          <p:cNvPr id="17" name="Rectangle: Rounded Corners 16">
+            <a:extLst>
+              <a:ext uri="{FF2B5EF4-FFF2-40B4-BE49-F238E27FC236}">
+                <a16:creationId xmlns:a16="http://schemas.microsoft.com/office/drawing/2014/main" id="{042EA16B-B4AC-B87F-77A1-3AE13CDAB5B9}"/>
               </a:ext>
             </a:extLst>
           </p:cNvPr>
@@ -11314,8 +12037,8 @@
         </p:nvSpPr>
         <p:spPr>
           <a:xfrm>
-            <a:off x="283566" y="2727509"/>
-            <a:ext cx="6000953" cy="3195009"/>
+            <a:off x="340716" y="2727509"/>
+            <a:ext cx="6212484" cy="3195009"/>
           </a:xfrm>
           <a:prstGeom prst="roundRect">
             <a:avLst/>
@@ -11452,10 +12175,10 @@
       </p:sp>
       <p:sp>
         <p:nvSpPr>
-          <p:cNvPr id="8" name="Rectangle: Rounded Corners 7">
-            <a:extLst>
-              <a:ext uri="{FF2B5EF4-FFF2-40B4-BE49-F238E27FC236}">
-                <a16:creationId xmlns:a16="http://schemas.microsoft.com/office/drawing/2014/main" id="{E9479206-2B6F-61B5-11FD-2AEA536AB0F8}"/>
+          <p:cNvPr id="22" name="Rectangle: Rounded Corners 21">
+            <a:extLst>
+              <a:ext uri="{FF2B5EF4-FFF2-40B4-BE49-F238E27FC236}">
+                <a16:creationId xmlns:a16="http://schemas.microsoft.com/office/drawing/2014/main" id="{7FD54D54-FD94-014F-4DA9-A90DACF52365}"/>
               </a:ext>
             </a:extLst>
           </p:cNvPr>
@@ -11464,7 +12187,7 @@
         </p:nvSpPr>
         <p:spPr>
           <a:xfrm>
-            <a:off x="1543249" y="6252383"/>
+            <a:off x="1600399" y="6252383"/>
             <a:ext cx="898618" cy="295271"/>
           </a:xfrm>
           <a:prstGeom prst="roundRect">
@@ -11516,10 +12239,10 @@
       </p:sp>
       <p:sp>
         <p:nvSpPr>
-          <p:cNvPr id="13" name="Cylinder 12">
-            <a:extLst>
-              <a:ext uri="{FF2B5EF4-FFF2-40B4-BE49-F238E27FC236}">
-                <a16:creationId xmlns:a16="http://schemas.microsoft.com/office/drawing/2014/main" id="{195748CA-E231-A0B8-1080-B97D02CFDBC8}"/>
+          <p:cNvPr id="23" name="Cylinder 22">
+            <a:extLst>
+              <a:ext uri="{FF2B5EF4-FFF2-40B4-BE49-F238E27FC236}">
+                <a16:creationId xmlns:a16="http://schemas.microsoft.com/office/drawing/2014/main" id="{C2CE633F-782B-6076-54E0-8C50CEF41A4A}"/>
               </a:ext>
             </a:extLst>
           </p:cNvPr>
@@ -11528,7 +12251,7 @@
         </p:nvSpPr>
         <p:spPr>
           <a:xfrm>
-            <a:off x="4869044" y="6217790"/>
+            <a:off x="4926194" y="6217790"/>
             <a:ext cx="1307067" cy="364459"/>
           </a:xfrm>
           <a:prstGeom prst="can">
@@ -11580,10 +12303,10 @@
       </p:sp>
       <p:sp>
         <p:nvSpPr>
-          <p:cNvPr id="14" name="Oval 13">
-            <a:extLst>
-              <a:ext uri="{FF2B5EF4-FFF2-40B4-BE49-F238E27FC236}">
-                <a16:creationId xmlns:a16="http://schemas.microsoft.com/office/drawing/2014/main" id="{58119580-8723-C375-DABE-F80474FD1677}"/>
+          <p:cNvPr id="24" name="Oval 23">
+            <a:extLst>
+              <a:ext uri="{FF2B5EF4-FFF2-40B4-BE49-F238E27FC236}">
+                <a16:creationId xmlns:a16="http://schemas.microsoft.com/office/drawing/2014/main" id="{94C0A6A7-1A8F-ED07-669C-0EB3544C5C75}"/>
               </a:ext>
             </a:extLst>
           </p:cNvPr>
@@ -11592,7 +12315,7 @@
         </p:nvSpPr>
         <p:spPr>
           <a:xfrm>
-            <a:off x="806192" y="3830773"/>
+            <a:off x="863342" y="3830773"/>
             <a:ext cx="716856" cy="605600"/>
           </a:xfrm>
           <a:prstGeom prst="ellipse">
@@ -11650,10 +12373,10 @@
       </p:sp>
       <p:sp>
         <p:nvSpPr>
-          <p:cNvPr id="15" name="Oval 14">
-            <a:extLst>
-              <a:ext uri="{FF2B5EF4-FFF2-40B4-BE49-F238E27FC236}">
-                <a16:creationId xmlns:a16="http://schemas.microsoft.com/office/drawing/2014/main" id="{77CBCC49-35DC-9D18-7EF6-70E1016EAF0E}"/>
+          <p:cNvPr id="25" name="Oval 24">
+            <a:extLst>
+              <a:ext uri="{FF2B5EF4-FFF2-40B4-BE49-F238E27FC236}">
+                <a16:creationId xmlns:a16="http://schemas.microsoft.com/office/drawing/2014/main" id="{58A64855-BB00-BC84-E8E4-9ED9605A78CB}"/>
               </a:ext>
             </a:extLst>
           </p:cNvPr>
@@ -11662,7 +12385,7 @@
         </p:nvSpPr>
         <p:spPr>
           <a:xfrm>
-            <a:off x="3624421" y="2821640"/>
+            <a:off x="3681571" y="2821640"/>
             <a:ext cx="1046319" cy="517864"/>
           </a:xfrm>
           <a:prstGeom prst="ellipse">
@@ -11702,10 +12425,10 @@
       </p:sp>
       <p:sp>
         <p:nvSpPr>
-          <p:cNvPr id="16" name="Rectangle 15">
-            <a:extLst>
-              <a:ext uri="{FF2B5EF4-FFF2-40B4-BE49-F238E27FC236}">
-                <a16:creationId xmlns:a16="http://schemas.microsoft.com/office/drawing/2014/main" id="{34830680-9E8D-005F-C442-A64F289322A2}"/>
+          <p:cNvPr id="26" name="Rectangle 25">
+            <a:extLst>
+              <a:ext uri="{FF2B5EF4-FFF2-40B4-BE49-F238E27FC236}">
+                <a16:creationId xmlns:a16="http://schemas.microsoft.com/office/drawing/2014/main" id="{93E39FAF-82BF-40AB-25DF-4C339661D5D6}"/>
               </a:ext>
             </a:extLst>
           </p:cNvPr>
@@ -11714,7 +12437,7 @@
         </p:nvSpPr>
         <p:spPr>
           <a:xfrm>
-            <a:off x="4359760" y="5341671"/>
+            <a:off x="4416910" y="5341671"/>
             <a:ext cx="129654" cy="141761"/>
           </a:xfrm>
           <a:prstGeom prst="rect">
@@ -11751,10 +12474,10 @@
       </p:sp>
       <p:sp>
         <p:nvSpPr>
-          <p:cNvPr id="17" name="Rectangle 16">
-            <a:extLst>
-              <a:ext uri="{FF2B5EF4-FFF2-40B4-BE49-F238E27FC236}">
-                <a16:creationId xmlns:a16="http://schemas.microsoft.com/office/drawing/2014/main" id="{ED4A1AB3-E634-CB2C-E4F0-5D24D6961E7D}"/>
+          <p:cNvPr id="27" name="Rectangle 26">
+            <a:extLst>
+              <a:ext uri="{FF2B5EF4-FFF2-40B4-BE49-F238E27FC236}">
+                <a16:creationId xmlns:a16="http://schemas.microsoft.com/office/drawing/2014/main" id="{96C6BD28-E3ED-E606-2636-54842BAF2108}"/>
               </a:ext>
             </a:extLst>
           </p:cNvPr>
@@ -11763,7 +12486,7 @@
         </p:nvSpPr>
         <p:spPr>
           <a:xfrm>
-            <a:off x="4489414" y="5341671"/>
+            <a:off x="4546564" y="5341671"/>
             <a:ext cx="129654" cy="141761"/>
           </a:xfrm>
           <a:prstGeom prst="rect">
@@ -11800,10 +12523,10 @@
       </p:sp>
       <p:sp>
         <p:nvSpPr>
-          <p:cNvPr id="18" name="Rectangle 17">
-            <a:extLst>
-              <a:ext uri="{FF2B5EF4-FFF2-40B4-BE49-F238E27FC236}">
-                <a16:creationId xmlns:a16="http://schemas.microsoft.com/office/drawing/2014/main" id="{FBF62025-8990-CE38-CE37-2B444E58DE2C}"/>
+          <p:cNvPr id="28" name="Rectangle 27">
+            <a:extLst>
+              <a:ext uri="{FF2B5EF4-FFF2-40B4-BE49-F238E27FC236}">
+                <a16:creationId xmlns:a16="http://schemas.microsoft.com/office/drawing/2014/main" id="{C1383AD6-D9A4-FEE6-5675-A5F6156A3593}"/>
               </a:ext>
             </a:extLst>
           </p:cNvPr>
@@ -11812,7 +12535,7 @@
         </p:nvSpPr>
         <p:spPr>
           <a:xfrm>
-            <a:off x="4616788" y="5341671"/>
+            <a:off x="4673938" y="5341671"/>
             <a:ext cx="129654" cy="141761"/>
           </a:xfrm>
           <a:prstGeom prst="rect">
@@ -11849,10 +12572,10 @@
       </p:sp>
       <p:sp>
         <p:nvSpPr>
-          <p:cNvPr id="19" name="Rectangle 18">
-            <a:extLst>
-              <a:ext uri="{FF2B5EF4-FFF2-40B4-BE49-F238E27FC236}">
-                <a16:creationId xmlns:a16="http://schemas.microsoft.com/office/drawing/2014/main" id="{091FB807-EE18-CE4A-64BC-5388F12BFB63}"/>
+          <p:cNvPr id="29" name="Rectangle 28">
+            <a:extLst>
+              <a:ext uri="{FF2B5EF4-FFF2-40B4-BE49-F238E27FC236}">
+                <a16:creationId xmlns:a16="http://schemas.microsoft.com/office/drawing/2014/main" id="{CDF40F64-A0F2-4F82-4616-58C67582C6F2}"/>
               </a:ext>
             </a:extLst>
           </p:cNvPr>
@@ -11861,7 +12584,7 @@
         </p:nvSpPr>
         <p:spPr>
           <a:xfrm>
-            <a:off x="4740750" y="5341671"/>
+            <a:off x="4797900" y="5341671"/>
             <a:ext cx="129654" cy="141761"/>
           </a:xfrm>
           <a:prstGeom prst="rect">
@@ -11898,10 +12621,10 @@
       </p:sp>
       <p:sp>
         <p:nvSpPr>
-          <p:cNvPr id="20" name="Rectangle 19">
-            <a:extLst>
-              <a:ext uri="{FF2B5EF4-FFF2-40B4-BE49-F238E27FC236}">
-                <a16:creationId xmlns:a16="http://schemas.microsoft.com/office/drawing/2014/main" id="{632D6467-1E25-4D57-3654-6D2A91BA92C6}"/>
+          <p:cNvPr id="30" name="Rectangle 29">
+            <a:extLst>
+              <a:ext uri="{FF2B5EF4-FFF2-40B4-BE49-F238E27FC236}">
+                <a16:creationId xmlns:a16="http://schemas.microsoft.com/office/drawing/2014/main" id="{7A328CF4-7F2D-B190-E0AE-D5967785561B}"/>
               </a:ext>
             </a:extLst>
           </p:cNvPr>
@@ -11910,7 +12633,7 @@
         </p:nvSpPr>
         <p:spPr>
           <a:xfrm>
-            <a:off x="4869551" y="5341671"/>
+            <a:off x="4926701" y="5341671"/>
             <a:ext cx="129654" cy="141761"/>
           </a:xfrm>
           <a:prstGeom prst="rect">
@@ -11947,10 +12670,10 @@
       </p:sp>
       <p:sp>
         <p:nvSpPr>
-          <p:cNvPr id="21" name="Rectangle 20">
-            <a:extLst>
-              <a:ext uri="{FF2B5EF4-FFF2-40B4-BE49-F238E27FC236}">
-                <a16:creationId xmlns:a16="http://schemas.microsoft.com/office/drawing/2014/main" id="{33FD66D4-39C6-6AF6-8FC6-9C2DBAFFA5E5}"/>
+          <p:cNvPr id="31" name="Rectangle 30">
+            <a:extLst>
+              <a:ext uri="{FF2B5EF4-FFF2-40B4-BE49-F238E27FC236}">
+                <a16:creationId xmlns:a16="http://schemas.microsoft.com/office/drawing/2014/main" id="{0243E3A7-6EF7-20D8-4F3C-AD44D8D2F6BC}"/>
               </a:ext>
             </a:extLst>
           </p:cNvPr>
@@ -11959,7 +12682,7 @@
         </p:nvSpPr>
         <p:spPr>
           <a:xfrm>
-            <a:off x="4998636" y="5341671"/>
+            <a:off x="5055786" y="5341671"/>
             <a:ext cx="129654" cy="141761"/>
           </a:xfrm>
           <a:prstGeom prst="rect">
@@ -11996,10 +12719,10 @@
       </p:sp>
       <p:sp>
         <p:nvSpPr>
-          <p:cNvPr id="22" name="Rectangle: Rounded Corners 21">
-            <a:extLst>
-              <a:ext uri="{FF2B5EF4-FFF2-40B4-BE49-F238E27FC236}">
-                <a16:creationId xmlns:a16="http://schemas.microsoft.com/office/drawing/2014/main" id="{3C9FEA34-87F7-ED32-B550-F43CEFD3ADA2}"/>
+          <p:cNvPr id="33" name="Rectangle: Rounded Corners 32">
+            <a:extLst>
+              <a:ext uri="{FF2B5EF4-FFF2-40B4-BE49-F238E27FC236}">
+                <a16:creationId xmlns:a16="http://schemas.microsoft.com/office/drawing/2014/main" id="{DF956A12-D5F4-605B-F973-3B7492069539}"/>
               </a:ext>
             </a:extLst>
           </p:cNvPr>
@@ -12008,7 +12731,7 @@
         </p:nvSpPr>
         <p:spPr>
           <a:xfrm>
-            <a:off x="3186718" y="1680753"/>
+            <a:off x="3243868" y="1680753"/>
             <a:ext cx="1914077" cy="525465"/>
           </a:xfrm>
           <a:prstGeom prst="roundRect">
@@ -12055,10 +12778,10 @@
       </p:sp>
       <p:sp>
         <p:nvSpPr>
-          <p:cNvPr id="23" name="Oval 22">
-            <a:extLst>
-              <a:ext uri="{FF2B5EF4-FFF2-40B4-BE49-F238E27FC236}">
-                <a16:creationId xmlns:a16="http://schemas.microsoft.com/office/drawing/2014/main" id="{E44C7003-DB9D-C142-0BBB-8C1FAC84E43B}"/>
+          <p:cNvPr id="35" name="Oval 34">
+            <a:extLst>
+              <a:ext uri="{FF2B5EF4-FFF2-40B4-BE49-F238E27FC236}">
+                <a16:creationId xmlns:a16="http://schemas.microsoft.com/office/drawing/2014/main" id="{07074D8F-0A83-651C-E258-8CB36E167CA8}"/>
               </a:ext>
             </a:extLst>
           </p:cNvPr>
@@ -12067,7 +12790,7 @@
         </p:nvSpPr>
         <p:spPr>
           <a:xfrm>
-            <a:off x="3785355" y="2595957"/>
+            <a:off x="3842505" y="2595957"/>
             <a:ext cx="240512" cy="179637"/>
           </a:xfrm>
           <a:prstGeom prst="ellipse">
@@ -12107,10 +12830,10 @@
       </p:sp>
       <p:sp>
         <p:nvSpPr>
-          <p:cNvPr id="24" name="Oval 23">
-            <a:extLst>
-              <a:ext uri="{FF2B5EF4-FFF2-40B4-BE49-F238E27FC236}">
-                <a16:creationId xmlns:a16="http://schemas.microsoft.com/office/drawing/2014/main" id="{0AEACA3F-51A8-EEBB-2128-389907F0B379}"/>
+          <p:cNvPr id="37" name="Oval 36">
+            <a:extLst>
+              <a:ext uri="{FF2B5EF4-FFF2-40B4-BE49-F238E27FC236}">
+                <a16:creationId xmlns:a16="http://schemas.microsoft.com/office/drawing/2014/main" id="{23C6675F-2A94-D9C7-BE69-6CFC8DFA99E3}"/>
               </a:ext>
             </a:extLst>
           </p:cNvPr>
@@ -12119,7 +12842,7 @@
         </p:nvSpPr>
         <p:spPr>
           <a:xfrm>
-            <a:off x="5034941" y="5037437"/>
+            <a:off x="5092091" y="5037437"/>
             <a:ext cx="1047562" cy="775514"/>
           </a:xfrm>
           <a:prstGeom prst="ellipse">
@@ -12172,10 +12895,10 @@
       </p:sp>
       <p:sp>
         <p:nvSpPr>
-          <p:cNvPr id="25" name="Rectangle 24">
-            <a:extLst>
-              <a:ext uri="{FF2B5EF4-FFF2-40B4-BE49-F238E27FC236}">
-                <a16:creationId xmlns:a16="http://schemas.microsoft.com/office/drawing/2014/main" id="{DD007557-97DE-F72A-CB08-8B4D12B1869C}"/>
+          <p:cNvPr id="38" name="Rectangle 37">
+            <a:extLst>
+              <a:ext uri="{FF2B5EF4-FFF2-40B4-BE49-F238E27FC236}">
+                <a16:creationId xmlns:a16="http://schemas.microsoft.com/office/drawing/2014/main" id="{1D9ED6A7-9759-A88D-7F62-644B4B17733A}"/>
               </a:ext>
             </a:extLst>
           </p:cNvPr>
@@ -12184,7 +12907,7 @@
         </p:nvSpPr>
         <p:spPr>
           <a:xfrm>
-            <a:off x="2152117" y="3511775"/>
+            <a:off x="2209267" y="3511775"/>
             <a:ext cx="129654" cy="141761"/>
           </a:xfrm>
           <a:prstGeom prst="rect">
@@ -12221,10 +12944,10 @@
       </p:sp>
       <p:sp>
         <p:nvSpPr>
-          <p:cNvPr id="26" name="Rectangle 25">
-            <a:extLst>
-              <a:ext uri="{FF2B5EF4-FFF2-40B4-BE49-F238E27FC236}">
-                <a16:creationId xmlns:a16="http://schemas.microsoft.com/office/drawing/2014/main" id="{416DEFE2-55F4-FA38-8D46-C259E8CF8B55}"/>
+          <p:cNvPr id="39" name="Rectangle 38">
+            <a:extLst>
+              <a:ext uri="{FF2B5EF4-FFF2-40B4-BE49-F238E27FC236}">
+                <a16:creationId xmlns:a16="http://schemas.microsoft.com/office/drawing/2014/main" id="{AAD23C9F-8560-A83D-92E3-61230B903CF4}"/>
               </a:ext>
             </a:extLst>
           </p:cNvPr>
@@ -12233,7 +12956,7 @@
         </p:nvSpPr>
         <p:spPr>
           <a:xfrm>
-            <a:off x="2281771" y="3511775"/>
+            <a:off x="2338921" y="3511775"/>
             <a:ext cx="129654" cy="141761"/>
           </a:xfrm>
           <a:prstGeom prst="rect">
@@ -12270,10 +12993,10 @@
       </p:sp>
       <p:sp>
         <p:nvSpPr>
-          <p:cNvPr id="27" name="Rectangle 26">
-            <a:extLst>
-              <a:ext uri="{FF2B5EF4-FFF2-40B4-BE49-F238E27FC236}">
-                <a16:creationId xmlns:a16="http://schemas.microsoft.com/office/drawing/2014/main" id="{3321F7FA-6BAD-AFF6-4534-648F680A505B}"/>
+          <p:cNvPr id="40" name="Rectangle 39">
+            <a:extLst>
+              <a:ext uri="{FF2B5EF4-FFF2-40B4-BE49-F238E27FC236}">
+                <a16:creationId xmlns:a16="http://schemas.microsoft.com/office/drawing/2014/main" id="{D55433D1-233A-8D0A-8E89-0ED7CF2DCAD3}"/>
               </a:ext>
             </a:extLst>
           </p:cNvPr>
@@ -12282,7 +13005,7 @@
         </p:nvSpPr>
         <p:spPr>
           <a:xfrm>
-            <a:off x="2409145" y="3511775"/>
+            <a:off x="2466295" y="3511775"/>
             <a:ext cx="129654" cy="141761"/>
           </a:xfrm>
           <a:prstGeom prst="rect">
@@ -12319,10 +13042,10 @@
       </p:sp>
       <p:sp>
         <p:nvSpPr>
-          <p:cNvPr id="28" name="Rectangle 27">
-            <a:extLst>
-              <a:ext uri="{FF2B5EF4-FFF2-40B4-BE49-F238E27FC236}">
-                <a16:creationId xmlns:a16="http://schemas.microsoft.com/office/drawing/2014/main" id="{6ABC7C86-7C59-C986-B005-7B26D26A4262}"/>
+          <p:cNvPr id="41" name="Rectangle 40">
+            <a:extLst>
+              <a:ext uri="{FF2B5EF4-FFF2-40B4-BE49-F238E27FC236}">
+                <a16:creationId xmlns:a16="http://schemas.microsoft.com/office/drawing/2014/main" id="{5940950F-5CD2-7A2F-FADD-00B46B542E2F}"/>
               </a:ext>
             </a:extLst>
           </p:cNvPr>
@@ -12331,7 +13054,7 @@
         </p:nvSpPr>
         <p:spPr>
           <a:xfrm>
-            <a:off x="2539931" y="3511775"/>
+            <a:off x="2597081" y="3511775"/>
             <a:ext cx="129654" cy="141761"/>
           </a:xfrm>
           <a:prstGeom prst="rect">
@@ -12368,10 +13091,10 @@
       </p:sp>
       <p:sp>
         <p:nvSpPr>
-          <p:cNvPr id="29" name="Rectangle 28">
-            <a:extLst>
-              <a:ext uri="{FF2B5EF4-FFF2-40B4-BE49-F238E27FC236}">
-                <a16:creationId xmlns:a16="http://schemas.microsoft.com/office/drawing/2014/main" id="{61E4B796-5243-A652-C05F-3F78649CF87E}"/>
+          <p:cNvPr id="42" name="Rectangle 41">
+            <a:extLst>
+              <a:ext uri="{FF2B5EF4-FFF2-40B4-BE49-F238E27FC236}">
+                <a16:creationId xmlns:a16="http://schemas.microsoft.com/office/drawing/2014/main" id="{210F4086-9188-36F0-1E9D-DF83511F6DD7}"/>
               </a:ext>
             </a:extLst>
           </p:cNvPr>
@@ -12380,7 +13103,7 @@
         </p:nvSpPr>
         <p:spPr>
           <a:xfrm>
-            <a:off x="2668732" y="3511775"/>
+            <a:off x="2725882" y="3511775"/>
             <a:ext cx="129654" cy="141761"/>
           </a:xfrm>
           <a:prstGeom prst="rect">
@@ -12417,10 +13140,10 @@
       </p:sp>
       <p:sp>
         <p:nvSpPr>
-          <p:cNvPr id="30" name="Rectangle 29">
-            <a:extLst>
-              <a:ext uri="{FF2B5EF4-FFF2-40B4-BE49-F238E27FC236}">
-                <a16:creationId xmlns:a16="http://schemas.microsoft.com/office/drawing/2014/main" id="{82E7E3DD-9654-DB19-8E5A-31802A51439B}"/>
+          <p:cNvPr id="43" name="Rectangle 42">
+            <a:extLst>
+              <a:ext uri="{FF2B5EF4-FFF2-40B4-BE49-F238E27FC236}">
+                <a16:creationId xmlns:a16="http://schemas.microsoft.com/office/drawing/2014/main" id="{49FD9561-A974-24A1-B44F-A8A9B3FE527A}"/>
               </a:ext>
             </a:extLst>
           </p:cNvPr>
@@ -12429,7 +13152,7 @@
         </p:nvSpPr>
         <p:spPr>
           <a:xfrm>
-            <a:off x="2797817" y="3511775"/>
+            <a:off x="2854967" y="3511775"/>
             <a:ext cx="129654" cy="141761"/>
           </a:xfrm>
           <a:prstGeom prst="rect">
@@ -12466,23 +13189,23 @@
       </p:sp>
       <p:cxnSp>
         <p:nvCxnSpPr>
-          <p:cNvPr id="35" name="Connector: Curved 34">
-            <a:extLst>
-              <a:ext uri="{FF2B5EF4-FFF2-40B4-BE49-F238E27FC236}">
-                <a16:creationId xmlns:a16="http://schemas.microsoft.com/office/drawing/2014/main" id="{75AC238C-9DB7-1CAC-992A-D69E944B6929}"/>
+          <p:cNvPr id="48" name="Connector: Curved 47">
+            <a:extLst>
+              <a:ext uri="{FF2B5EF4-FFF2-40B4-BE49-F238E27FC236}">
+                <a16:creationId xmlns:a16="http://schemas.microsoft.com/office/drawing/2014/main" id="{ABCCE4A8-71C8-B2AF-BB6A-8192CCB30578}"/>
               </a:ext>
             </a:extLst>
           </p:cNvPr>
           <p:cNvCxnSpPr>
             <a:cxnSpLocks/>
-            <a:stCxn id="30" idx="3"/>
-            <a:endCxn id="40" idx="7"/>
+            <a:stCxn id="43" idx="3"/>
+            <a:endCxn id="55" idx="7"/>
           </p:cNvCxnSpPr>
           <p:nvPr/>
         </p:nvCxnSpPr>
         <p:spPr>
           <a:xfrm flipH="1">
-            <a:off x="2096147" y="3582656"/>
+            <a:off x="2153297" y="3582656"/>
             <a:ext cx="831324" cy="341364"/>
           </a:xfrm>
           <a:prstGeom prst="curvedConnector4">
@@ -12512,10 +13235,10 @@
       </p:cxnSp>
       <p:sp>
         <p:nvSpPr>
-          <p:cNvPr id="39" name="TextBox 38">
-            <a:extLst>
-              <a:ext uri="{FF2B5EF4-FFF2-40B4-BE49-F238E27FC236}">
-                <a16:creationId xmlns:a16="http://schemas.microsoft.com/office/drawing/2014/main" id="{44685D72-24A5-076E-76C0-058258D5C108}"/>
+          <p:cNvPr id="54" name="TextBox 53">
+            <a:extLst>
+              <a:ext uri="{FF2B5EF4-FFF2-40B4-BE49-F238E27FC236}">
+                <a16:creationId xmlns:a16="http://schemas.microsoft.com/office/drawing/2014/main" id="{795D1CDB-97CC-E8CF-174E-2B92542DF915}"/>
               </a:ext>
             </a:extLst>
           </p:cNvPr>
@@ -12524,7 +13247,7 @@
         </p:nvSpPr>
         <p:spPr>
           <a:xfrm>
-            <a:off x="1922907" y="3272496"/>
+            <a:off x="1980057" y="3272496"/>
             <a:ext cx="1532792" cy="261610"/>
           </a:xfrm>
           <a:prstGeom prst="rect">
@@ -12547,10 +13270,10 @@
       </p:sp>
       <p:sp>
         <p:nvSpPr>
-          <p:cNvPr id="40" name="Oval 39">
-            <a:extLst>
-              <a:ext uri="{FF2B5EF4-FFF2-40B4-BE49-F238E27FC236}">
-                <a16:creationId xmlns:a16="http://schemas.microsoft.com/office/drawing/2014/main" id="{3F0A6773-0413-9B27-ABAC-CBEAFF455EC6}"/>
+          <p:cNvPr id="55" name="Oval 54">
+            <a:extLst>
+              <a:ext uri="{FF2B5EF4-FFF2-40B4-BE49-F238E27FC236}">
+                <a16:creationId xmlns:a16="http://schemas.microsoft.com/office/drawing/2014/main" id="{76DA817B-7DAB-F1C0-CAAD-3052432F068B}"/>
               </a:ext>
             </a:extLst>
           </p:cNvPr>
@@ -12559,7 +13282,7 @@
         </p:nvSpPr>
         <p:spPr>
           <a:xfrm>
-            <a:off x="1484272" y="3837221"/>
+            <a:off x="1541422" y="3837221"/>
             <a:ext cx="716856" cy="592704"/>
           </a:xfrm>
           <a:prstGeom prst="ellipse">
@@ -12617,23 +13340,23 @@
       </p:sp>
       <p:cxnSp>
         <p:nvCxnSpPr>
-          <p:cNvPr id="43" name="Connector: Curved 42">
-            <a:extLst>
-              <a:ext uri="{FF2B5EF4-FFF2-40B4-BE49-F238E27FC236}">
-                <a16:creationId xmlns:a16="http://schemas.microsoft.com/office/drawing/2014/main" id="{CCD051D7-0E60-9379-9295-BE7175E43099}"/>
+          <p:cNvPr id="58" name="Connector: Curved 57">
+            <a:extLst>
+              <a:ext uri="{FF2B5EF4-FFF2-40B4-BE49-F238E27FC236}">
+                <a16:creationId xmlns:a16="http://schemas.microsoft.com/office/drawing/2014/main" id="{0F115B42-0A77-4E83-1D0A-4BE37C14FF98}"/>
               </a:ext>
             </a:extLst>
           </p:cNvPr>
           <p:cNvCxnSpPr>
             <a:cxnSpLocks/>
-            <a:stCxn id="49" idx="3"/>
-            <a:endCxn id="8" idx="0"/>
+            <a:stCxn id="64" idx="3"/>
+            <a:endCxn id="22" idx="0"/>
           </p:cNvCxnSpPr>
           <p:nvPr/>
         </p:nvCxnSpPr>
         <p:spPr>
           <a:xfrm flipH="1">
-            <a:off x="1992558" y="5010660"/>
+            <a:off x="2049708" y="5010660"/>
             <a:ext cx="1194160" cy="1241723"/>
           </a:xfrm>
           <a:prstGeom prst="curvedConnector4">
@@ -12664,22 +13387,22 @@
       </p:cxnSp>
       <p:cxnSp>
         <p:nvCxnSpPr>
-          <p:cNvPr id="44" name="Straight Arrow Connector 43">
-            <a:extLst>
-              <a:ext uri="{FF2B5EF4-FFF2-40B4-BE49-F238E27FC236}">
-                <a16:creationId xmlns:a16="http://schemas.microsoft.com/office/drawing/2014/main" id="{8601FF43-4FC5-0D87-904B-D57B10E7C3E5}"/>
+          <p:cNvPr id="59" name="Straight Arrow Connector 58">
+            <a:extLst>
+              <a:ext uri="{FF2B5EF4-FFF2-40B4-BE49-F238E27FC236}">
+                <a16:creationId xmlns:a16="http://schemas.microsoft.com/office/drawing/2014/main" id="{AC579D30-D0D2-758A-4C82-754891336E0B}"/>
               </a:ext>
             </a:extLst>
           </p:cNvPr>
           <p:cNvCxnSpPr>
-            <a:stCxn id="22" idx="2"/>
-            <a:endCxn id="15" idx="0"/>
+            <a:stCxn id="33" idx="2"/>
+            <a:endCxn id="25" idx="0"/>
           </p:cNvCxnSpPr>
           <p:nvPr/>
         </p:nvCxnSpPr>
         <p:spPr>
           <a:xfrm>
-            <a:off x="4143757" y="2206218"/>
+            <a:off x="4200907" y="2206218"/>
             <a:ext cx="3824" cy="615422"/>
           </a:xfrm>
           <a:prstGeom prst="straightConnector1">
@@ -12706,10 +13429,10 @@
       </p:cxnSp>
       <p:sp>
         <p:nvSpPr>
-          <p:cNvPr id="45" name="Oval 44">
-            <a:extLst>
-              <a:ext uri="{FF2B5EF4-FFF2-40B4-BE49-F238E27FC236}">
-                <a16:creationId xmlns:a16="http://schemas.microsoft.com/office/drawing/2014/main" id="{DD3543BE-5730-B0B8-1A6C-CCFD7625A87E}"/>
+          <p:cNvPr id="60" name="Oval 59">
+            <a:extLst>
+              <a:ext uri="{FF2B5EF4-FFF2-40B4-BE49-F238E27FC236}">
+                <a16:creationId xmlns:a16="http://schemas.microsoft.com/office/drawing/2014/main" id="{FAF2F02A-0BB7-8A22-E728-184CA7A121D4}"/>
               </a:ext>
             </a:extLst>
           </p:cNvPr>
@@ -12718,7 +13441,7 @@
         </p:nvSpPr>
         <p:spPr>
           <a:xfrm>
-            <a:off x="3824968" y="2443931"/>
+            <a:off x="3882118" y="2443931"/>
             <a:ext cx="240512" cy="179637"/>
           </a:xfrm>
           <a:prstGeom prst="ellipse">
@@ -12758,10 +13481,10 @@
       </p:sp>
       <p:sp>
         <p:nvSpPr>
-          <p:cNvPr id="46" name="Oval 45">
-            <a:extLst>
-              <a:ext uri="{FF2B5EF4-FFF2-40B4-BE49-F238E27FC236}">
-                <a16:creationId xmlns:a16="http://schemas.microsoft.com/office/drawing/2014/main" id="{BC839444-C3A9-8E70-D46B-E4758B551D87}"/>
+          <p:cNvPr id="61" name="Oval 60">
+            <a:extLst>
+              <a:ext uri="{FF2B5EF4-FFF2-40B4-BE49-F238E27FC236}">
+                <a16:creationId xmlns:a16="http://schemas.microsoft.com/office/drawing/2014/main" id="{9FD3FB3C-928D-0F9E-54E8-5BC00EE7C632}"/>
               </a:ext>
             </a:extLst>
           </p:cNvPr>
@@ -12770,7 +13493,7 @@
         </p:nvSpPr>
         <p:spPr>
           <a:xfrm>
-            <a:off x="3859462" y="2290895"/>
+            <a:off x="3916612" y="2290895"/>
             <a:ext cx="240512" cy="179637"/>
           </a:xfrm>
           <a:prstGeom prst="ellipse">
@@ -12810,22 +13533,22 @@
       </p:sp>
       <p:cxnSp>
         <p:nvCxnSpPr>
-          <p:cNvPr id="47" name="Connector: Curved 46">
-            <a:extLst>
-              <a:ext uri="{FF2B5EF4-FFF2-40B4-BE49-F238E27FC236}">
-                <a16:creationId xmlns:a16="http://schemas.microsoft.com/office/drawing/2014/main" id="{0449F6E4-91E3-3C53-4639-9ADCCFB51DB3}"/>
+          <p:cNvPr id="62" name="Connector: Curved 61">
+            <a:extLst>
+              <a:ext uri="{FF2B5EF4-FFF2-40B4-BE49-F238E27FC236}">
+                <a16:creationId xmlns:a16="http://schemas.microsoft.com/office/drawing/2014/main" id="{F077AB1D-979F-ACE1-00F4-1A1CEAF9B7BA}"/>
               </a:ext>
             </a:extLst>
           </p:cNvPr>
           <p:cNvCxnSpPr>
-            <a:stCxn id="15" idx="2"/>
-            <a:endCxn id="25" idx="1"/>
+            <a:stCxn id="25" idx="2"/>
+            <a:endCxn id="38" idx="1"/>
           </p:cNvCxnSpPr>
           <p:nvPr/>
         </p:nvCxnSpPr>
         <p:spPr>
           <a:xfrm rot="10800000" flipV="1">
-            <a:off x="2152117" y="3080572"/>
+            <a:off x="2209267" y="3080572"/>
             <a:ext cx="1472304" cy="502084"/>
           </a:xfrm>
           <a:prstGeom prst="curvedConnector3">
@@ -12854,23 +13577,23 @@
       </p:cxnSp>
       <p:cxnSp>
         <p:nvCxnSpPr>
-          <p:cNvPr id="48" name="Connector: Curved 47">
-            <a:extLst>
-              <a:ext uri="{FF2B5EF4-FFF2-40B4-BE49-F238E27FC236}">
-                <a16:creationId xmlns:a16="http://schemas.microsoft.com/office/drawing/2014/main" id="{C5ABA387-F7C1-5A65-89FC-84D86BCF6531}"/>
+          <p:cNvPr id="63" name="Connector: Curved 62">
+            <a:extLst>
+              <a:ext uri="{FF2B5EF4-FFF2-40B4-BE49-F238E27FC236}">
+                <a16:creationId xmlns:a16="http://schemas.microsoft.com/office/drawing/2014/main" id="{7C100FD8-0F8D-444E-F691-D32CA47DB732}"/>
               </a:ext>
             </a:extLst>
           </p:cNvPr>
           <p:cNvCxnSpPr>
             <a:cxnSpLocks/>
-            <a:stCxn id="30" idx="3"/>
-            <a:endCxn id="14" idx="7"/>
+            <a:stCxn id="43" idx="3"/>
+            <a:endCxn id="24" idx="7"/>
           </p:cNvCxnSpPr>
           <p:nvPr/>
         </p:nvCxnSpPr>
         <p:spPr>
           <a:xfrm flipH="1">
-            <a:off x="1418067" y="3582656"/>
+            <a:off x="1475217" y="3582656"/>
             <a:ext cx="1509404" cy="336805"/>
           </a:xfrm>
           <a:prstGeom prst="curvedConnector4">
@@ -12900,10 +13623,10 @@
       </p:cxnSp>
       <p:sp>
         <p:nvSpPr>
-          <p:cNvPr id="49" name="Rectangle 48">
-            <a:extLst>
-              <a:ext uri="{FF2B5EF4-FFF2-40B4-BE49-F238E27FC236}">
-                <a16:creationId xmlns:a16="http://schemas.microsoft.com/office/drawing/2014/main" id="{34AB941A-9263-0640-DBCE-A683A1D05375}"/>
+          <p:cNvPr id="64" name="Rectangle 63">
+            <a:extLst>
+              <a:ext uri="{FF2B5EF4-FFF2-40B4-BE49-F238E27FC236}">
+                <a16:creationId xmlns:a16="http://schemas.microsoft.com/office/drawing/2014/main" id="{7E695E0A-800C-AA61-516A-14819BDF8478}"/>
               </a:ext>
             </a:extLst>
           </p:cNvPr>
@@ -12912,7 +13635,7 @@
         </p:nvSpPr>
         <p:spPr>
           <a:xfrm>
-            <a:off x="1277435" y="4307628"/>
+            <a:off x="1334585" y="4307628"/>
             <a:ext cx="1909283" cy="1406063"/>
           </a:xfrm>
           <a:prstGeom prst="rect">
@@ -13055,10 +13778,10 @@
       </p:sp>
       <p:sp>
         <p:nvSpPr>
-          <p:cNvPr id="50" name="TextBox 49">
-            <a:extLst>
-              <a:ext uri="{FF2B5EF4-FFF2-40B4-BE49-F238E27FC236}">
-                <a16:creationId xmlns:a16="http://schemas.microsoft.com/office/drawing/2014/main" id="{23F661E7-B374-3DD0-2883-C7FC85A09D2D}"/>
+          <p:cNvPr id="65" name="TextBox 64">
+            <a:extLst>
+              <a:ext uri="{FF2B5EF4-FFF2-40B4-BE49-F238E27FC236}">
+                <a16:creationId xmlns:a16="http://schemas.microsoft.com/office/drawing/2014/main" id="{3A531704-C51D-ACC5-7184-D9C93A5A0BE9}"/>
               </a:ext>
             </a:extLst>
           </p:cNvPr>
@@ -13067,7 +13790,7 @@
         </p:nvSpPr>
         <p:spPr>
           <a:xfrm>
-            <a:off x="3391584" y="5482410"/>
+            <a:off x="3448734" y="5482410"/>
             <a:ext cx="256802" cy="261610"/>
           </a:xfrm>
           <a:prstGeom prst="rect">
@@ -13090,23 +13813,23 @@
       </p:sp>
       <p:cxnSp>
         <p:nvCxnSpPr>
-          <p:cNvPr id="51" name="Connector: Curved 50">
-            <a:extLst>
-              <a:ext uri="{FF2B5EF4-FFF2-40B4-BE49-F238E27FC236}">
-                <a16:creationId xmlns:a16="http://schemas.microsoft.com/office/drawing/2014/main" id="{A80CF137-5861-F4A9-49C0-64CA4E5D9BBC}"/>
+          <p:cNvPr id="66" name="Connector: Curved 65">
+            <a:extLst>
+              <a:ext uri="{FF2B5EF4-FFF2-40B4-BE49-F238E27FC236}">
+                <a16:creationId xmlns:a16="http://schemas.microsoft.com/office/drawing/2014/main" id="{BDA2F6BF-DBE8-309C-2FCC-85468D97840B}"/>
               </a:ext>
             </a:extLst>
           </p:cNvPr>
           <p:cNvCxnSpPr>
             <a:cxnSpLocks/>
-            <a:stCxn id="49" idx="3"/>
-            <a:endCxn id="16" idx="1"/>
+            <a:stCxn id="64" idx="3"/>
+            <a:endCxn id="26" idx="1"/>
           </p:cNvCxnSpPr>
           <p:nvPr/>
         </p:nvCxnSpPr>
         <p:spPr>
           <a:xfrm>
-            <a:off x="3186718" y="5010660"/>
+            <a:off x="3243868" y="5010660"/>
             <a:ext cx="1173042" cy="401892"/>
           </a:xfrm>
           <a:prstGeom prst="curvedConnector3">
@@ -13135,10 +13858,10 @@
       </p:cxnSp>
       <p:sp>
         <p:nvSpPr>
-          <p:cNvPr id="52" name="TextBox 51">
-            <a:extLst>
-              <a:ext uri="{FF2B5EF4-FFF2-40B4-BE49-F238E27FC236}">
-                <a16:creationId xmlns:a16="http://schemas.microsoft.com/office/drawing/2014/main" id="{828F0798-F80D-F744-9C01-ECAEB4061997}"/>
+          <p:cNvPr id="67" name="TextBox 66">
+            <a:extLst>
+              <a:ext uri="{FF2B5EF4-FFF2-40B4-BE49-F238E27FC236}">
+                <a16:creationId xmlns:a16="http://schemas.microsoft.com/office/drawing/2014/main" id="{6580D0F4-FD16-DD22-8CF4-67404C70C485}"/>
               </a:ext>
             </a:extLst>
           </p:cNvPr>
@@ -13147,7 +13870,7 @@
         </p:nvSpPr>
         <p:spPr>
           <a:xfrm>
-            <a:off x="3833247" y="5150941"/>
+            <a:off x="3890397" y="5150941"/>
             <a:ext cx="489236" cy="261610"/>
           </a:xfrm>
           <a:prstGeom prst="rect">
@@ -13170,10 +13893,10 @@
       </p:sp>
       <p:sp>
         <p:nvSpPr>
-          <p:cNvPr id="53" name="TextBox 52">
-            <a:extLst>
-              <a:ext uri="{FF2B5EF4-FFF2-40B4-BE49-F238E27FC236}">
-                <a16:creationId xmlns:a16="http://schemas.microsoft.com/office/drawing/2014/main" id="{12FB3562-9CAD-F8C5-7E0C-D9F48F296EA0}"/>
+          <p:cNvPr id="68" name="TextBox 67">
+            <a:extLst>
+              <a:ext uri="{FF2B5EF4-FFF2-40B4-BE49-F238E27FC236}">
+                <a16:creationId xmlns:a16="http://schemas.microsoft.com/office/drawing/2014/main" id="{2FF727E2-6CED-A527-9DDB-2DFD8C0A9894}"/>
               </a:ext>
             </a:extLst>
           </p:cNvPr>
@@ -13182,7 +13905,7 @@
         </p:nvSpPr>
         <p:spPr>
           <a:xfrm>
-            <a:off x="5668337" y="5870648"/>
+            <a:off x="5725487" y="5870648"/>
             <a:ext cx="256802" cy="261610"/>
           </a:xfrm>
           <a:prstGeom prst="rect">
@@ -13205,10 +13928,10 @@
       </p:sp>
       <p:sp>
         <p:nvSpPr>
-          <p:cNvPr id="54" name="TextBox 53">
-            <a:extLst>
-              <a:ext uri="{FF2B5EF4-FFF2-40B4-BE49-F238E27FC236}">
-                <a16:creationId xmlns:a16="http://schemas.microsoft.com/office/drawing/2014/main" id="{E0BA4F46-097B-C80F-7282-FD2CD4412318}"/>
+          <p:cNvPr id="69" name="TextBox 68">
+            <a:extLst>
+              <a:ext uri="{FF2B5EF4-FFF2-40B4-BE49-F238E27FC236}">
+                <a16:creationId xmlns:a16="http://schemas.microsoft.com/office/drawing/2014/main" id="{DE12DFDA-DAE6-DC03-A8CF-B826737B0C7F}"/>
               </a:ext>
             </a:extLst>
           </p:cNvPr>
@@ -13217,7 +13940,7 @@
         </p:nvSpPr>
         <p:spPr>
           <a:xfrm>
-            <a:off x="5204381" y="5874758"/>
+            <a:off x="5261531" y="5874758"/>
             <a:ext cx="256802" cy="261610"/>
           </a:xfrm>
           <a:prstGeom prst="rect">
@@ -13240,10 +13963,10 @@
       </p:sp>
       <p:sp>
         <p:nvSpPr>
-          <p:cNvPr id="55" name="Rectangle: Single Corner Snipped 54">
-            <a:extLst>
-              <a:ext uri="{FF2B5EF4-FFF2-40B4-BE49-F238E27FC236}">
-                <a16:creationId xmlns:a16="http://schemas.microsoft.com/office/drawing/2014/main" id="{55996D6F-BC15-CF59-8EFC-BE3D55309AB6}"/>
+          <p:cNvPr id="70" name="Rectangle: Single Corner Snipped 69">
+            <a:extLst>
+              <a:ext uri="{FF2B5EF4-FFF2-40B4-BE49-F238E27FC236}">
+                <a16:creationId xmlns:a16="http://schemas.microsoft.com/office/drawing/2014/main" id="{463FADC6-3FAA-605A-0221-95614C304F1D}"/>
               </a:ext>
             </a:extLst>
           </p:cNvPr>
@@ -13252,7 +13975,7 @@
         </p:nvSpPr>
         <p:spPr>
           <a:xfrm>
-            <a:off x="4424587" y="4429925"/>
+            <a:off x="4481737" y="4429925"/>
             <a:ext cx="826166" cy="441422"/>
           </a:xfrm>
           <a:prstGeom prst="snip1Rect">
@@ -13301,10 +14024,10 @@
       </p:sp>
       <p:cxnSp>
         <p:nvCxnSpPr>
-          <p:cNvPr id="56" name="Straight Arrow Connector 55">
-            <a:extLst>
-              <a:ext uri="{FF2B5EF4-FFF2-40B4-BE49-F238E27FC236}">
-                <a16:creationId xmlns:a16="http://schemas.microsoft.com/office/drawing/2014/main" id="{BFF30045-A49C-639A-980D-2D608D62B7E0}"/>
+          <p:cNvPr id="73" name="Straight Arrow Connector 72">
+            <a:extLst>
+              <a:ext uri="{FF2B5EF4-FFF2-40B4-BE49-F238E27FC236}">
+                <a16:creationId xmlns:a16="http://schemas.microsoft.com/office/drawing/2014/main" id="{5AD9DA09-1C98-C634-C54D-78F47678EB12}"/>
               </a:ext>
             </a:extLst>
           </p:cNvPr>
@@ -13313,7 +14036,7 @@
         </p:nvCxnSpPr>
         <p:spPr>
           <a:xfrm>
-            <a:off x="3186718" y="4574743"/>
+            <a:off x="3243868" y="4574743"/>
             <a:ext cx="1237869" cy="0"/>
           </a:xfrm>
           <a:prstGeom prst="straightConnector1">
@@ -13341,10 +14064,10 @@
       </p:cxnSp>
       <p:sp>
         <p:nvSpPr>
-          <p:cNvPr id="57" name="TextBox 56">
-            <a:extLst>
-              <a:ext uri="{FF2B5EF4-FFF2-40B4-BE49-F238E27FC236}">
-                <a16:creationId xmlns:a16="http://schemas.microsoft.com/office/drawing/2014/main" id="{248DB0C5-737D-41B1-FBCD-A3F6139519DB}"/>
+          <p:cNvPr id="75" name="TextBox 74">
+            <a:extLst>
+              <a:ext uri="{FF2B5EF4-FFF2-40B4-BE49-F238E27FC236}">
+                <a16:creationId xmlns:a16="http://schemas.microsoft.com/office/drawing/2014/main" id="{2541A754-6808-E278-D922-FF2C592BA4AC}"/>
               </a:ext>
             </a:extLst>
           </p:cNvPr>
@@ -13353,7 +14076,7 @@
         </p:nvSpPr>
         <p:spPr>
           <a:xfrm>
-            <a:off x="3705106" y="4336678"/>
+            <a:off x="3762256" y="4336678"/>
             <a:ext cx="256802" cy="261610"/>
           </a:xfrm>
           <a:prstGeom prst="rect">
@@ -13376,21 +14099,21 @@
       </p:sp>
       <p:cxnSp>
         <p:nvCxnSpPr>
-          <p:cNvPr id="58" name="Straight Arrow Connector 57">
-            <a:extLst>
-              <a:ext uri="{FF2B5EF4-FFF2-40B4-BE49-F238E27FC236}">
-                <a16:creationId xmlns:a16="http://schemas.microsoft.com/office/drawing/2014/main" id="{6BFFE055-F2D3-C266-10EC-8FDFC013EF69}"/>
+          <p:cNvPr id="76" name="Straight Arrow Connector 75">
+            <a:extLst>
+              <a:ext uri="{FF2B5EF4-FFF2-40B4-BE49-F238E27FC236}">
+                <a16:creationId xmlns:a16="http://schemas.microsoft.com/office/drawing/2014/main" id="{7A08338C-626E-F947-840A-505BA182D7B4}"/>
               </a:ext>
             </a:extLst>
           </p:cNvPr>
           <p:cNvCxnSpPr>
-            <a:stCxn id="24" idx="4"/>
+            <a:stCxn id="37" idx="4"/>
           </p:cNvCxnSpPr>
           <p:nvPr/>
         </p:nvCxnSpPr>
         <p:spPr>
           <a:xfrm flipH="1">
-            <a:off x="5257330" y="5812951"/>
+            <a:off x="5314480" y="5812951"/>
             <a:ext cx="301392" cy="404839"/>
           </a:xfrm>
           <a:prstGeom prst="straightConnector1">
@@ -13417,21 +14140,21 @@
       </p:cxnSp>
       <p:cxnSp>
         <p:nvCxnSpPr>
-          <p:cNvPr id="59" name="Straight Arrow Connector 58">
-            <a:extLst>
-              <a:ext uri="{FF2B5EF4-FFF2-40B4-BE49-F238E27FC236}">
-                <a16:creationId xmlns:a16="http://schemas.microsoft.com/office/drawing/2014/main" id="{910F64F4-0708-EA76-8C1F-A7A7E6A6FBF5}"/>
+          <p:cNvPr id="77" name="Straight Arrow Connector 76">
+            <a:extLst>
+              <a:ext uri="{FF2B5EF4-FFF2-40B4-BE49-F238E27FC236}">
+                <a16:creationId xmlns:a16="http://schemas.microsoft.com/office/drawing/2014/main" id="{15D45433-743C-4AAB-7E28-BC62EE540204}"/>
               </a:ext>
             </a:extLst>
           </p:cNvPr>
           <p:cNvCxnSpPr>
-            <a:stCxn id="24" idx="4"/>
+            <a:stCxn id="37" idx="4"/>
           </p:cNvCxnSpPr>
           <p:nvPr/>
         </p:nvCxnSpPr>
         <p:spPr>
           <a:xfrm>
-            <a:off x="5558722" y="5812951"/>
+            <a:off x="5615872" y="5812951"/>
             <a:ext cx="274676" cy="404839"/>
           </a:xfrm>
           <a:prstGeom prst="straightConnector1">
@@ -13458,539 +14181,10 @@
       </p:cxnSp>
       <p:sp>
         <p:nvSpPr>
-          <p:cNvPr id="60" name="TextBox 59">
-            <a:extLst>
-              <a:ext uri="{FF2B5EF4-FFF2-40B4-BE49-F238E27FC236}">
-                <a16:creationId xmlns:a16="http://schemas.microsoft.com/office/drawing/2014/main" id="{003F762F-D027-3BC9-86ED-C99581E64A15}"/>
-              </a:ext>
-            </a:extLst>
-          </p:cNvPr>
-          <p:cNvSpPr txBox="1"/>
-          <p:nvPr/>
-        </p:nvSpPr>
-        <p:spPr>
-          <a:xfrm>
-            <a:off x="6538589" y="0"/>
-            <a:ext cx="5601498" cy="7201972"/>
-          </a:xfrm>
-          <a:prstGeom prst="rect">
-            <a:avLst/>
-          </a:prstGeom>
-          <a:noFill/>
-        </p:spPr>
-        <p:txBody>
-          <a:bodyPr wrap="square" rtlCol="0">
-            <a:spAutoFit/>
-          </a:bodyPr>
-          <a:lstStyle/>
-          <a:p>
-            <a:r>
-              <a:rPr lang="en-US" sz="1200"/>
-              <a:t>Race condition #1:  step #1 in the job</a:t>
-            </a:r>
-          </a:p>
-          <a:p>
-            <a:endParaRPr lang="en-US" sz="1200"/>
-          </a:p>
-          <a:p>
-            <a:r>
-              <a:rPr lang="en-US" sz="1200"/>
-              <a:t>Same neighbor’s different revisions (1, 6, 8) may be invoked at the same time, or latter ones may be completed first. </a:t>
-            </a:r>
-          </a:p>
-          <a:p>
-            <a:r>
-              <a:rPr lang="en-US" sz="1200"/>
-              <a:t>As long as the pushed states are target states (can finish programming with this version of state only, doesn’t need previous actions executed in strict order), latter revision can be executed first and doesn’t cause harm and may save some resource</a:t>
-            </a:r>
-          </a:p>
-          <a:p>
-            <a:pPr marL="171450" indent="-171450">
-              <a:buFont typeface="Arial" panose="020B0604020202020204" pitchFamily="34" charset="0"/>
-              <a:buChar char="•"/>
-            </a:pPr>
-            <a:endParaRPr lang="en-US" sz="1200"/>
-          </a:p>
-          <a:p>
-            <a:pPr marL="171450" indent="-171450">
-              <a:buFont typeface="Arial" panose="020B0604020202020204" pitchFamily="34" charset="0"/>
-              <a:buChar char="•"/>
-            </a:pPr>
-            <a:r>
-              <a:rPr lang="en-US" sz="1200"/>
-              <a:t>Case 1: 1 -&gt; 6 -&gt; 8</a:t>
-            </a:r>
-          </a:p>
-          <a:p>
-            <a:pPr marL="171450" indent="-171450">
-              <a:buFont typeface="Arial" panose="020B0604020202020204" pitchFamily="34" charset="0"/>
-              <a:buChar char="•"/>
-            </a:pPr>
-            <a:r>
-              <a:rPr lang="en-US" sz="1200"/>
-              <a:t>Case 2:  6 -&gt; 8 -&gt; 1</a:t>
-            </a:r>
-          </a:p>
-          <a:p>
-            <a:pPr marL="628650" lvl="1" indent="-171450">
-              <a:buFont typeface="Arial" panose="020B0604020202020204" pitchFamily="34" charset="0"/>
-              <a:buChar char="•"/>
-            </a:pPr>
-            <a:r>
-              <a:rPr lang="en-US" sz="1100"/>
-              <a:t>Ver 6 first</a:t>
-            </a:r>
-          </a:p>
-          <a:p>
-            <a:pPr marL="1085850" lvl="2" indent="-171450">
-              <a:buFont typeface="Arial" panose="020B0604020202020204" pitchFamily="34" charset="0"/>
-              <a:buChar char="•"/>
-            </a:pPr>
-            <a:r>
-              <a:rPr lang="en-US" sz="1100"/>
-              <a:t>Not found in </a:t>
-            </a:r>
-            <a:r>
-              <a:rPr lang="en-US" sz="1100" err="1"/>
-              <a:t>hashmap</a:t>
-            </a:r>
-            <a:r>
-              <a:rPr lang="en-US" sz="1100"/>
-              <a:t>, thus insert key with </a:t>
-            </a:r>
-            <a:r>
-              <a:rPr lang="en-US" sz="1100" err="1"/>
-              <a:t>ver</a:t>
-            </a:r>
-            <a:r>
-              <a:rPr lang="en-US" sz="1100"/>
-              <a:t> 6</a:t>
-            </a:r>
-          </a:p>
-          <a:p>
-            <a:pPr marL="1085850" lvl="2" indent="-171450">
-              <a:buFont typeface="Arial" panose="020B0604020202020204" pitchFamily="34" charset="0"/>
-              <a:buChar char="•"/>
-            </a:pPr>
-            <a:r>
-              <a:rPr lang="en-US" sz="1100"/>
-              <a:t>Async write to </a:t>
-            </a:r>
-            <a:r>
-              <a:rPr lang="en-US" sz="1100" err="1"/>
-              <a:t>db</a:t>
-            </a:r>
-            <a:r>
-              <a:rPr lang="en-US" sz="1100"/>
-              <a:t> table1</a:t>
-            </a:r>
-          </a:p>
-          <a:p>
-            <a:pPr marL="1085850" lvl="2" indent="-171450">
-              <a:buFont typeface="Arial" panose="020B0604020202020204" pitchFamily="34" charset="0"/>
-              <a:buChar char="•"/>
-            </a:pPr>
-            <a:r>
-              <a:rPr lang="en-US" sz="1100" err="1"/>
-              <a:t>eBPF</a:t>
-            </a:r>
-            <a:r>
-              <a:rPr lang="en-US" sz="1100"/>
-              <a:t> </a:t>
-            </a:r>
-            <a:r>
-              <a:rPr lang="en-US" sz="1100" err="1"/>
-              <a:t>syscall</a:t>
-            </a:r>
-            <a:r>
-              <a:rPr lang="en-US" sz="1100"/>
-              <a:t> is add if not found, or update if found</a:t>
-            </a:r>
-          </a:p>
-          <a:p>
-            <a:pPr marL="1085850" lvl="2" indent="-171450">
-              <a:buFont typeface="Arial" panose="020B0604020202020204" pitchFamily="34" charset="0"/>
-              <a:buChar char="•"/>
-            </a:pPr>
-            <a:r>
-              <a:rPr lang="en-US" sz="1100"/>
-              <a:t>Async write to </a:t>
-            </a:r>
-            <a:r>
-              <a:rPr lang="en-US" sz="1100" err="1"/>
-              <a:t>db</a:t>
-            </a:r>
-            <a:r>
-              <a:rPr lang="en-US" sz="1100"/>
-              <a:t> table2 if above succeeds</a:t>
-            </a:r>
-          </a:p>
-          <a:p>
-            <a:pPr marL="628650" lvl="1" indent="-171450">
-              <a:buFont typeface="Arial" panose="020B0604020202020204" pitchFamily="34" charset="0"/>
-              <a:buChar char="•"/>
-            </a:pPr>
-            <a:r>
-              <a:rPr lang="en-US" sz="1100"/>
-              <a:t>Ver 8 is to delete it</a:t>
-            </a:r>
-          </a:p>
-          <a:p>
-            <a:pPr marL="1085850" lvl="2" indent="-171450">
-              <a:buFont typeface="Arial" panose="020B0604020202020204" pitchFamily="34" charset="0"/>
-              <a:buChar char="•"/>
-            </a:pPr>
-            <a:r>
-              <a:rPr lang="en-US" sz="1100"/>
-              <a:t>Found </a:t>
-            </a:r>
-            <a:r>
-              <a:rPr lang="en-US" sz="1100" err="1"/>
-              <a:t>ver</a:t>
-            </a:r>
-            <a:r>
-              <a:rPr lang="en-US" sz="1100"/>
-              <a:t> 6 in </a:t>
-            </a:r>
-            <a:r>
-              <a:rPr lang="en-US" sz="1100" err="1"/>
-              <a:t>hashmap</a:t>
-            </a:r>
-            <a:r>
-              <a:rPr lang="en-US" sz="1100"/>
-              <a:t>, since 8 &gt; 6, update with </a:t>
-            </a:r>
-            <a:r>
-              <a:rPr lang="en-US" sz="1100" err="1"/>
-              <a:t>ver</a:t>
-            </a:r>
-            <a:r>
-              <a:rPr lang="en-US" sz="1100"/>
-              <a:t> 8</a:t>
-            </a:r>
-          </a:p>
-          <a:p>
-            <a:pPr marL="1085850" lvl="2" indent="-171450">
-              <a:buFont typeface="Arial" panose="020B0604020202020204" pitchFamily="34" charset="0"/>
-              <a:buChar char="•"/>
-            </a:pPr>
-            <a:r>
-              <a:rPr lang="en-US" sz="1100"/>
-              <a:t>Since in table1 </a:t>
-            </a:r>
-            <a:r>
-              <a:rPr lang="en-US" sz="1100" err="1"/>
-              <a:t>cur_ver</a:t>
-            </a:r>
-            <a:r>
-              <a:rPr lang="en-US" sz="1100"/>
-              <a:t> 8 &gt; </a:t>
-            </a:r>
-            <a:r>
-              <a:rPr lang="en-US" sz="1100" err="1"/>
-              <a:t>fetch_ver</a:t>
-            </a:r>
-            <a:r>
-              <a:rPr lang="en-US" sz="1100"/>
-              <a:t> 6, update</a:t>
-            </a:r>
-          </a:p>
-          <a:p>
-            <a:pPr marL="1085850" lvl="2" indent="-171450">
-              <a:buFont typeface="Arial" panose="020B0604020202020204" pitchFamily="34" charset="0"/>
-              <a:buChar char="•"/>
-            </a:pPr>
-            <a:r>
-              <a:rPr lang="en-US" sz="1100"/>
-              <a:t>delete from </a:t>
-            </a:r>
-            <a:r>
-              <a:rPr lang="en-US" sz="1100" err="1"/>
-              <a:t>eBPF</a:t>
-            </a:r>
-            <a:r>
-              <a:rPr lang="en-US" sz="1100"/>
-              <a:t> map and update table 2</a:t>
-            </a:r>
-          </a:p>
-          <a:p>
-            <a:pPr marL="628650" lvl="1" indent="-171450">
-              <a:buFont typeface="Arial" panose="020B0604020202020204" pitchFamily="34" charset="0"/>
-              <a:buChar char="•"/>
-            </a:pPr>
-            <a:r>
-              <a:rPr lang="en-US" sz="1100"/>
-              <a:t>Ver 1 at last</a:t>
-            </a:r>
-          </a:p>
-          <a:p>
-            <a:pPr marL="1085850" lvl="2" indent="-171450">
-              <a:buFont typeface="Arial" panose="020B0604020202020204" pitchFamily="34" charset="0"/>
-              <a:buChar char="•"/>
-            </a:pPr>
-            <a:r>
-              <a:rPr lang="en-US" sz="1100"/>
-              <a:t>Found </a:t>
-            </a:r>
-            <a:r>
-              <a:rPr lang="en-US" sz="1100" err="1"/>
-              <a:t>ver</a:t>
-            </a:r>
-            <a:r>
-              <a:rPr lang="en-US" sz="1100"/>
-              <a:t> 8 from </a:t>
-            </a:r>
-            <a:r>
-              <a:rPr lang="en-US" sz="1100" err="1"/>
-              <a:t>hashmap</a:t>
-            </a:r>
-            <a:r>
-              <a:rPr lang="en-US" sz="1100"/>
-              <a:t>, since 1 &lt; 8 simply ignore </a:t>
-            </a:r>
-            <a:r>
-              <a:rPr lang="en-US" sz="1100" err="1"/>
-              <a:t>eBPF</a:t>
-            </a:r>
-            <a:r>
-              <a:rPr lang="en-US" sz="1100"/>
-              <a:t> programming</a:t>
-            </a:r>
-          </a:p>
-          <a:p>
-            <a:pPr marL="1085850" lvl="2" indent="-171450">
-              <a:buFont typeface="Arial" panose="020B0604020202020204" pitchFamily="34" charset="0"/>
-              <a:buChar char="•"/>
-            </a:pPr>
-            <a:r>
-              <a:rPr lang="en-US" sz="1100"/>
-              <a:t>In table1, since 1 &lt; 8, also ignore updating</a:t>
-            </a:r>
-          </a:p>
-          <a:p>
-            <a:pPr marL="1085850" lvl="2" indent="-171450">
-              <a:buFont typeface="Arial" panose="020B0604020202020204" pitchFamily="34" charset="0"/>
-              <a:buChar char="•"/>
-            </a:pPr>
-            <a:r>
-              <a:rPr lang="en-US" sz="1100"/>
-              <a:t>Update table2</a:t>
-            </a:r>
-          </a:p>
-          <a:p>
-            <a:pPr marL="171450" indent="-171450">
-              <a:buFont typeface="Arial" panose="020B0604020202020204" pitchFamily="34" charset="0"/>
-              <a:buChar char="•"/>
-            </a:pPr>
-            <a:r>
-              <a:rPr lang="en-US" sz="1200"/>
-              <a:t>Case 3: 8 -&gt; 6 -&gt; 1 or 8 -&gt; 1 -&gt; 6</a:t>
-            </a:r>
-          </a:p>
-          <a:p>
-            <a:pPr marL="628650" lvl="1" indent="-171450">
-              <a:buFont typeface="Arial" panose="020B0604020202020204" pitchFamily="34" charset="0"/>
-              <a:buChar char="•"/>
-            </a:pPr>
-            <a:r>
-              <a:rPr lang="en-US" sz="1100"/>
-              <a:t>Ver 8 (deletion) first</a:t>
-            </a:r>
-          </a:p>
-          <a:p>
-            <a:pPr marL="1085850" lvl="2" indent="-171450">
-              <a:buFont typeface="Arial" panose="020B0604020202020204" pitchFamily="34" charset="0"/>
-              <a:buChar char="•"/>
-            </a:pPr>
-            <a:r>
-              <a:rPr lang="en-US" sz="1100"/>
-              <a:t>Not found in </a:t>
-            </a:r>
-            <a:r>
-              <a:rPr lang="en-US" sz="1100" err="1"/>
-              <a:t>hashmap</a:t>
-            </a:r>
-            <a:r>
-              <a:rPr lang="en-US" sz="1100"/>
-              <a:t>, thus insert key with </a:t>
-            </a:r>
-            <a:r>
-              <a:rPr lang="en-US" sz="1100" err="1"/>
-              <a:t>ver</a:t>
-            </a:r>
-            <a:r>
-              <a:rPr lang="en-US" sz="1100"/>
-              <a:t> 8</a:t>
-            </a:r>
-          </a:p>
-          <a:p>
-            <a:pPr marL="1085850" lvl="2" indent="-171450">
-              <a:buFont typeface="Arial" panose="020B0604020202020204" pitchFamily="34" charset="0"/>
-              <a:buChar char="•"/>
-            </a:pPr>
-            <a:r>
-              <a:rPr lang="en-US" sz="1100" err="1"/>
-              <a:t>eBPF</a:t>
-            </a:r>
-            <a:r>
-              <a:rPr lang="en-US" sz="1100"/>
-              <a:t> </a:t>
-            </a:r>
-            <a:r>
-              <a:rPr lang="en-US" sz="1100" err="1"/>
-              <a:t>syscall</a:t>
-            </a:r>
-            <a:r>
-              <a:rPr lang="en-US" sz="1100"/>
-              <a:t> is if found delete, if not found do nothing</a:t>
-            </a:r>
-          </a:p>
-          <a:p>
-            <a:pPr marL="1085850" lvl="2" indent="-171450">
-              <a:buFont typeface="Arial" panose="020B0604020202020204" pitchFamily="34" charset="0"/>
-              <a:buChar char="•"/>
-            </a:pPr>
-            <a:r>
-              <a:rPr lang="en-US" sz="1100"/>
-              <a:t>Update table1 and 2</a:t>
-            </a:r>
-          </a:p>
-          <a:p>
-            <a:pPr marL="628650" lvl="1" indent="-171450">
-              <a:buFont typeface="Arial" panose="020B0604020202020204" pitchFamily="34" charset="0"/>
-              <a:buChar char="•"/>
-            </a:pPr>
-            <a:r>
-              <a:rPr lang="en-US" sz="1100"/>
-              <a:t>Then </a:t>
-            </a:r>
-            <a:r>
-              <a:rPr lang="en-US" sz="1100" err="1"/>
-              <a:t>ver</a:t>
-            </a:r>
-            <a:r>
-              <a:rPr lang="en-US" sz="1100"/>
-              <a:t> 1 or </a:t>
-            </a:r>
-            <a:r>
-              <a:rPr lang="en-US" sz="1100" err="1"/>
-              <a:t>ver</a:t>
-            </a:r>
-            <a:r>
-              <a:rPr lang="en-US" sz="1100"/>
-              <a:t> 6</a:t>
-            </a:r>
-          </a:p>
-          <a:p>
-            <a:pPr marL="1085850" lvl="2" indent="-171450">
-              <a:buFont typeface="Arial" panose="020B0604020202020204" pitchFamily="34" charset="0"/>
-              <a:buChar char="•"/>
-            </a:pPr>
-            <a:r>
-              <a:rPr lang="en-US" sz="1100"/>
-              <a:t>Found </a:t>
-            </a:r>
-            <a:r>
-              <a:rPr lang="en-US" sz="1100" err="1"/>
-              <a:t>ver</a:t>
-            </a:r>
-            <a:r>
-              <a:rPr lang="en-US" sz="1100"/>
-              <a:t> 8 from </a:t>
-            </a:r>
-            <a:r>
-              <a:rPr lang="en-US" sz="1100" err="1"/>
-              <a:t>hashmap</a:t>
-            </a:r>
-            <a:r>
-              <a:rPr lang="en-US" sz="1100"/>
-              <a:t>, simply ignore </a:t>
-            </a:r>
-            <a:r>
-              <a:rPr lang="en-US" sz="1100" err="1"/>
-              <a:t>eBPF</a:t>
-            </a:r>
-            <a:r>
-              <a:rPr lang="en-US" sz="1100"/>
-              <a:t> programming but update table2</a:t>
-            </a:r>
-          </a:p>
-          <a:p>
-            <a:pPr marL="1085850" lvl="2" indent="-171450">
-              <a:buFont typeface="Arial" panose="020B0604020202020204" pitchFamily="34" charset="0"/>
-              <a:buChar char="•"/>
-            </a:pPr>
-            <a:r>
-              <a:rPr lang="en-US" sz="1100"/>
-              <a:t>In table1, since 1 or 6 &lt; 8, ignore updating</a:t>
-            </a:r>
-          </a:p>
-          <a:p>
-            <a:endParaRPr lang="en-US" sz="1100"/>
-          </a:p>
-          <a:p>
-            <a:r>
-              <a:rPr lang="en-US" sz="1100"/>
-              <a:t>Observation/philosophy:  </a:t>
-            </a:r>
-          </a:p>
-          <a:p>
-            <a:pPr marL="285750" indent="-285750">
-              <a:buFont typeface="Arial" panose="020B0604020202020204" pitchFamily="34" charset="0"/>
-              <a:buChar char="•"/>
-            </a:pPr>
-            <a:r>
-              <a:rPr lang="en-US" sz="1100"/>
-              <a:t>Concurrent HashMap and table1 (may combine later), update condition is increasing version</a:t>
-            </a:r>
-          </a:p>
-          <a:p>
-            <a:pPr marL="285750" indent="-285750">
-              <a:buFont typeface="Arial" panose="020B0604020202020204" pitchFamily="34" charset="0"/>
-              <a:buChar char="•"/>
-            </a:pPr>
-            <a:r>
-              <a:rPr lang="en-US" sz="1100"/>
-              <a:t>table2</a:t>
-            </a:r>
-          </a:p>
-          <a:p>
-            <a:pPr marL="742950" lvl="1" indent="-285750">
-              <a:buFont typeface="Courier New" panose="02070309020205020404" pitchFamily="49" charset="0"/>
-              <a:buChar char="o"/>
-            </a:pPr>
-            <a:r>
-              <a:rPr lang="en-US" sz="1100"/>
-              <a:t>programming done (succeeded + intended ignore) log to table2</a:t>
-            </a:r>
-          </a:p>
-          <a:p>
-            <a:pPr marL="742950" lvl="1" indent="-285750">
-              <a:buFont typeface="Courier New" panose="02070309020205020404" pitchFamily="49" charset="0"/>
-              <a:buChar char="o"/>
-            </a:pPr>
-            <a:r>
-              <a:rPr lang="en-US" sz="1100"/>
-              <a:t>programming failed do not log to table2</a:t>
-            </a:r>
-            <a:endParaRPr lang="en-US" sz="1400"/>
-          </a:p>
-          <a:p>
-            <a:pPr lvl="2"/>
-            <a:endParaRPr lang="en-US" sz="1100"/>
-          </a:p>
-          <a:p>
-            <a:pPr lvl="2"/>
-            <a:endParaRPr lang="en-US" sz="1100"/>
-          </a:p>
-        </p:txBody>
-      </p:sp>
-      <p:sp>
-        <p:nvSpPr>
-          <p:cNvPr id="10" name="Title 1">
-            <a:extLst>
-              <a:ext uri="{FF2B5EF4-FFF2-40B4-BE49-F238E27FC236}">
-                <a16:creationId xmlns:a16="http://schemas.microsoft.com/office/drawing/2014/main" id="{3E4AC56D-1D77-363D-CCF1-0F8577F445F9}"/>
+          <p:cNvPr id="5" name="Title 1">
+            <a:extLst>
+              <a:ext uri="{FF2B5EF4-FFF2-40B4-BE49-F238E27FC236}">
+                <a16:creationId xmlns:a16="http://schemas.microsoft.com/office/drawing/2014/main" id="{619AAC46-B63A-6E72-9290-B4F75216F8A0}"/>
               </a:ext>
             </a:extLst>
           </p:cNvPr>
@@ -14004,7 +14198,7 @@
         <p:spPr>
           <a:xfrm>
             <a:off x="838200" y="365125"/>
-            <a:ext cx="10515600" cy="1325563"/>
+            <a:ext cx="5199993" cy="1325563"/>
           </a:xfrm>
         </p:spPr>
         <p:txBody>
@@ -14021,18 +14215,13 @@
     </p:spTree>
     <p:extLst>
       <p:ext uri="{BB962C8B-B14F-4D97-AF65-F5344CB8AC3E}">
-        <p14:creationId xmlns:p14="http://schemas.microsoft.com/office/powerpoint/2010/main" val="3276570579"/>
+        <p14:creationId xmlns:p14="http://schemas.microsoft.com/office/powerpoint/2010/main" val="3178622597"/>
       </p:ext>
     </p:extLst>
   </p:cSld>
   <p:clrMapOvr>
     <a:masterClrMapping/>
   </p:clrMapOvr>
-  <p:extLst>
-    <p:ext uri="{6950BFC3-D8DA-4A85-94F7-54DA5524770B}">
-      <p188:commentRel xmlns:p188="http://schemas.microsoft.com/office/powerpoint/2018/8/main" r:id="rId3"/>
-    </p:ext>
-  </p:extLst>
 </p:sld>
 </file>
 
@@ -16465,7 +16654,7 @@
           <a:p>
             <a:r>
               <a:rPr lang="en-US" sz="1400"/>
-              <a:t>Race condition #2:    diff between HashMap and table 1</a:t>
+              <a:t>Race condition #3:    diff between HashMap and table 1</a:t>
             </a:r>
           </a:p>
           <a:p>
@@ -19294,7 +19483,7 @@
           <a:p>
             <a:r>
               <a:rPr lang="en-US" sz="1400"/>
-              <a:t>Race condition #3:  diff between table 1 and table 2</a:t>
+              <a:t>Race condition #4:  diff between table 1 and table 2</a:t>
             </a:r>
           </a:p>
           <a:p>
@@ -22396,7 +22585,7 @@
           <a:p>
             <a:r>
               <a:rPr lang="en-US" sz="1400"/>
-              <a:t>Race condition #4:  diff between real </a:t>
+              <a:t>Race condition #5:  diff between real </a:t>
             </a:r>
             <a:r>
               <a:rPr lang="en-US" sz="1400" err="1"/>
@@ -26127,7 +26316,7 @@
           <a:lstStyle/>
           <a:p>
             <a:r>
-              <a:rPr lang="en-US" sz="1100" dirty="0">
+              <a:rPr lang="en-US" sz="1100">
                 <a:solidFill>
                   <a:schemeClr val="tx1"/>
                 </a:solidFill>
@@ -26136,7 +26325,7 @@
             </a:r>
           </a:p>
           <a:p>
-            <a:endParaRPr lang="en-US" sz="1100" dirty="0">
+            <a:endParaRPr lang="en-US" sz="1100">
               <a:solidFill>
                 <a:schemeClr val="tx1"/>
               </a:solidFill>
@@ -26144,7 +26333,7 @@
           </a:p>
           <a:p>
             <a:r>
-              <a:rPr lang="en-US" sz="1100" dirty="0">
+              <a:rPr lang="en-US" sz="1100">
                 <a:solidFill>
                   <a:schemeClr val="accent6"/>
                 </a:solidFill>
@@ -26154,7 +26343,7 @@
           </a:p>
           <a:p>
             <a:r>
-              <a:rPr lang="en-US" sz="1100" dirty="0">
+              <a:rPr lang="en-US" sz="1100">
                 <a:solidFill>
                   <a:schemeClr val="accent6"/>
                 </a:solidFill>
@@ -26164,7 +26353,7 @@
           </a:p>
           <a:p>
             <a:r>
-              <a:rPr lang="en-US" sz="1100" dirty="0">
+              <a:rPr lang="en-US" sz="1100">
                 <a:solidFill>
                   <a:schemeClr val="accent6"/>
                 </a:solidFill>
@@ -26174,7 +26363,7 @@
           </a:p>
           <a:p>
             <a:r>
-              <a:rPr lang="en-US" sz="1100" dirty="0">
+              <a:rPr lang="en-US" sz="1100">
                 <a:solidFill>
                   <a:schemeClr val="accent6"/>
                 </a:solidFill>
@@ -26550,15 +26739,15 @@
           <a:lstStyle/>
           <a:p>
             <a:r>
-              <a:rPr lang="en-US" sz="1400" dirty="0"/>
+              <a:rPr lang="en-US" sz="1400"/>
               <a:t>Grpc (</a:t>
             </a:r>
             <a:r>
-              <a:rPr lang="en-US" sz="1400" dirty="0" err="1"/>
+              <a:rPr lang="en-US" sz="1400" err="1"/>
               <a:t>List&amp;Watch</a:t>
             </a:r>
             <a:r>
-              <a:rPr lang="en-US" sz="1400" dirty="0"/>
+              <a:rPr lang="en-US" sz="1400"/>
               <a:t> API) request</a:t>
             </a:r>
           </a:p>
@@ -27023,10 +27212,10 @@
           <a:p>
             <a:pPr algn="ctr"/>
             <a:r>
-              <a:rPr lang="en-US" dirty="0" err="1"/>
+              <a:rPr lang="en-US" err="1"/>
               <a:t>Hazelcast</a:t>
             </a:r>
-            <a:endParaRPr lang="en-US" dirty="0"/>
+            <a:endParaRPr lang="en-US"/>
           </a:p>
         </p:txBody>
       </p:sp>
@@ -27770,34 +27959,34 @@
           <a:lstStyle/>
           <a:p>
             <a:r>
-              <a:rPr lang="en-US" sz="1100" dirty="0"/>
+              <a:rPr lang="en-US" sz="1100"/>
               <a:t>Neighbor rule:</a:t>
             </a:r>
           </a:p>
           <a:p>
-            <a:endParaRPr lang="en-US" sz="1100" dirty="0"/>
-          </a:p>
-          <a:p>
-            <a:r>
-              <a:rPr lang="en-US" sz="1100" dirty="0"/>
+            <a:endParaRPr lang="en-US" sz="1100"/>
+          </a:p>
+          <a:p>
+            <a:r>
+              <a:rPr lang="en-US" sz="1100"/>
               <a:t>{</a:t>
             </a:r>
           </a:p>
           <a:p>
             <a:r>
-              <a:rPr lang="en-US" sz="1100" dirty="0"/>
+              <a:rPr lang="en-US" sz="1100"/>
               <a:t>    neighbor info</a:t>
             </a:r>
           </a:p>
           <a:p>
             <a:r>
-              <a:rPr lang="en-US" sz="1100" dirty="0"/>
+              <a:rPr lang="en-US" sz="1100"/>
               <a:t>    neighbor group</a:t>
             </a:r>
           </a:p>
           <a:p>
             <a:r>
-              <a:rPr lang="en-US" sz="1100" dirty="0"/>
+              <a:rPr lang="en-US" sz="1100"/>
               <a:t>}</a:t>
             </a:r>
           </a:p>
@@ -27848,40 +28037,40 @@
           <a:lstStyle/>
           <a:p>
             <a:r>
-              <a:rPr lang="en-US" sz="1100" dirty="0"/>
+              <a:rPr lang="en-US" sz="1100"/>
               <a:t>Neighbor rule:</a:t>
             </a:r>
           </a:p>
           <a:p>
-            <a:endParaRPr lang="en-US" sz="1100" dirty="0"/>
-          </a:p>
-          <a:p>
-            <a:r>
-              <a:rPr lang="en-US" sz="1100" dirty="0"/>
+            <a:endParaRPr lang="en-US" sz="1100"/>
+          </a:p>
+          <a:p>
+            <a:r>
+              <a:rPr lang="en-US" sz="1100"/>
               <a:t>{</a:t>
             </a:r>
           </a:p>
           <a:p>
             <a:r>
-              <a:rPr lang="en-US" sz="1100" dirty="0"/>
+              <a:rPr lang="en-US" sz="1100"/>
               <a:t>    neighbor info</a:t>
             </a:r>
           </a:p>
           <a:p>
             <a:r>
-              <a:rPr lang="en-US" sz="1100" dirty="0"/>
+              <a:rPr lang="en-US" sz="1100"/>
               <a:t>    neighbor group</a:t>
             </a:r>
           </a:p>
           <a:p>
             <a:r>
-              <a:rPr lang="en-US" sz="1100" dirty="0"/>
+              <a:rPr lang="en-US" sz="1100"/>
               <a:t>    neighbor version</a:t>
             </a:r>
           </a:p>
           <a:p>
             <a:r>
-              <a:rPr lang="en-US" sz="1100" dirty="0"/>
+              <a:rPr lang="en-US" sz="1100"/>
               <a:t>}</a:t>
             </a:r>
           </a:p>
@@ -28629,6 +28818,9 @@
           <a:p>
             <a:r>
               <a:rPr lang="en-US">
+                <a:solidFill>
+                  <a:schemeClr val="accent3"/>
+                </a:solidFill>
                 <a:cs typeface="Calibri"/>
               </a:rPr>
               <a:t>Neighbor level</a:t>
@@ -32776,16 +32968,16 @@
 <file path=customXml/itemProps1.xml><?xml version="1.0" encoding="utf-8"?>
 <ds:datastoreItem xmlns:ds="http://schemas.openxmlformats.org/officeDocument/2006/customXml" ds:itemID="{7153B77C-8669-490D-A1AF-B6547AA76D9B}">
   <ds:schemaRefs>
-    <ds:schemaRef ds:uri="http://www.w3.org/XML/1998/namespace"/>
+    <ds:schemaRef ds:uri="http://purl.org/dc/elements/1.1/"/>
+    <ds:schemaRef ds:uri="http://purl.org/dc/terms/"/>
+    <ds:schemaRef ds:uri="http://schemas.microsoft.com/office/2006/documentManagement/types"/>
+    <ds:schemaRef ds:uri="http://schemas.microsoft.com/office/2006/metadata/properties"/>
     <ds:schemaRef ds:uri="35b0bf06-ef8c-497b-921c-5cf98f14bf1b"/>
     <ds:schemaRef ds:uri="http://purl.org/dc/dcmitype/"/>
-    <ds:schemaRef ds:uri="http://schemas.microsoft.com/office/2006/metadata/properties"/>
-    <ds:schemaRef ds:uri="http://purl.org/dc/elements/1.1/"/>
-    <ds:schemaRef ds:uri="http://schemas.microsoft.com/office/2006/documentManagement/types"/>
     <ds:schemaRef ds:uri="http://schemas.openxmlformats.org/package/2006/metadata/core-properties"/>
     <ds:schemaRef ds:uri="http://schemas.microsoft.com/office/infopath/2007/PartnerControls"/>
     <ds:schemaRef ds:uri="84223b59-851b-4b03-9e37-5703e473df94"/>
-    <ds:schemaRef ds:uri="http://purl.org/dc/terms/"/>
+    <ds:schemaRef ds:uri="http://www.w3.org/XML/1998/namespace"/>
   </ds:schemaRefs>
 </ds:datastoreItem>
 </file>

</xml_diff>

<commit_message>
Update reconcile design spec with more details (#6)
Update reconcile with more details
</commit_message>
<xml_diff>
--- a/docs/design/Arion - State Reconciliation.pptx
+++ b/docs/design/Arion - State Reconciliation.pptx
@@ -19,8 +19,8 @@
     <p:sldId id="270" r:id="rId13"/>
     <p:sldId id="259" r:id="rId14"/>
     <p:sldId id="260" r:id="rId15"/>
-    <p:sldId id="267" r:id="rId16"/>
-    <p:sldId id="273" r:id="rId17"/>
+    <p:sldId id="273" r:id="rId16"/>
+    <p:sldId id="267" r:id="rId17"/>
     <p:sldId id="279" r:id="rId18"/>
     <p:sldId id="281" r:id="rId19"/>
     <p:sldId id="282" r:id="rId20"/>
@@ -146,14 +146,14 @@
   <p1510:revLst>
     <p1510:client id="{74C4598A-A2B3-4135-858D-A2ED4DF598A7}" v="748" vWet="752" dt="2022-09-13T21:48:03.230"/>
     <p1510:client id="{7D4F7EB4-D853-4E48-AA9A-E80CA53CED3B}" vWet="2" dt="2022-09-14T00:53:27.499"/>
-    <p1510:client id="{809F7682-8634-4D1E-9951-227E47637BCA}" v="2434" dt="2022-09-14T04:14:22.567"/>
+    <p1510:client id="{809F7682-8634-4D1E-9951-227E47637BCA}" v="3640" dt="2022-09-14T22:37:39.149"/>
   </p1510:revLst>
 </p1510:revInfo>
 </file>
 
 <file path=ppt/comments/modernComment_102_8DFAEFD1.xml><?xml version="1.0" encoding="utf-8"?>
 <p188:cmLst xmlns:a="http://schemas.openxmlformats.org/drawingml/2006/main" xmlns:r="http://schemas.openxmlformats.org/officeDocument/2006/relationships" xmlns:p188="http://schemas.microsoft.com/office/powerpoint/2018/8/main">
-  <p188:cm id="{F05FE77F-48F4-4819-AD75-5F103F9DFEA7}" authorId="{3666BA98-6DB4-47CA-27ED-68554259095C}" created="2022-09-13T16:41:54.113">
+  <p188:cm id="{F05FE77F-48F4-4819-AD75-5F103F9DFEA7}" authorId="{3666BA98-6DB4-47CA-27ED-68554259095C}" status="resolved" created="2022-09-13T16:41:54.113" complete="100000">
     <ac:txMkLst xmlns:ac="http://schemas.microsoft.com/office/drawing/2013/main/command">
       <pc:docMk xmlns:pc="http://schemas.microsoft.com/office/powerpoint/2013/main/command"/>
       <pc:sldMk xmlns:pc="http://schemas.microsoft.com/office/powerpoint/2013/main/command" cId="2382032849" sldId="258"/>
@@ -163,6 +163,21 @@
       </ac:txMk>
     </ac:txMkLst>
     <p188:pos x="2956143" y="611993"/>
+    <p188:replyLst>
+      <p188:reply id="{6F5ECDDC-80EE-4C22-8A63-78DAC48C22AE}" authorId="{3666BA98-6DB4-47CA-27ED-68554259095C}" created="2022-09-14T17:46:48.622">
+        <p188:txBody>
+          <a:bodyPr/>
+          <a:lstStyle/>
+          <a:p>
+            <a:r>
+              <a:rPr lang="en-US"/>
+              <a:t>1. if need to ensure strict order GoalState pushing, then this is the Tx
+2. if out of order GoalState pushing is allowed, then Tx can be further broke down to (getVersion) and (insertToDb), and will further accelerate the server processing speed</a:t>
+            </a:r>
+          </a:p>
+        </p188:txBody>
+      </p188:reply>
+    </p188:replyLst>
     <p188:txBody>
       <a:bodyPr/>
       <a:lstStyle/>
@@ -179,7 +194,7 @@
 
 <file path=ppt/comments/modernComment_111_C34C7FD3.xml><?xml version="1.0" encoding="utf-8"?>
 <p188:cmLst xmlns:a="http://schemas.openxmlformats.org/drawingml/2006/main" xmlns:r="http://schemas.openxmlformats.org/officeDocument/2006/relationships" xmlns:p188="http://schemas.microsoft.com/office/powerpoint/2018/8/main">
-  <p188:cm id="{F58A23D2-A8E8-4F9A-AFDE-F7461C539E30}" authorId="{3666BA98-6DB4-47CA-27ED-68554259095C}" created="2022-09-13T01:44:32.138">
+  <p188:cm id="{F58A23D2-A8E8-4F9A-AFDE-F7461C539E30}" authorId="{3666BA98-6DB4-47CA-27ED-68554259095C}" status="resolved" created="2022-09-13T01:44:32.138" complete="100000">
     <pc:sldMkLst xmlns:pc="http://schemas.microsoft.com/office/powerpoint/2013/main/command">
       <pc:docMk/>
       <pc:sldMk cId="3276570579" sldId="273"/>
@@ -301,7 +316,7 @@
           <a:p>
             <a:fld id="{A86F7C5E-7CBC-4A2C-88FC-655B3F7411DD}" type="datetimeFigureOut">
               <a:rPr lang="en-US" smtClean="0"/>
-              <a:t>9/13/2022</a:t>
+              <a:t>9/14/2022</a:t>
             </a:fld>
             <a:endParaRPr lang="en-US"/>
           </a:p>
@@ -696,48 +711,7 @@
           <a:bodyPr/>
           <a:lstStyle/>
           <a:p>
-            <a:r>
-              <a:rPr lang="en-US"/>
-              <a:t>There are 2 ways to solve the ordering issue: </a:t>
-            </a:r>
-          </a:p>
-          <a:p>
-            <a:pPr marL="228600" indent="-228600">
-              <a:buAutoNum type="arabicPeriod"/>
-            </a:pPr>
-            <a:r>
-              <a:rPr lang="en-US"/>
-              <a:t>Execution queues (and a set of queues make up a thread pool) that requires hashing on key. The disadvantages are mainly two</a:t>
-            </a:r>
-          </a:p>
-          <a:p>
-            <a:pPr marL="685800" lvl="1" indent="-228600">
-              <a:buFont typeface="+mj-lt"/>
-              <a:buAutoNum type="arabicParenR"/>
-            </a:pPr>
-            <a:r>
-              <a:rPr lang="en-US"/>
-              <a:t>Threading capabilities may not be very well balanced</a:t>
-            </a:r>
-          </a:p>
-          <a:p>
-            <a:pPr marL="685800" lvl="1" indent="-228600">
-              <a:buFont typeface="+mj-lt"/>
-              <a:buAutoNum type="arabicParenR"/>
-            </a:pPr>
-            <a:r>
-              <a:rPr lang="en-US"/>
-              <a:t>Batch/bulk retry, with order. What to do with 6 failed and then execute 8, may need a status tracking cache for each key anyway. That is very close to solution #2</a:t>
-            </a:r>
-          </a:p>
-          <a:p>
-            <a:pPr marL="228600" indent="-228600">
-              <a:buAutoNum type="arabicPeriod"/>
-            </a:pPr>
-            <a:r>
-              <a:rPr lang="en-US"/>
-              <a:t>Do not put strict order on sequential tasks (as long as each task has entire states, that doesn’t require previous delta changes to be done in strict order), but let them compete</a:t>
-            </a:r>
+            <a:endParaRPr lang="en-US"/>
           </a:p>
         </p:txBody>
       </p:sp>
@@ -767,7 +741,7 @@
     </p:spTree>
     <p:extLst>
       <p:ext uri="{BB962C8B-B14F-4D97-AF65-F5344CB8AC3E}">
-        <p14:creationId xmlns:p14="http://schemas.microsoft.com/office/powerpoint/2010/main" val="3967796804"/>
+        <p14:creationId xmlns:p14="http://schemas.microsoft.com/office/powerpoint/2010/main" val="2711280477"/>
       </p:ext>
     </p:extLst>
   </p:cSld>
@@ -821,7 +795,48 @@
           <a:bodyPr/>
           <a:lstStyle/>
           <a:p>
-            <a:endParaRPr lang="en-US"/>
+            <a:r>
+              <a:rPr lang="en-US"/>
+              <a:t>There are 2 ways to solve the ordering issue: </a:t>
+            </a:r>
+          </a:p>
+          <a:p>
+            <a:pPr marL="228600" indent="-228600">
+              <a:buAutoNum type="arabicPeriod"/>
+            </a:pPr>
+            <a:r>
+              <a:rPr lang="en-US"/>
+              <a:t>Execution queues (and a set of queues make up a thread pool) that requires hashing on key. The disadvantages are mainly two</a:t>
+            </a:r>
+          </a:p>
+          <a:p>
+            <a:pPr marL="685800" lvl="1" indent="-228600">
+              <a:buFont typeface="+mj-lt"/>
+              <a:buAutoNum type="arabicParenR"/>
+            </a:pPr>
+            <a:r>
+              <a:rPr lang="en-US"/>
+              <a:t>Threading capabilities may not be very well balanced</a:t>
+            </a:r>
+          </a:p>
+          <a:p>
+            <a:pPr marL="685800" lvl="1" indent="-228600">
+              <a:buFont typeface="+mj-lt"/>
+              <a:buAutoNum type="arabicParenR"/>
+            </a:pPr>
+            <a:r>
+              <a:rPr lang="en-US"/>
+              <a:t>Batch/bulk retry, with order. What to do with 6 failed and then execute 8, may need a status tracking cache for each key anyway. That is very close to solution #2</a:t>
+            </a:r>
+          </a:p>
+          <a:p>
+            <a:pPr marL="228600" indent="-228600">
+              <a:buAutoNum type="arabicPeriod"/>
+            </a:pPr>
+            <a:r>
+              <a:rPr lang="en-US"/>
+              <a:t>Do not put strict order on sequential tasks (as long as each task has entire states, that doesn’t require previous delta changes to be done in strict order), but let them compete</a:t>
+            </a:r>
           </a:p>
         </p:txBody>
       </p:sp>
@@ -851,7 +866,7 @@
     </p:spTree>
     <p:extLst>
       <p:ext uri="{BB962C8B-B14F-4D97-AF65-F5344CB8AC3E}">
-        <p14:creationId xmlns:p14="http://schemas.microsoft.com/office/powerpoint/2010/main" val="2711280477"/>
+        <p14:creationId xmlns:p14="http://schemas.microsoft.com/office/powerpoint/2010/main" val="3967796804"/>
       </p:ext>
     </p:extLst>
   </p:cSld>
@@ -1260,7 +1275,7 @@
           <a:p>
             <a:fld id="{4313DBB7-0233-4735-A383-51E67FFBC23A}" type="datetimeFigureOut">
               <a:rPr lang="en-US" smtClean="0"/>
-              <a:t>9/13/2022</a:t>
+              <a:t>9/14/2022</a:t>
             </a:fld>
             <a:endParaRPr lang="en-US"/>
           </a:p>
@@ -1458,7 +1473,7 @@
           <a:p>
             <a:fld id="{4313DBB7-0233-4735-A383-51E67FFBC23A}" type="datetimeFigureOut">
               <a:rPr lang="en-US" smtClean="0"/>
-              <a:t>9/13/2022</a:t>
+              <a:t>9/14/2022</a:t>
             </a:fld>
             <a:endParaRPr lang="en-US"/>
           </a:p>
@@ -1666,7 +1681,7 @@
           <a:p>
             <a:fld id="{4313DBB7-0233-4735-A383-51E67FFBC23A}" type="datetimeFigureOut">
               <a:rPr lang="en-US" smtClean="0"/>
-              <a:t>9/13/2022</a:t>
+              <a:t>9/14/2022</a:t>
             </a:fld>
             <a:endParaRPr lang="en-US"/>
           </a:p>
@@ -1864,7 +1879,7 @@
           <a:p>
             <a:fld id="{4313DBB7-0233-4735-A383-51E67FFBC23A}" type="datetimeFigureOut">
               <a:rPr lang="en-US" smtClean="0"/>
-              <a:t>9/13/2022</a:t>
+              <a:t>9/14/2022</a:t>
             </a:fld>
             <a:endParaRPr lang="en-US"/>
           </a:p>
@@ -2139,7 +2154,7 @@
           <a:p>
             <a:fld id="{4313DBB7-0233-4735-A383-51E67FFBC23A}" type="datetimeFigureOut">
               <a:rPr lang="en-US" smtClean="0"/>
-              <a:t>9/13/2022</a:t>
+              <a:t>9/14/2022</a:t>
             </a:fld>
             <a:endParaRPr lang="en-US"/>
           </a:p>
@@ -2404,7 +2419,7 @@
           <a:p>
             <a:fld id="{4313DBB7-0233-4735-A383-51E67FFBC23A}" type="datetimeFigureOut">
               <a:rPr lang="en-US" smtClean="0"/>
-              <a:t>9/13/2022</a:t>
+              <a:t>9/14/2022</a:t>
             </a:fld>
             <a:endParaRPr lang="en-US"/>
           </a:p>
@@ -2816,7 +2831,7 @@
           <a:p>
             <a:fld id="{4313DBB7-0233-4735-A383-51E67FFBC23A}" type="datetimeFigureOut">
               <a:rPr lang="en-US" smtClean="0"/>
-              <a:t>9/13/2022</a:t>
+              <a:t>9/14/2022</a:t>
             </a:fld>
             <a:endParaRPr lang="en-US"/>
           </a:p>
@@ -2957,7 +2972,7 @@
           <a:p>
             <a:fld id="{4313DBB7-0233-4735-A383-51E67FFBC23A}" type="datetimeFigureOut">
               <a:rPr lang="en-US" smtClean="0"/>
-              <a:t>9/13/2022</a:t>
+              <a:t>9/14/2022</a:t>
             </a:fld>
             <a:endParaRPr lang="en-US"/>
           </a:p>
@@ -3070,7 +3085,7 @@
           <a:p>
             <a:fld id="{4313DBB7-0233-4735-A383-51E67FFBC23A}" type="datetimeFigureOut">
               <a:rPr lang="en-US" smtClean="0"/>
-              <a:t>9/13/2022</a:t>
+              <a:t>9/14/2022</a:t>
             </a:fld>
             <a:endParaRPr lang="en-US"/>
           </a:p>
@@ -3381,7 +3396,7 @@
           <a:p>
             <a:fld id="{4313DBB7-0233-4735-A383-51E67FFBC23A}" type="datetimeFigureOut">
               <a:rPr lang="en-US" smtClean="0"/>
-              <a:t>9/13/2022</a:t>
+              <a:t>9/14/2022</a:t>
             </a:fld>
             <a:endParaRPr lang="en-US"/>
           </a:p>
@@ -3669,7 +3684,7 @@
           <a:p>
             <a:fld id="{4313DBB7-0233-4735-A383-51E67FFBC23A}" type="datetimeFigureOut">
               <a:rPr lang="en-US" smtClean="0"/>
-              <a:t>9/13/2022</a:t>
+              <a:t>9/14/2022</a:t>
             </a:fld>
             <a:endParaRPr lang="en-US"/>
           </a:p>
@@ -3910,7 +3925,7 @@
           <a:p>
             <a:fld id="{4313DBB7-0233-4735-A383-51E67FFBC23A}" type="datetimeFigureOut">
               <a:rPr lang="en-US" smtClean="0"/>
-              <a:t>9/13/2022</a:t>
+              <a:t>9/14/2022</a:t>
             </a:fld>
             <a:endParaRPr lang="en-US"/>
           </a:p>
@@ -4971,7 +4986,7 @@
           <a:p>
             <a:pPr algn="ctr"/>
             <a:r>
-              <a:rPr lang="en-US" sz="800" dirty="0">
+              <a:rPr lang="en-US" sz="800">
                 <a:solidFill>
                   <a:schemeClr val="tx1"/>
                 </a:solidFill>
@@ -4982,7 +4997,7 @@
           <a:p>
             <a:pPr algn="ctr"/>
             <a:r>
-              <a:rPr lang="en-US" sz="800" dirty="0">
+              <a:rPr lang="en-US" sz="800">
                 <a:solidFill>
                   <a:schemeClr val="tx1"/>
                 </a:solidFill>
@@ -5495,22 +5510,22 @@
           <a:p>
             <a:pPr algn="ctr"/>
             <a:r>
-              <a:rPr lang="en-US" sz="1000" dirty="0"/>
+              <a:rPr lang="en-US" sz="1000"/>
               <a:t>DB </a:t>
             </a:r>
             <a:r>
-              <a:rPr lang="en-US" sz="900" dirty="0"/>
+              <a:rPr lang="en-US" sz="900"/>
               <a:t>background</a:t>
             </a:r>
-            <a:endParaRPr lang="en-US" sz="1000" dirty="0"/>
+            <a:endParaRPr lang="en-US" sz="1000"/>
           </a:p>
           <a:p>
             <a:pPr algn="ctr"/>
             <a:r>
-              <a:rPr lang="en-US" sz="1000" dirty="0"/>
+              <a:rPr lang="en-US" sz="1000"/>
               <a:t>worker</a:t>
             </a:r>
-            <a:endParaRPr lang="en-US" sz="1100" dirty="0"/>
+            <a:endParaRPr lang="en-US" sz="1100"/>
           </a:p>
         </p:txBody>
       </p:sp>
@@ -6893,7 +6908,7 @@
           <a:lstStyle/>
           <a:p>
             <a:r>
-              <a:rPr lang="en-US" sz="900" dirty="0">
+              <a:rPr lang="en-US" sz="900">
                 <a:solidFill>
                   <a:schemeClr val="tx1"/>
                 </a:solidFill>
@@ -6906,7 +6921,7 @@
               <a:buAutoNum type="arabicPeriod"/>
             </a:pPr>
             <a:r>
-              <a:rPr lang="en-US" sz="900" dirty="0" err="1">
+              <a:rPr lang="en-US" sz="900" err="1">
                 <a:solidFill>
                   <a:schemeClr val="tx1"/>
                 </a:solidFill>
@@ -6914,7 +6929,7 @@
               <a:t>syncly</a:t>
             </a:r>
             <a:r>
-              <a:rPr lang="en-US" sz="900" dirty="0">
+              <a:rPr lang="en-US" sz="900">
                 <a:solidFill>
                   <a:schemeClr val="tx1"/>
                 </a:solidFill>
@@ -6927,7 +6942,7 @@
               <a:buAutoNum type="arabicPeriod"/>
             </a:pPr>
             <a:r>
-              <a:rPr lang="en-US" sz="900" dirty="0">
+              <a:rPr lang="en-US" sz="900">
                 <a:solidFill>
                   <a:schemeClr val="tx1"/>
                 </a:solidFill>
@@ -6940,7 +6955,7 @@
               <a:buAutoNum type="arabicPeriod"/>
             </a:pPr>
             <a:r>
-              <a:rPr lang="en-US" sz="900" dirty="0" err="1">
+              <a:rPr lang="en-US" sz="900" err="1">
                 <a:solidFill>
                   <a:schemeClr val="tx1"/>
                 </a:solidFill>
@@ -6948,7 +6963,7 @@
               <a:t>syncly</a:t>
             </a:r>
             <a:r>
-              <a:rPr lang="en-US" sz="900" dirty="0">
+              <a:rPr lang="en-US" sz="900">
                 <a:solidFill>
                   <a:schemeClr val="tx1"/>
                 </a:solidFill>
@@ -6956,7 +6971,7 @@
               <a:t> invoke </a:t>
             </a:r>
             <a:r>
-              <a:rPr lang="en-US" sz="900" dirty="0" err="1">
+              <a:rPr lang="en-US" sz="900" err="1">
                 <a:solidFill>
                   <a:schemeClr val="tx1"/>
                 </a:solidFill>
@@ -6964,7 +6979,7 @@
               <a:t>eBPF</a:t>
             </a:r>
             <a:r>
-              <a:rPr lang="en-US" sz="900" dirty="0">
+              <a:rPr lang="en-US" sz="900">
                 <a:solidFill>
                   <a:schemeClr val="tx1"/>
                 </a:solidFill>
@@ -6972,7 +6987,7 @@
               <a:t> </a:t>
             </a:r>
             <a:r>
-              <a:rPr lang="en-US" sz="900" dirty="0" err="1">
+              <a:rPr lang="en-US" sz="900" err="1">
                 <a:solidFill>
                   <a:schemeClr val="tx1"/>
                 </a:solidFill>
@@ -6980,7 +6995,7 @@
               <a:t>syscall</a:t>
             </a:r>
             <a:r>
-              <a:rPr lang="en-US" sz="900" dirty="0">
+              <a:rPr lang="en-US" sz="900">
                 <a:solidFill>
                   <a:schemeClr val="tx1"/>
                 </a:solidFill>
@@ -6993,7 +7008,7 @@
               <a:buAutoNum type="arabicPeriod"/>
             </a:pPr>
             <a:r>
-              <a:rPr lang="en-US" sz="900" dirty="0">
+              <a:rPr lang="en-US" sz="900">
                 <a:solidFill>
                   <a:schemeClr val="tx1"/>
                 </a:solidFill>
@@ -7243,7 +7258,7 @@
           <a:p>
             <a:pPr algn="ctr"/>
             <a:r>
-              <a:rPr lang="en-US" sz="900" dirty="0"/>
+              <a:rPr lang="en-US" sz="900"/>
               <a:t>Concurrent HashMap</a:t>
             </a:r>
           </a:p>
@@ -8606,124 +8621,10 @@
       </p:grpSpPr>
       <p:sp>
         <p:nvSpPr>
-          <p:cNvPr id="2" name="Title 1">
-            <a:extLst>
-              <a:ext uri="{FF2B5EF4-FFF2-40B4-BE49-F238E27FC236}">
-                <a16:creationId xmlns:a16="http://schemas.microsoft.com/office/drawing/2014/main" id="{38C38483-E53A-E2BF-11E0-AFF957EF5D6A}"/>
-              </a:ext>
-            </a:extLst>
-          </p:cNvPr>
-          <p:cNvSpPr>
-            <a:spLocks noGrp="1"/>
-          </p:cNvSpPr>
-          <p:nvPr>
-            <p:ph type="title"/>
-          </p:nvPr>
-        </p:nvSpPr>
-        <p:spPr>
-          <a:xfrm>
-            <a:off x="530247" y="96746"/>
-            <a:ext cx="10515600" cy="1325563"/>
-          </a:xfrm>
-        </p:spPr>
-        <p:txBody>
-          <a:bodyPr/>
-          <a:lstStyle/>
-          <a:p>
-            <a:r>
-              <a:rPr lang="en-US"/>
-              <a:t>Concurrency and race condition</a:t>
-            </a:r>
-          </a:p>
-        </p:txBody>
-      </p:sp>
-      <p:sp>
-        <p:nvSpPr>
-          <p:cNvPr id="72" name="TextBox 71">
-            <a:extLst>
-              <a:ext uri="{FF2B5EF4-FFF2-40B4-BE49-F238E27FC236}">
-                <a16:creationId xmlns:a16="http://schemas.microsoft.com/office/drawing/2014/main" id="{9A268795-8737-CCFB-AB89-69ACA13738F7}"/>
-              </a:ext>
-            </a:extLst>
-          </p:cNvPr>
-          <p:cNvSpPr txBox="1"/>
-          <p:nvPr/>
-        </p:nvSpPr>
-        <p:spPr>
-          <a:xfrm>
-            <a:off x="7278700" y="3258365"/>
-            <a:ext cx="4172436" cy="1908215"/>
-          </a:xfrm>
-          <a:prstGeom prst="rect">
-            <a:avLst/>
-          </a:prstGeom>
-          <a:noFill/>
-        </p:spPr>
-        <p:txBody>
-          <a:bodyPr wrap="square" rtlCol="0">
-            <a:spAutoFit/>
-          </a:bodyPr>
-          <a:lstStyle/>
-          <a:p>
-            <a:r>
-              <a:rPr lang="en-US" sz="1400"/>
-              <a:t>Memory cache: lock (competition) scope, per key (means resource identifier, and for neighbor it is  VNI + </a:t>
-            </a:r>
-            <a:r>
-              <a:rPr lang="en-US" sz="1400" err="1"/>
-              <a:t>vpc_ip</a:t>
-            </a:r>
-            <a:r>
-              <a:rPr lang="en-US" sz="1400"/>
-              <a:t>)</a:t>
-            </a:r>
-          </a:p>
-          <a:p>
-            <a:pPr lvl="1"/>
-            <a:r>
-              <a:rPr lang="en-US" sz="1400">
-                <a:hlinkClick r:id="rId3"/>
-              </a:rPr>
-              <a:t>https://github.com/facebook/folly/blob/main/folly/docs/AtomicHashMap.md</a:t>
-            </a:r>
-            <a:r>
-              <a:rPr lang="en-US" sz="1400"/>
-              <a:t> </a:t>
-            </a:r>
-          </a:p>
-          <a:p>
-            <a:pPr marL="685800" lvl="1" indent="-228600">
-              <a:buFont typeface="+mj-lt"/>
-              <a:buAutoNum type="arabicPeriod"/>
-            </a:pPr>
-            <a:r>
-              <a:rPr lang="en-US" sz="1200"/>
-              <a:t>find and iteration are wait-free, insert has key-level lock granularity</a:t>
-            </a:r>
-          </a:p>
-          <a:p>
-            <a:pPr marL="685800" lvl="1" indent="-228600">
-              <a:buFont typeface="+mj-lt"/>
-              <a:buAutoNum type="arabicPeriod"/>
-            </a:pPr>
-            <a:r>
-              <a:rPr lang="en-US" sz="1200"/>
-              <a:t>only supports 32 or 64 bit keys - this is because they must be atomically compare-and-</a:t>
-            </a:r>
-            <a:r>
-              <a:rPr lang="en-US" sz="1200" err="1"/>
-              <a:t>swaped</a:t>
-            </a:r>
-            <a:endParaRPr lang="en-US" sz="1200"/>
-          </a:p>
-        </p:txBody>
-      </p:sp>
-      <p:sp>
-        <p:nvSpPr>
-          <p:cNvPr id="14" name="Rectangle: Rounded Corners 13">
-            <a:extLst>
-              <a:ext uri="{FF2B5EF4-FFF2-40B4-BE49-F238E27FC236}">
-                <a16:creationId xmlns:a16="http://schemas.microsoft.com/office/drawing/2014/main" id="{0EFAD92F-E102-0827-413A-4A9683148DAC}"/>
+          <p:cNvPr id="5" name="Rectangle: Rounded Corners 4">
+            <a:extLst>
+              <a:ext uri="{FF2B5EF4-FFF2-40B4-BE49-F238E27FC236}">
+                <a16:creationId xmlns:a16="http://schemas.microsoft.com/office/drawing/2014/main" id="{44C2F6E4-68E8-7BD3-9AA0-3FC6A0F86D05}"/>
               </a:ext>
             </a:extLst>
           </p:cNvPr>
@@ -8732,8 +8633,8 @@
         </p:nvSpPr>
         <p:spPr>
           <a:xfrm>
-            <a:off x="164461" y="2727510"/>
-            <a:ext cx="6541140" cy="4033744"/>
+            <a:off x="107311" y="2727510"/>
+            <a:ext cx="6369690" cy="4033744"/>
           </a:xfrm>
           <a:prstGeom prst="roundRect">
             <a:avLst/>
@@ -8918,10 +8819,10 @@
       </p:sp>
       <p:sp>
         <p:nvSpPr>
-          <p:cNvPr id="17" name="Rectangle: Rounded Corners 16">
-            <a:extLst>
-              <a:ext uri="{FF2B5EF4-FFF2-40B4-BE49-F238E27FC236}">
-                <a16:creationId xmlns:a16="http://schemas.microsoft.com/office/drawing/2014/main" id="{042EA16B-B4AC-B87F-77A1-3AE13CDAB5B9}"/>
+          <p:cNvPr id="7" name="Rectangle: Rounded Corners 6">
+            <a:extLst>
+              <a:ext uri="{FF2B5EF4-FFF2-40B4-BE49-F238E27FC236}">
+                <a16:creationId xmlns:a16="http://schemas.microsoft.com/office/drawing/2014/main" id="{958AB707-D515-1EAF-A3C9-6C726169C230}"/>
               </a:ext>
             </a:extLst>
           </p:cNvPr>
@@ -8930,8 +8831,8 @@
         </p:nvSpPr>
         <p:spPr>
           <a:xfrm>
-            <a:off x="340716" y="2727509"/>
-            <a:ext cx="6212484" cy="3195009"/>
+            <a:off x="283566" y="2727509"/>
+            <a:ext cx="6000953" cy="3195009"/>
           </a:xfrm>
           <a:prstGeom prst="roundRect">
             <a:avLst/>
@@ -9068,10 +8969,10 @@
       </p:sp>
       <p:sp>
         <p:nvSpPr>
-          <p:cNvPr id="22" name="Rectangle: Rounded Corners 21">
-            <a:extLst>
-              <a:ext uri="{FF2B5EF4-FFF2-40B4-BE49-F238E27FC236}">
-                <a16:creationId xmlns:a16="http://schemas.microsoft.com/office/drawing/2014/main" id="{7FD54D54-FD94-014F-4DA9-A90DACF52365}"/>
+          <p:cNvPr id="8" name="Rectangle: Rounded Corners 7">
+            <a:extLst>
+              <a:ext uri="{FF2B5EF4-FFF2-40B4-BE49-F238E27FC236}">
+                <a16:creationId xmlns:a16="http://schemas.microsoft.com/office/drawing/2014/main" id="{E9479206-2B6F-61B5-11FD-2AEA536AB0F8}"/>
               </a:ext>
             </a:extLst>
           </p:cNvPr>
@@ -9080,7 +8981,7 @@
         </p:nvSpPr>
         <p:spPr>
           <a:xfrm>
-            <a:off x="1600399" y="6252383"/>
+            <a:off x="1543249" y="6252383"/>
             <a:ext cx="898618" cy="295271"/>
           </a:xfrm>
           <a:prstGeom prst="roundRect">
@@ -9132,10 +9033,10 @@
       </p:sp>
       <p:sp>
         <p:nvSpPr>
-          <p:cNvPr id="23" name="Cylinder 22">
-            <a:extLst>
-              <a:ext uri="{FF2B5EF4-FFF2-40B4-BE49-F238E27FC236}">
-                <a16:creationId xmlns:a16="http://schemas.microsoft.com/office/drawing/2014/main" id="{C2CE633F-782B-6076-54E0-8C50CEF41A4A}"/>
+          <p:cNvPr id="13" name="Cylinder 12">
+            <a:extLst>
+              <a:ext uri="{FF2B5EF4-FFF2-40B4-BE49-F238E27FC236}">
+                <a16:creationId xmlns:a16="http://schemas.microsoft.com/office/drawing/2014/main" id="{195748CA-E231-A0B8-1080-B97D02CFDBC8}"/>
               </a:ext>
             </a:extLst>
           </p:cNvPr>
@@ -9144,7 +9045,7 @@
         </p:nvSpPr>
         <p:spPr>
           <a:xfrm>
-            <a:off x="4926194" y="6217790"/>
+            <a:off x="4869044" y="6217790"/>
             <a:ext cx="1307067" cy="364459"/>
           </a:xfrm>
           <a:prstGeom prst="can">
@@ -9196,10 +9097,10 @@
       </p:sp>
       <p:sp>
         <p:nvSpPr>
-          <p:cNvPr id="24" name="Oval 23">
-            <a:extLst>
-              <a:ext uri="{FF2B5EF4-FFF2-40B4-BE49-F238E27FC236}">
-                <a16:creationId xmlns:a16="http://schemas.microsoft.com/office/drawing/2014/main" id="{94C0A6A7-1A8F-ED07-669C-0EB3544C5C75}"/>
+          <p:cNvPr id="14" name="Oval 13">
+            <a:extLst>
+              <a:ext uri="{FF2B5EF4-FFF2-40B4-BE49-F238E27FC236}">
+                <a16:creationId xmlns:a16="http://schemas.microsoft.com/office/drawing/2014/main" id="{58119580-8723-C375-DABE-F80474FD1677}"/>
               </a:ext>
             </a:extLst>
           </p:cNvPr>
@@ -9208,7 +9109,7 @@
         </p:nvSpPr>
         <p:spPr>
           <a:xfrm>
-            <a:off x="863342" y="3830773"/>
+            <a:off x="806192" y="3830773"/>
             <a:ext cx="716856" cy="605600"/>
           </a:xfrm>
           <a:prstGeom prst="ellipse">
@@ -9266,10 +9167,10 @@
       </p:sp>
       <p:sp>
         <p:nvSpPr>
-          <p:cNvPr id="25" name="Oval 24">
-            <a:extLst>
-              <a:ext uri="{FF2B5EF4-FFF2-40B4-BE49-F238E27FC236}">
-                <a16:creationId xmlns:a16="http://schemas.microsoft.com/office/drawing/2014/main" id="{58A64855-BB00-BC84-E8E4-9ED9605A78CB}"/>
+          <p:cNvPr id="15" name="Oval 14">
+            <a:extLst>
+              <a:ext uri="{FF2B5EF4-FFF2-40B4-BE49-F238E27FC236}">
+                <a16:creationId xmlns:a16="http://schemas.microsoft.com/office/drawing/2014/main" id="{77CBCC49-35DC-9D18-7EF6-70E1016EAF0E}"/>
               </a:ext>
             </a:extLst>
           </p:cNvPr>
@@ -9278,7 +9179,7 @@
         </p:nvSpPr>
         <p:spPr>
           <a:xfrm>
-            <a:off x="3681571" y="2821640"/>
+            <a:off x="3624421" y="2821640"/>
             <a:ext cx="1046319" cy="517864"/>
           </a:xfrm>
           <a:prstGeom prst="ellipse">
@@ -9318,10 +9219,10 @@
       </p:sp>
       <p:sp>
         <p:nvSpPr>
-          <p:cNvPr id="26" name="Rectangle 25">
-            <a:extLst>
-              <a:ext uri="{FF2B5EF4-FFF2-40B4-BE49-F238E27FC236}">
-                <a16:creationId xmlns:a16="http://schemas.microsoft.com/office/drawing/2014/main" id="{93E39FAF-82BF-40AB-25DF-4C339661D5D6}"/>
+          <p:cNvPr id="16" name="Rectangle 15">
+            <a:extLst>
+              <a:ext uri="{FF2B5EF4-FFF2-40B4-BE49-F238E27FC236}">
+                <a16:creationId xmlns:a16="http://schemas.microsoft.com/office/drawing/2014/main" id="{34830680-9E8D-005F-C442-A64F289322A2}"/>
               </a:ext>
             </a:extLst>
           </p:cNvPr>
@@ -9330,7 +9231,7 @@
         </p:nvSpPr>
         <p:spPr>
           <a:xfrm>
-            <a:off x="4416910" y="5341671"/>
+            <a:off x="4359760" y="5341671"/>
             <a:ext cx="129654" cy="141761"/>
           </a:xfrm>
           <a:prstGeom prst="rect">
@@ -9367,10 +9268,10 @@
       </p:sp>
       <p:sp>
         <p:nvSpPr>
-          <p:cNvPr id="27" name="Rectangle 26">
-            <a:extLst>
-              <a:ext uri="{FF2B5EF4-FFF2-40B4-BE49-F238E27FC236}">
-                <a16:creationId xmlns:a16="http://schemas.microsoft.com/office/drawing/2014/main" id="{96C6BD28-E3ED-E606-2636-54842BAF2108}"/>
+          <p:cNvPr id="17" name="Rectangle 16">
+            <a:extLst>
+              <a:ext uri="{FF2B5EF4-FFF2-40B4-BE49-F238E27FC236}">
+                <a16:creationId xmlns:a16="http://schemas.microsoft.com/office/drawing/2014/main" id="{ED4A1AB3-E634-CB2C-E4F0-5D24D6961E7D}"/>
               </a:ext>
             </a:extLst>
           </p:cNvPr>
@@ -9379,7 +9280,7 @@
         </p:nvSpPr>
         <p:spPr>
           <a:xfrm>
-            <a:off x="4546564" y="5341671"/>
+            <a:off x="4489414" y="5341671"/>
             <a:ext cx="129654" cy="141761"/>
           </a:xfrm>
           <a:prstGeom prst="rect">
@@ -9416,10 +9317,10 @@
       </p:sp>
       <p:sp>
         <p:nvSpPr>
-          <p:cNvPr id="28" name="Rectangle 27">
-            <a:extLst>
-              <a:ext uri="{FF2B5EF4-FFF2-40B4-BE49-F238E27FC236}">
-                <a16:creationId xmlns:a16="http://schemas.microsoft.com/office/drawing/2014/main" id="{C1383AD6-D9A4-FEE6-5675-A5F6156A3593}"/>
+          <p:cNvPr id="18" name="Rectangle 17">
+            <a:extLst>
+              <a:ext uri="{FF2B5EF4-FFF2-40B4-BE49-F238E27FC236}">
+                <a16:creationId xmlns:a16="http://schemas.microsoft.com/office/drawing/2014/main" id="{FBF62025-8990-CE38-CE37-2B444E58DE2C}"/>
               </a:ext>
             </a:extLst>
           </p:cNvPr>
@@ -9428,7 +9329,7 @@
         </p:nvSpPr>
         <p:spPr>
           <a:xfrm>
-            <a:off x="4673938" y="5341671"/>
+            <a:off x="4616788" y="5341671"/>
             <a:ext cx="129654" cy="141761"/>
           </a:xfrm>
           <a:prstGeom prst="rect">
@@ -9465,10 +9366,10 @@
       </p:sp>
       <p:sp>
         <p:nvSpPr>
-          <p:cNvPr id="29" name="Rectangle 28">
-            <a:extLst>
-              <a:ext uri="{FF2B5EF4-FFF2-40B4-BE49-F238E27FC236}">
-                <a16:creationId xmlns:a16="http://schemas.microsoft.com/office/drawing/2014/main" id="{CDF40F64-A0F2-4F82-4616-58C67582C6F2}"/>
+          <p:cNvPr id="19" name="Rectangle 18">
+            <a:extLst>
+              <a:ext uri="{FF2B5EF4-FFF2-40B4-BE49-F238E27FC236}">
+                <a16:creationId xmlns:a16="http://schemas.microsoft.com/office/drawing/2014/main" id="{091FB807-EE18-CE4A-64BC-5388F12BFB63}"/>
               </a:ext>
             </a:extLst>
           </p:cNvPr>
@@ -9477,7 +9378,7 @@
         </p:nvSpPr>
         <p:spPr>
           <a:xfrm>
-            <a:off x="4797900" y="5341671"/>
+            <a:off x="4740750" y="5341671"/>
             <a:ext cx="129654" cy="141761"/>
           </a:xfrm>
           <a:prstGeom prst="rect">
@@ -9514,10 +9415,10 @@
       </p:sp>
       <p:sp>
         <p:nvSpPr>
-          <p:cNvPr id="30" name="Rectangle 29">
-            <a:extLst>
-              <a:ext uri="{FF2B5EF4-FFF2-40B4-BE49-F238E27FC236}">
-                <a16:creationId xmlns:a16="http://schemas.microsoft.com/office/drawing/2014/main" id="{7A328CF4-7F2D-B190-E0AE-D5967785561B}"/>
+          <p:cNvPr id="20" name="Rectangle 19">
+            <a:extLst>
+              <a:ext uri="{FF2B5EF4-FFF2-40B4-BE49-F238E27FC236}">
+                <a16:creationId xmlns:a16="http://schemas.microsoft.com/office/drawing/2014/main" id="{632D6467-1E25-4D57-3654-6D2A91BA92C6}"/>
               </a:ext>
             </a:extLst>
           </p:cNvPr>
@@ -9526,7 +9427,7 @@
         </p:nvSpPr>
         <p:spPr>
           <a:xfrm>
-            <a:off x="4926701" y="5341671"/>
+            <a:off x="4869551" y="5341671"/>
             <a:ext cx="129654" cy="141761"/>
           </a:xfrm>
           <a:prstGeom prst="rect">
@@ -9563,10 +9464,10 @@
       </p:sp>
       <p:sp>
         <p:nvSpPr>
-          <p:cNvPr id="31" name="Rectangle 30">
-            <a:extLst>
-              <a:ext uri="{FF2B5EF4-FFF2-40B4-BE49-F238E27FC236}">
-                <a16:creationId xmlns:a16="http://schemas.microsoft.com/office/drawing/2014/main" id="{0243E3A7-6EF7-20D8-4F3C-AD44D8D2F6BC}"/>
+          <p:cNvPr id="21" name="Rectangle 20">
+            <a:extLst>
+              <a:ext uri="{FF2B5EF4-FFF2-40B4-BE49-F238E27FC236}">
+                <a16:creationId xmlns:a16="http://schemas.microsoft.com/office/drawing/2014/main" id="{33FD66D4-39C6-6AF6-8FC6-9C2DBAFFA5E5}"/>
               </a:ext>
             </a:extLst>
           </p:cNvPr>
@@ -9575,7 +9476,7 @@
         </p:nvSpPr>
         <p:spPr>
           <a:xfrm>
-            <a:off x="5055786" y="5341671"/>
+            <a:off x="4998636" y="5341671"/>
             <a:ext cx="129654" cy="141761"/>
           </a:xfrm>
           <a:prstGeom prst="rect">
@@ -9612,10 +9513,10 @@
       </p:sp>
       <p:sp>
         <p:nvSpPr>
-          <p:cNvPr id="33" name="Rectangle: Rounded Corners 32">
-            <a:extLst>
-              <a:ext uri="{FF2B5EF4-FFF2-40B4-BE49-F238E27FC236}">
-                <a16:creationId xmlns:a16="http://schemas.microsoft.com/office/drawing/2014/main" id="{DF956A12-D5F4-605B-F973-3B7492069539}"/>
+          <p:cNvPr id="22" name="Rectangle: Rounded Corners 21">
+            <a:extLst>
+              <a:ext uri="{FF2B5EF4-FFF2-40B4-BE49-F238E27FC236}">
+                <a16:creationId xmlns:a16="http://schemas.microsoft.com/office/drawing/2014/main" id="{3C9FEA34-87F7-ED32-B550-F43CEFD3ADA2}"/>
               </a:ext>
             </a:extLst>
           </p:cNvPr>
@@ -9624,7 +9525,7 @@
         </p:nvSpPr>
         <p:spPr>
           <a:xfrm>
-            <a:off x="3243868" y="1680753"/>
+            <a:off x="3186718" y="1680753"/>
             <a:ext cx="1914077" cy="525465"/>
           </a:xfrm>
           <a:prstGeom prst="roundRect">
@@ -9671,10 +9572,10 @@
       </p:sp>
       <p:sp>
         <p:nvSpPr>
-          <p:cNvPr id="35" name="Oval 34">
-            <a:extLst>
-              <a:ext uri="{FF2B5EF4-FFF2-40B4-BE49-F238E27FC236}">
-                <a16:creationId xmlns:a16="http://schemas.microsoft.com/office/drawing/2014/main" id="{07074D8F-0A83-651C-E258-8CB36E167CA8}"/>
+          <p:cNvPr id="23" name="Oval 22">
+            <a:extLst>
+              <a:ext uri="{FF2B5EF4-FFF2-40B4-BE49-F238E27FC236}">
+                <a16:creationId xmlns:a16="http://schemas.microsoft.com/office/drawing/2014/main" id="{E44C7003-DB9D-C142-0BBB-8C1FAC84E43B}"/>
               </a:ext>
             </a:extLst>
           </p:cNvPr>
@@ -9683,7 +9584,7 @@
         </p:nvSpPr>
         <p:spPr>
           <a:xfrm>
-            <a:off x="3842505" y="2595957"/>
+            <a:off x="3785355" y="2595957"/>
             <a:ext cx="240512" cy="179637"/>
           </a:xfrm>
           <a:prstGeom prst="ellipse">
@@ -9723,10 +9624,10 @@
       </p:sp>
       <p:sp>
         <p:nvSpPr>
-          <p:cNvPr id="37" name="Oval 36">
-            <a:extLst>
-              <a:ext uri="{FF2B5EF4-FFF2-40B4-BE49-F238E27FC236}">
-                <a16:creationId xmlns:a16="http://schemas.microsoft.com/office/drawing/2014/main" id="{23C6675F-2A94-D9C7-BE69-6CFC8DFA99E3}"/>
+          <p:cNvPr id="24" name="Oval 23">
+            <a:extLst>
+              <a:ext uri="{FF2B5EF4-FFF2-40B4-BE49-F238E27FC236}">
+                <a16:creationId xmlns:a16="http://schemas.microsoft.com/office/drawing/2014/main" id="{0AEACA3F-51A8-EEBB-2128-389907F0B379}"/>
               </a:ext>
             </a:extLst>
           </p:cNvPr>
@@ -9735,7 +9636,7 @@
         </p:nvSpPr>
         <p:spPr>
           <a:xfrm>
-            <a:off x="5092091" y="5037437"/>
+            <a:off x="5034941" y="5037437"/>
             <a:ext cx="1047562" cy="775514"/>
           </a:xfrm>
           <a:prstGeom prst="ellipse">
@@ -9788,10 +9689,10 @@
       </p:sp>
       <p:sp>
         <p:nvSpPr>
-          <p:cNvPr id="38" name="Rectangle 37">
-            <a:extLst>
-              <a:ext uri="{FF2B5EF4-FFF2-40B4-BE49-F238E27FC236}">
-                <a16:creationId xmlns:a16="http://schemas.microsoft.com/office/drawing/2014/main" id="{1D9ED6A7-9759-A88D-7F62-644B4B17733A}"/>
+          <p:cNvPr id="25" name="Rectangle 24">
+            <a:extLst>
+              <a:ext uri="{FF2B5EF4-FFF2-40B4-BE49-F238E27FC236}">
+                <a16:creationId xmlns:a16="http://schemas.microsoft.com/office/drawing/2014/main" id="{DD007557-97DE-F72A-CB08-8B4D12B1869C}"/>
               </a:ext>
             </a:extLst>
           </p:cNvPr>
@@ -9800,7 +9701,7 @@
         </p:nvSpPr>
         <p:spPr>
           <a:xfrm>
-            <a:off x="2209267" y="3511775"/>
+            <a:off x="2152117" y="3511775"/>
             <a:ext cx="129654" cy="141761"/>
           </a:xfrm>
           <a:prstGeom prst="rect">
@@ -9837,10 +9738,10 @@
       </p:sp>
       <p:sp>
         <p:nvSpPr>
-          <p:cNvPr id="39" name="Rectangle 38">
-            <a:extLst>
-              <a:ext uri="{FF2B5EF4-FFF2-40B4-BE49-F238E27FC236}">
-                <a16:creationId xmlns:a16="http://schemas.microsoft.com/office/drawing/2014/main" id="{AAD23C9F-8560-A83D-92E3-61230B903CF4}"/>
+          <p:cNvPr id="26" name="Rectangle 25">
+            <a:extLst>
+              <a:ext uri="{FF2B5EF4-FFF2-40B4-BE49-F238E27FC236}">
+                <a16:creationId xmlns:a16="http://schemas.microsoft.com/office/drawing/2014/main" id="{416DEFE2-55F4-FA38-8D46-C259E8CF8B55}"/>
               </a:ext>
             </a:extLst>
           </p:cNvPr>
@@ -9849,7 +9750,7 @@
         </p:nvSpPr>
         <p:spPr>
           <a:xfrm>
-            <a:off x="2338921" y="3511775"/>
+            <a:off x="2281771" y="3511775"/>
             <a:ext cx="129654" cy="141761"/>
           </a:xfrm>
           <a:prstGeom prst="rect">
@@ -9886,10 +9787,10 @@
       </p:sp>
       <p:sp>
         <p:nvSpPr>
-          <p:cNvPr id="40" name="Rectangle 39">
-            <a:extLst>
-              <a:ext uri="{FF2B5EF4-FFF2-40B4-BE49-F238E27FC236}">
-                <a16:creationId xmlns:a16="http://schemas.microsoft.com/office/drawing/2014/main" id="{D55433D1-233A-8D0A-8E89-0ED7CF2DCAD3}"/>
+          <p:cNvPr id="27" name="Rectangle 26">
+            <a:extLst>
+              <a:ext uri="{FF2B5EF4-FFF2-40B4-BE49-F238E27FC236}">
+                <a16:creationId xmlns:a16="http://schemas.microsoft.com/office/drawing/2014/main" id="{3321F7FA-6BAD-AFF6-4534-648F680A505B}"/>
               </a:ext>
             </a:extLst>
           </p:cNvPr>
@@ -9898,7 +9799,7 @@
         </p:nvSpPr>
         <p:spPr>
           <a:xfrm>
-            <a:off x="2466295" y="3511775"/>
+            <a:off x="2409145" y="3511775"/>
             <a:ext cx="129654" cy="141761"/>
           </a:xfrm>
           <a:prstGeom prst="rect">
@@ -9935,10 +9836,10 @@
       </p:sp>
       <p:sp>
         <p:nvSpPr>
-          <p:cNvPr id="41" name="Rectangle 40">
-            <a:extLst>
-              <a:ext uri="{FF2B5EF4-FFF2-40B4-BE49-F238E27FC236}">
-                <a16:creationId xmlns:a16="http://schemas.microsoft.com/office/drawing/2014/main" id="{5940950F-5CD2-7A2F-FADD-00B46B542E2F}"/>
+          <p:cNvPr id="28" name="Rectangle 27">
+            <a:extLst>
+              <a:ext uri="{FF2B5EF4-FFF2-40B4-BE49-F238E27FC236}">
+                <a16:creationId xmlns:a16="http://schemas.microsoft.com/office/drawing/2014/main" id="{6ABC7C86-7C59-C986-B005-7B26D26A4262}"/>
               </a:ext>
             </a:extLst>
           </p:cNvPr>
@@ -9947,7 +9848,7 @@
         </p:nvSpPr>
         <p:spPr>
           <a:xfrm>
-            <a:off x="2597081" y="3511775"/>
+            <a:off x="2539931" y="3511775"/>
             <a:ext cx="129654" cy="141761"/>
           </a:xfrm>
           <a:prstGeom prst="rect">
@@ -9984,10 +9885,10 @@
       </p:sp>
       <p:sp>
         <p:nvSpPr>
-          <p:cNvPr id="42" name="Rectangle 41">
-            <a:extLst>
-              <a:ext uri="{FF2B5EF4-FFF2-40B4-BE49-F238E27FC236}">
-                <a16:creationId xmlns:a16="http://schemas.microsoft.com/office/drawing/2014/main" id="{210F4086-9188-36F0-1E9D-DF83511F6DD7}"/>
+          <p:cNvPr id="29" name="Rectangle 28">
+            <a:extLst>
+              <a:ext uri="{FF2B5EF4-FFF2-40B4-BE49-F238E27FC236}">
+                <a16:creationId xmlns:a16="http://schemas.microsoft.com/office/drawing/2014/main" id="{61E4B796-5243-A652-C05F-3F78649CF87E}"/>
               </a:ext>
             </a:extLst>
           </p:cNvPr>
@@ -9996,7 +9897,7 @@
         </p:nvSpPr>
         <p:spPr>
           <a:xfrm>
-            <a:off x="2725882" y="3511775"/>
+            <a:off x="2668732" y="3511775"/>
             <a:ext cx="129654" cy="141761"/>
           </a:xfrm>
           <a:prstGeom prst="rect">
@@ -10033,10 +9934,10 @@
       </p:sp>
       <p:sp>
         <p:nvSpPr>
-          <p:cNvPr id="43" name="Rectangle 42">
-            <a:extLst>
-              <a:ext uri="{FF2B5EF4-FFF2-40B4-BE49-F238E27FC236}">
-                <a16:creationId xmlns:a16="http://schemas.microsoft.com/office/drawing/2014/main" id="{49FD9561-A974-24A1-B44F-A8A9B3FE527A}"/>
+          <p:cNvPr id="30" name="Rectangle 29">
+            <a:extLst>
+              <a:ext uri="{FF2B5EF4-FFF2-40B4-BE49-F238E27FC236}">
+                <a16:creationId xmlns:a16="http://schemas.microsoft.com/office/drawing/2014/main" id="{82E7E3DD-9654-DB19-8E5A-31802A51439B}"/>
               </a:ext>
             </a:extLst>
           </p:cNvPr>
@@ -10045,7 +9946,7 @@
         </p:nvSpPr>
         <p:spPr>
           <a:xfrm>
-            <a:off x="2854967" y="3511775"/>
+            <a:off x="2797817" y="3511775"/>
             <a:ext cx="129654" cy="141761"/>
           </a:xfrm>
           <a:prstGeom prst="rect">
@@ -10082,23 +9983,23 @@
       </p:sp>
       <p:cxnSp>
         <p:nvCxnSpPr>
-          <p:cNvPr id="48" name="Connector: Curved 47">
-            <a:extLst>
-              <a:ext uri="{FF2B5EF4-FFF2-40B4-BE49-F238E27FC236}">
-                <a16:creationId xmlns:a16="http://schemas.microsoft.com/office/drawing/2014/main" id="{ABCCE4A8-71C8-B2AF-BB6A-8192CCB30578}"/>
+          <p:cNvPr id="35" name="Connector: Curved 34">
+            <a:extLst>
+              <a:ext uri="{FF2B5EF4-FFF2-40B4-BE49-F238E27FC236}">
+                <a16:creationId xmlns:a16="http://schemas.microsoft.com/office/drawing/2014/main" id="{75AC238C-9DB7-1CAC-992A-D69E944B6929}"/>
               </a:ext>
             </a:extLst>
           </p:cNvPr>
           <p:cNvCxnSpPr>
             <a:cxnSpLocks/>
-            <a:stCxn id="43" idx="3"/>
-            <a:endCxn id="55" idx="7"/>
+            <a:stCxn id="30" idx="3"/>
+            <a:endCxn id="40" idx="7"/>
           </p:cNvCxnSpPr>
           <p:nvPr/>
         </p:nvCxnSpPr>
         <p:spPr>
           <a:xfrm flipH="1">
-            <a:off x="2153297" y="3582656"/>
+            <a:off x="2096147" y="3582656"/>
             <a:ext cx="831324" cy="341364"/>
           </a:xfrm>
           <a:prstGeom prst="curvedConnector4">
@@ -10128,10 +10029,10 @@
       </p:cxnSp>
       <p:sp>
         <p:nvSpPr>
-          <p:cNvPr id="54" name="TextBox 53">
-            <a:extLst>
-              <a:ext uri="{FF2B5EF4-FFF2-40B4-BE49-F238E27FC236}">
-                <a16:creationId xmlns:a16="http://schemas.microsoft.com/office/drawing/2014/main" id="{795D1CDB-97CC-E8CF-174E-2B92542DF915}"/>
+          <p:cNvPr id="39" name="TextBox 38">
+            <a:extLst>
+              <a:ext uri="{FF2B5EF4-FFF2-40B4-BE49-F238E27FC236}">
+                <a16:creationId xmlns:a16="http://schemas.microsoft.com/office/drawing/2014/main" id="{44685D72-24A5-076E-76C0-058258D5C108}"/>
               </a:ext>
             </a:extLst>
           </p:cNvPr>
@@ -10140,7 +10041,7 @@
         </p:nvSpPr>
         <p:spPr>
           <a:xfrm>
-            <a:off x="1980057" y="3272496"/>
+            <a:off x="1922907" y="3272496"/>
             <a:ext cx="1532792" cy="261610"/>
           </a:xfrm>
           <a:prstGeom prst="rect">
@@ -10163,10 +10064,10 @@
       </p:sp>
       <p:sp>
         <p:nvSpPr>
-          <p:cNvPr id="55" name="Oval 54">
-            <a:extLst>
-              <a:ext uri="{FF2B5EF4-FFF2-40B4-BE49-F238E27FC236}">
-                <a16:creationId xmlns:a16="http://schemas.microsoft.com/office/drawing/2014/main" id="{76DA817B-7DAB-F1C0-CAAD-3052432F068B}"/>
+          <p:cNvPr id="40" name="Oval 39">
+            <a:extLst>
+              <a:ext uri="{FF2B5EF4-FFF2-40B4-BE49-F238E27FC236}">
+                <a16:creationId xmlns:a16="http://schemas.microsoft.com/office/drawing/2014/main" id="{3F0A6773-0413-9B27-ABAC-CBEAFF455EC6}"/>
               </a:ext>
             </a:extLst>
           </p:cNvPr>
@@ -10175,7 +10076,7 @@
         </p:nvSpPr>
         <p:spPr>
           <a:xfrm>
-            <a:off x="1541422" y="3837221"/>
+            <a:off x="1484272" y="3837221"/>
             <a:ext cx="716856" cy="592704"/>
           </a:xfrm>
           <a:prstGeom prst="ellipse">
@@ -10233,23 +10134,23 @@
       </p:sp>
       <p:cxnSp>
         <p:nvCxnSpPr>
-          <p:cNvPr id="58" name="Connector: Curved 57">
-            <a:extLst>
-              <a:ext uri="{FF2B5EF4-FFF2-40B4-BE49-F238E27FC236}">
-                <a16:creationId xmlns:a16="http://schemas.microsoft.com/office/drawing/2014/main" id="{0F115B42-0A77-4E83-1D0A-4BE37C14FF98}"/>
+          <p:cNvPr id="43" name="Connector: Curved 42">
+            <a:extLst>
+              <a:ext uri="{FF2B5EF4-FFF2-40B4-BE49-F238E27FC236}">
+                <a16:creationId xmlns:a16="http://schemas.microsoft.com/office/drawing/2014/main" id="{CCD051D7-0E60-9379-9295-BE7175E43099}"/>
               </a:ext>
             </a:extLst>
           </p:cNvPr>
           <p:cNvCxnSpPr>
             <a:cxnSpLocks/>
-            <a:stCxn id="64" idx="3"/>
-            <a:endCxn id="22" idx="0"/>
+            <a:stCxn id="49" idx="3"/>
+            <a:endCxn id="8" idx="0"/>
           </p:cNvCxnSpPr>
           <p:nvPr/>
         </p:nvCxnSpPr>
         <p:spPr>
           <a:xfrm flipH="1">
-            <a:off x="2049708" y="5010660"/>
+            <a:off x="1992558" y="5010660"/>
             <a:ext cx="1194160" cy="1241723"/>
           </a:xfrm>
           <a:prstGeom prst="curvedConnector4">
@@ -10280,22 +10181,22 @@
       </p:cxnSp>
       <p:cxnSp>
         <p:nvCxnSpPr>
-          <p:cNvPr id="59" name="Straight Arrow Connector 58">
-            <a:extLst>
-              <a:ext uri="{FF2B5EF4-FFF2-40B4-BE49-F238E27FC236}">
-                <a16:creationId xmlns:a16="http://schemas.microsoft.com/office/drawing/2014/main" id="{AC579D30-D0D2-758A-4C82-754891336E0B}"/>
+          <p:cNvPr id="44" name="Straight Arrow Connector 43">
+            <a:extLst>
+              <a:ext uri="{FF2B5EF4-FFF2-40B4-BE49-F238E27FC236}">
+                <a16:creationId xmlns:a16="http://schemas.microsoft.com/office/drawing/2014/main" id="{8601FF43-4FC5-0D87-904B-D57B10E7C3E5}"/>
               </a:ext>
             </a:extLst>
           </p:cNvPr>
           <p:cNvCxnSpPr>
-            <a:stCxn id="33" idx="2"/>
-            <a:endCxn id="25" idx="0"/>
+            <a:stCxn id="22" idx="2"/>
+            <a:endCxn id="15" idx="0"/>
           </p:cNvCxnSpPr>
           <p:nvPr/>
         </p:nvCxnSpPr>
         <p:spPr>
           <a:xfrm>
-            <a:off x="4200907" y="2206218"/>
+            <a:off x="4143757" y="2206218"/>
             <a:ext cx="3824" cy="615422"/>
           </a:xfrm>
           <a:prstGeom prst="straightConnector1">
@@ -10322,10 +10223,10 @@
       </p:cxnSp>
       <p:sp>
         <p:nvSpPr>
-          <p:cNvPr id="60" name="Oval 59">
-            <a:extLst>
-              <a:ext uri="{FF2B5EF4-FFF2-40B4-BE49-F238E27FC236}">
-                <a16:creationId xmlns:a16="http://schemas.microsoft.com/office/drawing/2014/main" id="{FAF2F02A-0BB7-8A22-E728-184CA7A121D4}"/>
+          <p:cNvPr id="45" name="Oval 44">
+            <a:extLst>
+              <a:ext uri="{FF2B5EF4-FFF2-40B4-BE49-F238E27FC236}">
+                <a16:creationId xmlns:a16="http://schemas.microsoft.com/office/drawing/2014/main" id="{DD3543BE-5730-B0B8-1A6C-CCFD7625A87E}"/>
               </a:ext>
             </a:extLst>
           </p:cNvPr>
@@ -10334,7 +10235,7 @@
         </p:nvSpPr>
         <p:spPr>
           <a:xfrm>
-            <a:off x="3882118" y="2443931"/>
+            <a:off x="3824968" y="2443931"/>
             <a:ext cx="240512" cy="179637"/>
           </a:xfrm>
           <a:prstGeom prst="ellipse">
@@ -10374,10 +10275,10 @@
       </p:sp>
       <p:sp>
         <p:nvSpPr>
-          <p:cNvPr id="61" name="Oval 60">
-            <a:extLst>
-              <a:ext uri="{FF2B5EF4-FFF2-40B4-BE49-F238E27FC236}">
-                <a16:creationId xmlns:a16="http://schemas.microsoft.com/office/drawing/2014/main" id="{9FD3FB3C-928D-0F9E-54E8-5BC00EE7C632}"/>
+          <p:cNvPr id="46" name="Oval 45">
+            <a:extLst>
+              <a:ext uri="{FF2B5EF4-FFF2-40B4-BE49-F238E27FC236}">
+                <a16:creationId xmlns:a16="http://schemas.microsoft.com/office/drawing/2014/main" id="{BC839444-C3A9-8E70-D46B-E4758B551D87}"/>
               </a:ext>
             </a:extLst>
           </p:cNvPr>
@@ -10386,7 +10287,7 @@
         </p:nvSpPr>
         <p:spPr>
           <a:xfrm>
-            <a:off x="3916612" y="2290895"/>
+            <a:off x="3859462" y="2290895"/>
             <a:ext cx="240512" cy="179637"/>
           </a:xfrm>
           <a:prstGeom prst="ellipse">
@@ -10426,22 +10327,22 @@
       </p:sp>
       <p:cxnSp>
         <p:nvCxnSpPr>
-          <p:cNvPr id="62" name="Connector: Curved 61">
-            <a:extLst>
-              <a:ext uri="{FF2B5EF4-FFF2-40B4-BE49-F238E27FC236}">
-                <a16:creationId xmlns:a16="http://schemas.microsoft.com/office/drawing/2014/main" id="{F077AB1D-979F-ACE1-00F4-1A1CEAF9B7BA}"/>
+          <p:cNvPr id="47" name="Connector: Curved 46">
+            <a:extLst>
+              <a:ext uri="{FF2B5EF4-FFF2-40B4-BE49-F238E27FC236}">
+                <a16:creationId xmlns:a16="http://schemas.microsoft.com/office/drawing/2014/main" id="{0449F6E4-91E3-3C53-4639-9ADCCFB51DB3}"/>
               </a:ext>
             </a:extLst>
           </p:cNvPr>
           <p:cNvCxnSpPr>
-            <a:stCxn id="25" idx="2"/>
-            <a:endCxn id="38" idx="1"/>
+            <a:stCxn id="15" idx="2"/>
+            <a:endCxn id="25" idx="1"/>
           </p:cNvCxnSpPr>
           <p:nvPr/>
         </p:nvCxnSpPr>
         <p:spPr>
           <a:xfrm rot="10800000" flipV="1">
-            <a:off x="2209267" y="3080572"/>
+            <a:off x="2152117" y="3080572"/>
             <a:ext cx="1472304" cy="502084"/>
           </a:xfrm>
           <a:prstGeom prst="curvedConnector3">
@@ -10470,23 +10371,23 @@
       </p:cxnSp>
       <p:cxnSp>
         <p:nvCxnSpPr>
-          <p:cNvPr id="63" name="Connector: Curved 62">
-            <a:extLst>
-              <a:ext uri="{FF2B5EF4-FFF2-40B4-BE49-F238E27FC236}">
-                <a16:creationId xmlns:a16="http://schemas.microsoft.com/office/drawing/2014/main" id="{7C100FD8-0F8D-444E-F691-D32CA47DB732}"/>
+          <p:cNvPr id="48" name="Connector: Curved 47">
+            <a:extLst>
+              <a:ext uri="{FF2B5EF4-FFF2-40B4-BE49-F238E27FC236}">
+                <a16:creationId xmlns:a16="http://schemas.microsoft.com/office/drawing/2014/main" id="{C5ABA387-F7C1-5A65-89FC-84D86BCF6531}"/>
               </a:ext>
             </a:extLst>
           </p:cNvPr>
           <p:cNvCxnSpPr>
             <a:cxnSpLocks/>
-            <a:stCxn id="43" idx="3"/>
-            <a:endCxn id="24" idx="7"/>
+            <a:stCxn id="30" idx="3"/>
+            <a:endCxn id="14" idx="7"/>
           </p:cNvCxnSpPr>
           <p:nvPr/>
         </p:nvCxnSpPr>
         <p:spPr>
           <a:xfrm flipH="1">
-            <a:off x="1475217" y="3582656"/>
+            <a:off x="1418067" y="3582656"/>
             <a:ext cx="1509404" cy="336805"/>
           </a:xfrm>
           <a:prstGeom prst="curvedConnector4">
@@ -10516,10 +10417,10 @@
       </p:cxnSp>
       <p:sp>
         <p:nvSpPr>
-          <p:cNvPr id="64" name="Rectangle 63">
-            <a:extLst>
-              <a:ext uri="{FF2B5EF4-FFF2-40B4-BE49-F238E27FC236}">
-                <a16:creationId xmlns:a16="http://schemas.microsoft.com/office/drawing/2014/main" id="{7E695E0A-800C-AA61-516A-14819BDF8478}"/>
+          <p:cNvPr id="49" name="Rectangle 48">
+            <a:extLst>
+              <a:ext uri="{FF2B5EF4-FFF2-40B4-BE49-F238E27FC236}">
+                <a16:creationId xmlns:a16="http://schemas.microsoft.com/office/drawing/2014/main" id="{34AB941A-9263-0640-DBCE-A683A1D05375}"/>
               </a:ext>
             </a:extLst>
           </p:cNvPr>
@@ -10528,7 +10429,7 @@
         </p:nvSpPr>
         <p:spPr>
           <a:xfrm>
-            <a:off x="1334585" y="4307628"/>
+            <a:off x="1277435" y="4307628"/>
             <a:ext cx="1909283" cy="1406063"/>
           </a:xfrm>
           <a:prstGeom prst="rect">
@@ -10671,10 +10572,10 @@
       </p:sp>
       <p:sp>
         <p:nvSpPr>
-          <p:cNvPr id="65" name="TextBox 64">
-            <a:extLst>
-              <a:ext uri="{FF2B5EF4-FFF2-40B4-BE49-F238E27FC236}">
-                <a16:creationId xmlns:a16="http://schemas.microsoft.com/office/drawing/2014/main" id="{3A531704-C51D-ACC5-7184-D9C93A5A0BE9}"/>
+          <p:cNvPr id="50" name="TextBox 49">
+            <a:extLst>
+              <a:ext uri="{FF2B5EF4-FFF2-40B4-BE49-F238E27FC236}">
+                <a16:creationId xmlns:a16="http://schemas.microsoft.com/office/drawing/2014/main" id="{23F661E7-B374-3DD0-2883-C7FC85A09D2D}"/>
               </a:ext>
             </a:extLst>
           </p:cNvPr>
@@ -10683,7 +10584,7 @@
         </p:nvSpPr>
         <p:spPr>
           <a:xfrm>
-            <a:off x="3448734" y="5482410"/>
+            <a:off x="3391584" y="5482410"/>
             <a:ext cx="256802" cy="261610"/>
           </a:xfrm>
           <a:prstGeom prst="rect">
@@ -10706,23 +10607,23 @@
       </p:sp>
       <p:cxnSp>
         <p:nvCxnSpPr>
-          <p:cNvPr id="66" name="Connector: Curved 65">
-            <a:extLst>
-              <a:ext uri="{FF2B5EF4-FFF2-40B4-BE49-F238E27FC236}">
-                <a16:creationId xmlns:a16="http://schemas.microsoft.com/office/drawing/2014/main" id="{BDA2F6BF-DBE8-309C-2FCC-85468D97840B}"/>
+          <p:cNvPr id="51" name="Connector: Curved 50">
+            <a:extLst>
+              <a:ext uri="{FF2B5EF4-FFF2-40B4-BE49-F238E27FC236}">
+                <a16:creationId xmlns:a16="http://schemas.microsoft.com/office/drawing/2014/main" id="{A80CF137-5861-F4A9-49C0-64CA4E5D9BBC}"/>
               </a:ext>
             </a:extLst>
           </p:cNvPr>
           <p:cNvCxnSpPr>
             <a:cxnSpLocks/>
-            <a:stCxn id="64" idx="3"/>
-            <a:endCxn id="26" idx="1"/>
+            <a:stCxn id="49" idx="3"/>
+            <a:endCxn id="16" idx="1"/>
           </p:cNvCxnSpPr>
           <p:nvPr/>
         </p:nvCxnSpPr>
         <p:spPr>
           <a:xfrm>
-            <a:off x="3243868" y="5010660"/>
+            <a:off x="3186718" y="5010660"/>
             <a:ext cx="1173042" cy="401892"/>
           </a:xfrm>
           <a:prstGeom prst="curvedConnector3">
@@ -10751,10 +10652,10 @@
       </p:cxnSp>
       <p:sp>
         <p:nvSpPr>
-          <p:cNvPr id="67" name="TextBox 66">
-            <a:extLst>
-              <a:ext uri="{FF2B5EF4-FFF2-40B4-BE49-F238E27FC236}">
-                <a16:creationId xmlns:a16="http://schemas.microsoft.com/office/drawing/2014/main" id="{6580D0F4-FD16-DD22-8CF4-67404C70C485}"/>
+          <p:cNvPr id="52" name="TextBox 51">
+            <a:extLst>
+              <a:ext uri="{FF2B5EF4-FFF2-40B4-BE49-F238E27FC236}">
+                <a16:creationId xmlns:a16="http://schemas.microsoft.com/office/drawing/2014/main" id="{828F0798-F80D-F744-9C01-ECAEB4061997}"/>
               </a:ext>
             </a:extLst>
           </p:cNvPr>
@@ -10763,7 +10664,7 @@
         </p:nvSpPr>
         <p:spPr>
           <a:xfrm>
-            <a:off x="3890397" y="5150941"/>
+            <a:off x="3833247" y="5150941"/>
             <a:ext cx="489236" cy="261610"/>
           </a:xfrm>
           <a:prstGeom prst="rect">
@@ -10786,10 +10687,10 @@
       </p:sp>
       <p:sp>
         <p:nvSpPr>
-          <p:cNvPr id="68" name="TextBox 67">
-            <a:extLst>
-              <a:ext uri="{FF2B5EF4-FFF2-40B4-BE49-F238E27FC236}">
-                <a16:creationId xmlns:a16="http://schemas.microsoft.com/office/drawing/2014/main" id="{2FF727E2-6CED-A527-9DDB-2DFD8C0A9894}"/>
+          <p:cNvPr id="53" name="TextBox 52">
+            <a:extLst>
+              <a:ext uri="{FF2B5EF4-FFF2-40B4-BE49-F238E27FC236}">
+                <a16:creationId xmlns:a16="http://schemas.microsoft.com/office/drawing/2014/main" id="{12FB3562-9CAD-F8C5-7E0C-D9F48F296EA0}"/>
               </a:ext>
             </a:extLst>
           </p:cNvPr>
@@ -10798,7 +10699,7 @@
         </p:nvSpPr>
         <p:spPr>
           <a:xfrm>
-            <a:off x="5725487" y="5870648"/>
+            <a:off x="5668337" y="5870648"/>
             <a:ext cx="256802" cy="261610"/>
           </a:xfrm>
           <a:prstGeom prst="rect">
@@ -10821,10 +10722,10 @@
       </p:sp>
       <p:sp>
         <p:nvSpPr>
-          <p:cNvPr id="69" name="TextBox 68">
-            <a:extLst>
-              <a:ext uri="{FF2B5EF4-FFF2-40B4-BE49-F238E27FC236}">
-                <a16:creationId xmlns:a16="http://schemas.microsoft.com/office/drawing/2014/main" id="{DE12DFDA-DAE6-DC03-A8CF-B826737B0C7F}"/>
+          <p:cNvPr id="54" name="TextBox 53">
+            <a:extLst>
+              <a:ext uri="{FF2B5EF4-FFF2-40B4-BE49-F238E27FC236}">
+                <a16:creationId xmlns:a16="http://schemas.microsoft.com/office/drawing/2014/main" id="{E0BA4F46-097B-C80F-7282-FD2CD4412318}"/>
               </a:ext>
             </a:extLst>
           </p:cNvPr>
@@ -10833,7 +10734,7 @@
         </p:nvSpPr>
         <p:spPr>
           <a:xfrm>
-            <a:off x="5261531" y="5874758"/>
+            <a:off x="5204381" y="5874758"/>
             <a:ext cx="256802" cy="261610"/>
           </a:xfrm>
           <a:prstGeom prst="rect">
@@ -10856,10 +10757,10 @@
       </p:sp>
       <p:sp>
         <p:nvSpPr>
-          <p:cNvPr id="70" name="Rectangle: Single Corner Snipped 69">
-            <a:extLst>
-              <a:ext uri="{FF2B5EF4-FFF2-40B4-BE49-F238E27FC236}">
-                <a16:creationId xmlns:a16="http://schemas.microsoft.com/office/drawing/2014/main" id="{463FADC6-3FAA-605A-0221-95614C304F1D}"/>
+          <p:cNvPr id="55" name="Rectangle: Single Corner Snipped 54">
+            <a:extLst>
+              <a:ext uri="{FF2B5EF4-FFF2-40B4-BE49-F238E27FC236}">
+                <a16:creationId xmlns:a16="http://schemas.microsoft.com/office/drawing/2014/main" id="{55996D6F-BC15-CF59-8EFC-BE3D55309AB6}"/>
               </a:ext>
             </a:extLst>
           </p:cNvPr>
@@ -10868,7 +10769,7 @@
         </p:nvSpPr>
         <p:spPr>
           <a:xfrm>
-            <a:off x="4481737" y="4429925"/>
+            <a:off x="4424587" y="4429925"/>
             <a:ext cx="826166" cy="441422"/>
           </a:xfrm>
           <a:prstGeom prst="snip1Rect">
@@ -10917,10 +10818,10 @@
       </p:sp>
       <p:cxnSp>
         <p:nvCxnSpPr>
-          <p:cNvPr id="73" name="Straight Arrow Connector 72">
-            <a:extLst>
-              <a:ext uri="{FF2B5EF4-FFF2-40B4-BE49-F238E27FC236}">
-                <a16:creationId xmlns:a16="http://schemas.microsoft.com/office/drawing/2014/main" id="{5AD9DA09-1C98-C634-C54D-78F47678EB12}"/>
+          <p:cNvPr id="56" name="Straight Arrow Connector 55">
+            <a:extLst>
+              <a:ext uri="{FF2B5EF4-FFF2-40B4-BE49-F238E27FC236}">
+                <a16:creationId xmlns:a16="http://schemas.microsoft.com/office/drawing/2014/main" id="{BFF30045-A49C-639A-980D-2D608D62B7E0}"/>
               </a:ext>
             </a:extLst>
           </p:cNvPr>
@@ -10929,7 +10830,7 @@
         </p:nvCxnSpPr>
         <p:spPr>
           <a:xfrm>
-            <a:off x="3243868" y="4574743"/>
+            <a:off x="3186718" y="4574743"/>
             <a:ext cx="1237869" cy="0"/>
           </a:xfrm>
           <a:prstGeom prst="straightConnector1">
@@ -10957,10 +10858,10 @@
       </p:cxnSp>
       <p:sp>
         <p:nvSpPr>
-          <p:cNvPr id="75" name="TextBox 74">
-            <a:extLst>
-              <a:ext uri="{FF2B5EF4-FFF2-40B4-BE49-F238E27FC236}">
-                <a16:creationId xmlns:a16="http://schemas.microsoft.com/office/drawing/2014/main" id="{2541A754-6808-E278-D922-FF2C592BA4AC}"/>
+          <p:cNvPr id="57" name="TextBox 56">
+            <a:extLst>
+              <a:ext uri="{FF2B5EF4-FFF2-40B4-BE49-F238E27FC236}">
+                <a16:creationId xmlns:a16="http://schemas.microsoft.com/office/drawing/2014/main" id="{248DB0C5-737D-41B1-FBCD-A3F6139519DB}"/>
               </a:ext>
             </a:extLst>
           </p:cNvPr>
@@ -10969,7 +10870,7 @@
         </p:nvSpPr>
         <p:spPr>
           <a:xfrm>
-            <a:off x="3762256" y="4336678"/>
+            <a:off x="3705106" y="4336678"/>
             <a:ext cx="256802" cy="261610"/>
           </a:xfrm>
           <a:prstGeom prst="rect">
@@ -10992,21 +10893,21 @@
       </p:sp>
       <p:cxnSp>
         <p:nvCxnSpPr>
-          <p:cNvPr id="76" name="Straight Arrow Connector 75">
-            <a:extLst>
-              <a:ext uri="{FF2B5EF4-FFF2-40B4-BE49-F238E27FC236}">
-                <a16:creationId xmlns:a16="http://schemas.microsoft.com/office/drawing/2014/main" id="{7A08338C-626E-F947-840A-505BA182D7B4}"/>
+          <p:cNvPr id="58" name="Straight Arrow Connector 57">
+            <a:extLst>
+              <a:ext uri="{FF2B5EF4-FFF2-40B4-BE49-F238E27FC236}">
+                <a16:creationId xmlns:a16="http://schemas.microsoft.com/office/drawing/2014/main" id="{6BFFE055-F2D3-C266-10EC-8FDFC013EF69}"/>
               </a:ext>
             </a:extLst>
           </p:cNvPr>
           <p:cNvCxnSpPr>
-            <a:stCxn id="37" idx="4"/>
+            <a:stCxn id="24" idx="4"/>
           </p:cNvCxnSpPr>
           <p:nvPr/>
         </p:nvCxnSpPr>
         <p:spPr>
           <a:xfrm flipH="1">
-            <a:off x="5314480" y="5812951"/>
+            <a:off x="5257330" y="5812951"/>
             <a:ext cx="301392" cy="404839"/>
           </a:xfrm>
           <a:prstGeom prst="straightConnector1">
@@ -11033,21 +10934,21 @@
       </p:cxnSp>
       <p:cxnSp>
         <p:nvCxnSpPr>
-          <p:cNvPr id="77" name="Straight Arrow Connector 76">
-            <a:extLst>
-              <a:ext uri="{FF2B5EF4-FFF2-40B4-BE49-F238E27FC236}">
-                <a16:creationId xmlns:a16="http://schemas.microsoft.com/office/drawing/2014/main" id="{15D45433-743C-4AAB-7E28-BC62EE540204}"/>
+          <p:cNvPr id="59" name="Straight Arrow Connector 58">
+            <a:extLst>
+              <a:ext uri="{FF2B5EF4-FFF2-40B4-BE49-F238E27FC236}">
+                <a16:creationId xmlns:a16="http://schemas.microsoft.com/office/drawing/2014/main" id="{910F64F4-0708-EA76-8C1F-A7A7E6A6FBF5}"/>
               </a:ext>
             </a:extLst>
           </p:cNvPr>
           <p:cNvCxnSpPr>
-            <a:stCxn id="37" idx="4"/>
+            <a:stCxn id="24" idx="4"/>
           </p:cNvCxnSpPr>
           <p:nvPr/>
         </p:nvCxnSpPr>
         <p:spPr>
           <a:xfrm>
-            <a:off x="5615872" y="5812951"/>
+            <a:off x="5558722" y="5812951"/>
             <a:ext cx="274676" cy="404839"/>
           </a:xfrm>
           <a:prstGeom prst="straightConnector1">
@@ -11072,16 +10973,583 @@
           </a:fontRef>
         </p:style>
       </p:cxnSp>
+      <p:sp>
+        <p:nvSpPr>
+          <p:cNvPr id="60" name="TextBox 59">
+            <a:extLst>
+              <a:ext uri="{FF2B5EF4-FFF2-40B4-BE49-F238E27FC236}">
+                <a16:creationId xmlns:a16="http://schemas.microsoft.com/office/drawing/2014/main" id="{003F762F-D027-3BC9-86ED-C99581E64A15}"/>
+              </a:ext>
+            </a:extLst>
+          </p:cNvPr>
+          <p:cNvSpPr txBox="1"/>
+          <p:nvPr/>
+        </p:nvSpPr>
+        <p:spPr>
+          <a:xfrm>
+            <a:off x="6538589" y="0"/>
+            <a:ext cx="5601498" cy="7201972"/>
+          </a:xfrm>
+          <a:prstGeom prst="rect">
+            <a:avLst/>
+          </a:prstGeom>
+          <a:noFill/>
+        </p:spPr>
+        <p:txBody>
+          <a:bodyPr wrap="square" rtlCol="0">
+            <a:spAutoFit/>
+          </a:bodyPr>
+          <a:lstStyle/>
+          <a:p>
+            <a:r>
+              <a:rPr lang="en-US" sz="1200"/>
+              <a:t>Race condition #1:  step #1 in the job</a:t>
+            </a:r>
+          </a:p>
+          <a:p>
+            <a:endParaRPr lang="en-US" sz="1200"/>
+          </a:p>
+          <a:p>
+            <a:r>
+              <a:rPr lang="en-US" sz="1200"/>
+              <a:t>Same neighbor’s different revisions (1, 6, 8) may be invoked at the same time, or latter ones may be completed first. </a:t>
+            </a:r>
+          </a:p>
+          <a:p>
+            <a:r>
+              <a:rPr lang="en-US" sz="1200"/>
+              <a:t>As long as the pushed states are target states (can finish programming with this version of state only, doesn’t need previous actions executed in strict order), latter revision can be executed first and doesn’t cause harm and may save some resource</a:t>
+            </a:r>
+          </a:p>
+          <a:p>
+            <a:pPr marL="171450" indent="-171450">
+              <a:buFont typeface="Arial" panose="020B0604020202020204" pitchFamily="34" charset="0"/>
+              <a:buChar char="•"/>
+            </a:pPr>
+            <a:endParaRPr lang="en-US" sz="1200"/>
+          </a:p>
+          <a:p>
+            <a:pPr marL="171450" indent="-171450">
+              <a:buFont typeface="Arial" panose="020B0604020202020204" pitchFamily="34" charset="0"/>
+              <a:buChar char="•"/>
+            </a:pPr>
+            <a:r>
+              <a:rPr lang="en-US" sz="1200"/>
+              <a:t>Case 1: 1 -&gt; 6 -&gt; 8</a:t>
+            </a:r>
+          </a:p>
+          <a:p>
+            <a:pPr marL="171450" indent="-171450">
+              <a:buFont typeface="Arial" panose="020B0604020202020204" pitchFamily="34" charset="0"/>
+              <a:buChar char="•"/>
+            </a:pPr>
+            <a:r>
+              <a:rPr lang="en-US" sz="1200"/>
+              <a:t>Case 2: 6 -&gt; 8 -&gt; 1</a:t>
+            </a:r>
+          </a:p>
+          <a:p>
+            <a:pPr marL="628650" lvl="1" indent="-171450">
+              <a:buFont typeface="Arial" panose="020B0604020202020204" pitchFamily="34" charset="0"/>
+              <a:buChar char="•"/>
+            </a:pPr>
+            <a:r>
+              <a:rPr lang="en-US" sz="1100"/>
+              <a:t>Ver 6 first</a:t>
+            </a:r>
+          </a:p>
+          <a:p>
+            <a:pPr marL="1085850" lvl="2" indent="-171450">
+              <a:buFont typeface="Arial" panose="020B0604020202020204" pitchFamily="34" charset="0"/>
+              <a:buChar char="•"/>
+            </a:pPr>
+            <a:r>
+              <a:rPr lang="en-US" sz="1100"/>
+              <a:t>Not found in </a:t>
+            </a:r>
+            <a:r>
+              <a:rPr lang="en-US" sz="1100" err="1"/>
+              <a:t>hashmap</a:t>
+            </a:r>
+            <a:r>
+              <a:rPr lang="en-US" sz="1100"/>
+              <a:t>, thus insert key with </a:t>
+            </a:r>
+            <a:r>
+              <a:rPr lang="en-US" sz="1100" err="1"/>
+              <a:t>ver</a:t>
+            </a:r>
+            <a:r>
+              <a:rPr lang="en-US" sz="1100"/>
+              <a:t> 6</a:t>
+            </a:r>
+          </a:p>
+          <a:p>
+            <a:pPr marL="1085850" lvl="2" indent="-171450">
+              <a:buFont typeface="Arial" panose="020B0604020202020204" pitchFamily="34" charset="0"/>
+              <a:buChar char="•"/>
+            </a:pPr>
+            <a:r>
+              <a:rPr lang="en-US" sz="1100"/>
+              <a:t>Async write to </a:t>
+            </a:r>
+            <a:r>
+              <a:rPr lang="en-US" sz="1100" err="1"/>
+              <a:t>db</a:t>
+            </a:r>
+            <a:r>
+              <a:rPr lang="en-US" sz="1100"/>
+              <a:t> table1</a:t>
+            </a:r>
+          </a:p>
+          <a:p>
+            <a:pPr marL="1085850" lvl="2" indent="-171450">
+              <a:buFont typeface="Arial" panose="020B0604020202020204" pitchFamily="34" charset="0"/>
+              <a:buChar char="•"/>
+            </a:pPr>
+            <a:r>
+              <a:rPr lang="en-US" sz="1100" err="1"/>
+              <a:t>eBPF</a:t>
+            </a:r>
+            <a:r>
+              <a:rPr lang="en-US" sz="1100"/>
+              <a:t> </a:t>
+            </a:r>
+            <a:r>
+              <a:rPr lang="en-US" sz="1100" err="1"/>
+              <a:t>syscall</a:t>
+            </a:r>
+            <a:r>
+              <a:rPr lang="en-US" sz="1100"/>
+              <a:t> is add if not found, or update if found</a:t>
+            </a:r>
+          </a:p>
+          <a:p>
+            <a:pPr marL="1085850" lvl="2" indent="-171450">
+              <a:buFont typeface="Arial" panose="020B0604020202020204" pitchFamily="34" charset="0"/>
+              <a:buChar char="•"/>
+            </a:pPr>
+            <a:r>
+              <a:rPr lang="en-US" sz="1100"/>
+              <a:t>Async write to </a:t>
+            </a:r>
+            <a:r>
+              <a:rPr lang="en-US" sz="1100" err="1"/>
+              <a:t>db</a:t>
+            </a:r>
+            <a:r>
+              <a:rPr lang="en-US" sz="1100"/>
+              <a:t> table2 if above succeeds</a:t>
+            </a:r>
+          </a:p>
+          <a:p>
+            <a:pPr marL="628650" lvl="1" indent="-171450">
+              <a:buFont typeface="Arial" panose="020B0604020202020204" pitchFamily="34" charset="0"/>
+              <a:buChar char="•"/>
+            </a:pPr>
+            <a:r>
+              <a:rPr lang="en-US" sz="1100"/>
+              <a:t>Ver 8 is to delete it</a:t>
+            </a:r>
+          </a:p>
+          <a:p>
+            <a:pPr marL="1085850" lvl="2" indent="-171450">
+              <a:buFont typeface="Arial" panose="020B0604020202020204" pitchFamily="34" charset="0"/>
+              <a:buChar char="•"/>
+            </a:pPr>
+            <a:r>
+              <a:rPr lang="en-US" sz="1100"/>
+              <a:t>Found </a:t>
+            </a:r>
+            <a:r>
+              <a:rPr lang="en-US" sz="1100" err="1"/>
+              <a:t>ver</a:t>
+            </a:r>
+            <a:r>
+              <a:rPr lang="en-US" sz="1100"/>
+              <a:t> 6 in </a:t>
+            </a:r>
+            <a:r>
+              <a:rPr lang="en-US" sz="1100" err="1"/>
+              <a:t>hashmap</a:t>
+            </a:r>
+            <a:r>
+              <a:rPr lang="en-US" sz="1100"/>
+              <a:t>, since 8 &gt; 6, update with </a:t>
+            </a:r>
+            <a:r>
+              <a:rPr lang="en-US" sz="1100" err="1"/>
+              <a:t>ver</a:t>
+            </a:r>
+            <a:r>
+              <a:rPr lang="en-US" sz="1100"/>
+              <a:t> 8</a:t>
+            </a:r>
+          </a:p>
+          <a:p>
+            <a:pPr marL="1085850" lvl="2" indent="-171450">
+              <a:buFont typeface="Arial" panose="020B0604020202020204" pitchFamily="34" charset="0"/>
+              <a:buChar char="•"/>
+            </a:pPr>
+            <a:r>
+              <a:rPr lang="en-US" sz="1100"/>
+              <a:t>Since in table1 </a:t>
+            </a:r>
+            <a:r>
+              <a:rPr lang="en-US" sz="1100" err="1"/>
+              <a:t>cur_ver</a:t>
+            </a:r>
+            <a:r>
+              <a:rPr lang="en-US" sz="1100"/>
+              <a:t> 8 &gt; </a:t>
+            </a:r>
+            <a:r>
+              <a:rPr lang="en-US" sz="1100" err="1"/>
+              <a:t>fetch_ver</a:t>
+            </a:r>
+            <a:r>
+              <a:rPr lang="en-US" sz="1100"/>
+              <a:t> 6, update</a:t>
+            </a:r>
+          </a:p>
+          <a:p>
+            <a:pPr marL="1085850" lvl="2" indent="-171450">
+              <a:buFont typeface="Arial" panose="020B0604020202020204" pitchFamily="34" charset="0"/>
+              <a:buChar char="•"/>
+            </a:pPr>
+            <a:r>
+              <a:rPr lang="en-US" sz="1100"/>
+              <a:t>delete from </a:t>
+            </a:r>
+            <a:r>
+              <a:rPr lang="en-US" sz="1100" err="1"/>
+              <a:t>eBPF</a:t>
+            </a:r>
+            <a:r>
+              <a:rPr lang="en-US" sz="1100"/>
+              <a:t> map and update table 2</a:t>
+            </a:r>
+          </a:p>
+          <a:p>
+            <a:pPr marL="628650" lvl="1" indent="-171450">
+              <a:buFont typeface="Arial" panose="020B0604020202020204" pitchFamily="34" charset="0"/>
+              <a:buChar char="•"/>
+            </a:pPr>
+            <a:r>
+              <a:rPr lang="en-US" sz="1100"/>
+              <a:t>Ver 1 at last</a:t>
+            </a:r>
+          </a:p>
+          <a:p>
+            <a:pPr marL="1085850" lvl="2" indent="-171450">
+              <a:buFont typeface="Arial" panose="020B0604020202020204" pitchFamily="34" charset="0"/>
+              <a:buChar char="•"/>
+            </a:pPr>
+            <a:r>
+              <a:rPr lang="en-US" sz="1100"/>
+              <a:t>Found </a:t>
+            </a:r>
+            <a:r>
+              <a:rPr lang="en-US" sz="1100" err="1"/>
+              <a:t>ver</a:t>
+            </a:r>
+            <a:r>
+              <a:rPr lang="en-US" sz="1100"/>
+              <a:t> 8 from </a:t>
+            </a:r>
+            <a:r>
+              <a:rPr lang="en-US" sz="1100" err="1"/>
+              <a:t>hashmap</a:t>
+            </a:r>
+            <a:r>
+              <a:rPr lang="en-US" sz="1100"/>
+              <a:t>, since 1 &lt; 8 simply ignore </a:t>
+            </a:r>
+            <a:r>
+              <a:rPr lang="en-US" sz="1100" err="1"/>
+              <a:t>eBPF</a:t>
+            </a:r>
+            <a:r>
+              <a:rPr lang="en-US" sz="1100"/>
+              <a:t> programming</a:t>
+            </a:r>
+          </a:p>
+          <a:p>
+            <a:pPr marL="1085850" lvl="2" indent="-171450">
+              <a:buFont typeface="Arial" panose="020B0604020202020204" pitchFamily="34" charset="0"/>
+              <a:buChar char="•"/>
+            </a:pPr>
+            <a:r>
+              <a:rPr lang="en-US" sz="1100"/>
+              <a:t>In table1, since 1 &lt; 8, also ignore updating</a:t>
+            </a:r>
+          </a:p>
+          <a:p>
+            <a:pPr marL="1085850" lvl="2" indent="-171450">
+              <a:buFont typeface="Arial" panose="020B0604020202020204" pitchFamily="34" charset="0"/>
+              <a:buChar char="•"/>
+            </a:pPr>
+            <a:r>
+              <a:rPr lang="en-US" sz="1100"/>
+              <a:t>Update table2</a:t>
+            </a:r>
+          </a:p>
+          <a:p>
+            <a:pPr marL="171450" indent="-171450">
+              <a:buFont typeface="Arial" panose="020B0604020202020204" pitchFamily="34" charset="0"/>
+              <a:buChar char="•"/>
+            </a:pPr>
+            <a:r>
+              <a:rPr lang="en-US" sz="1200"/>
+              <a:t>Case 3: 8 -&gt; 6 -&gt; 1 or 8 -&gt; 1 -&gt; 6</a:t>
+            </a:r>
+          </a:p>
+          <a:p>
+            <a:pPr marL="628650" lvl="1" indent="-171450">
+              <a:buFont typeface="Arial" panose="020B0604020202020204" pitchFamily="34" charset="0"/>
+              <a:buChar char="•"/>
+            </a:pPr>
+            <a:r>
+              <a:rPr lang="en-US" sz="1100"/>
+              <a:t>Ver 8 (deletion) first</a:t>
+            </a:r>
+          </a:p>
+          <a:p>
+            <a:pPr marL="1085850" lvl="2" indent="-171450">
+              <a:buFont typeface="Arial" panose="020B0604020202020204" pitchFamily="34" charset="0"/>
+              <a:buChar char="•"/>
+            </a:pPr>
+            <a:r>
+              <a:rPr lang="en-US" sz="1100"/>
+              <a:t>Not found in </a:t>
+            </a:r>
+            <a:r>
+              <a:rPr lang="en-US" sz="1100" err="1"/>
+              <a:t>hashmap</a:t>
+            </a:r>
+            <a:r>
+              <a:rPr lang="en-US" sz="1100"/>
+              <a:t>, thus insert key with </a:t>
+            </a:r>
+            <a:r>
+              <a:rPr lang="en-US" sz="1100" err="1"/>
+              <a:t>ver</a:t>
+            </a:r>
+            <a:r>
+              <a:rPr lang="en-US" sz="1100"/>
+              <a:t> 8</a:t>
+            </a:r>
+          </a:p>
+          <a:p>
+            <a:pPr marL="1085850" lvl="2" indent="-171450">
+              <a:buFont typeface="Arial" panose="020B0604020202020204" pitchFamily="34" charset="0"/>
+              <a:buChar char="•"/>
+            </a:pPr>
+            <a:r>
+              <a:rPr lang="en-US" sz="1100" err="1"/>
+              <a:t>eBPF</a:t>
+            </a:r>
+            <a:r>
+              <a:rPr lang="en-US" sz="1100"/>
+              <a:t> </a:t>
+            </a:r>
+            <a:r>
+              <a:rPr lang="en-US" sz="1100" err="1"/>
+              <a:t>syscall</a:t>
+            </a:r>
+            <a:r>
+              <a:rPr lang="en-US" sz="1100"/>
+              <a:t> is if found delete, if not found do nothing</a:t>
+            </a:r>
+          </a:p>
+          <a:p>
+            <a:pPr marL="1085850" lvl="2" indent="-171450">
+              <a:buFont typeface="Arial" panose="020B0604020202020204" pitchFamily="34" charset="0"/>
+              <a:buChar char="•"/>
+            </a:pPr>
+            <a:r>
+              <a:rPr lang="en-US" sz="1100"/>
+              <a:t>Update table1 and 2</a:t>
+            </a:r>
+          </a:p>
+          <a:p>
+            <a:pPr marL="628650" lvl="1" indent="-171450">
+              <a:buFont typeface="Arial" panose="020B0604020202020204" pitchFamily="34" charset="0"/>
+              <a:buChar char="•"/>
+            </a:pPr>
+            <a:r>
+              <a:rPr lang="en-US" sz="1100"/>
+              <a:t>Then </a:t>
+            </a:r>
+            <a:r>
+              <a:rPr lang="en-US" sz="1100" err="1"/>
+              <a:t>ver</a:t>
+            </a:r>
+            <a:r>
+              <a:rPr lang="en-US" sz="1100"/>
+              <a:t> 1 or </a:t>
+            </a:r>
+            <a:r>
+              <a:rPr lang="en-US" sz="1100" err="1"/>
+              <a:t>ver</a:t>
+            </a:r>
+            <a:r>
+              <a:rPr lang="en-US" sz="1100"/>
+              <a:t> 6</a:t>
+            </a:r>
+          </a:p>
+          <a:p>
+            <a:pPr marL="1085850" lvl="2" indent="-171450">
+              <a:buFont typeface="Arial" panose="020B0604020202020204" pitchFamily="34" charset="0"/>
+              <a:buChar char="•"/>
+            </a:pPr>
+            <a:r>
+              <a:rPr lang="en-US" sz="1100"/>
+              <a:t>Found </a:t>
+            </a:r>
+            <a:r>
+              <a:rPr lang="en-US" sz="1100" err="1"/>
+              <a:t>ver</a:t>
+            </a:r>
+            <a:r>
+              <a:rPr lang="en-US" sz="1100"/>
+              <a:t> 8 from </a:t>
+            </a:r>
+            <a:r>
+              <a:rPr lang="en-US" sz="1100" err="1"/>
+              <a:t>hashmap</a:t>
+            </a:r>
+            <a:r>
+              <a:rPr lang="en-US" sz="1100"/>
+              <a:t>, simply ignore </a:t>
+            </a:r>
+            <a:r>
+              <a:rPr lang="en-US" sz="1100" err="1"/>
+              <a:t>eBPF</a:t>
+            </a:r>
+            <a:r>
+              <a:rPr lang="en-US" sz="1100"/>
+              <a:t> programming but update table2</a:t>
+            </a:r>
+          </a:p>
+          <a:p>
+            <a:pPr marL="1085850" lvl="2" indent="-171450">
+              <a:buFont typeface="Arial" panose="020B0604020202020204" pitchFamily="34" charset="0"/>
+              <a:buChar char="•"/>
+            </a:pPr>
+            <a:r>
+              <a:rPr lang="en-US" sz="1100"/>
+              <a:t>In table1, since 1 or 6 &lt; 8, ignore updating</a:t>
+            </a:r>
+          </a:p>
+          <a:p>
+            <a:endParaRPr lang="en-US" sz="1100"/>
+          </a:p>
+          <a:p>
+            <a:r>
+              <a:rPr lang="en-US" sz="1100"/>
+              <a:t>Observation/philosophy:  </a:t>
+            </a:r>
+          </a:p>
+          <a:p>
+            <a:pPr marL="285750" indent="-285750">
+              <a:buFont typeface="Arial" panose="020B0604020202020204" pitchFamily="34" charset="0"/>
+              <a:buChar char="•"/>
+            </a:pPr>
+            <a:r>
+              <a:rPr lang="en-US" sz="1100"/>
+              <a:t>Concurrent HashMap and table1 (may combine later), update condition is increasing version</a:t>
+            </a:r>
+          </a:p>
+          <a:p>
+            <a:pPr marL="285750" indent="-285750">
+              <a:buFont typeface="Arial" panose="020B0604020202020204" pitchFamily="34" charset="0"/>
+              <a:buChar char="•"/>
+            </a:pPr>
+            <a:r>
+              <a:rPr lang="en-US" sz="1100"/>
+              <a:t>table2</a:t>
+            </a:r>
+          </a:p>
+          <a:p>
+            <a:pPr marL="742950" lvl="1" indent="-285750">
+              <a:buFont typeface="Courier New" panose="02070309020205020404" pitchFamily="49" charset="0"/>
+              <a:buChar char="o"/>
+            </a:pPr>
+            <a:r>
+              <a:rPr lang="en-US" sz="1100"/>
+              <a:t>programming done (succeeded + intended ignore) log to table2</a:t>
+            </a:r>
+          </a:p>
+          <a:p>
+            <a:pPr marL="742950" lvl="1" indent="-285750">
+              <a:buFont typeface="Courier New" panose="02070309020205020404" pitchFamily="49" charset="0"/>
+              <a:buChar char="o"/>
+            </a:pPr>
+            <a:r>
+              <a:rPr lang="en-US" sz="1100"/>
+              <a:t>programming failed do not log to table2</a:t>
+            </a:r>
+            <a:endParaRPr lang="en-US" sz="1400"/>
+          </a:p>
+          <a:p>
+            <a:pPr lvl="2"/>
+            <a:endParaRPr lang="en-US" sz="1100"/>
+          </a:p>
+          <a:p>
+            <a:pPr lvl="2"/>
+            <a:endParaRPr lang="en-US" sz="1100"/>
+          </a:p>
+        </p:txBody>
+      </p:sp>
+      <p:sp>
+        <p:nvSpPr>
+          <p:cNvPr id="10" name="Title 1">
+            <a:extLst>
+              <a:ext uri="{FF2B5EF4-FFF2-40B4-BE49-F238E27FC236}">
+                <a16:creationId xmlns:a16="http://schemas.microsoft.com/office/drawing/2014/main" id="{3E4AC56D-1D77-363D-CCF1-0F8577F445F9}"/>
+              </a:ext>
+            </a:extLst>
+          </p:cNvPr>
+          <p:cNvSpPr>
+            <a:spLocks noGrp="1"/>
+          </p:cNvSpPr>
+          <p:nvPr>
+            <p:ph type="title"/>
+          </p:nvPr>
+        </p:nvSpPr>
+        <p:spPr>
+          <a:xfrm>
+            <a:off x="838200" y="365125"/>
+            <a:ext cx="10515600" cy="1325563"/>
+          </a:xfrm>
+        </p:spPr>
+        <p:txBody>
+          <a:bodyPr/>
+          <a:lstStyle/>
+          <a:p>
+            <a:r>
+              <a:rPr lang="en-US"/>
+              <a:t>Race conditions</a:t>
+            </a:r>
+          </a:p>
+        </p:txBody>
+      </p:sp>
     </p:spTree>
     <p:extLst>
       <p:ext uri="{BB962C8B-B14F-4D97-AF65-F5344CB8AC3E}">
-        <p14:creationId xmlns:p14="http://schemas.microsoft.com/office/powerpoint/2010/main" val="3178622597"/>
+        <p14:creationId xmlns:p14="http://schemas.microsoft.com/office/powerpoint/2010/main" val="3276570579"/>
       </p:ext>
     </p:extLst>
   </p:cSld>
   <p:clrMapOvr>
     <a:masterClrMapping/>
   </p:clrMapOvr>
+  <p:extLst>
+    <p:ext uri="{6950BFC3-D8DA-4A85-94F7-54DA5524770B}">
+      <p188:commentRel xmlns:p188="http://schemas.microsoft.com/office/powerpoint/2018/8/main" r:id="rId3"/>
+    </p:ext>
+  </p:extLst>
 </p:sld>
 </file>
 
@@ -11104,10 +11572,265 @@
       </p:grpSpPr>
       <p:sp>
         <p:nvSpPr>
-          <p:cNvPr id="5" name="Rectangle: Rounded Corners 4">
-            <a:extLst>
-              <a:ext uri="{FF2B5EF4-FFF2-40B4-BE49-F238E27FC236}">
-                <a16:creationId xmlns:a16="http://schemas.microsoft.com/office/drawing/2014/main" id="{44C2F6E4-68E8-7BD3-9AA0-3FC6A0F86D05}"/>
+          <p:cNvPr id="72" name="TextBox 71">
+            <a:extLst>
+              <a:ext uri="{FF2B5EF4-FFF2-40B4-BE49-F238E27FC236}">
+                <a16:creationId xmlns:a16="http://schemas.microsoft.com/office/drawing/2014/main" id="{9A268795-8737-CCFB-AB89-69ACA13738F7}"/>
+              </a:ext>
+            </a:extLst>
+          </p:cNvPr>
+          <p:cNvSpPr txBox="1"/>
+          <p:nvPr/>
+        </p:nvSpPr>
+        <p:spPr>
+          <a:xfrm>
+            <a:off x="7032062" y="591159"/>
+            <a:ext cx="4618161" cy="6124754"/>
+          </a:xfrm>
+          <a:prstGeom prst="rect">
+            <a:avLst/>
+          </a:prstGeom>
+          <a:noFill/>
+        </p:spPr>
+        <p:txBody>
+          <a:bodyPr wrap="square" rtlCol="0">
+            <a:spAutoFit/>
+          </a:bodyPr>
+          <a:lstStyle/>
+          <a:p>
+            <a:r>
+              <a:rPr lang="en-US" sz="1400"/>
+              <a:t>Race condition #2: </a:t>
+            </a:r>
+            <a:r>
+              <a:rPr lang="en-US" altLang="zh-CN" sz="1200"/>
+              <a:t>step 1 &amp; 3 needs to be protected in one transaction/critical-section, otherwise step 3 may not reflect the step 1’s strict version control per </a:t>
+            </a:r>
+            <a:r>
+              <a:rPr lang="en-US" altLang="zh-CN" sz="1200" err="1"/>
+              <a:t>resource_id</a:t>
+            </a:r>
+            <a:r>
+              <a:rPr lang="en-US" altLang="zh-CN" sz="1200"/>
+              <a:t> (per key)</a:t>
+            </a:r>
+          </a:p>
+          <a:p>
+            <a:endParaRPr lang="en-US" sz="1200"/>
+          </a:p>
+          <a:p>
+            <a:r>
+              <a:rPr lang="en-US" sz="1200"/>
+              <a:t>Although competition of version control only happens in key granularity, it is not recommended to choose a non-concurrent </a:t>
+            </a:r>
+            <a:r>
+              <a:rPr lang="en-US" sz="1200" err="1"/>
+              <a:t>hashmap</a:t>
+            </a:r>
+            <a:r>
+              <a:rPr lang="en-US" sz="1200"/>
+              <a:t> and let different </a:t>
+            </a:r>
+            <a:r>
+              <a:rPr lang="en-US" sz="1200" err="1"/>
+              <a:t>kv</a:t>
+            </a:r>
+            <a:r>
+              <a:rPr lang="en-US" sz="1200"/>
+              <a:t> elements to be processed by multi threads at the same time without protection. </a:t>
+            </a:r>
+          </a:p>
+          <a:p>
+            <a:endParaRPr lang="en-US" sz="1200"/>
+          </a:p>
+          <a:p>
+            <a:r>
+              <a:rPr lang="en-US" sz="1200"/>
+              <a:t>So we still choose a concurrent </a:t>
+            </a:r>
+            <a:r>
+              <a:rPr lang="en-US" sz="1200" err="1"/>
+              <a:t>hashmap</a:t>
+            </a:r>
+            <a:r>
+              <a:rPr lang="en-US" sz="1200"/>
+              <a:t>, plus a key level obj lock for our own purpose: </a:t>
+            </a:r>
+          </a:p>
+          <a:p>
+            <a:pPr marL="342900" indent="-342900">
+              <a:buFont typeface="+mj-lt"/>
+              <a:buAutoNum type="arabicPeriod"/>
+            </a:pPr>
+            <a:endParaRPr lang="en-US" sz="1400"/>
+          </a:p>
+          <a:p>
+            <a:pPr marL="342900" indent="-342900">
+              <a:buFont typeface="+mj-lt"/>
+              <a:buAutoNum type="arabicPeriod"/>
+            </a:pPr>
+            <a:r>
+              <a:rPr lang="en-US" sz="1400"/>
+              <a:t>Concurrent hash map</a:t>
+            </a:r>
+          </a:p>
+          <a:p>
+            <a:pPr marL="800100" lvl="1" indent="-342900">
+              <a:buFont typeface="Arial" panose="020B0604020202020204" pitchFamily="34" charset="0"/>
+              <a:buChar char="•"/>
+            </a:pPr>
+            <a:r>
+              <a:rPr lang="en-US" sz="1200">
+                <a:hlinkClick r:id="rId3">
+                  <a:extLst>
+                    <a:ext uri="{A12FA001-AC4F-418D-AE19-62706E023703}">
+                      <ahyp:hlinkClr xmlns:ahyp="http://schemas.microsoft.com/office/drawing/2018/hyperlinkcolor" val="tx"/>
+                    </a:ext>
+                  </a:extLst>
+                </a:hlinkClick>
+              </a:rPr>
+              <a:t>https://github.com/facebook/folly/blob/main/folly/docs/AtomicHashMap.md</a:t>
+            </a:r>
+            <a:r>
+              <a:rPr lang="en-US" sz="1200"/>
+              <a:t>  </a:t>
+            </a:r>
+          </a:p>
+          <a:p>
+            <a:pPr marL="800100" lvl="1" indent="-342900">
+              <a:buFont typeface="Arial" panose="020B0604020202020204" pitchFamily="34" charset="0"/>
+              <a:buChar char="•"/>
+            </a:pPr>
+            <a:r>
+              <a:rPr lang="en-US" sz="1200"/>
+              <a:t>find and iteration are wait-free, insert has key-level lock granularity</a:t>
+            </a:r>
+          </a:p>
+          <a:p>
+            <a:pPr marL="800100" lvl="1" indent="-342900">
+              <a:buFont typeface="Arial" panose="020B0604020202020204" pitchFamily="34" charset="0"/>
+              <a:buChar char="•"/>
+            </a:pPr>
+            <a:r>
+              <a:rPr lang="en-US" sz="1200"/>
+              <a:t>only supports 32 or 64 bit keys - this is because they must be atomically compare-and-</a:t>
+            </a:r>
+            <a:r>
+              <a:rPr lang="en-US" sz="1200" err="1"/>
+              <a:t>swaped</a:t>
+            </a:r>
+            <a:endParaRPr lang="en-US" sz="1200"/>
+          </a:p>
+          <a:p>
+            <a:pPr marL="342900" indent="-342900">
+              <a:buFont typeface="+mj-lt"/>
+              <a:buAutoNum type="arabicPeriod"/>
+            </a:pPr>
+            <a:r>
+              <a:rPr lang="en-US" sz="1400"/>
+              <a:t>K and V are</a:t>
+            </a:r>
+          </a:p>
+          <a:p>
+            <a:pPr marL="800100" lvl="1" indent="-342900">
+              <a:buFont typeface="Arial" panose="020B0604020202020204" pitchFamily="34" charset="0"/>
+              <a:buChar char="•"/>
+            </a:pPr>
+            <a:r>
+              <a:rPr lang="en-US" sz="1200"/>
+              <a:t>Key – long int that encoded from </a:t>
+            </a:r>
+            <a:r>
+              <a:rPr lang="en-US" sz="1200" err="1"/>
+              <a:t>resource_id</a:t>
+            </a:r>
+            <a:r>
+              <a:rPr lang="en-US" sz="1200"/>
+              <a:t> (in neighbor case, it is    VNI + </a:t>
+            </a:r>
+            <a:r>
+              <a:rPr lang="en-US" sz="1200" err="1"/>
+              <a:t>vpc_ip</a:t>
+            </a:r>
+            <a:r>
+              <a:rPr lang="en-US" sz="1200"/>
+              <a:t>)</a:t>
+            </a:r>
+          </a:p>
+          <a:p>
+            <a:pPr marL="800100" lvl="1" indent="-342900">
+              <a:buFont typeface="Arial" panose="020B0604020202020204" pitchFamily="34" charset="0"/>
+              <a:buChar char="•"/>
+            </a:pPr>
+            <a:r>
+              <a:rPr lang="en-US" sz="1200"/>
+              <a:t>Value – 2 tuples element</a:t>
+            </a:r>
+          </a:p>
+          <a:p>
+            <a:pPr marL="1257300" lvl="2" indent="-342900">
+              <a:buFont typeface="Courier New" panose="02070309020205020404" pitchFamily="49" charset="0"/>
+              <a:buChar char="o"/>
+            </a:pPr>
+            <a:r>
+              <a:rPr lang="en-US" sz="1200"/>
+              <a:t>1st tuple is Version object (or int value if locking is feasible) that assigned per neighbor key</a:t>
+            </a:r>
+          </a:p>
+          <a:p>
+            <a:pPr marL="1714500" lvl="3" indent="-342900">
+              <a:buFont typeface="Wingdings" panose="05000000000000000000" pitchFamily="2" charset="2"/>
+              <a:buChar char="q"/>
+            </a:pPr>
+            <a:r>
+              <a:rPr lang="en-US" sz="1200"/>
+              <a:t>for critical section of (step 1-3) protection and the protection granularity is per key</a:t>
+            </a:r>
+          </a:p>
+          <a:p>
+            <a:pPr marL="1714500" lvl="3" indent="-342900">
+              <a:buFont typeface="Wingdings" panose="05000000000000000000" pitchFamily="2" charset="2"/>
+              <a:buChar char="q"/>
+            </a:pPr>
+            <a:r>
+              <a:rPr lang="en-US" sz="1200"/>
+              <a:t>to store the version for the atomic operation above</a:t>
+            </a:r>
+          </a:p>
+          <a:p>
+            <a:pPr marL="1257300" lvl="2" indent="-342900">
+              <a:buFont typeface="Courier New" panose="02070309020205020404" pitchFamily="49" charset="0"/>
+              <a:buChar char="o"/>
+            </a:pPr>
+            <a:r>
+              <a:rPr lang="en-US" sz="1200"/>
+              <a:t>2nd tuple is of course the metadata of this goal state, for Neighbor case it contains </a:t>
+            </a:r>
+            <a:r>
+              <a:rPr lang="en-US" sz="1200" err="1"/>
+              <a:t>HostIP</a:t>
+            </a:r>
+            <a:r>
+              <a:rPr lang="en-US" sz="1200"/>
+              <a:t>, </a:t>
+            </a:r>
+            <a:r>
+              <a:rPr lang="en-US" sz="1200" err="1"/>
+              <a:t>HostMac</a:t>
+            </a:r>
+            <a:r>
+              <a:rPr lang="en-US" sz="1200"/>
+              <a:t> etc. </a:t>
+            </a:r>
+          </a:p>
+        </p:txBody>
+      </p:sp>
+      <p:sp>
+        <p:nvSpPr>
+          <p:cNvPr id="14" name="Rectangle: Rounded Corners 13">
+            <a:extLst>
+              <a:ext uri="{FF2B5EF4-FFF2-40B4-BE49-F238E27FC236}">
+                <a16:creationId xmlns:a16="http://schemas.microsoft.com/office/drawing/2014/main" id="{0EFAD92F-E102-0827-413A-4A9683148DAC}"/>
               </a:ext>
             </a:extLst>
           </p:cNvPr>
@@ -11116,8 +11839,8 @@
         </p:nvSpPr>
         <p:spPr>
           <a:xfrm>
-            <a:off x="107311" y="2727510"/>
-            <a:ext cx="6369690" cy="4033744"/>
+            <a:off x="164461" y="2727510"/>
+            <a:ext cx="6541140" cy="4033744"/>
           </a:xfrm>
           <a:prstGeom prst="roundRect">
             <a:avLst/>
@@ -11302,10 +12025,10 @@
       </p:sp>
       <p:sp>
         <p:nvSpPr>
-          <p:cNvPr id="7" name="Rectangle: Rounded Corners 6">
-            <a:extLst>
-              <a:ext uri="{FF2B5EF4-FFF2-40B4-BE49-F238E27FC236}">
-                <a16:creationId xmlns:a16="http://schemas.microsoft.com/office/drawing/2014/main" id="{958AB707-D515-1EAF-A3C9-6C726169C230}"/>
+          <p:cNvPr id="17" name="Rectangle: Rounded Corners 16">
+            <a:extLst>
+              <a:ext uri="{FF2B5EF4-FFF2-40B4-BE49-F238E27FC236}">
+                <a16:creationId xmlns:a16="http://schemas.microsoft.com/office/drawing/2014/main" id="{042EA16B-B4AC-B87F-77A1-3AE13CDAB5B9}"/>
               </a:ext>
             </a:extLst>
           </p:cNvPr>
@@ -11314,8 +12037,8 @@
         </p:nvSpPr>
         <p:spPr>
           <a:xfrm>
-            <a:off x="283566" y="2727509"/>
-            <a:ext cx="6000953" cy="3195009"/>
+            <a:off x="340716" y="2727509"/>
+            <a:ext cx="6212484" cy="3195009"/>
           </a:xfrm>
           <a:prstGeom prst="roundRect">
             <a:avLst/>
@@ -11452,10 +12175,10 @@
       </p:sp>
       <p:sp>
         <p:nvSpPr>
-          <p:cNvPr id="8" name="Rectangle: Rounded Corners 7">
-            <a:extLst>
-              <a:ext uri="{FF2B5EF4-FFF2-40B4-BE49-F238E27FC236}">
-                <a16:creationId xmlns:a16="http://schemas.microsoft.com/office/drawing/2014/main" id="{E9479206-2B6F-61B5-11FD-2AEA536AB0F8}"/>
+          <p:cNvPr id="22" name="Rectangle: Rounded Corners 21">
+            <a:extLst>
+              <a:ext uri="{FF2B5EF4-FFF2-40B4-BE49-F238E27FC236}">
+                <a16:creationId xmlns:a16="http://schemas.microsoft.com/office/drawing/2014/main" id="{7FD54D54-FD94-014F-4DA9-A90DACF52365}"/>
               </a:ext>
             </a:extLst>
           </p:cNvPr>
@@ -11464,7 +12187,7 @@
         </p:nvSpPr>
         <p:spPr>
           <a:xfrm>
-            <a:off x="1543249" y="6252383"/>
+            <a:off x="1600399" y="6252383"/>
             <a:ext cx="898618" cy="295271"/>
           </a:xfrm>
           <a:prstGeom prst="roundRect">
@@ -11516,10 +12239,10 @@
       </p:sp>
       <p:sp>
         <p:nvSpPr>
-          <p:cNvPr id="13" name="Cylinder 12">
-            <a:extLst>
-              <a:ext uri="{FF2B5EF4-FFF2-40B4-BE49-F238E27FC236}">
-                <a16:creationId xmlns:a16="http://schemas.microsoft.com/office/drawing/2014/main" id="{195748CA-E231-A0B8-1080-B97D02CFDBC8}"/>
+          <p:cNvPr id="23" name="Cylinder 22">
+            <a:extLst>
+              <a:ext uri="{FF2B5EF4-FFF2-40B4-BE49-F238E27FC236}">
+                <a16:creationId xmlns:a16="http://schemas.microsoft.com/office/drawing/2014/main" id="{C2CE633F-782B-6076-54E0-8C50CEF41A4A}"/>
               </a:ext>
             </a:extLst>
           </p:cNvPr>
@@ -11528,7 +12251,7 @@
         </p:nvSpPr>
         <p:spPr>
           <a:xfrm>
-            <a:off x="4869044" y="6217790"/>
+            <a:off x="4926194" y="6217790"/>
             <a:ext cx="1307067" cy="364459"/>
           </a:xfrm>
           <a:prstGeom prst="can">
@@ -11580,10 +12303,10 @@
       </p:sp>
       <p:sp>
         <p:nvSpPr>
-          <p:cNvPr id="14" name="Oval 13">
-            <a:extLst>
-              <a:ext uri="{FF2B5EF4-FFF2-40B4-BE49-F238E27FC236}">
-                <a16:creationId xmlns:a16="http://schemas.microsoft.com/office/drawing/2014/main" id="{58119580-8723-C375-DABE-F80474FD1677}"/>
+          <p:cNvPr id="24" name="Oval 23">
+            <a:extLst>
+              <a:ext uri="{FF2B5EF4-FFF2-40B4-BE49-F238E27FC236}">
+                <a16:creationId xmlns:a16="http://schemas.microsoft.com/office/drawing/2014/main" id="{94C0A6A7-1A8F-ED07-669C-0EB3544C5C75}"/>
               </a:ext>
             </a:extLst>
           </p:cNvPr>
@@ -11592,7 +12315,7 @@
         </p:nvSpPr>
         <p:spPr>
           <a:xfrm>
-            <a:off x="806192" y="3830773"/>
+            <a:off x="863342" y="3830773"/>
             <a:ext cx="716856" cy="605600"/>
           </a:xfrm>
           <a:prstGeom prst="ellipse">
@@ -11650,10 +12373,10 @@
       </p:sp>
       <p:sp>
         <p:nvSpPr>
-          <p:cNvPr id="15" name="Oval 14">
-            <a:extLst>
-              <a:ext uri="{FF2B5EF4-FFF2-40B4-BE49-F238E27FC236}">
-                <a16:creationId xmlns:a16="http://schemas.microsoft.com/office/drawing/2014/main" id="{77CBCC49-35DC-9D18-7EF6-70E1016EAF0E}"/>
+          <p:cNvPr id="25" name="Oval 24">
+            <a:extLst>
+              <a:ext uri="{FF2B5EF4-FFF2-40B4-BE49-F238E27FC236}">
+                <a16:creationId xmlns:a16="http://schemas.microsoft.com/office/drawing/2014/main" id="{58A64855-BB00-BC84-E8E4-9ED9605A78CB}"/>
               </a:ext>
             </a:extLst>
           </p:cNvPr>
@@ -11662,7 +12385,7 @@
         </p:nvSpPr>
         <p:spPr>
           <a:xfrm>
-            <a:off x="3624421" y="2821640"/>
+            <a:off x="3681571" y="2821640"/>
             <a:ext cx="1046319" cy="517864"/>
           </a:xfrm>
           <a:prstGeom prst="ellipse">
@@ -11702,10 +12425,10 @@
       </p:sp>
       <p:sp>
         <p:nvSpPr>
-          <p:cNvPr id="16" name="Rectangle 15">
-            <a:extLst>
-              <a:ext uri="{FF2B5EF4-FFF2-40B4-BE49-F238E27FC236}">
-                <a16:creationId xmlns:a16="http://schemas.microsoft.com/office/drawing/2014/main" id="{34830680-9E8D-005F-C442-A64F289322A2}"/>
+          <p:cNvPr id="26" name="Rectangle 25">
+            <a:extLst>
+              <a:ext uri="{FF2B5EF4-FFF2-40B4-BE49-F238E27FC236}">
+                <a16:creationId xmlns:a16="http://schemas.microsoft.com/office/drawing/2014/main" id="{93E39FAF-82BF-40AB-25DF-4C339661D5D6}"/>
               </a:ext>
             </a:extLst>
           </p:cNvPr>
@@ -11714,7 +12437,7 @@
         </p:nvSpPr>
         <p:spPr>
           <a:xfrm>
-            <a:off x="4359760" y="5341671"/>
+            <a:off x="4416910" y="5341671"/>
             <a:ext cx="129654" cy="141761"/>
           </a:xfrm>
           <a:prstGeom prst="rect">
@@ -11751,10 +12474,10 @@
       </p:sp>
       <p:sp>
         <p:nvSpPr>
-          <p:cNvPr id="17" name="Rectangle 16">
-            <a:extLst>
-              <a:ext uri="{FF2B5EF4-FFF2-40B4-BE49-F238E27FC236}">
-                <a16:creationId xmlns:a16="http://schemas.microsoft.com/office/drawing/2014/main" id="{ED4A1AB3-E634-CB2C-E4F0-5D24D6961E7D}"/>
+          <p:cNvPr id="27" name="Rectangle 26">
+            <a:extLst>
+              <a:ext uri="{FF2B5EF4-FFF2-40B4-BE49-F238E27FC236}">
+                <a16:creationId xmlns:a16="http://schemas.microsoft.com/office/drawing/2014/main" id="{96C6BD28-E3ED-E606-2636-54842BAF2108}"/>
               </a:ext>
             </a:extLst>
           </p:cNvPr>
@@ -11763,7 +12486,7 @@
         </p:nvSpPr>
         <p:spPr>
           <a:xfrm>
-            <a:off x="4489414" y="5341671"/>
+            <a:off x="4546564" y="5341671"/>
             <a:ext cx="129654" cy="141761"/>
           </a:xfrm>
           <a:prstGeom prst="rect">
@@ -11800,10 +12523,10 @@
       </p:sp>
       <p:sp>
         <p:nvSpPr>
-          <p:cNvPr id="18" name="Rectangle 17">
-            <a:extLst>
-              <a:ext uri="{FF2B5EF4-FFF2-40B4-BE49-F238E27FC236}">
-                <a16:creationId xmlns:a16="http://schemas.microsoft.com/office/drawing/2014/main" id="{FBF62025-8990-CE38-CE37-2B444E58DE2C}"/>
+          <p:cNvPr id="28" name="Rectangle 27">
+            <a:extLst>
+              <a:ext uri="{FF2B5EF4-FFF2-40B4-BE49-F238E27FC236}">
+                <a16:creationId xmlns:a16="http://schemas.microsoft.com/office/drawing/2014/main" id="{C1383AD6-D9A4-FEE6-5675-A5F6156A3593}"/>
               </a:ext>
             </a:extLst>
           </p:cNvPr>
@@ -11812,7 +12535,7 @@
         </p:nvSpPr>
         <p:spPr>
           <a:xfrm>
-            <a:off x="4616788" y="5341671"/>
+            <a:off x="4673938" y="5341671"/>
             <a:ext cx="129654" cy="141761"/>
           </a:xfrm>
           <a:prstGeom prst="rect">
@@ -11849,10 +12572,10 @@
       </p:sp>
       <p:sp>
         <p:nvSpPr>
-          <p:cNvPr id="19" name="Rectangle 18">
-            <a:extLst>
-              <a:ext uri="{FF2B5EF4-FFF2-40B4-BE49-F238E27FC236}">
-                <a16:creationId xmlns:a16="http://schemas.microsoft.com/office/drawing/2014/main" id="{091FB807-EE18-CE4A-64BC-5388F12BFB63}"/>
+          <p:cNvPr id="29" name="Rectangle 28">
+            <a:extLst>
+              <a:ext uri="{FF2B5EF4-FFF2-40B4-BE49-F238E27FC236}">
+                <a16:creationId xmlns:a16="http://schemas.microsoft.com/office/drawing/2014/main" id="{CDF40F64-A0F2-4F82-4616-58C67582C6F2}"/>
               </a:ext>
             </a:extLst>
           </p:cNvPr>
@@ -11861,7 +12584,7 @@
         </p:nvSpPr>
         <p:spPr>
           <a:xfrm>
-            <a:off x="4740750" y="5341671"/>
+            <a:off x="4797900" y="5341671"/>
             <a:ext cx="129654" cy="141761"/>
           </a:xfrm>
           <a:prstGeom prst="rect">
@@ -11898,10 +12621,10 @@
       </p:sp>
       <p:sp>
         <p:nvSpPr>
-          <p:cNvPr id="20" name="Rectangle 19">
-            <a:extLst>
-              <a:ext uri="{FF2B5EF4-FFF2-40B4-BE49-F238E27FC236}">
-                <a16:creationId xmlns:a16="http://schemas.microsoft.com/office/drawing/2014/main" id="{632D6467-1E25-4D57-3654-6D2A91BA92C6}"/>
+          <p:cNvPr id="30" name="Rectangle 29">
+            <a:extLst>
+              <a:ext uri="{FF2B5EF4-FFF2-40B4-BE49-F238E27FC236}">
+                <a16:creationId xmlns:a16="http://schemas.microsoft.com/office/drawing/2014/main" id="{7A328CF4-7F2D-B190-E0AE-D5967785561B}"/>
               </a:ext>
             </a:extLst>
           </p:cNvPr>
@@ -11910,7 +12633,7 @@
         </p:nvSpPr>
         <p:spPr>
           <a:xfrm>
-            <a:off x="4869551" y="5341671"/>
+            <a:off x="4926701" y="5341671"/>
             <a:ext cx="129654" cy="141761"/>
           </a:xfrm>
           <a:prstGeom prst="rect">
@@ -11947,10 +12670,10 @@
       </p:sp>
       <p:sp>
         <p:nvSpPr>
-          <p:cNvPr id="21" name="Rectangle 20">
-            <a:extLst>
-              <a:ext uri="{FF2B5EF4-FFF2-40B4-BE49-F238E27FC236}">
-                <a16:creationId xmlns:a16="http://schemas.microsoft.com/office/drawing/2014/main" id="{33FD66D4-39C6-6AF6-8FC6-9C2DBAFFA5E5}"/>
+          <p:cNvPr id="31" name="Rectangle 30">
+            <a:extLst>
+              <a:ext uri="{FF2B5EF4-FFF2-40B4-BE49-F238E27FC236}">
+                <a16:creationId xmlns:a16="http://schemas.microsoft.com/office/drawing/2014/main" id="{0243E3A7-6EF7-20D8-4F3C-AD44D8D2F6BC}"/>
               </a:ext>
             </a:extLst>
           </p:cNvPr>
@@ -11959,7 +12682,7 @@
         </p:nvSpPr>
         <p:spPr>
           <a:xfrm>
-            <a:off x="4998636" y="5341671"/>
+            <a:off x="5055786" y="5341671"/>
             <a:ext cx="129654" cy="141761"/>
           </a:xfrm>
           <a:prstGeom prst="rect">
@@ -11996,10 +12719,10 @@
       </p:sp>
       <p:sp>
         <p:nvSpPr>
-          <p:cNvPr id="22" name="Rectangle: Rounded Corners 21">
-            <a:extLst>
-              <a:ext uri="{FF2B5EF4-FFF2-40B4-BE49-F238E27FC236}">
-                <a16:creationId xmlns:a16="http://schemas.microsoft.com/office/drawing/2014/main" id="{3C9FEA34-87F7-ED32-B550-F43CEFD3ADA2}"/>
+          <p:cNvPr id="33" name="Rectangle: Rounded Corners 32">
+            <a:extLst>
+              <a:ext uri="{FF2B5EF4-FFF2-40B4-BE49-F238E27FC236}">
+                <a16:creationId xmlns:a16="http://schemas.microsoft.com/office/drawing/2014/main" id="{DF956A12-D5F4-605B-F973-3B7492069539}"/>
               </a:ext>
             </a:extLst>
           </p:cNvPr>
@@ -12008,7 +12731,7 @@
         </p:nvSpPr>
         <p:spPr>
           <a:xfrm>
-            <a:off x="3186718" y="1680753"/>
+            <a:off x="3243868" y="1680753"/>
             <a:ext cx="1914077" cy="525465"/>
           </a:xfrm>
           <a:prstGeom prst="roundRect">
@@ -12055,10 +12778,10 @@
       </p:sp>
       <p:sp>
         <p:nvSpPr>
-          <p:cNvPr id="23" name="Oval 22">
-            <a:extLst>
-              <a:ext uri="{FF2B5EF4-FFF2-40B4-BE49-F238E27FC236}">
-                <a16:creationId xmlns:a16="http://schemas.microsoft.com/office/drawing/2014/main" id="{E44C7003-DB9D-C142-0BBB-8C1FAC84E43B}"/>
+          <p:cNvPr id="35" name="Oval 34">
+            <a:extLst>
+              <a:ext uri="{FF2B5EF4-FFF2-40B4-BE49-F238E27FC236}">
+                <a16:creationId xmlns:a16="http://schemas.microsoft.com/office/drawing/2014/main" id="{07074D8F-0A83-651C-E258-8CB36E167CA8}"/>
               </a:ext>
             </a:extLst>
           </p:cNvPr>
@@ -12067,7 +12790,7 @@
         </p:nvSpPr>
         <p:spPr>
           <a:xfrm>
-            <a:off x="3785355" y="2595957"/>
+            <a:off x="3842505" y="2595957"/>
             <a:ext cx="240512" cy="179637"/>
           </a:xfrm>
           <a:prstGeom prst="ellipse">
@@ -12107,10 +12830,10 @@
       </p:sp>
       <p:sp>
         <p:nvSpPr>
-          <p:cNvPr id="24" name="Oval 23">
-            <a:extLst>
-              <a:ext uri="{FF2B5EF4-FFF2-40B4-BE49-F238E27FC236}">
-                <a16:creationId xmlns:a16="http://schemas.microsoft.com/office/drawing/2014/main" id="{0AEACA3F-51A8-EEBB-2128-389907F0B379}"/>
+          <p:cNvPr id="37" name="Oval 36">
+            <a:extLst>
+              <a:ext uri="{FF2B5EF4-FFF2-40B4-BE49-F238E27FC236}">
+                <a16:creationId xmlns:a16="http://schemas.microsoft.com/office/drawing/2014/main" id="{23C6675F-2A94-D9C7-BE69-6CFC8DFA99E3}"/>
               </a:ext>
             </a:extLst>
           </p:cNvPr>
@@ -12119,7 +12842,7 @@
         </p:nvSpPr>
         <p:spPr>
           <a:xfrm>
-            <a:off x="5034941" y="5037437"/>
+            <a:off x="5092091" y="5037437"/>
             <a:ext cx="1047562" cy="775514"/>
           </a:xfrm>
           <a:prstGeom prst="ellipse">
@@ -12172,10 +12895,10 @@
       </p:sp>
       <p:sp>
         <p:nvSpPr>
-          <p:cNvPr id="25" name="Rectangle 24">
-            <a:extLst>
-              <a:ext uri="{FF2B5EF4-FFF2-40B4-BE49-F238E27FC236}">
-                <a16:creationId xmlns:a16="http://schemas.microsoft.com/office/drawing/2014/main" id="{DD007557-97DE-F72A-CB08-8B4D12B1869C}"/>
+          <p:cNvPr id="38" name="Rectangle 37">
+            <a:extLst>
+              <a:ext uri="{FF2B5EF4-FFF2-40B4-BE49-F238E27FC236}">
+                <a16:creationId xmlns:a16="http://schemas.microsoft.com/office/drawing/2014/main" id="{1D9ED6A7-9759-A88D-7F62-644B4B17733A}"/>
               </a:ext>
             </a:extLst>
           </p:cNvPr>
@@ -12184,7 +12907,7 @@
         </p:nvSpPr>
         <p:spPr>
           <a:xfrm>
-            <a:off x="2152117" y="3511775"/>
+            <a:off x="2209267" y="3511775"/>
             <a:ext cx="129654" cy="141761"/>
           </a:xfrm>
           <a:prstGeom prst="rect">
@@ -12221,10 +12944,10 @@
       </p:sp>
       <p:sp>
         <p:nvSpPr>
-          <p:cNvPr id="26" name="Rectangle 25">
-            <a:extLst>
-              <a:ext uri="{FF2B5EF4-FFF2-40B4-BE49-F238E27FC236}">
-                <a16:creationId xmlns:a16="http://schemas.microsoft.com/office/drawing/2014/main" id="{416DEFE2-55F4-FA38-8D46-C259E8CF8B55}"/>
+          <p:cNvPr id="39" name="Rectangle 38">
+            <a:extLst>
+              <a:ext uri="{FF2B5EF4-FFF2-40B4-BE49-F238E27FC236}">
+                <a16:creationId xmlns:a16="http://schemas.microsoft.com/office/drawing/2014/main" id="{AAD23C9F-8560-A83D-92E3-61230B903CF4}"/>
               </a:ext>
             </a:extLst>
           </p:cNvPr>
@@ -12233,7 +12956,7 @@
         </p:nvSpPr>
         <p:spPr>
           <a:xfrm>
-            <a:off x="2281771" y="3511775"/>
+            <a:off x="2338921" y="3511775"/>
             <a:ext cx="129654" cy="141761"/>
           </a:xfrm>
           <a:prstGeom prst="rect">
@@ -12270,10 +12993,10 @@
       </p:sp>
       <p:sp>
         <p:nvSpPr>
-          <p:cNvPr id="27" name="Rectangle 26">
-            <a:extLst>
-              <a:ext uri="{FF2B5EF4-FFF2-40B4-BE49-F238E27FC236}">
-                <a16:creationId xmlns:a16="http://schemas.microsoft.com/office/drawing/2014/main" id="{3321F7FA-6BAD-AFF6-4534-648F680A505B}"/>
+          <p:cNvPr id="40" name="Rectangle 39">
+            <a:extLst>
+              <a:ext uri="{FF2B5EF4-FFF2-40B4-BE49-F238E27FC236}">
+                <a16:creationId xmlns:a16="http://schemas.microsoft.com/office/drawing/2014/main" id="{D55433D1-233A-8D0A-8E89-0ED7CF2DCAD3}"/>
               </a:ext>
             </a:extLst>
           </p:cNvPr>
@@ -12282,7 +13005,7 @@
         </p:nvSpPr>
         <p:spPr>
           <a:xfrm>
-            <a:off x="2409145" y="3511775"/>
+            <a:off x="2466295" y="3511775"/>
             <a:ext cx="129654" cy="141761"/>
           </a:xfrm>
           <a:prstGeom prst="rect">
@@ -12319,10 +13042,10 @@
       </p:sp>
       <p:sp>
         <p:nvSpPr>
-          <p:cNvPr id="28" name="Rectangle 27">
-            <a:extLst>
-              <a:ext uri="{FF2B5EF4-FFF2-40B4-BE49-F238E27FC236}">
-                <a16:creationId xmlns:a16="http://schemas.microsoft.com/office/drawing/2014/main" id="{6ABC7C86-7C59-C986-B005-7B26D26A4262}"/>
+          <p:cNvPr id="41" name="Rectangle 40">
+            <a:extLst>
+              <a:ext uri="{FF2B5EF4-FFF2-40B4-BE49-F238E27FC236}">
+                <a16:creationId xmlns:a16="http://schemas.microsoft.com/office/drawing/2014/main" id="{5940950F-5CD2-7A2F-FADD-00B46B542E2F}"/>
               </a:ext>
             </a:extLst>
           </p:cNvPr>
@@ -12331,7 +13054,7 @@
         </p:nvSpPr>
         <p:spPr>
           <a:xfrm>
-            <a:off x="2539931" y="3511775"/>
+            <a:off x="2597081" y="3511775"/>
             <a:ext cx="129654" cy="141761"/>
           </a:xfrm>
           <a:prstGeom prst="rect">
@@ -12368,10 +13091,10 @@
       </p:sp>
       <p:sp>
         <p:nvSpPr>
-          <p:cNvPr id="29" name="Rectangle 28">
-            <a:extLst>
-              <a:ext uri="{FF2B5EF4-FFF2-40B4-BE49-F238E27FC236}">
-                <a16:creationId xmlns:a16="http://schemas.microsoft.com/office/drawing/2014/main" id="{61E4B796-5243-A652-C05F-3F78649CF87E}"/>
+          <p:cNvPr id="42" name="Rectangle 41">
+            <a:extLst>
+              <a:ext uri="{FF2B5EF4-FFF2-40B4-BE49-F238E27FC236}">
+                <a16:creationId xmlns:a16="http://schemas.microsoft.com/office/drawing/2014/main" id="{210F4086-9188-36F0-1E9D-DF83511F6DD7}"/>
               </a:ext>
             </a:extLst>
           </p:cNvPr>
@@ -12380,7 +13103,7 @@
         </p:nvSpPr>
         <p:spPr>
           <a:xfrm>
-            <a:off x="2668732" y="3511775"/>
+            <a:off x="2725882" y="3511775"/>
             <a:ext cx="129654" cy="141761"/>
           </a:xfrm>
           <a:prstGeom prst="rect">
@@ -12417,10 +13140,10 @@
       </p:sp>
       <p:sp>
         <p:nvSpPr>
-          <p:cNvPr id="30" name="Rectangle 29">
-            <a:extLst>
-              <a:ext uri="{FF2B5EF4-FFF2-40B4-BE49-F238E27FC236}">
-                <a16:creationId xmlns:a16="http://schemas.microsoft.com/office/drawing/2014/main" id="{82E7E3DD-9654-DB19-8E5A-31802A51439B}"/>
+          <p:cNvPr id="43" name="Rectangle 42">
+            <a:extLst>
+              <a:ext uri="{FF2B5EF4-FFF2-40B4-BE49-F238E27FC236}">
+                <a16:creationId xmlns:a16="http://schemas.microsoft.com/office/drawing/2014/main" id="{49FD9561-A974-24A1-B44F-A8A9B3FE527A}"/>
               </a:ext>
             </a:extLst>
           </p:cNvPr>
@@ -12429,7 +13152,7 @@
         </p:nvSpPr>
         <p:spPr>
           <a:xfrm>
-            <a:off x="2797817" y="3511775"/>
+            <a:off x="2854967" y="3511775"/>
             <a:ext cx="129654" cy="141761"/>
           </a:xfrm>
           <a:prstGeom prst="rect">
@@ -12466,23 +13189,23 @@
       </p:sp>
       <p:cxnSp>
         <p:nvCxnSpPr>
-          <p:cNvPr id="35" name="Connector: Curved 34">
-            <a:extLst>
-              <a:ext uri="{FF2B5EF4-FFF2-40B4-BE49-F238E27FC236}">
-                <a16:creationId xmlns:a16="http://schemas.microsoft.com/office/drawing/2014/main" id="{75AC238C-9DB7-1CAC-992A-D69E944B6929}"/>
+          <p:cNvPr id="48" name="Connector: Curved 47">
+            <a:extLst>
+              <a:ext uri="{FF2B5EF4-FFF2-40B4-BE49-F238E27FC236}">
+                <a16:creationId xmlns:a16="http://schemas.microsoft.com/office/drawing/2014/main" id="{ABCCE4A8-71C8-B2AF-BB6A-8192CCB30578}"/>
               </a:ext>
             </a:extLst>
           </p:cNvPr>
           <p:cNvCxnSpPr>
             <a:cxnSpLocks/>
-            <a:stCxn id="30" idx="3"/>
-            <a:endCxn id="40" idx="7"/>
+            <a:stCxn id="43" idx="3"/>
+            <a:endCxn id="55" idx="7"/>
           </p:cNvCxnSpPr>
           <p:nvPr/>
         </p:nvCxnSpPr>
         <p:spPr>
           <a:xfrm flipH="1">
-            <a:off x="2096147" y="3582656"/>
+            <a:off x="2153297" y="3582656"/>
             <a:ext cx="831324" cy="341364"/>
           </a:xfrm>
           <a:prstGeom prst="curvedConnector4">
@@ -12512,10 +13235,10 @@
       </p:cxnSp>
       <p:sp>
         <p:nvSpPr>
-          <p:cNvPr id="39" name="TextBox 38">
-            <a:extLst>
-              <a:ext uri="{FF2B5EF4-FFF2-40B4-BE49-F238E27FC236}">
-                <a16:creationId xmlns:a16="http://schemas.microsoft.com/office/drawing/2014/main" id="{44685D72-24A5-076E-76C0-058258D5C108}"/>
+          <p:cNvPr id="54" name="TextBox 53">
+            <a:extLst>
+              <a:ext uri="{FF2B5EF4-FFF2-40B4-BE49-F238E27FC236}">
+                <a16:creationId xmlns:a16="http://schemas.microsoft.com/office/drawing/2014/main" id="{795D1CDB-97CC-E8CF-174E-2B92542DF915}"/>
               </a:ext>
             </a:extLst>
           </p:cNvPr>
@@ -12524,7 +13247,7 @@
         </p:nvSpPr>
         <p:spPr>
           <a:xfrm>
-            <a:off x="1922907" y="3272496"/>
+            <a:off x="1980057" y="3272496"/>
             <a:ext cx="1532792" cy="261610"/>
           </a:xfrm>
           <a:prstGeom prst="rect">
@@ -12547,10 +13270,10 @@
       </p:sp>
       <p:sp>
         <p:nvSpPr>
-          <p:cNvPr id="40" name="Oval 39">
-            <a:extLst>
-              <a:ext uri="{FF2B5EF4-FFF2-40B4-BE49-F238E27FC236}">
-                <a16:creationId xmlns:a16="http://schemas.microsoft.com/office/drawing/2014/main" id="{3F0A6773-0413-9B27-ABAC-CBEAFF455EC6}"/>
+          <p:cNvPr id="55" name="Oval 54">
+            <a:extLst>
+              <a:ext uri="{FF2B5EF4-FFF2-40B4-BE49-F238E27FC236}">
+                <a16:creationId xmlns:a16="http://schemas.microsoft.com/office/drawing/2014/main" id="{76DA817B-7DAB-F1C0-CAAD-3052432F068B}"/>
               </a:ext>
             </a:extLst>
           </p:cNvPr>
@@ -12559,7 +13282,7 @@
         </p:nvSpPr>
         <p:spPr>
           <a:xfrm>
-            <a:off x="1484272" y="3837221"/>
+            <a:off x="1541422" y="3837221"/>
             <a:ext cx="716856" cy="592704"/>
           </a:xfrm>
           <a:prstGeom prst="ellipse">
@@ -12617,23 +13340,23 @@
       </p:sp>
       <p:cxnSp>
         <p:nvCxnSpPr>
-          <p:cNvPr id="43" name="Connector: Curved 42">
-            <a:extLst>
-              <a:ext uri="{FF2B5EF4-FFF2-40B4-BE49-F238E27FC236}">
-                <a16:creationId xmlns:a16="http://schemas.microsoft.com/office/drawing/2014/main" id="{CCD051D7-0E60-9379-9295-BE7175E43099}"/>
+          <p:cNvPr id="58" name="Connector: Curved 57">
+            <a:extLst>
+              <a:ext uri="{FF2B5EF4-FFF2-40B4-BE49-F238E27FC236}">
+                <a16:creationId xmlns:a16="http://schemas.microsoft.com/office/drawing/2014/main" id="{0F115B42-0A77-4E83-1D0A-4BE37C14FF98}"/>
               </a:ext>
             </a:extLst>
           </p:cNvPr>
           <p:cNvCxnSpPr>
             <a:cxnSpLocks/>
-            <a:stCxn id="49" idx="3"/>
-            <a:endCxn id="8" idx="0"/>
+            <a:stCxn id="64" idx="3"/>
+            <a:endCxn id="22" idx="0"/>
           </p:cNvCxnSpPr>
           <p:nvPr/>
         </p:nvCxnSpPr>
         <p:spPr>
           <a:xfrm flipH="1">
-            <a:off x="1992558" y="5010660"/>
+            <a:off x="2049708" y="5010660"/>
             <a:ext cx="1194160" cy="1241723"/>
           </a:xfrm>
           <a:prstGeom prst="curvedConnector4">
@@ -12664,22 +13387,22 @@
       </p:cxnSp>
       <p:cxnSp>
         <p:nvCxnSpPr>
-          <p:cNvPr id="44" name="Straight Arrow Connector 43">
-            <a:extLst>
-              <a:ext uri="{FF2B5EF4-FFF2-40B4-BE49-F238E27FC236}">
-                <a16:creationId xmlns:a16="http://schemas.microsoft.com/office/drawing/2014/main" id="{8601FF43-4FC5-0D87-904B-D57B10E7C3E5}"/>
+          <p:cNvPr id="59" name="Straight Arrow Connector 58">
+            <a:extLst>
+              <a:ext uri="{FF2B5EF4-FFF2-40B4-BE49-F238E27FC236}">
+                <a16:creationId xmlns:a16="http://schemas.microsoft.com/office/drawing/2014/main" id="{AC579D30-D0D2-758A-4C82-754891336E0B}"/>
               </a:ext>
             </a:extLst>
           </p:cNvPr>
           <p:cNvCxnSpPr>
-            <a:stCxn id="22" idx="2"/>
-            <a:endCxn id="15" idx="0"/>
+            <a:stCxn id="33" idx="2"/>
+            <a:endCxn id="25" idx="0"/>
           </p:cNvCxnSpPr>
           <p:nvPr/>
         </p:nvCxnSpPr>
         <p:spPr>
           <a:xfrm>
-            <a:off x="4143757" y="2206218"/>
+            <a:off x="4200907" y="2206218"/>
             <a:ext cx="3824" cy="615422"/>
           </a:xfrm>
           <a:prstGeom prst="straightConnector1">
@@ -12706,10 +13429,10 @@
       </p:cxnSp>
       <p:sp>
         <p:nvSpPr>
-          <p:cNvPr id="45" name="Oval 44">
-            <a:extLst>
-              <a:ext uri="{FF2B5EF4-FFF2-40B4-BE49-F238E27FC236}">
-                <a16:creationId xmlns:a16="http://schemas.microsoft.com/office/drawing/2014/main" id="{DD3543BE-5730-B0B8-1A6C-CCFD7625A87E}"/>
+          <p:cNvPr id="60" name="Oval 59">
+            <a:extLst>
+              <a:ext uri="{FF2B5EF4-FFF2-40B4-BE49-F238E27FC236}">
+                <a16:creationId xmlns:a16="http://schemas.microsoft.com/office/drawing/2014/main" id="{FAF2F02A-0BB7-8A22-E728-184CA7A121D4}"/>
               </a:ext>
             </a:extLst>
           </p:cNvPr>
@@ -12718,7 +13441,7 @@
         </p:nvSpPr>
         <p:spPr>
           <a:xfrm>
-            <a:off x="3824968" y="2443931"/>
+            <a:off x="3882118" y="2443931"/>
             <a:ext cx="240512" cy="179637"/>
           </a:xfrm>
           <a:prstGeom prst="ellipse">
@@ -12758,10 +13481,10 @@
       </p:sp>
       <p:sp>
         <p:nvSpPr>
-          <p:cNvPr id="46" name="Oval 45">
-            <a:extLst>
-              <a:ext uri="{FF2B5EF4-FFF2-40B4-BE49-F238E27FC236}">
-                <a16:creationId xmlns:a16="http://schemas.microsoft.com/office/drawing/2014/main" id="{BC839444-C3A9-8E70-D46B-E4758B551D87}"/>
+          <p:cNvPr id="61" name="Oval 60">
+            <a:extLst>
+              <a:ext uri="{FF2B5EF4-FFF2-40B4-BE49-F238E27FC236}">
+                <a16:creationId xmlns:a16="http://schemas.microsoft.com/office/drawing/2014/main" id="{9FD3FB3C-928D-0F9E-54E8-5BC00EE7C632}"/>
               </a:ext>
             </a:extLst>
           </p:cNvPr>
@@ -12770,7 +13493,7 @@
         </p:nvSpPr>
         <p:spPr>
           <a:xfrm>
-            <a:off x="3859462" y="2290895"/>
+            <a:off x="3916612" y="2290895"/>
             <a:ext cx="240512" cy="179637"/>
           </a:xfrm>
           <a:prstGeom prst="ellipse">
@@ -12810,22 +13533,22 @@
       </p:sp>
       <p:cxnSp>
         <p:nvCxnSpPr>
-          <p:cNvPr id="47" name="Connector: Curved 46">
-            <a:extLst>
-              <a:ext uri="{FF2B5EF4-FFF2-40B4-BE49-F238E27FC236}">
-                <a16:creationId xmlns:a16="http://schemas.microsoft.com/office/drawing/2014/main" id="{0449F6E4-91E3-3C53-4639-9ADCCFB51DB3}"/>
+          <p:cNvPr id="62" name="Connector: Curved 61">
+            <a:extLst>
+              <a:ext uri="{FF2B5EF4-FFF2-40B4-BE49-F238E27FC236}">
+                <a16:creationId xmlns:a16="http://schemas.microsoft.com/office/drawing/2014/main" id="{F077AB1D-979F-ACE1-00F4-1A1CEAF9B7BA}"/>
               </a:ext>
             </a:extLst>
           </p:cNvPr>
           <p:cNvCxnSpPr>
-            <a:stCxn id="15" idx="2"/>
-            <a:endCxn id="25" idx="1"/>
+            <a:stCxn id="25" idx="2"/>
+            <a:endCxn id="38" idx="1"/>
           </p:cNvCxnSpPr>
           <p:nvPr/>
         </p:nvCxnSpPr>
         <p:spPr>
           <a:xfrm rot="10800000" flipV="1">
-            <a:off x="2152117" y="3080572"/>
+            <a:off x="2209267" y="3080572"/>
             <a:ext cx="1472304" cy="502084"/>
           </a:xfrm>
           <a:prstGeom prst="curvedConnector3">
@@ -12854,23 +13577,23 @@
       </p:cxnSp>
       <p:cxnSp>
         <p:nvCxnSpPr>
-          <p:cNvPr id="48" name="Connector: Curved 47">
-            <a:extLst>
-              <a:ext uri="{FF2B5EF4-FFF2-40B4-BE49-F238E27FC236}">
-                <a16:creationId xmlns:a16="http://schemas.microsoft.com/office/drawing/2014/main" id="{C5ABA387-F7C1-5A65-89FC-84D86BCF6531}"/>
+          <p:cNvPr id="63" name="Connector: Curved 62">
+            <a:extLst>
+              <a:ext uri="{FF2B5EF4-FFF2-40B4-BE49-F238E27FC236}">
+                <a16:creationId xmlns:a16="http://schemas.microsoft.com/office/drawing/2014/main" id="{7C100FD8-0F8D-444E-F691-D32CA47DB732}"/>
               </a:ext>
             </a:extLst>
           </p:cNvPr>
           <p:cNvCxnSpPr>
             <a:cxnSpLocks/>
-            <a:stCxn id="30" idx="3"/>
-            <a:endCxn id="14" idx="7"/>
+            <a:stCxn id="43" idx="3"/>
+            <a:endCxn id="24" idx="7"/>
           </p:cNvCxnSpPr>
           <p:nvPr/>
         </p:nvCxnSpPr>
         <p:spPr>
           <a:xfrm flipH="1">
-            <a:off x="1418067" y="3582656"/>
+            <a:off x="1475217" y="3582656"/>
             <a:ext cx="1509404" cy="336805"/>
           </a:xfrm>
           <a:prstGeom prst="curvedConnector4">
@@ -12900,10 +13623,10 @@
       </p:cxnSp>
       <p:sp>
         <p:nvSpPr>
-          <p:cNvPr id="49" name="Rectangle 48">
-            <a:extLst>
-              <a:ext uri="{FF2B5EF4-FFF2-40B4-BE49-F238E27FC236}">
-                <a16:creationId xmlns:a16="http://schemas.microsoft.com/office/drawing/2014/main" id="{34AB941A-9263-0640-DBCE-A683A1D05375}"/>
+          <p:cNvPr id="64" name="Rectangle 63">
+            <a:extLst>
+              <a:ext uri="{FF2B5EF4-FFF2-40B4-BE49-F238E27FC236}">
+                <a16:creationId xmlns:a16="http://schemas.microsoft.com/office/drawing/2014/main" id="{7E695E0A-800C-AA61-516A-14819BDF8478}"/>
               </a:ext>
             </a:extLst>
           </p:cNvPr>
@@ -12912,7 +13635,7 @@
         </p:nvSpPr>
         <p:spPr>
           <a:xfrm>
-            <a:off x="1277435" y="4307628"/>
+            <a:off x="1334585" y="4307628"/>
             <a:ext cx="1909283" cy="1406063"/>
           </a:xfrm>
           <a:prstGeom prst="rect">
@@ -13055,10 +13778,10 @@
       </p:sp>
       <p:sp>
         <p:nvSpPr>
-          <p:cNvPr id="50" name="TextBox 49">
-            <a:extLst>
-              <a:ext uri="{FF2B5EF4-FFF2-40B4-BE49-F238E27FC236}">
-                <a16:creationId xmlns:a16="http://schemas.microsoft.com/office/drawing/2014/main" id="{23F661E7-B374-3DD0-2883-C7FC85A09D2D}"/>
+          <p:cNvPr id="65" name="TextBox 64">
+            <a:extLst>
+              <a:ext uri="{FF2B5EF4-FFF2-40B4-BE49-F238E27FC236}">
+                <a16:creationId xmlns:a16="http://schemas.microsoft.com/office/drawing/2014/main" id="{3A531704-C51D-ACC5-7184-D9C93A5A0BE9}"/>
               </a:ext>
             </a:extLst>
           </p:cNvPr>
@@ -13067,7 +13790,7 @@
         </p:nvSpPr>
         <p:spPr>
           <a:xfrm>
-            <a:off x="3391584" y="5482410"/>
+            <a:off x="3448734" y="5482410"/>
             <a:ext cx="256802" cy="261610"/>
           </a:xfrm>
           <a:prstGeom prst="rect">
@@ -13090,23 +13813,23 @@
       </p:sp>
       <p:cxnSp>
         <p:nvCxnSpPr>
-          <p:cNvPr id="51" name="Connector: Curved 50">
-            <a:extLst>
-              <a:ext uri="{FF2B5EF4-FFF2-40B4-BE49-F238E27FC236}">
-                <a16:creationId xmlns:a16="http://schemas.microsoft.com/office/drawing/2014/main" id="{A80CF137-5861-F4A9-49C0-64CA4E5D9BBC}"/>
+          <p:cNvPr id="66" name="Connector: Curved 65">
+            <a:extLst>
+              <a:ext uri="{FF2B5EF4-FFF2-40B4-BE49-F238E27FC236}">
+                <a16:creationId xmlns:a16="http://schemas.microsoft.com/office/drawing/2014/main" id="{BDA2F6BF-DBE8-309C-2FCC-85468D97840B}"/>
               </a:ext>
             </a:extLst>
           </p:cNvPr>
           <p:cNvCxnSpPr>
             <a:cxnSpLocks/>
-            <a:stCxn id="49" idx="3"/>
-            <a:endCxn id="16" idx="1"/>
+            <a:stCxn id="64" idx="3"/>
+            <a:endCxn id="26" idx="1"/>
           </p:cNvCxnSpPr>
           <p:nvPr/>
         </p:nvCxnSpPr>
         <p:spPr>
           <a:xfrm>
-            <a:off x="3186718" y="5010660"/>
+            <a:off x="3243868" y="5010660"/>
             <a:ext cx="1173042" cy="401892"/>
           </a:xfrm>
           <a:prstGeom prst="curvedConnector3">
@@ -13135,10 +13858,10 @@
       </p:cxnSp>
       <p:sp>
         <p:nvSpPr>
-          <p:cNvPr id="52" name="TextBox 51">
-            <a:extLst>
-              <a:ext uri="{FF2B5EF4-FFF2-40B4-BE49-F238E27FC236}">
-                <a16:creationId xmlns:a16="http://schemas.microsoft.com/office/drawing/2014/main" id="{828F0798-F80D-F744-9C01-ECAEB4061997}"/>
+          <p:cNvPr id="67" name="TextBox 66">
+            <a:extLst>
+              <a:ext uri="{FF2B5EF4-FFF2-40B4-BE49-F238E27FC236}">
+                <a16:creationId xmlns:a16="http://schemas.microsoft.com/office/drawing/2014/main" id="{6580D0F4-FD16-DD22-8CF4-67404C70C485}"/>
               </a:ext>
             </a:extLst>
           </p:cNvPr>
@@ -13147,7 +13870,7 @@
         </p:nvSpPr>
         <p:spPr>
           <a:xfrm>
-            <a:off x="3833247" y="5150941"/>
+            <a:off x="3890397" y="5150941"/>
             <a:ext cx="489236" cy="261610"/>
           </a:xfrm>
           <a:prstGeom prst="rect">
@@ -13170,10 +13893,10 @@
       </p:sp>
       <p:sp>
         <p:nvSpPr>
-          <p:cNvPr id="53" name="TextBox 52">
-            <a:extLst>
-              <a:ext uri="{FF2B5EF4-FFF2-40B4-BE49-F238E27FC236}">
-                <a16:creationId xmlns:a16="http://schemas.microsoft.com/office/drawing/2014/main" id="{12FB3562-9CAD-F8C5-7E0C-D9F48F296EA0}"/>
+          <p:cNvPr id="68" name="TextBox 67">
+            <a:extLst>
+              <a:ext uri="{FF2B5EF4-FFF2-40B4-BE49-F238E27FC236}">
+                <a16:creationId xmlns:a16="http://schemas.microsoft.com/office/drawing/2014/main" id="{2FF727E2-6CED-A527-9DDB-2DFD8C0A9894}"/>
               </a:ext>
             </a:extLst>
           </p:cNvPr>
@@ -13182,7 +13905,7 @@
         </p:nvSpPr>
         <p:spPr>
           <a:xfrm>
-            <a:off x="5668337" y="5870648"/>
+            <a:off x="5725487" y="5870648"/>
             <a:ext cx="256802" cy="261610"/>
           </a:xfrm>
           <a:prstGeom prst="rect">
@@ -13205,10 +13928,10 @@
       </p:sp>
       <p:sp>
         <p:nvSpPr>
-          <p:cNvPr id="54" name="TextBox 53">
-            <a:extLst>
-              <a:ext uri="{FF2B5EF4-FFF2-40B4-BE49-F238E27FC236}">
-                <a16:creationId xmlns:a16="http://schemas.microsoft.com/office/drawing/2014/main" id="{E0BA4F46-097B-C80F-7282-FD2CD4412318}"/>
+          <p:cNvPr id="69" name="TextBox 68">
+            <a:extLst>
+              <a:ext uri="{FF2B5EF4-FFF2-40B4-BE49-F238E27FC236}">
+                <a16:creationId xmlns:a16="http://schemas.microsoft.com/office/drawing/2014/main" id="{DE12DFDA-DAE6-DC03-A8CF-B826737B0C7F}"/>
               </a:ext>
             </a:extLst>
           </p:cNvPr>
@@ -13217,7 +13940,7 @@
         </p:nvSpPr>
         <p:spPr>
           <a:xfrm>
-            <a:off x="5204381" y="5874758"/>
+            <a:off x="5261531" y="5874758"/>
             <a:ext cx="256802" cy="261610"/>
           </a:xfrm>
           <a:prstGeom prst="rect">
@@ -13240,10 +13963,10 @@
       </p:sp>
       <p:sp>
         <p:nvSpPr>
-          <p:cNvPr id="55" name="Rectangle: Single Corner Snipped 54">
-            <a:extLst>
-              <a:ext uri="{FF2B5EF4-FFF2-40B4-BE49-F238E27FC236}">
-                <a16:creationId xmlns:a16="http://schemas.microsoft.com/office/drawing/2014/main" id="{55996D6F-BC15-CF59-8EFC-BE3D55309AB6}"/>
+          <p:cNvPr id="70" name="Rectangle: Single Corner Snipped 69">
+            <a:extLst>
+              <a:ext uri="{FF2B5EF4-FFF2-40B4-BE49-F238E27FC236}">
+                <a16:creationId xmlns:a16="http://schemas.microsoft.com/office/drawing/2014/main" id="{463FADC6-3FAA-605A-0221-95614C304F1D}"/>
               </a:ext>
             </a:extLst>
           </p:cNvPr>
@@ -13252,7 +13975,7 @@
         </p:nvSpPr>
         <p:spPr>
           <a:xfrm>
-            <a:off x="4424587" y="4429925"/>
+            <a:off x="4481737" y="4429925"/>
             <a:ext cx="826166" cy="441422"/>
           </a:xfrm>
           <a:prstGeom prst="snip1Rect">
@@ -13301,10 +14024,10 @@
       </p:sp>
       <p:cxnSp>
         <p:nvCxnSpPr>
-          <p:cNvPr id="56" name="Straight Arrow Connector 55">
-            <a:extLst>
-              <a:ext uri="{FF2B5EF4-FFF2-40B4-BE49-F238E27FC236}">
-                <a16:creationId xmlns:a16="http://schemas.microsoft.com/office/drawing/2014/main" id="{BFF30045-A49C-639A-980D-2D608D62B7E0}"/>
+          <p:cNvPr id="73" name="Straight Arrow Connector 72">
+            <a:extLst>
+              <a:ext uri="{FF2B5EF4-FFF2-40B4-BE49-F238E27FC236}">
+                <a16:creationId xmlns:a16="http://schemas.microsoft.com/office/drawing/2014/main" id="{5AD9DA09-1C98-C634-C54D-78F47678EB12}"/>
               </a:ext>
             </a:extLst>
           </p:cNvPr>
@@ -13313,7 +14036,7 @@
         </p:nvCxnSpPr>
         <p:spPr>
           <a:xfrm>
-            <a:off x="3186718" y="4574743"/>
+            <a:off x="3243868" y="4574743"/>
             <a:ext cx="1237869" cy="0"/>
           </a:xfrm>
           <a:prstGeom prst="straightConnector1">
@@ -13341,10 +14064,10 @@
       </p:cxnSp>
       <p:sp>
         <p:nvSpPr>
-          <p:cNvPr id="57" name="TextBox 56">
-            <a:extLst>
-              <a:ext uri="{FF2B5EF4-FFF2-40B4-BE49-F238E27FC236}">
-                <a16:creationId xmlns:a16="http://schemas.microsoft.com/office/drawing/2014/main" id="{248DB0C5-737D-41B1-FBCD-A3F6139519DB}"/>
+          <p:cNvPr id="75" name="TextBox 74">
+            <a:extLst>
+              <a:ext uri="{FF2B5EF4-FFF2-40B4-BE49-F238E27FC236}">
+                <a16:creationId xmlns:a16="http://schemas.microsoft.com/office/drawing/2014/main" id="{2541A754-6808-E278-D922-FF2C592BA4AC}"/>
               </a:ext>
             </a:extLst>
           </p:cNvPr>
@@ -13353,7 +14076,7 @@
         </p:nvSpPr>
         <p:spPr>
           <a:xfrm>
-            <a:off x="3705106" y="4336678"/>
+            <a:off x="3762256" y="4336678"/>
             <a:ext cx="256802" cy="261610"/>
           </a:xfrm>
           <a:prstGeom prst="rect">
@@ -13376,21 +14099,21 @@
       </p:sp>
       <p:cxnSp>
         <p:nvCxnSpPr>
-          <p:cNvPr id="58" name="Straight Arrow Connector 57">
-            <a:extLst>
-              <a:ext uri="{FF2B5EF4-FFF2-40B4-BE49-F238E27FC236}">
-                <a16:creationId xmlns:a16="http://schemas.microsoft.com/office/drawing/2014/main" id="{6BFFE055-F2D3-C266-10EC-8FDFC013EF69}"/>
+          <p:cNvPr id="76" name="Straight Arrow Connector 75">
+            <a:extLst>
+              <a:ext uri="{FF2B5EF4-FFF2-40B4-BE49-F238E27FC236}">
+                <a16:creationId xmlns:a16="http://schemas.microsoft.com/office/drawing/2014/main" id="{7A08338C-626E-F947-840A-505BA182D7B4}"/>
               </a:ext>
             </a:extLst>
           </p:cNvPr>
           <p:cNvCxnSpPr>
-            <a:stCxn id="24" idx="4"/>
+            <a:stCxn id="37" idx="4"/>
           </p:cNvCxnSpPr>
           <p:nvPr/>
         </p:nvCxnSpPr>
         <p:spPr>
           <a:xfrm flipH="1">
-            <a:off x="5257330" y="5812951"/>
+            <a:off x="5314480" y="5812951"/>
             <a:ext cx="301392" cy="404839"/>
           </a:xfrm>
           <a:prstGeom prst="straightConnector1">
@@ -13417,21 +14140,21 @@
       </p:cxnSp>
       <p:cxnSp>
         <p:nvCxnSpPr>
-          <p:cNvPr id="59" name="Straight Arrow Connector 58">
-            <a:extLst>
-              <a:ext uri="{FF2B5EF4-FFF2-40B4-BE49-F238E27FC236}">
-                <a16:creationId xmlns:a16="http://schemas.microsoft.com/office/drawing/2014/main" id="{910F64F4-0708-EA76-8C1F-A7A7E6A6FBF5}"/>
+          <p:cNvPr id="77" name="Straight Arrow Connector 76">
+            <a:extLst>
+              <a:ext uri="{FF2B5EF4-FFF2-40B4-BE49-F238E27FC236}">
+                <a16:creationId xmlns:a16="http://schemas.microsoft.com/office/drawing/2014/main" id="{15D45433-743C-4AAB-7E28-BC62EE540204}"/>
               </a:ext>
             </a:extLst>
           </p:cNvPr>
           <p:cNvCxnSpPr>
-            <a:stCxn id="24" idx="4"/>
+            <a:stCxn id="37" idx="4"/>
           </p:cNvCxnSpPr>
           <p:nvPr/>
         </p:nvCxnSpPr>
         <p:spPr>
           <a:xfrm>
-            <a:off x="5558722" y="5812951"/>
+            <a:off x="5615872" y="5812951"/>
             <a:ext cx="274676" cy="404839"/>
           </a:xfrm>
           <a:prstGeom prst="straightConnector1">
@@ -13458,539 +14181,10 @@
       </p:cxnSp>
       <p:sp>
         <p:nvSpPr>
-          <p:cNvPr id="60" name="TextBox 59">
-            <a:extLst>
-              <a:ext uri="{FF2B5EF4-FFF2-40B4-BE49-F238E27FC236}">
-                <a16:creationId xmlns:a16="http://schemas.microsoft.com/office/drawing/2014/main" id="{003F762F-D027-3BC9-86ED-C99581E64A15}"/>
-              </a:ext>
-            </a:extLst>
-          </p:cNvPr>
-          <p:cNvSpPr txBox="1"/>
-          <p:nvPr/>
-        </p:nvSpPr>
-        <p:spPr>
-          <a:xfrm>
-            <a:off x="6538589" y="0"/>
-            <a:ext cx="5601498" cy="7201972"/>
-          </a:xfrm>
-          <a:prstGeom prst="rect">
-            <a:avLst/>
-          </a:prstGeom>
-          <a:noFill/>
-        </p:spPr>
-        <p:txBody>
-          <a:bodyPr wrap="square" rtlCol="0">
-            <a:spAutoFit/>
-          </a:bodyPr>
-          <a:lstStyle/>
-          <a:p>
-            <a:r>
-              <a:rPr lang="en-US" sz="1200"/>
-              <a:t>Race condition #1:  step #1 in the job</a:t>
-            </a:r>
-          </a:p>
-          <a:p>
-            <a:endParaRPr lang="en-US" sz="1200"/>
-          </a:p>
-          <a:p>
-            <a:r>
-              <a:rPr lang="en-US" sz="1200"/>
-              <a:t>Same neighbor’s different revisions (1, 6, 8) may be invoked at the same time, or latter ones may be completed first. </a:t>
-            </a:r>
-          </a:p>
-          <a:p>
-            <a:r>
-              <a:rPr lang="en-US" sz="1200"/>
-              <a:t>As long as the pushed states are target states (can finish programming with this version of state only, doesn’t need previous actions executed in strict order), latter revision can be executed first and doesn’t cause harm and may save some resource</a:t>
-            </a:r>
-          </a:p>
-          <a:p>
-            <a:pPr marL="171450" indent="-171450">
-              <a:buFont typeface="Arial" panose="020B0604020202020204" pitchFamily="34" charset="0"/>
-              <a:buChar char="•"/>
-            </a:pPr>
-            <a:endParaRPr lang="en-US" sz="1200"/>
-          </a:p>
-          <a:p>
-            <a:pPr marL="171450" indent="-171450">
-              <a:buFont typeface="Arial" panose="020B0604020202020204" pitchFamily="34" charset="0"/>
-              <a:buChar char="•"/>
-            </a:pPr>
-            <a:r>
-              <a:rPr lang="en-US" sz="1200"/>
-              <a:t>Case 1: 1 -&gt; 6 -&gt; 8</a:t>
-            </a:r>
-          </a:p>
-          <a:p>
-            <a:pPr marL="171450" indent="-171450">
-              <a:buFont typeface="Arial" panose="020B0604020202020204" pitchFamily="34" charset="0"/>
-              <a:buChar char="•"/>
-            </a:pPr>
-            <a:r>
-              <a:rPr lang="en-US" sz="1200"/>
-              <a:t>Case 2:  6 -&gt; 8 -&gt; 1</a:t>
-            </a:r>
-          </a:p>
-          <a:p>
-            <a:pPr marL="628650" lvl="1" indent="-171450">
-              <a:buFont typeface="Arial" panose="020B0604020202020204" pitchFamily="34" charset="0"/>
-              <a:buChar char="•"/>
-            </a:pPr>
-            <a:r>
-              <a:rPr lang="en-US" sz="1100"/>
-              <a:t>Ver 6 first</a:t>
-            </a:r>
-          </a:p>
-          <a:p>
-            <a:pPr marL="1085850" lvl="2" indent="-171450">
-              <a:buFont typeface="Arial" panose="020B0604020202020204" pitchFamily="34" charset="0"/>
-              <a:buChar char="•"/>
-            </a:pPr>
-            <a:r>
-              <a:rPr lang="en-US" sz="1100"/>
-              <a:t>Not found in </a:t>
-            </a:r>
-            <a:r>
-              <a:rPr lang="en-US" sz="1100" err="1"/>
-              <a:t>hashmap</a:t>
-            </a:r>
-            <a:r>
-              <a:rPr lang="en-US" sz="1100"/>
-              <a:t>, thus insert key with </a:t>
-            </a:r>
-            <a:r>
-              <a:rPr lang="en-US" sz="1100" err="1"/>
-              <a:t>ver</a:t>
-            </a:r>
-            <a:r>
-              <a:rPr lang="en-US" sz="1100"/>
-              <a:t> 6</a:t>
-            </a:r>
-          </a:p>
-          <a:p>
-            <a:pPr marL="1085850" lvl="2" indent="-171450">
-              <a:buFont typeface="Arial" panose="020B0604020202020204" pitchFamily="34" charset="0"/>
-              <a:buChar char="•"/>
-            </a:pPr>
-            <a:r>
-              <a:rPr lang="en-US" sz="1100"/>
-              <a:t>Async write to </a:t>
-            </a:r>
-            <a:r>
-              <a:rPr lang="en-US" sz="1100" err="1"/>
-              <a:t>db</a:t>
-            </a:r>
-            <a:r>
-              <a:rPr lang="en-US" sz="1100"/>
-              <a:t> table1</a:t>
-            </a:r>
-          </a:p>
-          <a:p>
-            <a:pPr marL="1085850" lvl="2" indent="-171450">
-              <a:buFont typeface="Arial" panose="020B0604020202020204" pitchFamily="34" charset="0"/>
-              <a:buChar char="•"/>
-            </a:pPr>
-            <a:r>
-              <a:rPr lang="en-US" sz="1100" err="1"/>
-              <a:t>eBPF</a:t>
-            </a:r>
-            <a:r>
-              <a:rPr lang="en-US" sz="1100"/>
-              <a:t> </a:t>
-            </a:r>
-            <a:r>
-              <a:rPr lang="en-US" sz="1100" err="1"/>
-              <a:t>syscall</a:t>
-            </a:r>
-            <a:r>
-              <a:rPr lang="en-US" sz="1100"/>
-              <a:t> is add if not found, or update if found</a:t>
-            </a:r>
-          </a:p>
-          <a:p>
-            <a:pPr marL="1085850" lvl="2" indent="-171450">
-              <a:buFont typeface="Arial" panose="020B0604020202020204" pitchFamily="34" charset="0"/>
-              <a:buChar char="•"/>
-            </a:pPr>
-            <a:r>
-              <a:rPr lang="en-US" sz="1100"/>
-              <a:t>Async write to </a:t>
-            </a:r>
-            <a:r>
-              <a:rPr lang="en-US" sz="1100" err="1"/>
-              <a:t>db</a:t>
-            </a:r>
-            <a:r>
-              <a:rPr lang="en-US" sz="1100"/>
-              <a:t> table2 if above succeeds</a:t>
-            </a:r>
-          </a:p>
-          <a:p>
-            <a:pPr marL="628650" lvl="1" indent="-171450">
-              <a:buFont typeface="Arial" panose="020B0604020202020204" pitchFamily="34" charset="0"/>
-              <a:buChar char="•"/>
-            </a:pPr>
-            <a:r>
-              <a:rPr lang="en-US" sz="1100"/>
-              <a:t>Ver 8 is to delete it</a:t>
-            </a:r>
-          </a:p>
-          <a:p>
-            <a:pPr marL="1085850" lvl="2" indent="-171450">
-              <a:buFont typeface="Arial" panose="020B0604020202020204" pitchFamily="34" charset="0"/>
-              <a:buChar char="•"/>
-            </a:pPr>
-            <a:r>
-              <a:rPr lang="en-US" sz="1100"/>
-              <a:t>Found </a:t>
-            </a:r>
-            <a:r>
-              <a:rPr lang="en-US" sz="1100" err="1"/>
-              <a:t>ver</a:t>
-            </a:r>
-            <a:r>
-              <a:rPr lang="en-US" sz="1100"/>
-              <a:t> 6 in </a:t>
-            </a:r>
-            <a:r>
-              <a:rPr lang="en-US" sz="1100" err="1"/>
-              <a:t>hashmap</a:t>
-            </a:r>
-            <a:r>
-              <a:rPr lang="en-US" sz="1100"/>
-              <a:t>, since 8 &gt; 6, update with </a:t>
-            </a:r>
-            <a:r>
-              <a:rPr lang="en-US" sz="1100" err="1"/>
-              <a:t>ver</a:t>
-            </a:r>
-            <a:r>
-              <a:rPr lang="en-US" sz="1100"/>
-              <a:t> 8</a:t>
-            </a:r>
-          </a:p>
-          <a:p>
-            <a:pPr marL="1085850" lvl="2" indent="-171450">
-              <a:buFont typeface="Arial" panose="020B0604020202020204" pitchFamily="34" charset="0"/>
-              <a:buChar char="•"/>
-            </a:pPr>
-            <a:r>
-              <a:rPr lang="en-US" sz="1100"/>
-              <a:t>Since in table1 </a:t>
-            </a:r>
-            <a:r>
-              <a:rPr lang="en-US" sz="1100" err="1"/>
-              <a:t>cur_ver</a:t>
-            </a:r>
-            <a:r>
-              <a:rPr lang="en-US" sz="1100"/>
-              <a:t> 8 &gt; </a:t>
-            </a:r>
-            <a:r>
-              <a:rPr lang="en-US" sz="1100" err="1"/>
-              <a:t>fetch_ver</a:t>
-            </a:r>
-            <a:r>
-              <a:rPr lang="en-US" sz="1100"/>
-              <a:t> 6, update</a:t>
-            </a:r>
-          </a:p>
-          <a:p>
-            <a:pPr marL="1085850" lvl="2" indent="-171450">
-              <a:buFont typeface="Arial" panose="020B0604020202020204" pitchFamily="34" charset="0"/>
-              <a:buChar char="•"/>
-            </a:pPr>
-            <a:r>
-              <a:rPr lang="en-US" sz="1100"/>
-              <a:t>delete from </a:t>
-            </a:r>
-            <a:r>
-              <a:rPr lang="en-US" sz="1100" err="1"/>
-              <a:t>eBPF</a:t>
-            </a:r>
-            <a:r>
-              <a:rPr lang="en-US" sz="1100"/>
-              <a:t> map and update table 2</a:t>
-            </a:r>
-          </a:p>
-          <a:p>
-            <a:pPr marL="628650" lvl="1" indent="-171450">
-              <a:buFont typeface="Arial" panose="020B0604020202020204" pitchFamily="34" charset="0"/>
-              <a:buChar char="•"/>
-            </a:pPr>
-            <a:r>
-              <a:rPr lang="en-US" sz="1100"/>
-              <a:t>Ver 1 at last</a:t>
-            </a:r>
-          </a:p>
-          <a:p>
-            <a:pPr marL="1085850" lvl="2" indent="-171450">
-              <a:buFont typeface="Arial" panose="020B0604020202020204" pitchFamily="34" charset="0"/>
-              <a:buChar char="•"/>
-            </a:pPr>
-            <a:r>
-              <a:rPr lang="en-US" sz="1100"/>
-              <a:t>Found </a:t>
-            </a:r>
-            <a:r>
-              <a:rPr lang="en-US" sz="1100" err="1"/>
-              <a:t>ver</a:t>
-            </a:r>
-            <a:r>
-              <a:rPr lang="en-US" sz="1100"/>
-              <a:t> 8 from </a:t>
-            </a:r>
-            <a:r>
-              <a:rPr lang="en-US" sz="1100" err="1"/>
-              <a:t>hashmap</a:t>
-            </a:r>
-            <a:r>
-              <a:rPr lang="en-US" sz="1100"/>
-              <a:t>, since 1 &lt; 8 simply ignore </a:t>
-            </a:r>
-            <a:r>
-              <a:rPr lang="en-US" sz="1100" err="1"/>
-              <a:t>eBPF</a:t>
-            </a:r>
-            <a:r>
-              <a:rPr lang="en-US" sz="1100"/>
-              <a:t> programming</a:t>
-            </a:r>
-          </a:p>
-          <a:p>
-            <a:pPr marL="1085850" lvl="2" indent="-171450">
-              <a:buFont typeface="Arial" panose="020B0604020202020204" pitchFamily="34" charset="0"/>
-              <a:buChar char="•"/>
-            </a:pPr>
-            <a:r>
-              <a:rPr lang="en-US" sz="1100"/>
-              <a:t>In table1, since 1 &lt; 8, also ignore updating</a:t>
-            </a:r>
-          </a:p>
-          <a:p>
-            <a:pPr marL="1085850" lvl="2" indent="-171450">
-              <a:buFont typeface="Arial" panose="020B0604020202020204" pitchFamily="34" charset="0"/>
-              <a:buChar char="•"/>
-            </a:pPr>
-            <a:r>
-              <a:rPr lang="en-US" sz="1100"/>
-              <a:t>Update table2</a:t>
-            </a:r>
-          </a:p>
-          <a:p>
-            <a:pPr marL="171450" indent="-171450">
-              <a:buFont typeface="Arial" panose="020B0604020202020204" pitchFamily="34" charset="0"/>
-              <a:buChar char="•"/>
-            </a:pPr>
-            <a:r>
-              <a:rPr lang="en-US" sz="1200"/>
-              <a:t>Case 3: 8 -&gt; 6 -&gt; 1 or 8 -&gt; 1 -&gt; 6</a:t>
-            </a:r>
-          </a:p>
-          <a:p>
-            <a:pPr marL="628650" lvl="1" indent="-171450">
-              <a:buFont typeface="Arial" panose="020B0604020202020204" pitchFamily="34" charset="0"/>
-              <a:buChar char="•"/>
-            </a:pPr>
-            <a:r>
-              <a:rPr lang="en-US" sz="1100"/>
-              <a:t>Ver 8 (deletion) first</a:t>
-            </a:r>
-          </a:p>
-          <a:p>
-            <a:pPr marL="1085850" lvl="2" indent="-171450">
-              <a:buFont typeface="Arial" panose="020B0604020202020204" pitchFamily="34" charset="0"/>
-              <a:buChar char="•"/>
-            </a:pPr>
-            <a:r>
-              <a:rPr lang="en-US" sz="1100"/>
-              <a:t>Not found in </a:t>
-            </a:r>
-            <a:r>
-              <a:rPr lang="en-US" sz="1100" err="1"/>
-              <a:t>hashmap</a:t>
-            </a:r>
-            <a:r>
-              <a:rPr lang="en-US" sz="1100"/>
-              <a:t>, thus insert key with </a:t>
-            </a:r>
-            <a:r>
-              <a:rPr lang="en-US" sz="1100" err="1"/>
-              <a:t>ver</a:t>
-            </a:r>
-            <a:r>
-              <a:rPr lang="en-US" sz="1100"/>
-              <a:t> 8</a:t>
-            </a:r>
-          </a:p>
-          <a:p>
-            <a:pPr marL="1085850" lvl="2" indent="-171450">
-              <a:buFont typeface="Arial" panose="020B0604020202020204" pitchFamily="34" charset="0"/>
-              <a:buChar char="•"/>
-            </a:pPr>
-            <a:r>
-              <a:rPr lang="en-US" sz="1100" err="1"/>
-              <a:t>eBPF</a:t>
-            </a:r>
-            <a:r>
-              <a:rPr lang="en-US" sz="1100"/>
-              <a:t> </a:t>
-            </a:r>
-            <a:r>
-              <a:rPr lang="en-US" sz="1100" err="1"/>
-              <a:t>syscall</a:t>
-            </a:r>
-            <a:r>
-              <a:rPr lang="en-US" sz="1100"/>
-              <a:t> is if found delete, if not found do nothing</a:t>
-            </a:r>
-          </a:p>
-          <a:p>
-            <a:pPr marL="1085850" lvl="2" indent="-171450">
-              <a:buFont typeface="Arial" panose="020B0604020202020204" pitchFamily="34" charset="0"/>
-              <a:buChar char="•"/>
-            </a:pPr>
-            <a:r>
-              <a:rPr lang="en-US" sz="1100"/>
-              <a:t>Update table1 and 2</a:t>
-            </a:r>
-          </a:p>
-          <a:p>
-            <a:pPr marL="628650" lvl="1" indent="-171450">
-              <a:buFont typeface="Arial" panose="020B0604020202020204" pitchFamily="34" charset="0"/>
-              <a:buChar char="•"/>
-            </a:pPr>
-            <a:r>
-              <a:rPr lang="en-US" sz="1100"/>
-              <a:t>Then </a:t>
-            </a:r>
-            <a:r>
-              <a:rPr lang="en-US" sz="1100" err="1"/>
-              <a:t>ver</a:t>
-            </a:r>
-            <a:r>
-              <a:rPr lang="en-US" sz="1100"/>
-              <a:t> 1 or </a:t>
-            </a:r>
-            <a:r>
-              <a:rPr lang="en-US" sz="1100" err="1"/>
-              <a:t>ver</a:t>
-            </a:r>
-            <a:r>
-              <a:rPr lang="en-US" sz="1100"/>
-              <a:t> 6</a:t>
-            </a:r>
-          </a:p>
-          <a:p>
-            <a:pPr marL="1085850" lvl="2" indent="-171450">
-              <a:buFont typeface="Arial" panose="020B0604020202020204" pitchFamily="34" charset="0"/>
-              <a:buChar char="•"/>
-            </a:pPr>
-            <a:r>
-              <a:rPr lang="en-US" sz="1100"/>
-              <a:t>Found </a:t>
-            </a:r>
-            <a:r>
-              <a:rPr lang="en-US" sz="1100" err="1"/>
-              <a:t>ver</a:t>
-            </a:r>
-            <a:r>
-              <a:rPr lang="en-US" sz="1100"/>
-              <a:t> 8 from </a:t>
-            </a:r>
-            <a:r>
-              <a:rPr lang="en-US" sz="1100" err="1"/>
-              <a:t>hashmap</a:t>
-            </a:r>
-            <a:r>
-              <a:rPr lang="en-US" sz="1100"/>
-              <a:t>, simply ignore </a:t>
-            </a:r>
-            <a:r>
-              <a:rPr lang="en-US" sz="1100" err="1"/>
-              <a:t>eBPF</a:t>
-            </a:r>
-            <a:r>
-              <a:rPr lang="en-US" sz="1100"/>
-              <a:t> programming but update table2</a:t>
-            </a:r>
-          </a:p>
-          <a:p>
-            <a:pPr marL="1085850" lvl="2" indent="-171450">
-              <a:buFont typeface="Arial" panose="020B0604020202020204" pitchFamily="34" charset="0"/>
-              <a:buChar char="•"/>
-            </a:pPr>
-            <a:r>
-              <a:rPr lang="en-US" sz="1100"/>
-              <a:t>In table1, since 1 or 6 &lt; 8, ignore updating</a:t>
-            </a:r>
-          </a:p>
-          <a:p>
-            <a:endParaRPr lang="en-US" sz="1100"/>
-          </a:p>
-          <a:p>
-            <a:r>
-              <a:rPr lang="en-US" sz="1100"/>
-              <a:t>Observation/philosophy:  </a:t>
-            </a:r>
-          </a:p>
-          <a:p>
-            <a:pPr marL="285750" indent="-285750">
-              <a:buFont typeface="Arial" panose="020B0604020202020204" pitchFamily="34" charset="0"/>
-              <a:buChar char="•"/>
-            </a:pPr>
-            <a:r>
-              <a:rPr lang="en-US" sz="1100"/>
-              <a:t>Concurrent HashMap and table1 (may combine later), update condition is increasing version</a:t>
-            </a:r>
-          </a:p>
-          <a:p>
-            <a:pPr marL="285750" indent="-285750">
-              <a:buFont typeface="Arial" panose="020B0604020202020204" pitchFamily="34" charset="0"/>
-              <a:buChar char="•"/>
-            </a:pPr>
-            <a:r>
-              <a:rPr lang="en-US" sz="1100"/>
-              <a:t>table2</a:t>
-            </a:r>
-          </a:p>
-          <a:p>
-            <a:pPr marL="742950" lvl="1" indent="-285750">
-              <a:buFont typeface="Courier New" panose="02070309020205020404" pitchFamily="49" charset="0"/>
-              <a:buChar char="o"/>
-            </a:pPr>
-            <a:r>
-              <a:rPr lang="en-US" sz="1100"/>
-              <a:t>programming done (succeeded + intended ignore) log to table2</a:t>
-            </a:r>
-          </a:p>
-          <a:p>
-            <a:pPr marL="742950" lvl="1" indent="-285750">
-              <a:buFont typeface="Courier New" panose="02070309020205020404" pitchFamily="49" charset="0"/>
-              <a:buChar char="o"/>
-            </a:pPr>
-            <a:r>
-              <a:rPr lang="en-US" sz="1100"/>
-              <a:t>programming failed do not log to table2</a:t>
-            </a:r>
-            <a:endParaRPr lang="en-US" sz="1400"/>
-          </a:p>
-          <a:p>
-            <a:pPr lvl="2"/>
-            <a:endParaRPr lang="en-US" sz="1100"/>
-          </a:p>
-          <a:p>
-            <a:pPr lvl="2"/>
-            <a:endParaRPr lang="en-US" sz="1100"/>
-          </a:p>
-        </p:txBody>
-      </p:sp>
-      <p:sp>
-        <p:nvSpPr>
-          <p:cNvPr id="10" name="Title 1">
-            <a:extLst>
-              <a:ext uri="{FF2B5EF4-FFF2-40B4-BE49-F238E27FC236}">
-                <a16:creationId xmlns:a16="http://schemas.microsoft.com/office/drawing/2014/main" id="{3E4AC56D-1D77-363D-CCF1-0F8577F445F9}"/>
+          <p:cNvPr id="5" name="Title 1">
+            <a:extLst>
+              <a:ext uri="{FF2B5EF4-FFF2-40B4-BE49-F238E27FC236}">
+                <a16:creationId xmlns:a16="http://schemas.microsoft.com/office/drawing/2014/main" id="{619AAC46-B63A-6E72-9290-B4F75216F8A0}"/>
               </a:ext>
             </a:extLst>
           </p:cNvPr>
@@ -14004,7 +14198,7 @@
         <p:spPr>
           <a:xfrm>
             <a:off x="838200" y="365125"/>
-            <a:ext cx="10515600" cy="1325563"/>
+            <a:ext cx="5199993" cy="1325563"/>
           </a:xfrm>
         </p:spPr>
         <p:txBody>
@@ -14021,18 +14215,13 @@
     </p:spTree>
     <p:extLst>
       <p:ext uri="{BB962C8B-B14F-4D97-AF65-F5344CB8AC3E}">
-        <p14:creationId xmlns:p14="http://schemas.microsoft.com/office/powerpoint/2010/main" val="3276570579"/>
+        <p14:creationId xmlns:p14="http://schemas.microsoft.com/office/powerpoint/2010/main" val="3178622597"/>
       </p:ext>
     </p:extLst>
   </p:cSld>
   <p:clrMapOvr>
     <a:masterClrMapping/>
   </p:clrMapOvr>
-  <p:extLst>
-    <p:ext uri="{6950BFC3-D8DA-4A85-94F7-54DA5524770B}">
-      <p188:commentRel xmlns:p188="http://schemas.microsoft.com/office/powerpoint/2018/8/main" r:id="rId3"/>
-    </p:ext>
-  </p:extLst>
 </p:sld>
 </file>
 
@@ -16465,7 +16654,7 @@
           <a:p>
             <a:r>
               <a:rPr lang="en-US" sz="1400"/>
-              <a:t>Race condition #2:    diff between HashMap and table 1</a:t>
+              <a:t>Race condition #3:    diff between HashMap and table 1</a:t>
             </a:r>
           </a:p>
           <a:p>
@@ -19294,7 +19483,7 @@
           <a:p>
             <a:r>
               <a:rPr lang="en-US" sz="1400"/>
-              <a:t>Race condition #3:  diff between table 1 and table 2</a:t>
+              <a:t>Race condition #4:  diff between table 1 and table 2</a:t>
             </a:r>
           </a:p>
           <a:p>
@@ -22396,7 +22585,7 @@
           <a:p>
             <a:r>
               <a:rPr lang="en-US" sz="1400"/>
-              <a:t>Race condition #4:  diff between real </a:t>
+              <a:t>Race condition #5:  diff between real </a:t>
             </a:r>
             <a:r>
               <a:rPr lang="en-US" sz="1400" err="1"/>
@@ -26127,7 +26316,7 @@
           <a:lstStyle/>
           <a:p>
             <a:r>
-              <a:rPr lang="en-US" sz="1100" dirty="0">
+              <a:rPr lang="en-US" sz="1100">
                 <a:solidFill>
                   <a:schemeClr val="tx1"/>
                 </a:solidFill>
@@ -26136,7 +26325,7 @@
             </a:r>
           </a:p>
           <a:p>
-            <a:endParaRPr lang="en-US" sz="1100" dirty="0">
+            <a:endParaRPr lang="en-US" sz="1100">
               <a:solidFill>
                 <a:schemeClr val="tx1"/>
               </a:solidFill>
@@ -26144,7 +26333,7 @@
           </a:p>
           <a:p>
             <a:r>
-              <a:rPr lang="en-US" sz="1100" dirty="0">
+              <a:rPr lang="en-US" sz="1100">
                 <a:solidFill>
                   <a:schemeClr val="accent6"/>
                 </a:solidFill>
@@ -26154,7 +26343,7 @@
           </a:p>
           <a:p>
             <a:r>
-              <a:rPr lang="en-US" sz="1100" dirty="0">
+              <a:rPr lang="en-US" sz="1100">
                 <a:solidFill>
                   <a:schemeClr val="accent6"/>
                 </a:solidFill>
@@ -26164,7 +26353,7 @@
           </a:p>
           <a:p>
             <a:r>
-              <a:rPr lang="en-US" sz="1100" dirty="0">
+              <a:rPr lang="en-US" sz="1100">
                 <a:solidFill>
                   <a:schemeClr val="accent6"/>
                 </a:solidFill>
@@ -26174,7 +26363,7 @@
           </a:p>
           <a:p>
             <a:r>
-              <a:rPr lang="en-US" sz="1100" dirty="0">
+              <a:rPr lang="en-US" sz="1100">
                 <a:solidFill>
                   <a:schemeClr val="accent6"/>
                 </a:solidFill>
@@ -26550,15 +26739,15 @@
           <a:lstStyle/>
           <a:p>
             <a:r>
-              <a:rPr lang="en-US" sz="1400" dirty="0"/>
+              <a:rPr lang="en-US" sz="1400"/>
               <a:t>Grpc (</a:t>
             </a:r>
             <a:r>
-              <a:rPr lang="en-US" sz="1400" dirty="0" err="1"/>
+              <a:rPr lang="en-US" sz="1400" err="1"/>
               <a:t>List&amp;Watch</a:t>
             </a:r>
             <a:r>
-              <a:rPr lang="en-US" sz="1400" dirty="0"/>
+              <a:rPr lang="en-US" sz="1400"/>
               <a:t> API) request</a:t>
             </a:r>
           </a:p>
@@ -27023,10 +27212,10 @@
           <a:p>
             <a:pPr algn="ctr"/>
             <a:r>
-              <a:rPr lang="en-US" dirty="0" err="1"/>
+              <a:rPr lang="en-US" err="1"/>
               <a:t>Hazelcast</a:t>
             </a:r>
-            <a:endParaRPr lang="en-US" dirty="0"/>
+            <a:endParaRPr lang="en-US"/>
           </a:p>
         </p:txBody>
       </p:sp>
@@ -27770,34 +27959,34 @@
           <a:lstStyle/>
           <a:p>
             <a:r>
-              <a:rPr lang="en-US" sz="1100" dirty="0"/>
+              <a:rPr lang="en-US" sz="1100"/>
               <a:t>Neighbor rule:</a:t>
             </a:r>
           </a:p>
           <a:p>
-            <a:endParaRPr lang="en-US" sz="1100" dirty="0"/>
-          </a:p>
-          <a:p>
-            <a:r>
-              <a:rPr lang="en-US" sz="1100" dirty="0"/>
+            <a:endParaRPr lang="en-US" sz="1100"/>
+          </a:p>
+          <a:p>
+            <a:r>
+              <a:rPr lang="en-US" sz="1100"/>
               <a:t>{</a:t>
             </a:r>
           </a:p>
           <a:p>
             <a:r>
-              <a:rPr lang="en-US" sz="1100" dirty="0"/>
+              <a:rPr lang="en-US" sz="1100"/>
               <a:t>    neighbor info</a:t>
             </a:r>
           </a:p>
           <a:p>
             <a:r>
-              <a:rPr lang="en-US" sz="1100" dirty="0"/>
+              <a:rPr lang="en-US" sz="1100"/>
               <a:t>    neighbor group</a:t>
             </a:r>
           </a:p>
           <a:p>
             <a:r>
-              <a:rPr lang="en-US" sz="1100" dirty="0"/>
+              <a:rPr lang="en-US" sz="1100"/>
               <a:t>}</a:t>
             </a:r>
           </a:p>
@@ -27848,40 +28037,40 @@
           <a:lstStyle/>
           <a:p>
             <a:r>
-              <a:rPr lang="en-US" sz="1100" dirty="0"/>
+              <a:rPr lang="en-US" sz="1100"/>
               <a:t>Neighbor rule:</a:t>
             </a:r>
           </a:p>
           <a:p>
-            <a:endParaRPr lang="en-US" sz="1100" dirty="0"/>
-          </a:p>
-          <a:p>
-            <a:r>
-              <a:rPr lang="en-US" sz="1100" dirty="0"/>
+            <a:endParaRPr lang="en-US" sz="1100"/>
+          </a:p>
+          <a:p>
+            <a:r>
+              <a:rPr lang="en-US" sz="1100"/>
               <a:t>{</a:t>
             </a:r>
           </a:p>
           <a:p>
             <a:r>
-              <a:rPr lang="en-US" sz="1100" dirty="0"/>
+              <a:rPr lang="en-US" sz="1100"/>
               <a:t>    neighbor info</a:t>
             </a:r>
           </a:p>
           <a:p>
             <a:r>
-              <a:rPr lang="en-US" sz="1100" dirty="0"/>
+              <a:rPr lang="en-US" sz="1100"/>
               <a:t>    neighbor group</a:t>
             </a:r>
           </a:p>
           <a:p>
             <a:r>
-              <a:rPr lang="en-US" sz="1100" dirty="0"/>
+              <a:rPr lang="en-US" sz="1100"/>
               <a:t>    neighbor version</a:t>
             </a:r>
           </a:p>
           <a:p>
             <a:r>
-              <a:rPr lang="en-US" sz="1100" dirty="0"/>
+              <a:rPr lang="en-US" sz="1100"/>
               <a:t>}</a:t>
             </a:r>
           </a:p>
@@ -28629,6 +28818,9 @@
           <a:p>
             <a:r>
               <a:rPr lang="en-US">
+                <a:solidFill>
+                  <a:schemeClr val="accent3"/>
+                </a:solidFill>
                 <a:cs typeface="Calibri"/>
               </a:rPr>
               <a:t>Neighbor level</a:t>
@@ -32776,16 +32968,16 @@
 <file path=customXml/itemProps1.xml><?xml version="1.0" encoding="utf-8"?>
 <ds:datastoreItem xmlns:ds="http://schemas.openxmlformats.org/officeDocument/2006/customXml" ds:itemID="{7153B77C-8669-490D-A1AF-B6547AA76D9B}">
   <ds:schemaRefs>
-    <ds:schemaRef ds:uri="http://www.w3.org/XML/1998/namespace"/>
+    <ds:schemaRef ds:uri="http://purl.org/dc/elements/1.1/"/>
+    <ds:schemaRef ds:uri="http://purl.org/dc/terms/"/>
+    <ds:schemaRef ds:uri="http://schemas.microsoft.com/office/2006/documentManagement/types"/>
+    <ds:schemaRef ds:uri="http://schemas.microsoft.com/office/2006/metadata/properties"/>
     <ds:schemaRef ds:uri="35b0bf06-ef8c-497b-921c-5cf98f14bf1b"/>
     <ds:schemaRef ds:uri="http://purl.org/dc/dcmitype/"/>
-    <ds:schemaRef ds:uri="http://schemas.microsoft.com/office/2006/metadata/properties"/>
-    <ds:schemaRef ds:uri="http://purl.org/dc/elements/1.1/"/>
-    <ds:schemaRef ds:uri="http://schemas.microsoft.com/office/2006/documentManagement/types"/>
     <ds:schemaRef ds:uri="http://schemas.openxmlformats.org/package/2006/metadata/core-properties"/>
     <ds:schemaRef ds:uri="http://schemas.microsoft.com/office/infopath/2007/PartnerControls"/>
     <ds:schemaRef ds:uri="84223b59-851b-4b03-9e37-5703e473df94"/>
-    <ds:schemaRef ds:uri="http://purl.org/dc/terms/"/>
+    <ds:schemaRef ds:uri="http://www.w3.org/XML/1998/namespace"/>
   </ds:schemaRefs>
 </ds:datastoreItem>
 </file>

</xml_diff>

<commit_message>
Update reconciliation design spec
</commit_message>
<xml_diff>
--- a/docs/design/Arion - State Reconciliation.pptx
+++ b/docs/design/Arion - State Reconciliation.pptx
@@ -144,9 +144,7 @@
 <file path=ppt/revisionInfo.xml><?xml version="1.0" encoding="utf-8"?>
 <p1510:revInfo xmlns:a="http://schemas.openxmlformats.org/drawingml/2006/main" xmlns:r="http://schemas.openxmlformats.org/officeDocument/2006/relationships" xmlns:p1510="http://schemas.microsoft.com/office/powerpoint/2015/10/main">
   <p1510:revLst>
-    <p1510:client id="{74C4598A-A2B3-4135-858D-A2ED4DF598A7}" v="748" vWet="752" dt="2022-09-13T21:48:03.230"/>
-    <p1510:client id="{7D4F7EB4-D853-4E48-AA9A-E80CA53CED3B}" vWet="2" dt="2022-09-14T00:53:27.499"/>
-    <p1510:client id="{809F7682-8634-4D1E-9951-227E47637BCA}" v="3640" dt="2022-09-14T22:37:39.149"/>
+    <p1510:client id="{809F7682-8634-4D1E-9951-227E47637BCA}" v="3640" dt="2022-10-12T18:57:11.901"/>
   </p1510:revLst>
 </p1510:revInfo>
 </file>
@@ -316,7 +314,7 @@
           <a:p>
             <a:fld id="{A86F7C5E-7CBC-4A2C-88FC-655B3F7411DD}" type="datetimeFigureOut">
               <a:rPr lang="en-US" smtClean="0"/>
-              <a:t>9/14/2022</a:t>
+              <a:t>10/12/2022</a:t>
             </a:fld>
             <a:endParaRPr lang="en-US"/>
           </a:p>
@@ -1275,7 +1273,7 @@
           <a:p>
             <a:fld id="{4313DBB7-0233-4735-A383-51E67FFBC23A}" type="datetimeFigureOut">
               <a:rPr lang="en-US" smtClean="0"/>
-              <a:t>9/14/2022</a:t>
+              <a:t>10/12/2022</a:t>
             </a:fld>
             <a:endParaRPr lang="en-US"/>
           </a:p>
@@ -1473,7 +1471,7 @@
           <a:p>
             <a:fld id="{4313DBB7-0233-4735-A383-51E67FFBC23A}" type="datetimeFigureOut">
               <a:rPr lang="en-US" smtClean="0"/>
-              <a:t>9/14/2022</a:t>
+              <a:t>10/12/2022</a:t>
             </a:fld>
             <a:endParaRPr lang="en-US"/>
           </a:p>
@@ -1681,7 +1679,7 @@
           <a:p>
             <a:fld id="{4313DBB7-0233-4735-A383-51E67FFBC23A}" type="datetimeFigureOut">
               <a:rPr lang="en-US" smtClean="0"/>
-              <a:t>9/14/2022</a:t>
+              <a:t>10/12/2022</a:t>
             </a:fld>
             <a:endParaRPr lang="en-US"/>
           </a:p>
@@ -1879,7 +1877,7 @@
           <a:p>
             <a:fld id="{4313DBB7-0233-4735-A383-51E67FFBC23A}" type="datetimeFigureOut">
               <a:rPr lang="en-US" smtClean="0"/>
-              <a:t>9/14/2022</a:t>
+              <a:t>10/12/2022</a:t>
             </a:fld>
             <a:endParaRPr lang="en-US"/>
           </a:p>
@@ -2154,7 +2152,7 @@
           <a:p>
             <a:fld id="{4313DBB7-0233-4735-A383-51E67FFBC23A}" type="datetimeFigureOut">
               <a:rPr lang="en-US" smtClean="0"/>
-              <a:t>9/14/2022</a:t>
+              <a:t>10/12/2022</a:t>
             </a:fld>
             <a:endParaRPr lang="en-US"/>
           </a:p>
@@ -2419,7 +2417,7 @@
           <a:p>
             <a:fld id="{4313DBB7-0233-4735-A383-51E67FFBC23A}" type="datetimeFigureOut">
               <a:rPr lang="en-US" smtClean="0"/>
-              <a:t>9/14/2022</a:t>
+              <a:t>10/12/2022</a:t>
             </a:fld>
             <a:endParaRPr lang="en-US"/>
           </a:p>
@@ -2831,7 +2829,7 @@
           <a:p>
             <a:fld id="{4313DBB7-0233-4735-A383-51E67FFBC23A}" type="datetimeFigureOut">
               <a:rPr lang="en-US" smtClean="0"/>
-              <a:t>9/14/2022</a:t>
+              <a:t>10/12/2022</a:t>
             </a:fld>
             <a:endParaRPr lang="en-US"/>
           </a:p>
@@ -2972,7 +2970,7 @@
           <a:p>
             <a:fld id="{4313DBB7-0233-4735-A383-51E67FFBC23A}" type="datetimeFigureOut">
               <a:rPr lang="en-US" smtClean="0"/>
-              <a:t>9/14/2022</a:t>
+              <a:t>10/12/2022</a:t>
             </a:fld>
             <a:endParaRPr lang="en-US"/>
           </a:p>
@@ -3085,7 +3083,7 @@
           <a:p>
             <a:fld id="{4313DBB7-0233-4735-A383-51E67FFBC23A}" type="datetimeFigureOut">
               <a:rPr lang="en-US" smtClean="0"/>
-              <a:t>9/14/2022</a:t>
+              <a:t>10/12/2022</a:t>
             </a:fld>
             <a:endParaRPr lang="en-US"/>
           </a:p>
@@ -3396,7 +3394,7 @@
           <a:p>
             <a:fld id="{4313DBB7-0233-4735-A383-51E67FFBC23A}" type="datetimeFigureOut">
               <a:rPr lang="en-US" smtClean="0"/>
-              <a:t>9/14/2022</a:t>
+              <a:t>10/12/2022</a:t>
             </a:fld>
             <a:endParaRPr lang="en-US"/>
           </a:p>
@@ -3684,7 +3682,7 @@
           <a:p>
             <a:fld id="{4313DBB7-0233-4735-A383-51E67FFBC23A}" type="datetimeFigureOut">
               <a:rPr lang="en-US" smtClean="0"/>
-              <a:t>9/14/2022</a:t>
+              <a:t>10/12/2022</a:t>
             </a:fld>
             <a:endParaRPr lang="en-US"/>
           </a:p>
@@ -3925,7 +3923,7 @@
           <a:p>
             <a:fld id="{4313DBB7-0233-4735-A383-51E67FFBC23A}" type="datetimeFigureOut">
               <a:rPr lang="en-US" smtClean="0"/>
-              <a:t>9/14/2022</a:t>
+              <a:t>10/12/2022</a:t>
             </a:fld>
             <a:endParaRPr lang="en-US"/>
           </a:p>
@@ -6466,7 +6464,7 @@
         <p:spPr>
           <a:xfrm>
             <a:off x="7108008" y="2775594"/>
-            <a:ext cx="4172436" cy="3908762"/>
+            <a:ext cx="4172436" cy="3570208"/>
           </a:xfrm>
           <a:prstGeom prst="rect">
             <a:avLst/>
@@ -6484,7 +6482,7 @@
               <a:buChar char="•"/>
             </a:pPr>
             <a:r>
-              <a:rPr lang="en-US" sz="1400"/>
+              <a:rPr lang="en-US" sz="1400" dirty="0"/>
               <a:t>Grpc (completion queue) is single thread</a:t>
             </a:r>
           </a:p>
@@ -6494,7 +6492,7 @@
               <a:buChar char="o"/>
             </a:pPr>
             <a:r>
-              <a:rPr lang="en-US" sz="1200"/>
+              <a:rPr lang="en-US" sz="1200" dirty="0"/>
               <a:t>Receives and put a task in worker pool</a:t>
             </a:r>
           </a:p>
@@ -6504,15 +6502,15 @@
               <a:buChar char="o"/>
             </a:pPr>
             <a:r>
-              <a:rPr lang="en-US" sz="1200"/>
+              <a:rPr lang="en-US" sz="1200" dirty="0"/>
               <a:t>Each task in dedicated worker thread is executed </a:t>
             </a:r>
             <a:r>
-              <a:rPr lang="en-US" sz="1200" err="1"/>
+              <a:rPr lang="en-US" sz="1200" dirty="0" err="1"/>
               <a:t>syncly</a:t>
             </a:r>
             <a:r>
-              <a:rPr lang="en-US" sz="1200"/>
+              <a:rPr lang="en-US" sz="1200" dirty="0"/>
               <a:t>. But across worker threads order (like revision 1&amp;6 was distributed to 2 workers) are not guaranteed</a:t>
             </a:r>
           </a:p>
@@ -6521,7 +6519,7 @@
               <a:buFont typeface="Arial" panose="020B0604020202020204" pitchFamily="34" charset="0"/>
               <a:buChar char="•"/>
             </a:pPr>
-            <a:endParaRPr lang="en-US" sz="1400"/>
+            <a:endParaRPr lang="en-US" sz="1400" dirty="0"/>
           </a:p>
           <a:p>
             <a:pPr marL="342900" indent="-342900">
@@ -6529,7 +6527,7 @@
               <a:buChar char="•"/>
             </a:pPr>
             <a:r>
-              <a:rPr lang="en-US" sz="1400"/>
+              <a:rPr lang="en-US" sz="1400" dirty="0"/>
               <a:t>DB background writer is single thread</a:t>
             </a:r>
           </a:p>
@@ -6538,7 +6536,7 @@
               <a:buFont typeface="Arial" panose="020B0604020202020204" pitchFamily="34" charset="0"/>
               <a:buChar char="•"/>
             </a:pPr>
-            <a:endParaRPr lang="en-US" sz="1400"/>
+            <a:endParaRPr lang="en-US" sz="1400" dirty="0"/>
           </a:p>
           <a:p>
             <a:pPr marL="342900" indent="-342900">
@@ -6546,15 +6544,8 @@
               <a:buChar char="•"/>
             </a:pPr>
             <a:r>
-              <a:rPr lang="en-US" altLang="zh-CN" sz="1400"/>
+              <a:rPr lang="en-US" altLang="zh-CN" sz="1400" dirty="0"/>
               <a:t>In each sync job, the process is:</a:t>
-            </a:r>
-          </a:p>
-          <a:p>
-            <a:pPr lvl="1"/>
-            <a:r>
-              <a:rPr lang="en-US" altLang="zh-CN" sz="1100"/>
-              <a:t>step 1 &amp; 3 needs to be protected in one transaction/critical-section</a:t>
             </a:r>
           </a:p>
           <a:p>
@@ -6563,11 +6554,11 @@
               <a:buAutoNum type="arabicPeriod"/>
             </a:pPr>
             <a:r>
-              <a:rPr lang="en-US" altLang="zh-CN" sz="1200" err="1"/>
+              <a:rPr lang="en-US" altLang="zh-CN" sz="1200" dirty="0" err="1"/>
               <a:t>Syncly</a:t>
             </a:r>
             <a:r>
-              <a:rPr lang="en-US" altLang="zh-CN" sz="1200"/>
+              <a:rPr lang="en-US" altLang="zh-CN" sz="1200" dirty="0"/>
               <a:t> check and then store (if feasible) revision for the key in memory cache</a:t>
             </a:r>
           </a:p>
@@ -6577,12 +6568,20 @@
               <a:buAutoNum type="arabicPeriod"/>
             </a:pPr>
             <a:r>
-              <a:rPr lang="en-US" altLang="zh-CN" sz="1200" err="1"/>
-              <a:t>Asyncly</a:t>
-            </a:r>
-            <a:r>
-              <a:rPr lang="en-US" altLang="zh-CN" sz="1200"/>
-              <a:t> write to table 1 (received neighbor detail table)</a:t>
+              <a:rPr lang="en-US" altLang="zh-CN" sz="1200" dirty="0" err="1"/>
+              <a:t>Syncly</a:t>
+            </a:r>
+            <a:r>
+              <a:rPr lang="en-US" altLang="zh-CN" sz="1200" dirty="0"/>
+              <a:t> invoke </a:t>
+            </a:r>
+            <a:r>
+              <a:rPr lang="en-US" altLang="zh-CN" sz="1200" dirty="0" err="1"/>
+              <a:t>eBPF</a:t>
+            </a:r>
+            <a:r>
+              <a:rPr lang="en-US" altLang="zh-CN" sz="1200" dirty="0"/>
+              <a:t> map update and get return code</a:t>
             </a:r>
           </a:p>
           <a:p>
@@ -6591,20 +6590,12 @@
               <a:buAutoNum type="arabicPeriod"/>
             </a:pPr>
             <a:r>
-              <a:rPr lang="en-US" altLang="zh-CN" sz="1200" err="1"/>
-              <a:t>Syncly</a:t>
-            </a:r>
-            <a:r>
-              <a:rPr lang="en-US" altLang="zh-CN" sz="1200"/>
-              <a:t> invoke </a:t>
-            </a:r>
-            <a:r>
-              <a:rPr lang="en-US" altLang="zh-CN" sz="1200" err="1"/>
-              <a:t>eBPF</a:t>
-            </a:r>
-            <a:r>
-              <a:rPr lang="en-US" altLang="zh-CN" sz="1200"/>
-              <a:t> map update and get return code</a:t>
+              <a:rPr lang="en-US" altLang="zh-CN" sz="1200" dirty="0" err="1"/>
+              <a:t>Asyncly</a:t>
+            </a:r>
+            <a:r>
+              <a:rPr lang="en-US" altLang="zh-CN" sz="1200" dirty="0"/>
+              <a:t> write to table 1 (received neighbor detail table)</a:t>
             </a:r>
           </a:p>
           <a:p>
@@ -6613,15 +6604,15 @@
               <a:buAutoNum type="arabicPeriod"/>
             </a:pPr>
             <a:r>
-              <a:rPr lang="en-US" altLang="zh-CN" sz="1200"/>
-              <a:t>Only if #3 succeeds, </a:t>
-            </a:r>
-            <a:r>
-              <a:rPr lang="en-US" altLang="zh-CN" sz="1200" err="1"/>
+              <a:rPr lang="en-US" altLang="zh-CN" sz="1200" dirty="0"/>
+              <a:t>Only if #2 succeeds, </a:t>
+            </a:r>
+            <a:r>
+              <a:rPr lang="en-US" altLang="zh-CN" sz="1200" dirty="0" err="1"/>
               <a:t>asyncly</a:t>
             </a:r>
             <a:r>
-              <a:rPr lang="en-US" altLang="zh-CN" sz="1200"/>
+              <a:rPr lang="en-US" altLang="zh-CN" sz="1200" dirty="0"/>
               <a:t> write to table 2 (programming journal table)</a:t>
             </a:r>
           </a:p>
@@ -6908,7 +6899,7 @@
           <a:lstStyle/>
           <a:p>
             <a:r>
-              <a:rPr lang="en-US" sz="900">
+              <a:rPr lang="en-US" sz="900" dirty="0">
                 <a:solidFill>
                   <a:schemeClr val="tx1"/>
                 </a:solidFill>
@@ -6921,7 +6912,7 @@
               <a:buAutoNum type="arabicPeriod"/>
             </a:pPr>
             <a:r>
-              <a:rPr lang="en-US" sz="900" err="1">
+              <a:rPr lang="en-US" sz="900" dirty="0" err="1">
                 <a:solidFill>
                   <a:schemeClr val="tx1"/>
                 </a:solidFill>
@@ -6929,7 +6920,7 @@
               <a:t>syncly</a:t>
             </a:r>
             <a:r>
-              <a:rPr lang="en-US" sz="900">
+              <a:rPr lang="en-US" sz="900" dirty="0">
                 <a:solidFill>
                   <a:schemeClr val="tx1"/>
                 </a:solidFill>
@@ -6942,7 +6933,61 @@
               <a:buAutoNum type="arabicPeriod"/>
             </a:pPr>
             <a:r>
-              <a:rPr lang="en-US" sz="900">
+              <a:rPr lang="en-US" sz="900" dirty="0" err="1">
+                <a:solidFill>
+                  <a:schemeClr val="tx1"/>
+                </a:solidFill>
+              </a:rPr>
+              <a:t>syncly</a:t>
+            </a:r>
+            <a:r>
+              <a:rPr lang="en-US" sz="900" dirty="0">
+                <a:solidFill>
+                  <a:schemeClr val="tx1"/>
+                </a:solidFill>
+              </a:rPr>
+              <a:t> invoke </a:t>
+            </a:r>
+            <a:r>
+              <a:rPr lang="en-US" sz="900" dirty="0" err="1">
+                <a:solidFill>
+                  <a:schemeClr val="tx1"/>
+                </a:solidFill>
+              </a:rPr>
+              <a:t>eBPF</a:t>
+            </a:r>
+            <a:r>
+              <a:rPr lang="en-US" sz="900" dirty="0">
+                <a:solidFill>
+                  <a:schemeClr val="tx1"/>
+                </a:solidFill>
+              </a:rPr>
+              <a:t> </a:t>
+            </a:r>
+            <a:r>
+              <a:rPr lang="en-US" sz="900" dirty="0" err="1">
+                <a:solidFill>
+                  <a:schemeClr val="tx1"/>
+                </a:solidFill>
+              </a:rPr>
+              <a:t>syscall</a:t>
+            </a:r>
+            <a:r>
+              <a:rPr lang="en-US" sz="900" dirty="0">
+                <a:solidFill>
+                  <a:schemeClr val="tx1"/>
+                </a:solidFill>
+              </a:rPr>
+              <a:t> with return code</a:t>
+            </a:r>
+          </a:p>
+          <a:p>
+            <a:pPr marL="228600" indent="-228600">
+              <a:buFontTx/>
+              <a:buAutoNum type="arabicPeriod"/>
+            </a:pPr>
+            <a:r>
+              <a:rPr lang="en-US" sz="900" dirty="0">
                 <a:solidFill>
                   <a:schemeClr val="tx1"/>
                 </a:solidFill>
@@ -6955,60 +7000,7 @@
               <a:buAutoNum type="arabicPeriod"/>
             </a:pPr>
             <a:r>
-              <a:rPr lang="en-US" sz="900" err="1">
-                <a:solidFill>
-                  <a:schemeClr val="tx1"/>
-                </a:solidFill>
-              </a:rPr>
-              <a:t>syncly</a:t>
-            </a:r>
-            <a:r>
-              <a:rPr lang="en-US" sz="900">
-                <a:solidFill>
-                  <a:schemeClr val="tx1"/>
-                </a:solidFill>
-              </a:rPr>
-              <a:t> invoke </a:t>
-            </a:r>
-            <a:r>
-              <a:rPr lang="en-US" sz="900" err="1">
-                <a:solidFill>
-                  <a:schemeClr val="tx1"/>
-                </a:solidFill>
-              </a:rPr>
-              <a:t>eBPF</a:t>
-            </a:r>
-            <a:r>
-              <a:rPr lang="en-US" sz="900">
-                <a:solidFill>
-                  <a:schemeClr val="tx1"/>
-                </a:solidFill>
-              </a:rPr>
-              <a:t> </a:t>
-            </a:r>
-            <a:r>
-              <a:rPr lang="en-US" sz="900" err="1">
-                <a:solidFill>
-                  <a:schemeClr val="tx1"/>
-                </a:solidFill>
-              </a:rPr>
-              <a:t>syscall</a:t>
-            </a:r>
-            <a:r>
-              <a:rPr lang="en-US" sz="900">
-                <a:solidFill>
-                  <a:schemeClr val="tx1"/>
-                </a:solidFill>
-              </a:rPr>
-              <a:t> with return code</a:t>
-            </a:r>
-          </a:p>
-          <a:p>
-            <a:pPr marL="228600" indent="-228600">
-              <a:buAutoNum type="arabicPeriod"/>
-            </a:pPr>
-            <a:r>
-              <a:rPr lang="en-US" sz="900">
+              <a:rPr lang="en-US" sz="900" dirty="0">
                 <a:solidFill>
                   <a:schemeClr val="tx1"/>
                 </a:solidFill>
@@ -7047,8 +7039,8 @@
           <a:lstStyle/>
           <a:p>
             <a:r>
-              <a:rPr lang="en-US" sz="1100"/>
-              <a:t>3</a:t>
+              <a:rPr lang="en-US" sz="1100" dirty="0"/>
+              <a:t>2</a:t>
             </a:r>
           </a:p>
         </p:txBody>
@@ -7127,8 +7119,8 @@
           <a:lstStyle/>
           <a:p>
             <a:r>
-              <a:rPr lang="en-US" sz="1100"/>
-              <a:t>2 &amp; 4</a:t>
+              <a:rPr lang="en-US" sz="1100" dirty="0"/>
+              <a:t>3 &amp; 4</a:t>
             </a:r>
           </a:p>
         </p:txBody>
@@ -7996,14 +7988,14 @@
           <p:nvPr>
             <p:extLst>
               <p:ext uri="{D42A27DB-BD31-4B8C-83A1-F6EECF244321}">
-                <p14:modId xmlns:p14="http://schemas.microsoft.com/office/powerpoint/2010/main" val="955552321"/>
+                <p14:modId xmlns:p14="http://schemas.microsoft.com/office/powerpoint/2010/main" val="2801018521"/>
               </p:ext>
             </p:extLst>
           </p:nvPr>
         </p:nvGraphicFramePr>
         <p:xfrm>
           <a:off x="9768400" y="2178607"/>
-          <a:ext cx="2131957" cy="2848428"/>
+          <a:ext cx="1164929" cy="2848428"/>
         </p:xfrm>
         <a:graphic>
           <a:graphicData uri="http://schemas.openxmlformats.org/drawingml/2006/table">
@@ -8016,13 +8008,6 @@
                   <a:extLst>
                     <a:ext uri="{9D8B030D-6E8A-4147-A177-3AD203B41FA5}">
                       <a16:colId xmlns:a16="http://schemas.microsoft.com/office/drawing/2014/main" val="3784944628"/>
-                    </a:ext>
-                  </a:extLst>
-                </a:gridCol>
-                <a:gridCol w="967028">
-                  <a:extLst>
-                    <a:ext uri="{9D8B030D-6E8A-4147-A177-3AD203B41FA5}">
-                      <a16:colId xmlns:a16="http://schemas.microsoft.com/office/drawing/2014/main" val="2613236928"/>
                     </a:ext>
                   </a:extLst>
                 </a:gridCol>
@@ -8041,25 +8026,6 @@
                   </a:txBody>
                   <a:tcPr/>
                 </a:tc>
-                <a:tc>
-                  <a:txBody>
-                    <a:bodyPr/>
-                    <a:lstStyle/>
-                    <a:p>
-                      <a:r>
-                        <a:rPr lang="en-US" sz="1200"/>
-                        <a:t>Cont</a:t>
-                      </a:r>
-                    </a:p>
-                    <a:p>
-                      <a:r>
-                        <a:rPr lang="en-US" sz="1200"/>
-                        <a:t>Tail</a:t>
-                      </a:r>
-                    </a:p>
-                  </a:txBody>
-                  <a:tcPr/>
-                </a:tc>
                 <a:extLst>
                   <a:ext uri="{0D108BD9-81ED-4DB2-BD59-A6C34878D82A}">
                     <a16:rowId xmlns:a16="http://schemas.microsoft.com/office/drawing/2014/main" val="91540299"/>
@@ -8073,19 +8039,9 @@
                     <a:lstStyle/>
                     <a:p>
                       <a:r>
-                        <a:rPr lang="en-US" sz="1200"/>
+                        <a:rPr lang="en-US" sz="1200" dirty="0"/>
                         <a:t>1</a:t>
                       </a:r>
-                    </a:p>
-                  </a:txBody>
-                  <a:tcPr/>
-                </a:tc>
-                <a:tc>
-                  <a:txBody>
-                    <a:bodyPr/>
-                    <a:lstStyle/>
-                    <a:p>
-                      <a:endParaRPr lang="en-US" sz="1200"/>
                     </a:p>
                   </a:txBody>
                   <a:tcPr/>
@@ -8110,16 +8066,6 @@
                   </a:txBody>
                   <a:tcPr/>
                 </a:tc>
-                <a:tc>
-                  <a:txBody>
-                    <a:bodyPr/>
-                    <a:lstStyle/>
-                    <a:p>
-                      <a:endParaRPr lang="en-US" sz="1200"/>
-                    </a:p>
-                  </a:txBody>
-                  <a:tcPr/>
-                </a:tc>
                 <a:extLst>
                   <a:ext uri="{0D108BD9-81ED-4DB2-BD59-A6C34878D82A}">
                     <a16:rowId xmlns:a16="http://schemas.microsoft.com/office/drawing/2014/main" val="3454885143"/>
@@ -8136,16 +8082,6 @@
                         <a:rPr lang="en-US" sz="1200"/>
                         <a:t>3</a:t>
                       </a:r>
-                    </a:p>
-                  </a:txBody>
-                  <a:tcPr/>
-                </a:tc>
-                <a:tc>
-                  <a:txBody>
-                    <a:bodyPr/>
-                    <a:lstStyle/>
-                    <a:p>
-                      <a:endParaRPr lang="en-US" sz="1200"/>
                     </a:p>
                   </a:txBody>
                   <a:tcPr/>
@@ -8170,19 +8106,6 @@
                   </a:txBody>
                   <a:tcPr/>
                 </a:tc>
-                <a:tc>
-                  <a:txBody>
-                    <a:bodyPr/>
-                    <a:lstStyle/>
-                    <a:p>
-                      <a:r>
-                        <a:rPr lang="en-US" sz="1200"/>
-                        <a:t>Y</a:t>
-                      </a:r>
-                    </a:p>
-                  </a:txBody>
-                  <a:tcPr/>
-                </a:tc>
                 <a:extLst>
                   <a:ext uri="{0D108BD9-81ED-4DB2-BD59-A6C34878D82A}">
                     <a16:rowId xmlns:a16="http://schemas.microsoft.com/office/drawing/2014/main" val="4112895154"/>
@@ -8196,19 +8119,9 @@
                     <a:lstStyle/>
                     <a:p>
                       <a:r>
-                        <a:rPr lang="en-US" sz="1200"/>
+                        <a:rPr lang="en-US" sz="1200" dirty="0"/>
                         <a:t>6</a:t>
                       </a:r>
-                    </a:p>
-                  </a:txBody>
-                  <a:tcPr/>
-                </a:tc>
-                <a:tc>
-                  <a:txBody>
-                    <a:bodyPr/>
-                    <a:lstStyle/>
-                    <a:p>
-                      <a:endParaRPr lang="en-US" sz="1200"/>
                     </a:p>
                   </a:txBody>
                   <a:tcPr/>
@@ -8314,7 +8227,7 @@
         <p:spPr>
           <a:xfrm>
             <a:off x="511000" y="1143848"/>
-            <a:ext cx="5050744" cy="5339923"/>
+            <a:ext cx="5050744" cy="5155257"/>
           </a:xfrm>
           <a:prstGeom prst="rect">
             <a:avLst/>
@@ -8332,7 +8245,7 @@
               <a:buAutoNum type="arabicPeriod"/>
             </a:pPr>
             <a:r>
-              <a:rPr lang="en-US" sz="1200"/>
+              <a:rPr lang="en-US" sz="1200" dirty="0"/>
               <a:t>Table 1 – Neighbor rule table</a:t>
             </a:r>
           </a:p>
@@ -8342,7 +8255,7 @@
               <a:buChar char="•"/>
             </a:pPr>
             <a:r>
-              <a:rPr lang="en-US" sz="1100"/>
+              <a:rPr lang="en-US" sz="1100" dirty="0"/>
               <a:t>neighbor table stores received (but may not be programmed later) per neighbor (means per key) and version</a:t>
             </a:r>
           </a:p>
@@ -8352,7 +8265,7 @@
               <a:buChar char="•"/>
             </a:pPr>
             <a:r>
-              <a:rPr lang="en-US" sz="1100"/>
+              <a:rPr lang="en-US" sz="1100" dirty="0"/>
               <a:t>serving best effort local on-demand lookup</a:t>
             </a:r>
           </a:p>
@@ -8362,7 +8275,7 @@
               <a:buChar char="•"/>
             </a:pPr>
             <a:r>
-              <a:rPr lang="en-US" sz="1100"/>
+              <a:rPr lang="en-US" sz="1100" dirty="0"/>
               <a:t>relies on local agent to provide eventual consistency with server</a:t>
             </a:r>
           </a:p>
@@ -8371,7 +8284,7 @@
               <a:buFont typeface="+mj-lt"/>
               <a:buAutoNum type="arabicPeriod"/>
             </a:pPr>
-            <a:endParaRPr lang="en-US" sz="1200"/>
+            <a:endParaRPr lang="en-US" sz="1200" dirty="0"/>
           </a:p>
           <a:p>
             <a:pPr marL="342900" indent="-342900">
@@ -8379,15 +8292,15 @@
               <a:buAutoNum type="arabicPeriod"/>
             </a:pPr>
             <a:r>
-              <a:rPr lang="en-US" sz="1200"/>
+              <a:rPr lang="en-US" sz="1200" dirty="0"/>
               <a:t>Table 2 – </a:t>
             </a:r>
             <a:r>
-              <a:rPr lang="en-US" sz="1200" err="1"/>
+              <a:rPr lang="en-US" sz="1200" dirty="0" err="1"/>
               <a:t>eBPF</a:t>
             </a:r>
             <a:r>
-              <a:rPr lang="en-US" sz="1200"/>
+              <a:rPr lang="en-US" sz="1200" dirty="0"/>
               <a:t> version programming journal table</a:t>
             </a:r>
           </a:p>
@@ -8397,7 +8310,7 @@
               <a:buChar char="•"/>
             </a:pPr>
             <a:r>
-              <a:rPr lang="en-US" sz="1100"/>
+              <a:rPr lang="en-US" sz="1100" dirty="0"/>
               <a:t>eBpf table (for real programming status) maintains versions of</a:t>
             </a:r>
           </a:p>
@@ -8407,7 +8320,7 @@
               <a:buChar char="o"/>
             </a:pPr>
             <a:r>
-              <a:rPr lang="en-US" sz="1100"/>
+              <a:rPr lang="en-US" sz="1100" dirty="0"/>
               <a:t>successfully programmed</a:t>
             </a:r>
           </a:p>
@@ -8417,7 +8330,7 @@
               <a:buChar char="o"/>
             </a:pPr>
             <a:r>
-              <a:rPr lang="en-US" sz="1100"/>
+              <a:rPr lang="en-US" sz="1100" dirty="0"/>
               <a:t>intended ignored (means earlier versions that doesn’t need to catch up)</a:t>
             </a:r>
           </a:p>
@@ -8427,15 +8340,15 @@
               <a:buChar char="o"/>
             </a:pPr>
             <a:r>
-              <a:rPr lang="en-US" sz="1100"/>
+              <a:rPr lang="en-US" sz="1100" dirty="0"/>
               <a:t>only for </a:t>
             </a:r>
             <a:r>
-              <a:rPr lang="en-US" sz="1100" err="1"/>
+              <a:rPr lang="en-US" sz="1100" dirty="0" err="1"/>
               <a:t>eBPF</a:t>
             </a:r>
             <a:r>
-              <a:rPr lang="en-US" sz="1100"/>
+              <a:rPr lang="en-US" sz="1100" dirty="0"/>
               <a:t> failed case, do not log to table2 and that is a gap version that we would like to catch</a:t>
             </a:r>
           </a:p>
@@ -8445,7 +8358,7 @@
               <a:buChar char="•"/>
             </a:pPr>
             <a:r>
-              <a:rPr lang="en-US" sz="1100"/>
+              <a:rPr lang="en-US" sz="1100" dirty="0"/>
               <a:t>for reconcile, to know from which version it failed to program eBpf</a:t>
             </a:r>
           </a:p>
@@ -8455,16 +8368,8 @@
               <a:buChar char="•"/>
             </a:pPr>
             <a:r>
-              <a:rPr lang="en-US" sz="1100"/>
-              <a:t>for keeping the data volume of the journal (1 by 1) under control, could use a background monitor to periodically mark continuous tail (delete the section before it, and </a:t>
-            </a:r>
-            <a:r>
-              <a:rPr lang="en-US" sz="1100" err="1"/>
-              <a:t>nex</a:t>
-            </a:r>
-            <a:r>
-              <a:rPr lang="en-US" sz="1100"/>
-              <a:t> time only start from it)</a:t>
+              <a:rPr lang="en-US" sz="1100" dirty="0"/>
+              <a:t>for keeping the data volume of the journal (1 by 1) under control, could find continuous section (tail before the min gap) to delete while finding the LKG version</a:t>
             </a:r>
           </a:p>
           <a:p>
@@ -8472,7 +8377,7 @@
               <a:buFont typeface="+mj-lt"/>
               <a:buAutoNum type="arabicPeriod"/>
             </a:pPr>
-            <a:endParaRPr lang="en-US" sz="1200"/>
+            <a:endParaRPr lang="en-US" sz="1200" dirty="0"/>
           </a:p>
           <a:p>
             <a:pPr marL="342900" indent="-342900">
@@ -8480,7 +8385,7 @@
               <a:buAutoNum type="arabicPeriod"/>
             </a:pPr>
             <a:r>
-              <a:rPr lang="en-US" sz="1200"/>
+              <a:rPr lang="en-US" sz="1200" dirty="0"/>
               <a:t>When neighbor received, for neighbor rule table</a:t>
             </a:r>
           </a:p>
@@ -8490,7 +8395,7 @@
               <a:buChar char="•"/>
             </a:pPr>
             <a:r>
-              <a:rPr lang="en-US" sz="1100"/>
+              <a:rPr lang="en-US" sz="1100" dirty="0"/>
               <a:t>Add or update neighbor</a:t>
             </a:r>
           </a:p>
@@ -8500,7 +8405,7 @@
               <a:buChar char="•"/>
             </a:pPr>
             <a:r>
-              <a:rPr lang="en-US" sz="1100"/>
+              <a:rPr lang="en-US" sz="1100" dirty="0"/>
               <a:t>Delete neighbor (purge)</a:t>
             </a:r>
           </a:p>
@@ -8509,7 +8414,7 @@
               <a:buFont typeface="+mj-lt"/>
               <a:buAutoNum type="arabicPeriod"/>
             </a:pPr>
-            <a:endParaRPr lang="en-US" sz="1200"/>
+            <a:endParaRPr lang="en-US" sz="1200" dirty="0"/>
           </a:p>
           <a:p>
             <a:pPr marL="342900" indent="-342900">
@@ -8517,7 +8422,7 @@
               <a:buAutoNum type="arabicPeriod"/>
             </a:pPr>
             <a:r>
-              <a:rPr lang="en-US" sz="1200"/>
+              <a:rPr lang="en-US" sz="1200" dirty="0"/>
               <a:t>When eBpf programming</a:t>
             </a:r>
           </a:p>
@@ -8527,7 +8432,7 @@
               <a:buChar char="•"/>
             </a:pPr>
             <a:r>
-              <a:rPr lang="en-US" sz="1100"/>
+              <a:rPr lang="en-US" sz="1100" dirty="0"/>
               <a:t>succeeds, then insert this version to table2</a:t>
             </a:r>
           </a:p>
@@ -8537,7 +8442,7 @@
               <a:buChar char="•"/>
             </a:pPr>
             <a:r>
-              <a:rPr lang="en-US" sz="1100"/>
+              <a:rPr lang="en-US" sz="1100" dirty="0"/>
               <a:t>intended ignored (treated as succeeded), insert this version to table2</a:t>
             </a:r>
           </a:p>
@@ -8547,8 +8452,8 @@
               <a:buChar char="•"/>
             </a:pPr>
             <a:r>
-              <a:rPr lang="en-US" sz="1100"/>
-              <a:t>failed, do not log in table2</a:t>
+              <a:rPr lang="en-US" sz="1100" dirty="0"/>
+              <a:t>failed, do not log to table2</a:t>
             </a:r>
           </a:p>
           <a:p>
@@ -8556,7 +8461,7 @@
               <a:buFont typeface="+mj-lt"/>
               <a:buAutoNum type="arabicPeriod"/>
             </a:pPr>
-            <a:endParaRPr lang="en-US" sz="1200"/>
+            <a:endParaRPr lang="en-US" sz="1200" dirty="0"/>
           </a:p>
           <a:p>
             <a:pPr marL="342900" indent="-342900">
@@ -8564,7 +8469,7 @@
               <a:buAutoNum type="arabicPeriod"/>
             </a:pPr>
             <a:r>
-              <a:rPr lang="en-US" sz="1200"/>
+              <a:rPr lang="en-US" sz="1200" dirty="0"/>
               <a:t>When Agent started</a:t>
             </a:r>
           </a:p>
@@ -8574,14 +8479,14 @@
               <a:buChar char="•"/>
             </a:pPr>
             <a:r>
-              <a:rPr lang="en-US" sz="1200" i="1">
+              <a:rPr lang="en-US" sz="1200" i="1" dirty="0">
                 <a:highlight>
                   <a:srgbClr val="C1D2B8"/>
                 </a:highlight>
               </a:rPr>
-              <a:t>Select the continuous tail, min(gap) between continuous versions from table2</a:t>
-            </a:r>
-            <a:endParaRPr lang="en-US" sz="1200" i="1">
+              <a:t>Select min(gap) between continuous versions from table2</a:t>
+            </a:r>
+            <a:endParaRPr lang="en-US" sz="1200" i="1" dirty="0">
               <a:solidFill>
                 <a:srgbClr val="FF0000"/>
               </a:solidFill>
@@ -10460,7 +10365,7 @@
           <a:lstStyle/>
           <a:p>
             <a:r>
-              <a:rPr lang="en-US" sz="900">
+              <a:rPr lang="en-US" sz="900" dirty="0">
                 <a:solidFill>
                   <a:schemeClr val="tx1"/>
                 </a:solidFill>
@@ -10473,7 +10378,7 @@
               <a:buAutoNum type="arabicPeriod"/>
             </a:pPr>
             <a:r>
-              <a:rPr lang="en-US" sz="900" err="1">
+              <a:rPr lang="en-US" sz="900" dirty="0" err="1">
                 <a:solidFill>
                   <a:schemeClr val="tx1"/>
                 </a:solidFill>
@@ -10481,7 +10386,7 @@
               <a:t>syncly</a:t>
             </a:r>
             <a:r>
-              <a:rPr lang="en-US" sz="900">
+              <a:rPr lang="en-US" sz="900" dirty="0">
                 <a:solidFill>
                   <a:schemeClr val="tx1"/>
                 </a:solidFill>
@@ -10494,7 +10399,61 @@
               <a:buAutoNum type="arabicPeriod"/>
             </a:pPr>
             <a:r>
-              <a:rPr lang="en-US" sz="900">
+              <a:rPr lang="en-US" sz="900" dirty="0" err="1">
+                <a:solidFill>
+                  <a:schemeClr val="tx1"/>
+                </a:solidFill>
+              </a:rPr>
+              <a:t>syncly</a:t>
+            </a:r>
+            <a:r>
+              <a:rPr lang="en-US" sz="900" dirty="0">
+                <a:solidFill>
+                  <a:schemeClr val="tx1"/>
+                </a:solidFill>
+              </a:rPr>
+              <a:t> invoke </a:t>
+            </a:r>
+            <a:r>
+              <a:rPr lang="en-US" sz="900" dirty="0" err="1">
+                <a:solidFill>
+                  <a:schemeClr val="tx1"/>
+                </a:solidFill>
+              </a:rPr>
+              <a:t>eBPF</a:t>
+            </a:r>
+            <a:r>
+              <a:rPr lang="en-US" sz="900" dirty="0">
+                <a:solidFill>
+                  <a:schemeClr val="tx1"/>
+                </a:solidFill>
+              </a:rPr>
+              <a:t> </a:t>
+            </a:r>
+            <a:r>
+              <a:rPr lang="en-US" sz="900" dirty="0" err="1">
+                <a:solidFill>
+                  <a:schemeClr val="tx1"/>
+                </a:solidFill>
+              </a:rPr>
+              <a:t>syscall</a:t>
+            </a:r>
+            <a:r>
+              <a:rPr lang="en-US" sz="900" dirty="0">
+                <a:solidFill>
+                  <a:schemeClr val="tx1"/>
+                </a:solidFill>
+              </a:rPr>
+              <a:t> with return code</a:t>
+            </a:r>
+          </a:p>
+          <a:p>
+            <a:pPr marL="228600" indent="-228600">
+              <a:buFontTx/>
+              <a:buAutoNum type="arabicPeriod"/>
+            </a:pPr>
+            <a:r>
+              <a:rPr lang="en-US" sz="900" dirty="0">
                 <a:solidFill>
                   <a:schemeClr val="tx1"/>
                 </a:solidFill>
@@ -10507,60 +10466,7 @@
               <a:buAutoNum type="arabicPeriod"/>
             </a:pPr>
             <a:r>
-              <a:rPr lang="en-US" sz="900" err="1">
-                <a:solidFill>
-                  <a:schemeClr val="tx1"/>
-                </a:solidFill>
-              </a:rPr>
-              <a:t>syncly</a:t>
-            </a:r>
-            <a:r>
-              <a:rPr lang="en-US" sz="900">
-                <a:solidFill>
-                  <a:schemeClr val="tx1"/>
-                </a:solidFill>
-              </a:rPr>
-              <a:t> invoke </a:t>
-            </a:r>
-            <a:r>
-              <a:rPr lang="en-US" sz="900" err="1">
-                <a:solidFill>
-                  <a:schemeClr val="tx1"/>
-                </a:solidFill>
-              </a:rPr>
-              <a:t>eBPF</a:t>
-            </a:r>
-            <a:r>
-              <a:rPr lang="en-US" sz="900">
-                <a:solidFill>
-                  <a:schemeClr val="tx1"/>
-                </a:solidFill>
-              </a:rPr>
-              <a:t> </a:t>
-            </a:r>
-            <a:r>
-              <a:rPr lang="en-US" sz="900" err="1">
-                <a:solidFill>
-                  <a:schemeClr val="tx1"/>
-                </a:solidFill>
-              </a:rPr>
-              <a:t>syscall</a:t>
-            </a:r>
-            <a:r>
-              <a:rPr lang="en-US" sz="900">
-                <a:solidFill>
-                  <a:schemeClr val="tx1"/>
-                </a:solidFill>
-              </a:rPr>
-              <a:t> with return code</a:t>
-            </a:r>
-          </a:p>
-          <a:p>
-            <a:pPr marL="228600" indent="-228600">
-              <a:buAutoNum type="arabicPeriod"/>
-            </a:pPr>
-            <a:r>
-              <a:rPr lang="en-US" sz="900">
+              <a:rPr lang="en-US" sz="900" dirty="0">
                 <a:solidFill>
                   <a:schemeClr val="tx1"/>
                 </a:solidFill>
@@ -10599,8 +10505,8 @@
           <a:lstStyle/>
           <a:p>
             <a:r>
-              <a:rPr lang="en-US" sz="1100"/>
-              <a:t>3</a:t>
+              <a:rPr lang="en-US" sz="1100" dirty="0"/>
+              <a:t>2</a:t>
             </a:r>
           </a:p>
         </p:txBody>
@@ -10679,8 +10585,8 @@
           <a:lstStyle/>
           <a:p>
             <a:r>
-              <a:rPr lang="en-US" sz="1100"/>
-              <a:t>2 &amp; 4</a:t>
+              <a:rPr lang="en-US" sz="1100" dirty="0"/>
+              <a:t>3 &amp; 4</a:t>
             </a:r>
           </a:p>
         </p:txBody>
@@ -11002,22 +10908,22 @@
           <a:lstStyle/>
           <a:p>
             <a:r>
-              <a:rPr lang="en-US" sz="1200"/>
+              <a:rPr lang="en-US" sz="1200" dirty="0"/>
               <a:t>Race condition #1:  step #1 in the job</a:t>
             </a:r>
           </a:p>
           <a:p>
-            <a:endParaRPr lang="en-US" sz="1200"/>
-          </a:p>
-          <a:p>
-            <a:r>
-              <a:rPr lang="en-US" sz="1200"/>
+            <a:endParaRPr lang="en-US" sz="1200" dirty="0"/>
+          </a:p>
+          <a:p>
+            <a:r>
+              <a:rPr lang="en-US" sz="1200" dirty="0"/>
               <a:t>Same neighbor’s different revisions (1, 6, 8) may be invoked at the same time, or latter ones may be completed first. </a:t>
             </a:r>
           </a:p>
           <a:p>
             <a:r>
-              <a:rPr lang="en-US" sz="1200"/>
+              <a:rPr lang="en-US" sz="1200" dirty="0"/>
               <a:t>As long as the pushed states are target states (can finish programming with this version of state only, doesn’t need previous actions executed in strict order), latter revision can be executed first and doesn’t cause harm and may save some resource</a:t>
             </a:r>
           </a:p>
@@ -11026,7 +10932,7 @@
               <a:buFont typeface="Arial" panose="020B0604020202020204" pitchFamily="34" charset="0"/>
               <a:buChar char="•"/>
             </a:pPr>
-            <a:endParaRPr lang="en-US" sz="1200"/>
+            <a:endParaRPr lang="en-US" sz="1200" dirty="0"/>
           </a:p>
           <a:p>
             <a:pPr marL="171450" indent="-171450">
@@ -11034,7 +10940,7 @@
               <a:buChar char="•"/>
             </a:pPr>
             <a:r>
-              <a:rPr lang="en-US" sz="1200"/>
+              <a:rPr lang="en-US" sz="1200" dirty="0"/>
               <a:t>Case 1: 1 -&gt; 6 -&gt; 8</a:t>
             </a:r>
           </a:p>
@@ -11044,7 +10950,7 @@
               <a:buChar char="•"/>
             </a:pPr>
             <a:r>
-              <a:rPr lang="en-US" sz="1200"/>
+              <a:rPr lang="en-US" sz="1200" dirty="0"/>
               <a:t>Case 2: 6 -&gt; 8 -&gt; 1</a:t>
             </a:r>
           </a:p>
@@ -11054,7 +10960,7 @@
               <a:buChar char="•"/>
             </a:pPr>
             <a:r>
-              <a:rPr lang="en-US" sz="1100"/>
+              <a:rPr lang="en-US" sz="1100" dirty="0"/>
               <a:t>Ver 6 first</a:t>
             </a:r>
           </a:p>
@@ -11064,23 +10970,23 @@
               <a:buChar char="•"/>
             </a:pPr>
             <a:r>
-              <a:rPr lang="en-US" sz="1100"/>
+              <a:rPr lang="en-US" sz="1100" dirty="0"/>
               <a:t>Not found in </a:t>
             </a:r>
             <a:r>
-              <a:rPr lang="en-US" sz="1100" err="1"/>
+              <a:rPr lang="en-US" sz="1100" dirty="0" err="1"/>
               <a:t>hashmap</a:t>
             </a:r>
             <a:r>
-              <a:rPr lang="en-US" sz="1100"/>
+              <a:rPr lang="en-US" sz="1100" dirty="0"/>
               <a:t>, thus insert key with </a:t>
             </a:r>
             <a:r>
-              <a:rPr lang="en-US" sz="1100" err="1"/>
+              <a:rPr lang="en-US" sz="1100" dirty="0" err="1"/>
               <a:t>ver</a:t>
             </a:r>
             <a:r>
-              <a:rPr lang="en-US" sz="1100"/>
+              <a:rPr lang="en-US" sz="1100" dirty="0"/>
               <a:t> 6</a:t>
             </a:r>
           </a:p>
@@ -11090,15 +10996,15 @@
               <a:buChar char="•"/>
             </a:pPr>
             <a:r>
-              <a:rPr lang="en-US" sz="1100"/>
+              <a:rPr lang="en-US" sz="1100" dirty="0"/>
               <a:t>Async write to </a:t>
             </a:r>
             <a:r>
-              <a:rPr lang="en-US" sz="1100" err="1"/>
+              <a:rPr lang="en-US" sz="1100" dirty="0" err="1"/>
               <a:t>db</a:t>
             </a:r>
             <a:r>
-              <a:rPr lang="en-US" sz="1100"/>
+              <a:rPr lang="en-US" sz="1100" dirty="0"/>
               <a:t> table1</a:t>
             </a:r>
           </a:p>
@@ -11108,19 +11014,19 @@
               <a:buChar char="•"/>
             </a:pPr>
             <a:r>
-              <a:rPr lang="en-US" sz="1100" err="1"/>
+              <a:rPr lang="en-US" sz="1100" dirty="0" err="1"/>
               <a:t>eBPF</a:t>
             </a:r>
             <a:r>
-              <a:rPr lang="en-US" sz="1100"/>
+              <a:rPr lang="en-US" sz="1100" dirty="0"/>
               <a:t> </a:t>
             </a:r>
             <a:r>
-              <a:rPr lang="en-US" sz="1100" err="1"/>
+              <a:rPr lang="en-US" sz="1100" dirty="0" err="1"/>
               <a:t>syscall</a:t>
             </a:r>
             <a:r>
-              <a:rPr lang="en-US" sz="1100"/>
+              <a:rPr lang="en-US" sz="1100" dirty="0"/>
               <a:t> is add if not found, or update if found</a:t>
             </a:r>
           </a:p>
@@ -11130,15 +11036,15 @@
               <a:buChar char="•"/>
             </a:pPr>
             <a:r>
-              <a:rPr lang="en-US" sz="1100"/>
+              <a:rPr lang="en-US" sz="1100" dirty="0"/>
               <a:t>Async write to </a:t>
             </a:r>
             <a:r>
-              <a:rPr lang="en-US" sz="1100" err="1"/>
+              <a:rPr lang="en-US" sz="1100" dirty="0" err="1"/>
               <a:t>db</a:t>
             </a:r>
             <a:r>
-              <a:rPr lang="en-US" sz="1100"/>
+              <a:rPr lang="en-US" sz="1100" dirty="0"/>
               <a:t> table2 if above succeeds</a:t>
             </a:r>
           </a:p>
@@ -11148,7 +11054,7 @@
               <a:buChar char="•"/>
             </a:pPr>
             <a:r>
-              <a:rPr lang="en-US" sz="1100"/>
+              <a:rPr lang="en-US" sz="1100" dirty="0"/>
               <a:t>Ver 8 is to delete it</a:t>
             </a:r>
           </a:p>
@@ -11158,31 +11064,31 @@
               <a:buChar char="•"/>
             </a:pPr>
             <a:r>
-              <a:rPr lang="en-US" sz="1100"/>
+              <a:rPr lang="en-US" sz="1100" dirty="0"/>
               <a:t>Found </a:t>
             </a:r>
             <a:r>
-              <a:rPr lang="en-US" sz="1100" err="1"/>
+              <a:rPr lang="en-US" sz="1100" dirty="0" err="1"/>
               <a:t>ver</a:t>
             </a:r>
             <a:r>
-              <a:rPr lang="en-US" sz="1100"/>
+              <a:rPr lang="en-US" sz="1100" dirty="0"/>
               <a:t> 6 in </a:t>
             </a:r>
             <a:r>
-              <a:rPr lang="en-US" sz="1100" err="1"/>
+              <a:rPr lang="en-US" sz="1100" dirty="0" err="1"/>
               <a:t>hashmap</a:t>
             </a:r>
             <a:r>
-              <a:rPr lang="en-US" sz="1100"/>
+              <a:rPr lang="en-US" sz="1100" dirty="0"/>
               <a:t>, since 8 &gt; 6, update with </a:t>
             </a:r>
             <a:r>
-              <a:rPr lang="en-US" sz="1100" err="1"/>
+              <a:rPr lang="en-US" sz="1100" dirty="0" err="1"/>
               <a:t>ver</a:t>
             </a:r>
             <a:r>
-              <a:rPr lang="en-US" sz="1100"/>
+              <a:rPr lang="en-US" sz="1100" dirty="0"/>
               <a:t> 8</a:t>
             </a:r>
           </a:p>
@@ -11192,23 +11098,23 @@
               <a:buChar char="•"/>
             </a:pPr>
             <a:r>
-              <a:rPr lang="en-US" sz="1100"/>
+              <a:rPr lang="en-US" sz="1100" dirty="0"/>
               <a:t>Since in table1 </a:t>
             </a:r>
             <a:r>
-              <a:rPr lang="en-US" sz="1100" err="1"/>
+              <a:rPr lang="en-US" sz="1100" dirty="0" err="1"/>
               <a:t>cur_ver</a:t>
             </a:r>
             <a:r>
-              <a:rPr lang="en-US" sz="1100"/>
+              <a:rPr lang="en-US" sz="1100" dirty="0"/>
               <a:t> 8 &gt; </a:t>
             </a:r>
             <a:r>
-              <a:rPr lang="en-US" sz="1100" err="1"/>
+              <a:rPr lang="en-US" sz="1100" dirty="0" err="1"/>
               <a:t>fetch_ver</a:t>
             </a:r>
             <a:r>
-              <a:rPr lang="en-US" sz="1100"/>
+              <a:rPr lang="en-US" sz="1100" dirty="0"/>
               <a:t> 6, update</a:t>
             </a:r>
           </a:p>
@@ -11218,15 +11124,15 @@
               <a:buChar char="•"/>
             </a:pPr>
             <a:r>
-              <a:rPr lang="en-US" sz="1100"/>
+              <a:rPr lang="en-US" sz="1100" dirty="0"/>
               <a:t>delete from </a:t>
             </a:r>
             <a:r>
-              <a:rPr lang="en-US" sz="1100" err="1"/>
+              <a:rPr lang="en-US" sz="1100" dirty="0" err="1"/>
               <a:t>eBPF</a:t>
             </a:r>
             <a:r>
-              <a:rPr lang="en-US" sz="1100"/>
+              <a:rPr lang="en-US" sz="1100" dirty="0"/>
               <a:t> map and update table 2</a:t>
             </a:r>
           </a:p>
@@ -11236,7 +11142,7 @@
               <a:buChar char="•"/>
             </a:pPr>
             <a:r>
-              <a:rPr lang="en-US" sz="1100"/>
+              <a:rPr lang="en-US" sz="1100" dirty="0"/>
               <a:t>Ver 1 at last</a:t>
             </a:r>
           </a:p>
@@ -11246,31 +11152,31 @@
               <a:buChar char="•"/>
             </a:pPr>
             <a:r>
-              <a:rPr lang="en-US" sz="1100"/>
+              <a:rPr lang="en-US" sz="1100" dirty="0"/>
               <a:t>Found </a:t>
             </a:r>
             <a:r>
-              <a:rPr lang="en-US" sz="1100" err="1"/>
+              <a:rPr lang="en-US" sz="1100" dirty="0" err="1"/>
               <a:t>ver</a:t>
             </a:r>
             <a:r>
-              <a:rPr lang="en-US" sz="1100"/>
+              <a:rPr lang="en-US" sz="1100" dirty="0"/>
               <a:t> 8 from </a:t>
             </a:r>
             <a:r>
-              <a:rPr lang="en-US" sz="1100" err="1"/>
+              <a:rPr lang="en-US" sz="1100" dirty="0" err="1"/>
               <a:t>hashmap</a:t>
             </a:r>
             <a:r>
-              <a:rPr lang="en-US" sz="1100"/>
+              <a:rPr lang="en-US" sz="1100" dirty="0"/>
               <a:t>, since 1 &lt; 8 simply ignore </a:t>
             </a:r>
             <a:r>
-              <a:rPr lang="en-US" sz="1100" err="1"/>
+              <a:rPr lang="en-US" sz="1100" dirty="0" err="1"/>
               <a:t>eBPF</a:t>
             </a:r>
             <a:r>
-              <a:rPr lang="en-US" sz="1100"/>
+              <a:rPr lang="en-US" sz="1100" dirty="0"/>
               <a:t> programming</a:t>
             </a:r>
           </a:p>
@@ -11280,7 +11186,7 @@
               <a:buChar char="•"/>
             </a:pPr>
             <a:r>
-              <a:rPr lang="en-US" sz="1100"/>
+              <a:rPr lang="en-US" sz="1100" dirty="0"/>
               <a:t>In table1, since 1 &lt; 8, also ignore updating</a:t>
             </a:r>
           </a:p>
@@ -11290,7 +11196,7 @@
               <a:buChar char="•"/>
             </a:pPr>
             <a:r>
-              <a:rPr lang="en-US" sz="1100"/>
+              <a:rPr lang="en-US" sz="1100" dirty="0"/>
               <a:t>Update table2</a:t>
             </a:r>
           </a:p>
@@ -11300,7 +11206,7 @@
               <a:buChar char="•"/>
             </a:pPr>
             <a:r>
-              <a:rPr lang="en-US" sz="1200"/>
+              <a:rPr lang="en-US" sz="1200" dirty="0"/>
               <a:t>Case 3: 8 -&gt; 6 -&gt; 1 or 8 -&gt; 1 -&gt; 6</a:t>
             </a:r>
           </a:p>
@@ -11310,7 +11216,7 @@
               <a:buChar char="•"/>
             </a:pPr>
             <a:r>
-              <a:rPr lang="en-US" sz="1100"/>
+              <a:rPr lang="en-US" sz="1100" dirty="0"/>
               <a:t>Ver 8 (deletion) first</a:t>
             </a:r>
           </a:p>
@@ -11320,23 +11226,23 @@
               <a:buChar char="•"/>
             </a:pPr>
             <a:r>
-              <a:rPr lang="en-US" sz="1100"/>
+              <a:rPr lang="en-US" sz="1100" dirty="0"/>
               <a:t>Not found in </a:t>
             </a:r>
             <a:r>
-              <a:rPr lang="en-US" sz="1100" err="1"/>
+              <a:rPr lang="en-US" sz="1100" dirty="0" err="1"/>
               <a:t>hashmap</a:t>
             </a:r>
             <a:r>
-              <a:rPr lang="en-US" sz="1100"/>
+              <a:rPr lang="en-US" sz="1100" dirty="0"/>
               <a:t>, thus insert key with </a:t>
             </a:r>
             <a:r>
-              <a:rPr lang="en-US" sz="1100" err="1"/>
+              <a:rPr lang="en-US" sz="1100" dirty="0" err="1"/>
               <a:t>ver</a:t>
             </a:r>
             <a:r>
-              <a:rPr lang="en-US" sz="1100"/>
+              <a:rPr lang="en-US" sz="1100" dirty="0"/>
               <a:t> 8</a:t>
             </a:r>
           </a:p>
@@ -11346,19 +11252,19 @@
               <a:buChar char="•"/>
             </a:pPr>
             <a:r>
-              <a:rPr lang="en-US" sz="1100" err="1"/>
+              <a:rPr lang="en-US" sz="1100" dirty="0" err="1"/>
               <a:t>eBPF</a:t>
             </a:r>
             <a:r>
-              <a:rPr lang="en-US" sz="1100"/>
+              <a:rPr lang="en-US" sz="1100" dirty="0"/>
               <a:t> </a:t>
             </a:r>
             <a:r>
-              <a:rPr lang="en-US" sz="1100" err="1"/>
+              <a:rPr lang="en-US" sz="1100" dirty="0" err="1"/>
               <a:t>syscall</a:t>
             </a:r>
             <a:r>
-              <a:rPr lang="en-US" sz="1100"/>
+              <a:rPr lang="en-US" sz="1100" dirty="0"/>
               <a:t> is if found delete, if not found do nothing</a:t>
             </a:r>
           </a:p>
@@ -11368,7 +11274,7 @@
               <a:buChar char="•"/>
             </a:pPr>
             <a:r>
-              <a:rPr lang="en-US" sz="1100"/>
+              <a:rPr lang="en-US" sz="1100" dirty="0"/>
               <a:t>Update table1 and 2</a:t>
             </a:r>
           </a:p>
@@ -11378,23 +11284,23 @@
               <a:buChar char="•"/>
             </a:pPr>
             <a:r>
-              <a:rPr lang="en-US" sz="1100"/>
+              <a:rPr lang="en-US" sz="1100" dirty="0"/>
               <a:t>Then </a:t>
             </a:r>
             <a:r>
-              <a:rPr lang="en-US" sz="1100" err="1"/>
+              <a:rPr lang="en-US" sz="1100" dirty="0" err="1"/>
               <a:t>ver</a:t>
             </a:r>
             <a:r>
-              <a:rPr lang="en-US" sz="1100"/>
+              <a:rPr lang="en-US" sz="1100" dirty="0"/>
               <a:t> 1 or </a:t>
             </a:r>
             <a:r>
-              <a:rPr lang="en-US" sz="1100" err="1"/>
+              <a:rPr lang="en-US" sz="1100" dirty="0" err="1"/>
               <a:t>ver</a:t>
             </a:r>
             <a:r>
-              <a:rPr lang="en-US" sz="1100"/>
+              <a:rPr lang="en-US" sz="1100" dirty="0"/>
               <a:t> 6</a:t>
             </a:r>
           </a:p>
@@ -11404,31 +11310,31 @@
               <a:buChar char="•"/>
             </a:pPr>
             <a:r>
-              <a:rPr lang="en-US" sz="1100"/>
+              <a:rPr lang="en-US" sz="1100" dirty="0"/>
               <a:t>Found </a:t>
             </a:r>
             <a:r>
-              <a:rPr lang="en-US" sz="1100" err="1"/>
+              <a:rPr lang="en-US" sz="1100" dirty="0" err="1"/>
               <a:t>ver</a:t>
             </a:r>
             <a:r>
-              <a:rPr lang="en-US" sz="1100"/>
+              <a:rPr lang="en-US" sz="1100" dirty="0"/>
               <a:t> 8 from </a:t>
             </a:r>
             <a:r>
-              <a:rPr lang="en-US" sz="1100" err="1"/>
+              <a:rPr lang="en-US" sz="1100" dirty="0" err="1"/>
               <a:t>hashmap</a:t>
             </a:r>
             <a:r>
-              <a:rPr lang="en-US" sz="1100"/>
+              <a:rPr lang="en-US" sz="1100" dirty="0"/>
               <a:t>, simply ignore </a:t>
             </a:r>
             <a:r>
-              <a:rPr lang="en-US" sz="1100" err="1"/>
+              <a:rPr lang="en-US" sz="1100" dirty="0" err="1"/>
               <a:t>eBPF</a:t>
             </a:r>
             <a:r>
-              <a:rPr lang="en-US" sz="1100"/>
+              <a:rPr lang="en-US" sz="1100" dirty="0"/>
               <a:t> programming but update table2</a:t>
             </a:r>
           </a:p>
@@ -11438,16 +11344,16 @@
               <a:buChar char="•"/>
             </a:pPr>
             <a:r>
-              <a:rPr lang="en-US" sz="1100"/>
+              <a:rPr lang="en-US" sz="1100" dirty="0"/>
               <a:t>In table1, since 1 or 6 &lt; 8, ignore updating</a:t>
             </a:r>
           </a:p>
           <a:p>
-            <a:endParaRPr lang="en-US" sz="1100"/>
-          </a:p>
-          <a:p>
-            <a:r>
-              <a:rPr lang="en-US" sz="1100"/>
+            <a:endParaRPr lang="en-US" sz="1100" dirty="0"/>
+          </a:p>
+          <a:p>
+            <a:r>
+              <a:rPr lang="en-US" sz="1100" dirty="0"/>
               <a:t>Observation/philosophy:  </a:t>
             </a:r>
           </a:p>
@@ -11457,7 +11363,7 @@
               <a:buChar char="•"/>
             </a:pPr>
             <a:r>
-              <a:rPr lang="en-US" sz="1100"/>
+              <a:rPr lang="en-US" sz="1100" dirty="0"/>
               <a:t>Concurrent HashMap and table1 (may combine later), update condition is increasing version</a:t>
             </a:r>
           </a:p>
@@ -11467,7 +11373,7 @@
               <a:buChar char="•"/>
             </a:pPr>
             <a:r>
-              <a:rPr lang="en-US" sz="1100"/>
+              <a:rPr lang="en-US" sz="1100" dirty="0"/>
               <a:t>table2</a:t>
             </a:r>
           </a:p>
@@ -11477,7 +11383,7 @@
               <a:buChar char="o"/>
             </a:pPr>
             <a:r>
-              <a:rPr lang="en-US" sz="1100"/>
+              <a:rPr lang="en-US" sz="1100" dirty="0"/>
               <a:t>programming done (succeeded + intended ignore) log to table2</a:t>
             </a:r>
           </a:p>
@@ -11487,18 +11393,18 @@
               <a:buChar char="o"/>
             </a:pPr>
             <a:r>
-              <a:rPr lang="en-US" sz="1100"/>
+              <a:rPr lang="en-US" sz="1100" dirty="0"/>
               <a:t>programming failed do not log to table2</a:t>
             </a:r>
-            <a:endParaRPr lang="en-US" sz="1400"/>
+            <a:endParaRPr lang="en-US" sz="1400" dirty="0"/>
           </a:p>
           <a:p>
             <a:pPr lvl="2"/>
-            <a:endParaRPr lang="en-US" sz="1100"/>
+            <a:endParaRPr lang="en-US" sz="1100" dirty="0"/>
           </a:p>
           <a:p>
             <a:pPr lvl="2"/>
-            <a:endParaRPr lang="en-US" sz="1100"/>
+            <a:endParaRPr lang="en-US" sz="1100" dirty="0"/>
           </a:p>
         </p:txBody>
       </p:sp>
@@ -11584,8 +11490,8 @@
         </p:nvSpPr>
         <p:spPr>
           <a:xfrm>
-            <a:off x="7032062" y="591159"/>
-            <a:ext cx="4618161" cy="6124754"/>
+            <a:off x="7032062" y="473237"/>
+            <a:ext cx="4618161" cy="6555641"/>
           </a:xfrm>
           <a:prstGeom prst="rect">
             <a:avLst/>
@@ -11599,62 +11505,51 @@
           <a:lstStyle/>
           <a:p>
             <a:r>
-              <a:rPr lang="en-US" sz="1400"/>
-              <a:t>Race condition #2: </a:t>
-            </a:r>
-            <a:r>
-              <a:rPr lang="en-US" altLang="zh-CN" sz="1200"/>
-              <a:t>step 1 &amp; 3 needs to be protected in one transaction/critical-section, otherwise step 3 may not reflect the step 1’s strict version control per </a:t>
-            </a:r>
-            <a:r>
-              <a:rPr lang="en-US" altLang="zh-CN" sz="1200" err="1"/>
-              <a:t>resource_id</a:t>
-            </a:r>
-            <a:r>
-              <a:rPr lang="en-US" altLang="zh-CN" sz="1200"/>
-              <a:t> (per key)</a:t>
-            </a:r>
-          </a:p>
-          <a:p>
-            <a:endParaRPr lang="en-US" sz="1200"/>
-          </a:p>
-          <a:p>
-            <a:r>
-              <a:rPr lang="en-US" sz="1200"/>
+              <a:rPr lang="en-US" sz="1400" dirty="0"/>
+              <a:t>Race condition #2: or mismatched states between step 1 and step 2</a:t>
+            </a:r>
+            <a:endParaRPr lang="en-US" altLang="zh-CN" sz="1200" dirty="0"/>
+          </a:p>
+          <a:p>
+            <a:endParaRPr lang="en-US" sz="1200" dirty="0"/>
+          </a:p>
+          <a:p>
+            <a:r>
+              <a:rPr lang="en-US" sz="1200" dirty="0"/>
               <a:t>Although competition of version control only happens in key granularity, it is not recommended to choose a non-concurrent </a:t>
             </a:r>
             <a:r>
-              <a:rPr lang="en-US" sz="1200" err="1"/>
+              <a:rPr lang="en-US" sz="1200" dirty="0" err="1"/>
               <a:t>hashmap</a:t>
             </a:r>
             <a:r>
-              <a:rPr lang="en-US" sz="1200"/>
+              <a:rPr lang="en-US" sz="1200" dirty="0"/>
               <a:t> and let different </a:t>
             </a:r>
             <a:r>
-              <a:rPr lang="en-US" sz="1200" err="1"/>
+              <a:rPr lang="en-US" sz="1200" dirty="0" err="1"/>
               <a:t>kv</a:t>
             </a:r>
             <a:r>
-              <a:rPr lang="en-US" sz="1200"/>
+              <a:rPr lang="en-US" sz="1200" dirty="0"/>
               <a:t> elements to be processed by multi threads at the same time without protection. </a:t>
             </a:r>
           </a:p>
           <a:p>
-            <a:endParaRPr lang="en-US" sz="1200"/>
-          </a:p>
-          <a:p>
-            <a:r>
-              <a:rPr lang="en-US" sz="1200"/>
+            <a:endParaRPr lang="en-US" sz="1200" dirty="0"/>
+          </a:p>
+          <a:p>
+            <a:r>
+              <a:rPr lang="en-US" sz="1200" dirty="0"/>
               <a:t>So we still choose a concurrent </a:t>
             </a:r>
             <a:r>
-              <a:rPr lang="en-US" sz="1200" err="1"/>
+              <a:rPr lang="en-US" sz="1200" dirty="0" err="1"/>
               <a:t>hashmap</a:t>
             </a:r>
             <a:r>
-              <a:rPr lang="en-US" sz="1200"/>
-              <a:t>, plus a key level obj lock for our own purpose: </a:t>
+              <a:rPr lang="en-US" sz="1200" dirty="0"/>
+              <a:t>: </a:t>
             </a:r>
           </a:p>
           <a:p>
@@ -11662,7 +11557,7 @@
               <a:buFont typeface="+mj-lt"/>
               <a:buAutoNum type="arabicPeriod"/>
             </a:pPr>
-            <a:endParaRPr lang="en-US" sz="1400"/>
+            <a:endParaRPr lang="en-US" sz="1400" dirty="0"/>
           </a:p>
           <a:p>
             <a:pPr marL="342900" indent="-342900">
@@ -11670,7 +11565,7 @@
               <a:buAutoNum type="arabicPeriod"/>
             </a:pPr>
             <a:r>
-              <a:rPr lang="en-US" sz="1400"/>
+              <a:rPr lang="en-US" sz="1400" dirty="0"/>
               <a:t>Concurrent hash map</a:t>
             </a:r>
           </a:p>
@@ -11680,20 +11575,14 @@
               <a:buChar char="•"/>
             </a:pPr>
             <a:r>
-              <a:rPr lang="en-US" sz="1200">
-                <a:hlinkClick r:id="rId3">
-                  <a:extLst>
-                    <a:ext uri="{A12FA001-AC4F-418D-AE19-62706E023703}">
-                      <ahyp:hlinkClr xmlns:ahyp="http://schemas.microsoft.com/office/drawing/2018/hyperlinkcolor" val="tx"/>
-                    </a:ext>
-                  </a:extLst>
-                </a:hlinkClick>
+              <a:rPr lang="en-US" sz="1200" dirty="0">
+                <a:hlinkClick r:id="rId3"/>
               </a:rPr>
-              <a:t>https://github.com/facebook/folly/blob/main/folly/docs/AtomicHashMap.md</a:t>
-            </a:r>
-            <a:r>
-              <a:rPr lang="en-US" sz="1200"/>
-              <a:t>  </a:t>
+              <a:t>https://github.com/facebook/folly/blob/main/folly/concurrency/ConcurrentHashMap.h</a:t>
+            </a:r>
+            <a:r>
+              <a:rPr lang="en-US" sz="1200" dirty="0"/>
+              <a:t> </a:t>
             </a:r>
           </a:p>
           <a:p>
@@ -11702,8 +11591,25 @@
               <a:buChar char="•"/>
             </a:pPr>
             <a:r>
-              <a:rPr lang="en-US" sz="1200"/>
+              <a:rPr lang="en-US" sz="1200" dirty="0"/>
               <a:t>find and iteration are wait-free, insert has key-level lock granularity</a:t>
+            </a:r>
+          </a:p>
+          <a:p>
+            <a:pPr marL="342900" indent="-342900">
+              <a:buFont typeface="+mj-lt"/>
+              <a:buAutoNum type="arabicPeriod"/>
+            </a:pPr>
+            <a:endParaRPr lang="en-US" sz="1400" dirty="0"/>
+          </a:p>
+          <a:p>
+            <a:pPr marL="342900" indent="-342900">
+              <a:buFont typeface="+mj-lt"/>
+              <a:buAutoNum type="arabicPeriod"/>
+            </a:pPr>
+            <a:r>
+              <a:rPr lang="en-US" sz="1400" dirty="0"/>
+              <a:t>K and V are</a:t>
             </a:r>
           </a:p>
           <a:p>
@@ -11712,23 +11618,24 @@
               <a:buChar char="•"/>
             </a:pPr>
             <a:r>
-              <a:rPr lang="en-US" sz="1200"/>
-              <a:t>only supports 32 or 64 bit keys - this is because they must be atomically compare-and-</a:t>
-            </a:r>
-            <a:r>
-              <a:rPr lang="en-US" sz="1200" err="1"/>
-              <a:t>swaped</a:t>
-            </a:r>
-            <a:endParaRPr lang="en-US" sz="1200"/>
-          </a:p>
-          <a:p>
-            <a:pPr marL="342900" indent="-342900">
-              <a:buFont typeface="+mj-lt"/>
-              <a:buAutoNum type="arabicPeriod"/>
-            </a:pPr>
-            <a:r>
-              <a:rPr lang="en-US" sz="1400"/>
-              <a:t>K and V are</a:t>
+              <a:rPr lang="en-US" sz="1200" dirty="0"/>
+              <a:t>Key – string that encoded from </a:t>
+            </a:r>
+            <a:r>
+              <a:rPr lang="en-US" sz="1200" dirty="0" err="1"/>
+              <a:t>resource_id</a:t>
+            </a:r>
+            <a:r>
+              <a:rPr lang="en-US" sz="1200" dirty="0"/>
+              <a:t> (in neighbor case, it is    VNI + ‘-’ + </a:t>
+            </a:r>
+            <a:r>
+              <a:rPr lang="en-US" sz="1200" dirty="0" err="1"/>
+              <a:t>vpc_ip</a:t>
+            </a:r>
+            <a:r>
+              <a:rPr lang="en-US" sz="1200" dirty="0"/>
+              <a:t>)</a:t>
             </a:r>
           </a:p>
           <a:p>
@@ -11737,24 +11644,29 @@
               <a:buChar char="•"/>
             </a:pPr>
             <a:r>
-              <a:rPr lang="en-US" sz="1200"/>
-              <a:t>Key – long int that encoded from </a:t>
-            </a:r>
-            <a:r>
-              <a:rPr lang="en-US" sz="1200" err="1"/>
-              <a:t>resource_id</a:t>
-            </a:r>
-            <a:r>
-              <a:rPr lang="en-US" sz="1200"/>
-              <a:t> (in neighbor case, it is    VNI + </a:t>
-            </a:r>
-            <a:r>
-              <a:rPr lang="en-US" sz="1200" err="1"/>
-              <a:t>vpc_ip</a:t>
-            </a:r>
-            <a:r>
-              <a:rPr lang="en-US" sz="1200"/>
-              <a:t>)</a:t>
+              <a:rPr lang="en-US" sz="1200" dirty="0"/>
+              <a:t>Value – neighbor fields</a:t>
+            </a:r>
+          </a:p>
+          <a:p>
+            <a:endParaRPr lang="en-US" sz="1400" dirty="0"/>
+          </a:p>
+          <a:p>
+            <a:pPr marL="342900" indent="-342900">
+              <a:buFont typeface="+mj-lt"/>
+              <a:buAutoNum type="arabicPeriod" startAt="3"/>
+            </a:pPr>
+            <a:r>
+              <a:rPr lang="en-US" sz="1400" dirty="0"/>
+              <a:t>Mismatch of concurrent map and </a:t>
+            </a:r>
+            <a:r>
+              <a:rPr lang="en-US" sz="1400" dirty="0" err="1"/>
+              <a:t>ebpf</a:t>
+            </a:r>
+            <a:r>
+              <a:rPr lang="en-US" sz="1400" dirty="0"/>
+              <a:t> states could happen, but our design principle here is</a:t>
             </a:r>
           </a:p>
           <a:p>
@@ -11763,65 +11675,90 @@
               <a:buChar char="•"/>
             </a:pPr>
             <a:r>
-              <a:rPr lang="en-US" sz="1200"/>
-              <a:t>Value – 2 tuples element</a:t>
+              <a:rPr lang="en-US" sz="1400" dirty="0"/>
+              <a:t>Let table2 reflect the real states of </a:t>
+            </a:r>
+            <a:r>
+              <a:rPr lang="en-US" sz="1400" dirty="0" err="1"/>
+              <a:t>ebpf</a:t>
+            </a:r>
+            <a:r>
+              <a:rPr lang="en-US" sz="1400" dirty="0"/>
+              <a:t>, if </a:t>
+            </a:r>
+            <a:r>
+              <a:rPr lang="en-US" sz="1400" dirty="0" err="1"/>
+              <a:t>ebpf</a:t>
+            </a:r>
+            <a:r>
+              <a:rPr lang="en-US" sz="1400" dirty="0"/>
+              <a:t> failed then this version will be missing in DB</a:t>
+            </a:r>
+          </a:p>
+          <a:p>
+            <a:pPr marL="800100" lvl="1" indent="-342900">
+              <a:buFont typeface="Arial" panose="020B0604020202020204" pitchFamily="34" charset="0"/>
+              <a:buChar char="•"/>
+            </a:pPr>
+            <a:r>
+              <a:rPr lang="en-US" sz="1400" dirty="0"/>
+              <a:t>Then let</a:t>
             </a:r>
           </a:p>
           <a:p>
             <a:pPr marL="1257300" lvl="2" indent="-342900">
-              <a:buFont typeface="Courier New" panose="02070309020205020404" pitchFamily="49" charset="0"/>
-              <a:buChar char="o"/>
+              <a:buFont typeface="Arial" panose="020B0604020202020204" pitchFamily="34" charset="0"/>
+              <a:buChar char="•"/>
             </a:pPr>
             <a:r>
-              <a:rPr lang="en-US" sz="1200"/>
-              <a:t>1st tuple is Version object (or int value if locking is feasible) that assigned per neighbor key</a:t>
-            </a:r>
-          </a:p>
-          <a:p>
-            <a:pPr marL="1714500" lvl="3" indent="-342900">
-              <a:buFont typeface="Wingdings" panose="05000000000000000000" pitchFamily="2" charset="2"/>
-              <a:buChar char="q"/>
+              <a:rPr lang="en-US" sz="1200" dirty="0"/>
+              <a:t>Timeout check</a:t>
+            </a:r>
+          </a:p>
+          <a:p>
+            <a:pPr marL="1257300" lvl="2" indent="-342900">
+              <a:buFont typeface="Arial" panose="020B0604020202020204" pitchFamily="34" charset="0"/>
+              <a:buChar char="•"/>
             </a:pPr>
             <a:r>
-              <a:rPr lang="en-US" sz="1200"/>
-              <a:t>for critical section of (step 1-3) protection and the protection granularity is per key</a:t>
-            </a:r>
-          </a:p>
-          <a:p>
-            <a:pPr marL="1714500" lvl="3" indent="-342900">
-              <a:buFont typeface="Wingdings" panose="05000000000000000000" pitchFamily="2" charset="2"/>
-              <a:buChar char="q"/>
+              <a:rPr lang="en-US" sz="1200" dirty="0"/>
+              <a:t>Periodical background check</a:t>
+            </a:r>
+          </a:p>
+          <a:p>
+            <a:pPr marL="1257300" lvl="2" indent="-342900">
+              <a:buFont typeface="Arial" panose="020B0604020202020204" pitchFamily="34" charset="0"/>
+              <a:buChar char="•"/>
             </a:pPr>
             <a:r>
-              <a:rPr lang="en-US" sz="1200"/>
-              <a:t>to store the version for the atomic operation above</a:t>
-            </a:r>
-          </a:p>
-          <a:p>
-            <a:pPr marL="1257300" lvl="2" indent="-342900">
-              <a:buFont typeface="Courier New" panose="02070309020205020404" pitchFamily="49" charset="0"/>
-              <a:buChar char="o"/>
+              <a:rPr lang="en-US" sz="1200" dirty="0"/>
+              <a:t>Or next time starting of agent</a:t>
+            </a:r>
+          </a:p>
+          <a:p>
+            <a:pPr marL="800100" lvl="1" indent="-342900">
+              <a:buFont typeface="Arial" panose="020B0604020202020204" pitchFamily="34" charset="0"/>
+              <a:buChar char="•"/>
             </a:pPr>
             <a:r>
-              <a:rPr lang="en-US" sz="1200"/>
-              <a:t>2nd tuple is of course the metadata of this goal state, for Neighbor case it contains </a:t>
-            </a:r>
-            <a:r>
-              <a:rPr lang="en-US" sz="1200" err="1"/>
-              <a:t>HostIP</a:t>
-            </a:r>
-            <a:r>
-              <a:rPr lang="en-US" sz="1200"/>
-              <a:t>, </a:t>
-            </a:r>
-            <a:r>
-              <a:rPr lang="en-US" sz="1200" err="1"/>
-              <a:t>HostMac</a:t>
-            </a:r>
-            <a:r>
-              <a:rPr lang="en-US" sz="1200"/>
-              <a:t> etc. </a:t>
-            </a:r>
+              <a:rPr lang="en-US" sz="1400" dirty="0"/>
+              <a:t>to decide when to retry failed/missing versions of </a:t>
+            </a:r>
+            <a:r>
+              <a:rPr lang="en-US" sz="1400" dirty="0" err="1"/>
+              <a:t>ebpf</a:t>
+            </a:r>
+            <a:r>
+              <a:rPr lang="en-US" sz="1400" dirty="0"/>
+              <a:t> programming</a:t>
+            </a:r>
+          </a:p>
+          <a:p>
+            <a:pPr marL="800100" lvl="1" indent="-342900">
+              <a:buFont typeface="+mj-lt"/>
+              <a:buAutoNum type="arabicPeriod"/>
+            </a:pPr>
+            <a:endParaRPr lang="en-US" sz="1400" dirty="0"/>
           </a:p>
         </p:txBody>
       </p:sp>
@@ -13666,7 +13603,7 @@
           <a:lstStyle/>
           <a:p>
             <a:r>
-              <a:rPr lang="en-US" sz="900">
+              <a:rPr lang="en-US" sz="900" dirty="0">
                 <a:solidFill>
                   <a:schemeClr val="tx1"/>
                 </a:solidFill>
@@ -13679,7 +13616,7 @@
               <a:buAutoNum type="arabicPeriod"/>
             </a:pPr>
             <a:r>
-              <a:rPr lang="en-US" sz="900" err="1">
+              <a:rPr lang="en-US" sz="900" dirty="0" err="1">
                 <a:solidFill>
                   <a:schemeClr val="tx1"/>
                 </a:solidFill>
@@ -13687,7 +13624,7 @@
               <a:t>syncly</a:t>
             </a:r>
             <a:r>
-              <a:rPr lang="en-US" sz="900">
+              <a:rPr lang="en-US" sz="900" dirty="0">
                 <a:solidFill>
                   <a:schemeClr val="tx1"/>
                 </a:solidFill>
@@ -13700,7 +13637,61 @@
               <a:buAutoNum type="arabicPeriod"/>
             </a:pPr>
             <a:r>
-              <a:rPr lang="en-US" sz="900">
+              <a:rPr lang="en-US" sz="900" dirty="0" err="1">
+                <a:solidFill>
+                  <a:schemeClr val="tx1"/>
+                </a:solidFill>
+              </a:rPr>
+              <a:t>syncly</a:t>
+            </a:r>
+            <a:r>
+              <a:rPr lang="en-US" sz="900" dirty="0">
+                <a:solidFill>
+                  <a:schemeClr val="tx1"/>
+                </a:solidFill>
+              </a:rPr>
+              <a:t> invoke </a:t>
+            </a:r>
+            <a:r>
+              <a:rPr lang="en-US" sz="900" dirty="0" err="1">
+                <a:solidFill>
+                  <a:schemeClr val="tx1"/>
+                </a:solidFill>
+              </a:rPr>
+              <a:t>eBPF</a:t>
+            </a:r>
+            <a:r>
+              <a:rPr lang="en-US" sz="900" dirty="0">
+                <a:solidFill>
+                  <a:schemeClr val="tx1"/>
+                </a:solidFill>
+              </a:rPr>
+              <a:t> </a:t>
+            </a:r>
+            <a:r>
+              <a:rPr lang="en-US" sz="900" dirty="0" err="1">
+                <a:solidFill>
+                  <a:schemeClr val="tx1"/>
+                </a:solidFill>
+              </a:rPr>
+              <a:t>syscall</a:t>
+            </a:r>
+            <a:r>
+              <a:rPr lang="en-US" sz="900" dirty="0">
+                <a:solidFill>
+                  <a:schemeClr val="tx1"/>
+                </a:solidFill>
+              </a:rPr>
+              <a:t> with return code</a:t>
+            </a:r>
+          </a:p>
+          <a:p>
+            <a:pPr marL="228600" indent="-228600">
+              <a:buFontTx/>
+              <a:buAutoNum type="arabicPeriod"/>
+            </a:pPr>
+            <a:r>
+              <a:rPr lang="en-US" sz="900" dirty="0">
                 <a:solidFill>
                   <a:schemeClr val="tx1"/>
                 </a:solidFill>
@@ -13713,60 +13704,7 @@
               <a:buAutoNum type="arabicPeriod"/>
             </a:pPr>
             <a:r>
-              <a:rPr lang="en-US" sz="900" err="1">
-                <a:solidFill>
-                  <a:schemeClr val="tx1"/>
-                </a:solidFill>
-              </a:rPr>
-              <a:t>syncly</a:t>
-            </a:r>
-            <a:r>
-              <a:rPr lang="en-US" sz="900">
-                <a:solidFill>
-                  <a:schemeClr val="tx1"/>
-                </a:solidFill>
-              </a:rPr>
-              <a:t> invoke </a:t>
-            </a:r>
-            <a:r>
-              <a:rPr lang="en-US" sz="900" err="1">
-                <a:solidFill>
-                  <a:schemeClr val="tx1"/>
-                </a:solidFill>
-              </a:rPr>
-              <a:t>eBPF</a:t>
-            </a:r>
-            <a:r>
-              <a:rPr lang="en-US" sz="900">
-                <a:solidFill>
-                  <a:schemeClr val="tx1"/>
-                </a:solidFill>
-              </a:rPr>
-              <a:t> </a:t>
-            </a:r>
-            <a:r>
-              <a:rPr lang="en-US" sz="900" err="1">
-                <a:solidFill>
-                  <a:schemeClr val="tx1"/>
-                </a:solidFill>
-              </a:rPr>
-              <a:t>syscall</a:t>
-            </a:r>
-            <a:r>
-              <a:rPr lang="en-US" sz="900">
-                <a:solidFill>
-                  <a:schemeClr val="tx1"/>
-                </a:solidFill>
-              </a:rPr>
-              <a:t> with return code</a:t>
-            </a:r>
-          </a:p>
-          <a:p>
-            <a:pPr marL="228600" indent="-228600">
-              <a:buAutoNum type="arabicPeriod"/>
-            </a:pPr>
-            <a:r>
-              <a:rPr lang="en-US" sz="900">
+              <a:rPr lang="en-US" sz="900" dirty="0">
                 <a:solidFill>
                   <a:schemeClr val="tx1"/>
                 </a:solidFill>
@@ -13805,8 +13743,8 @@
           <a:lstStyle/>
           <a:p>
             <a:r>
-              <a:rPr lang="en-US" sz="1100"/>
-              <a:t>3</a:t>
+              <a:rPr lang="en-US" sz="1100" dirty="0"/>
+              <a:t>2</a:t>
             </a:r>
           </a:p>
         </p:txBody>
@@ -13885,8 +13823,8 @@
           <a:lstStyle/>
           <a:p>
             <a:r>
-              <a:rPr lang="en-US" sz="1100"/>
-              <a:t>2 &amp; 4</a:t>
+              <a:rPr lang="en-US" sz="1100" dirty="0"/>
+              <a:t>3 &amp; 4</a:t>
             </a:r>
           </a:p>
         </p:txBody>
@@ -16111,7 +16049,7 @@
           <a:lstStyle/>
           <a:p>
             <a:r>
-              <a:rPr lang="en-US" sz="900">
+              <a:rPr lang="en-US" sz="900" dirty="0">
                 <a:solidFill>
                   <a:schemeClr val="tx1"/>
                 </a:solidFill>
@@ -16124,7 +16062,7 @@
               <a:buAutoNum type="arabicPeriod"/>
             </a:pPr>
             <a:r>
-              <a:rPr lang="en-US" sz="900" err="1">
+              <a:rPr lang="en-US" sz="900" dirty="0" err="1">
                 <a:solidFill>
                   <a:schemeClr val="tx1"/>
                 </a:solidFill>
@@ -16132,7 +16070,7 @@
               <a:t>syncly</a:t>
             </a:r>
             <a:r>
-              <a:rPr lang="en-US" sz="900">
+              <a:rPr lang="en-US" sz="900" dirty="0">
                 <a:solidFill>
                   <a:schemeClr val="tx1"/>
                 </a:solidFill>
@@ -16145,7 +16083,61 @@
               <a:buAutoNum type="arabicPeriod"/>
             </a:pPr>
             <a:r>
-              <a:rPr lang="en-US" sz="900">
+              <a:rPr lang="en-US" sz="900" dirty="0" err="1">
+                <a:solidFill>
+                  <a:schemeClr val="tx1"/>
+                </a:solidFill>
+              </a:rPr>
+              <a:t>syncly</a:t>
+            </a:r>
+            <a:r>
+              <a:rPr lang="en-US" sz="900" dirty="0">
+                <a:solidFill>
+                  <a:schemeClr val="tx1"/>
+                </a:solidFill>
+              </a:rPr>
+              <a:t> invoke </a:t>
+            </a:r>
+            <a:r>
+              <a:rPr lang="en-US" sz="900" dirty="0" err="1">
+                <a:solidFill>
+                  <a:schemeClr val="tx1"/>
+                </a:solidFill>
+              </a:rPr>
+              <a:t>eBPF</a:t>
+            </a:r>
+            <a:r>
+              <a:rPr lang="en-US" sz="900" dirty="0">
+                <a:solidFill>
+                  <a:schemeClr val="tx1"/>
+                </a:solidFill>
+              </a:rPr>
+              <a:t> </a:t>
+            </a:r>
+            <a:r>
+              <a:rPr lang="en-US" sz="900" dirty="0" err="1">
+                <a:solidFill>
+                  <a:schemeClr val="tx1"/>
+                </a:solidFill>
+              </a:rPr>
+              <a:t>syscall</a:t>
+            </a:r>
+            <a:r>
+              <a:rPr lang="en-US" sz="900" dirty="0">
+                <a:solidFill>
+                  <a:schemeClr val="tx1"/>
+                </a:solidFill>
+              </a:rPr>
+              <a:t> with return code</a:t>
+            </a:r>
+          </a:p>
+          <a:p>
+            <a:pPr marL="228600" indent="-228600">
+              <a:buFontTx/>
+              <a:buAutoNum type="arabicPeriod"/>
+            </a:pPr>
+            <a:r>
+              <a:rPr lang="en-US" sz="900" dirty="0">
                 <a:solidFill>
                   <a:schemeClr val="tx1"/>
                 </a:solidFill>
@@ -16158,60 +16150,7 @@
               <a:buAutoNum type="arabicPeriod"/>
             </a:pPr>
             <a:r>
-              <a:rPr lang="en-US" sz="900" err="1">
-                <a:solidFill>
-                  <a:schemeClr val="tx1"/>
-                </a:solidFill>
-              </a:rPr>
-              <a:t>syncly</a:t>
-            </a:r>
-            <a:r>
-              <a:rPr lang="en-US" sz="900">
-                <a:solidFill>
-                  <a:schemeClr val="tx1"/>
-                </a:solidFill>
-              </a:rPr>
-              <a:t> invoke </a:t>
-            </a:r>
-            <a:r>
-              <a:rPr lang="en-US" sz="900" err="1">
-                <a:solidFill>
-                  <a:schemeClr val="tx1"/>
-                </a:solidFill>
-              </a:rPr>
-              <a:t>eBPF</a:t>
-            </a:r>
-            <a:r>
-              <a:rPr lang="en-US" sz="900">
-                <a:solidFill>
-                  <a:schemeClr val="tx1"/>
-                </a:solidFill>
-              </a:rPr>
-              <a:t> </a:t>
-            </a:r>
-            <a:r>
-              <a:rPr lang="en-US" sz="900" err="1">
-                <a:solidFill>
-                  <a:schemeClr val="tx1"/>
-                </a:solidFill>
-              </a:rPr>
-              <a:t>syscall</a:t>
-            </a:r>
-            <a:r>
-              <a:rPr lang="en-US" sz="900">
-                <a:solidFill>
-                  <a:schemeClr val="tx1"/>
-                </a:solidFill>
-              </a:rPr>
-              <a:t> with return code</a:t>
-            </a:r>
-          </a:p>
-          <a:p>
-            <a:pPr marL="228600" indent="-228600">
-              <a:buAutoNum type="arabicPeriod"/>
-            </a:pPr>
-            <a:r>
-              <a:rPr lang="en-US" sz="900">
+              <a:rPr lang="en-US" sz="900" dirty="0">
                 <a:solidFill>
                   <a:schemeClr val="tx1"/>
                 </a:solidFill>
@@ -16250,8 +16189,8 @@
           <a:lstStyle/>
           <a:p>
             <a:r>
-              <a:rPr lang="en-US" sz="1100"/>
-              <a:t>3</a:t>
+              <a:rPr lang="en-US" sz="1100" dirty="0"/>
+              <a:t>2</a:t>
             </a:r>
           </a:p>
         </p:txBody>
@@ -16330,8 +16269,8 @@
           <a:lstStyle/>
           <a:p>
             <a:r>
-              <a:rPr lang="en-US" sz="1100"/>
-              <a:t>2 &amp; 4</a:t>
+              <a:rPr lang="en-US" sz="1100" dirty="0"/>
+              <a:t>3 &amp; 4</a:t>
             </a:r>
           </a:p>
         </p:txBody>
@@ -18940,7 +18879,7 @@
           <a:lstStyle/>
           <a:p>
             <a:r>
-              <a:rPr lang="en-US" sz="900">
+              <a:rPr lang="en-US" sz="900" dirty="0">
                 <a:solidFill>
                   <a:schemeClr val="tx1"/>
                 </a:solidFill>
@@ -18953,7 +18892,7 @@
               <a:buAutoNum type="arabicPeriod"/>
             </a:pPr>
             <a:r>
-              <a:rPr lang="en-US" sz="900" err="1">
+              <a:rPr lang="en-US" sz="900" dirty="0" err="1">
                 <a:solidFill>
                   <a:schemeClr val="tx1"/>
                 </a:solidFill>
@@ -18961,7 +18900,7 @@
               <a:t>syncly</a:t>
             </a:r>
             <a:r>
-              <a:rPr lang="en-US" sz="900">
+              <a:rPr lang="en-US" sz="900" dirty="0">
                 <a:solidFill>
                   <a:schemeClr val="tx1"/>
                 </a:solidFill>
@@ -18974,7 +18913,61 @@
               <a:buAutoNum type="arabicPeriod"/>
             </a:pPr>
             <a:r>
-              <a:rPr lang="en-US" sz="900">
+              <a:rPr lang="en-US" sz="900" dirty="0" err="1">
+                <a:solidFill>
+                  <a:schemeClr val="tx1"/>
+                </a:solidFill>
+              </a:rPr>
+              <a:t>syncly</a:t>
+            </a:r>
+            <a:r>
+              <a:rPr lang="en-US" sz="900" dirty="0">
+                <a:solidFill>
+                  <a:schemeClr val="tx1"/>
+                </a:solidFill>
+              </a:rPr>
+              <a:t> invoke </a:t>
+            </a:r>
+            <a:r>
+              <a:rPr lang="en-US" sz="900" dirty="0" err="1">
+                <a:solidFill>
+                  <a:schemeClr val="tx1"/>
+                </a:solidFill>
+              </a:rPr>
+              <a:t>eBPF</a:t>
+            </a:r>
+            <a:r>
+              <a:rPr lang="en-US" sz="900" dirty="0">
+                <a:solidFill>
+                  <a:schemeClr val="tx1"/>
+                </a:solidFill>
+              </a:rPr>
+              <a:t> </a:t>
+            </a:r>
+            <a:r>
+              <a:rPr lang="en-US" sz="900" dirty="0" err="1">
+                <a:solidFill>
+                  <a:schemeClr val="tx1"/>
+                </a:solidFill>
+              </a:rPr>
+              <a:t>syscall</a:t>
+            </a:r>
+            <a:r>
+              <a:rPr lang="en-US" sz="900" dirty="0">
+                <a:solidFill>
+                  <a:schemeClr val="tx1"/>
+                </a:solidFill>
+              </a:rPr>
+              <a:t> with return code</a:t>
+            </a:r>
+          </a:p>
+          <a:p>
+            <a:pPr marL="228600" indent="-228600">
+              <a:buFontTx/>
+              <a:buAutoNum type="arabicPeriod"/>
+            </a:pPr>
+            <a:r>
+              <a:rPr lang="en-US" sz="900" dirty="0">
                 <a:solidFill>
                   <a:schemeClr val="tx1"/>
                 </a:solidFill>
@@ -18987,60 +18980,7 @@
               <a:buAutoNum type="arabicPeriod"/>
             </a:pPr>
             <a:r>
-              <a:rPr lang="en-US" sz="900" err="1">
-                <a:solidFill>
-                  <a:schemeClr val="tx1"/>
-                </a:solidFill>
-              </a:rPr>
-              <a:t>syncly</a:t>
-            </a:r>
-            <a:r>
-              <a:rPr lang="en-US" sz="900">
-                <a:solidFill>
-                  <a:schemeClr val="tx1"/>
-                </a:solidFill>
-              </a:rPr>
-              <a:t> invoke </a:t>
-            </a:r>
-            <a:r>
-              <a:rPr lang="en-US" sz="900" err="1">
-                <a:solidFill>
-                  <a:schemeClr val="tx1"/>
-                </a:solidFill>
-              </a:rPr>
-              <a:t>eBPF</a:t>
-            </a:r>
-            <a:r>
-              <a:rPr lang="en-US" sz="900">
-                <a:solidFill>
-                  <a:schemeClr val="tx1"/>
-                </a:solidFill>
-              </a:rPr>
-              <a:t> </a:t>
-            </a:r>
-            <a:r>
-              <a:rPr lang="en-US" sz="900" err="1">
-                <a:solidFill>
-                  <a:schemeClr val="tx1"/>
-                </a:solidFill>
-              </a:rPr>
-              <a:t>syscall</a:t>
-            </a:r>
-            <a:r>
-              <a:rPr lang="en-US" sz="900">
-                <a:solidFill>
-                  <a:schemeClr val="tx1"/>
-                </a:solidFill>
-              </a:rPr>
-              <a:t> with return code</a:t>
-            </a:r>
-          </a:p>
-          <a:p>
-            <a:pPr marL="228600" indent="-228600">
-              <a:buAutoNum type="arabicPeriod"/>
-            </a:pPr>
-            <a:r>
-              <a:rPr lang="en-US" sz="900">
+              <a:rPr lang="en-US" sz="900" dirty="0">
                 <a:solidFill>
                   <a:schemeClr val="tx1"/>
                 </a:solidFill>
@@ -19079,8 +19019,8 @@
           <a:lstStyle/>
           <a:p>
             <a:r>
-              <a:rPr lang="en-US" sz="1100"/>
-              <a:t>3</a:t>
+              <a:rPr lang="en-US" sz="1100" dirty="0"/>
+              <a:t>2</a:t>
             </a:r>
           </a:p>
         </p:txBody>
@@ -19159,8 +19099,8 @@
           <a:lstStyle/>
           <a:p>
             <a:r>
-              <a:rPr lang="en-US" sz="1100"/>
-              <a:t>2 &amp; 4</a:t>
+              <a:rPr lang="en-US" sz="1100" dirty="0"/>
+              <a:t>3 &amp; 4</a:t>
             </a:r>
           </a:p>
         </p:txBody>
@@ -19840,14 +19780,14 @@
           <p:nvPr>
             <p:extLst>
               <p:ext uri="{D42A27DB-BD31-4B8C-83A1-F6EECF244321}">
-                <p14:modId xmlns:p14="http://schemas.microsoft.com/office/powerpoint/2010/main" val="3291349146"/>
+                <p14:modId xmlns:p14="http://schemas.microsoft.com/office/powerpoint/2010/main" val="1030442183"/>
               </p:ext>
             </p:extLst>
           </p:nvPr>
         </p:nvGraphicFramePr>
         <p:xfrm>
           <a:off x="9904951" y="870834"/>
-          <a:ext cx="2131957" cy="2848428"/>
+          <a:ext cx="1164929" cy="2848428"/>
         </p:xfrm>
         <a:graphic>
           <a:graphicData uri="http://schemas.openxmlformats.org/drawingml/2006/table">
@@ -19863,13 +19803,6 @@
                     </a:ext>
                   </a:extLst>
                 </a:gridCol>
-                <a:gridCol w="967028">
-                  <a:extLst>
-                    <a:ext uri="{9D8B030D-6E8A-4147-A177-3AD203B41FA5}">
-                      <a16:colId xmlns:a16="http://schemas.microsoft.com/office/drawing/2014/main" val="2613236928"/>
-                    </a:ext>
-                  </a:extLst>
-                </a:gridCol>
               </a:tblGrid>
               <a:tr h="474738">
                 <a:tc>
@@ -19880,25 +19813,6 @@
                       <a:r>
                         <a:rPr lang="en-US" sz="1200"/>
                         <a:t>Version (key)</a:t>
-                      </a:r>
-                    </a:p>
-                  </a:txBody>
-                  <a:tcPr/>
-                </a:tc>
-                <a:tc>
-                  <a:txBody>
-                    <a:bodyPr/>
-                    <a:lstStyle/>
-                    <a:p>
-                      <a:r>
-                        <a:rPr lang="en-US" sz="1200"/>
-                        <a:t>Cont</a:t>
-                      </a:r>
-                    </a:p>
-                    <a:p>
-                      <a:r>
-                        <a:rPr lang="en-US" sz="1200"/>
-                        <a:t>Tail</a:t>
                       </a:r>
                     </a:p>
                   </a:txBody>
@@ -19924,16 +19838,6 @@
                   </a:txBody>
                   <a:tcPr/>
                 </a:tc>
-                <a:tc>
-                  <a:txBody>
-                    <a:bodyPr/>
-                    <a:lstStyle/>
-                    <a:p>
-                      <a:endParaRPr lang="en-US" sz="1200"/>
-                    </a:p>
-                  </a:txBody>
-                  <a:tcPr/>
-                </a:tc>
                 <a:extLst>
                   <a:ext uri="{0D108BD9-81ED-4DB2-BD59-A6C34878D82A}">
                     <a16:rowId xmlns:a16="http://schemas.microsoft.com/office/drawing/2014/main" val="95644299"/>
@@ -19950,16 +19854,6 @@
                         <a:rPr lang="en-US" sz="1200"/>
                         <a:t>2</a:t>
                       </a:r>
-                    </a:p>
-                  </a:txBody>
-                  <a:tcPr/>
-                </a:tc>
-                <a:tc>
-                  <a:txBody>
-                    <a:bodyPr/>
-                    <a:lstStyle/>
-                    <a:p>
-                      <a:endParaRPr lang="en-US" sz="1200"/>
                     </a:p>
                   </a:txBody>
                   <a:tcPr/>
@@ -19984,16 +19878,6 @@
                   </a:txBody>
                   <a:tcPr/>
                 </a:tc>
-                <a:tc>
-                  <a:txBody>
-                    <a:bodyPr/>
-                    <a:lstStyle/>
-                    <a:p>
-                      <a:endParaRPr lang="en-US" sz="1200"/>
-                    </a:p>
-                  </a:txBody>
-                  <a:tcPr/>
-                </a:tc>
                 <a:extLst>
                   <a:ext uri="{0D108BD9-81ED-4DB2-BD59-A6C34878D82A}">
                     <a16:rowId xmlns:a16="http://schemas.microsoft.com/office/drawing/2014/main" val="3339507767"/>
@@ -20014,19 +19898,6 @@
                   </a:txBody>
                   <a:tcPr/>
                 </a:tc>
-                <a:tc>
-                  <a:txBody>
-                    <a:bodyPr/>
-                    <a:lstStyle/>
-                    <a:p>
-                      <a:r>
-                        <a:rPr lang="en-US" sz="1200"/>
-                        <a:t>Y</a:t>
-                      </a:r>
-                    </a:p>
-                  </a:txBody>
-                  <a:tcPr/>
-                </a:tc>
                 <a:extLst>
                   <a:ext uri="{0D108BD9-81ED-4DB2-BD59-A6C34878D82A}">
                     <a16:rowId xmlns:a16="http://schemas.microsoft.com/office/drawing/2014/main" val="4112895154"/>
@@ -20040,19 +19911,9 @@
                     <a:lstStyle/>
                     <a:p>
                       <a:r>
-                        <a:rPr lang="en-US" sz="1200"/>
+                        <a:rPr lang="en-US" sz="1200" dirty="0"/>
                         <a:t>6</a:t>
                       </a:r>
-                    </a:p>
-                  </a:txBody>
-                  <a:tcPr/>
-                </a:tc>
-                <a:tc>
-                  <a:txBody>
-                    <a:bodyPr/>
-                    <a:lstStyle/>
-                    <a:p>
-                      <a:endParaRPr lang="en-US" sz="1200"/>
                     </a:p>
                   </a:txBody>
                   <a:tcPr/>
@@ -22042,7 +21903,7 @@
           <a:lstStyle/>
           <a:p>
             <a:r>
-              <a:rPr lang="en-US" sz="900">
+              <a:rPr lang="en-US" sz="900" dirty="0">
                 <a:solidFill>
                   <a:schemeClr val="tx1"/>
                 </a:solidFill>
@@ -22055,7 +21916,7 @@
               <a:buAutoNum type="arabicPeriod"/>
             </a:pPr>
             <a:r>
-              <a:rPr lang="en-US" sz="900" err="1">
+              <a:rPr lang="en-US" sz="900" dirty="0" err="1">
                 <a:solidFill>
                   <a:schemeClr val="tx1"/>
                 </a:solidFill>
@@ -22063,7 +21924,7 @@
               <a:t>syncly</a:t>
             </a:r>
             <a:r>
-              <a:rPr lang="en-US" sz="900">
+              <a:rPr lang="en-US" sz="900" dirty="0">
                 <a:solidFill>
                   <a:schemeClr val="tx1"/>
                 </a:solidFill>
@@ -22076,7 +21937,61 @@
               <a:buAutoNum type="arabicPeriod"/>
             </a:pPr>
             <a:r>
-              <a:rPr lang="en-US" sz="900">
+              <a:rPr lang="en-US" sz="900" dirty="0" err="1">
+                <a:solidFill>
+                  <a:schemeClr val="tx1"/>
+                </a:solidFill>
+              </a:rPr>
+              <a:t>syncly</a:t>
+            </a:r>
+            <a:r>
+              <a:rPr lang="en-US" sz="900" dirty="0">
+                <a:solidFill>
+                  <a:schemeClr val="tx1"/>
+                </a:solidFill>
+              </a:rPr>
+              <a:t> invoke </a:t>
+            </a:r>
+            <a:r>
+              <a:rPr lang="en-US" sz="900" dirty="0" err="1">
+                <a:solidFill>
+                  <a:schemeClr val="tx1"/>
+                </a:solidFill>
+              </a:rPr>
+              <a:t>eBPF</a:t>
+            </a:r>
+            <a:r>
+              <a:rPr lang="en-US" sz="900" dirty="0">
+                <a:solidFill>
+                  <a:schemeClr val="tx1"/>
+                </a:solidFill>
+              </a:rPr>
+              <a:t> </a:t>
+            </a:r>
+            <a:r>
+              <a:rPr lang="en-US" sz="900" dirty="0" err="1">
+                <a:solidFill>
+                  <a:schemeClr val="tx1"/>
+                </a:solidFill>
+              </a:rPr>
+              <a:t>syscall</a:t>
+            </a:r>
+            <a:r>
+              <a:rPr lang="en-US" sz="900" dirty="0">
+                <a:solidFill>
+                  <a:schemeClr val="tx1"/>
+                </a:solidFill>
+              </a:rPr>
+              <a:t> with return code</a:t>
+            </a:r>
+          </a:p>
+          <a:p>
+            <a:pPr marL="228600" indent="-228600">
+              <a:buFontTx/>
+              <a:buAutoNum type="arabicPeriod"/>
+            </a:pPr>
+            <a:r>
+              <a:rPr lang="en-US" sz="900" dirty="0">
                 <a:solidFill>
                   <a:schemeClr val="tx1"/>
                 </a:solidFill>
@@ -22089,60 +22004,7 @@
               <a:buAutoNum type="arabicPeriod"/>
             </a:pPr>
             <a:r>
-              <a:rPr lang="en-US" sz="900" err="1">
-                <a:solidFill>
-                  <a:schemeClr val="tx1"/>
-                </a:solidFill>
-              </a:rPr>
-              <a:t>syncly</a:t>
-            </a:r>
-            <a:r>
-              <a:rPr lang="en-US" sz="900">
-                <a:solidFill>
-                  <a:schemeClr val="tx1"/>
-                </a:solidFill>
-              </a:rPr>
-              <a:t> invoke </a:t>
-            </a:r>
-            <a:r>
-              <a:rPr lang="en-US" sz="900" err="1">
-                <a:solidFill>
-                  <a:schemeClr val="tx1"/>
-                </a:solidFill>
-              </a:rPr>
-              <a:t>eBPF</a:t>
-            </a:r>
-            <a:r>
-              <a:rPr lang="en-US" sz="900">
-                <a:solidFill>
-                  <a:schemeClr val="tx1"/>
-                </a:solidFill>
-              </a:rPr>
-              <a:t> </a:t>
-            </a:r>
-            <a:r>
-              <a:rPr lang="en-US" sz="900" err="1">
-                <a:solidFill>
-                  <a:schemeClr val="tx1"/>
-                </a:solidFill>
-              </a:rPr>
-              <a:t>syscall</a:t>
-            </a:r>
-            <a:r>
-              <a:rPr lang="en-US" sz="900">
-                <a:solidFill>
-                  <a:schemeClr val="tx1"/>
-                </a:solidFill>
-              </a:rPr>
-              <a:t> with return code</a:t>
-            </a:r>
-          </a:p>
-          <a:p>
-            <a:pPr marL="228600" indent="-228600">
-              <a:buAutoNum type="arabicPeriod"/>
-            </a:pPr>
-            <a:r>
-              <a:rPr lang="en-US" sz="900">
+              <a:rPr lang="en-US" sz="900" dirty="0">
                 <a:solidFill>
                   <a:schemeClr val="tx1"/>
                 </a:solidFill>
@@ -22570,7 +22432,7 @@
         <p:spPr>
           <a:xfrm>
             <a:off x="7087114" y="1680753"/>
-            <a:ext cx="4445175" cy="4647426"/>
+            <a:ext cx="4445175" cy="4708981"/>
           </a:xfrm>
           <a:prstGeom prst="rect">
             <a:avLst/>
@@ -22584,15 +22446,15 @@
           <a:lstStyle/>
           <a:p>
             <a:r>
-              <a:rPr lang="en-US" sz="1400"/>
+              <a:rPr lang="en-US" sz="1400" dirty="0"/>
               <a:t>Race condition #5:  diff between real </a:t>
             </a:r>
             <a:r>
-              <a:rPr lang="en-US" sz="1400" err="1"/>
+              <a:rPr lang="en-US" sz="1400" dirty="0" err="1"/>
               <a:t>eBPF</a:t>
             </a:r>
             <a:r>
-              <a:rPr lang="en-US" sz="1400"/>
+              <a:rPr lang="en-US" sz="1400" dirty="0"/>
               <a:t> map and table 2</a:t>
             </a:r>
           </a:p>
@@ -22602,11 +22464,11 @@
               <a:buChar char="•"/>
             </a:pPr>
             <a:r>
-              <a:rPr lang="en-US" sz="1200" err="1"/>
+              <a:rPr lang="en-US" sz="1200" dirty="0" err="1"/>
               <a:t>eBPF</a:t>
             </a:r>
             <a:r>
-              <a:rPr lang="en-US" sz="1200"/>
+              <a:rPr lang="en-US" sz="1200" dirty="0"/>
               <a:t> programming is successful</a:t>
             </a:r>
           </a:p>
@@ -22615,7 +22477,7 @@
               <a:buFont typeface="Arial" panose="020B0604020202020204" pitchFamily="34" charset="0"/>
               <a:buChar char="•"/>
             </a:pPr>
-            <a:endParaRPr lang="en-US" sz="1200"/>
+            <a:endParaRPr lang="en-US" sz="1200" dirty="0"/>
           </a:p>
           <a:p>
             <a:pPr marL="171450" indent="-171450">
@@ -22623,15 +22485,15 @@
               <a:buChar char="•"/>
             </a:pPr>
             <a:r>
-              <a:rPr lang="en-US" sz="1200"/>
+              <a:rPr lang="en-US" sz="1200" dirty="0"/>
               <a:t>But later (since the </a:t>
             </a:r>
             <a:r>
-              <a:rPr lang="en-US" sz="1200" err="1"/>
+              <a:rPr lang="en-US" sz="1200" dirty="0" err="1"/>
               <a:t>db</a:t>
             </a:r>
             <a:r>
-              <a:rPr lang="en-US" sz="1200"/>
+              <a:rPr lang="en-US" sz="1200" dirty="0"/>
               <a:t> writer is async) logging to table 2 failed, or agent crashed before it</a:t>
             </a:r>
           </a:p>
@@ -22640,18 +22502,18 @@
               <a:buFont typeface="Arial" panose="020B0604020202020204" pitchFamily="34" charset="0"/>
               <a:buChar char="•"/>
             </a:pPr>
-            <a:endParaRPr lang="en-US" sz="1400"/>
+            <a:endParaRPr lang="en-US" sz="1400" dirty="0"/>
           </a:p>
           <a:p>
             <a:pPr marL="171450" indent="-171450">
               <a:buFont typeface="Arial" panose="020B0604020202020204" pitchFamily="34" charset="0"/>
               <a:buChar char="•"/>
             </a:pPr>
-            <a:endParaRPr lang="en-US" sz="1400"/>
-          </a:p>
-          <a:p>
-            <a:r>
-              <a:rPr lang="en-US" sz="1400"/>
+            <a:endParaRPr lang="en-US" sz="1400" dirty="0"/>
+          </a:p>
+          <a:p>
+            <a:r>
+              <a:rPr lang="en-US" sz="1400" dirty="0"/>
               <a:t>Result</a:t>
             </a:r>
           </a:p>
@@ -22661,7 +22523,7 @@
               <a:buChar char="•"/>
             </a:pPr>
             <a:r>
-              <a:rPr lang="en-US" sz="1200"/>
+              <a:rPr lang="en-US" sz="1200" dirty="0"/>
               <a:t>Table 2 (or server monitoring table) is lagging behind</a:t>
             </a:r>
           </a:p>
@@ -22670,7 +22532,7 @@
               <a:buFont typeface="Arial" panose="020B0604020202020204" pitchFamily="34" charset="0"/>
               <a:buChar char="•"/>
             </a:pPr>
-            <a:endParaRPr lang="en-US" sz="1200"/>
+            <a:endParaRPr lang="en-US" sz="1200" dirty="0"/>
           </a:p>
           <a:p>
             <a:pPr marL="171450" indent="-171450">
@@ -22678,7 +22540,7 @@
               <a:buChar char="•"/>
             </a:pPr>
             <a:r>
-              <a:rPr lang="en-US" sz="1200"/>
+              <a:rPr lang="en-US" sz="1200" dirty="0"/>
               <a:t>Next agent restart (starting point of reconcile) will pick up the version to recover even earlier than needed version</a:t>
             </a:r>
           </a:p>
@@ -22687,7 +22549,7 @@
               <a:buFont typeface="Arial" panose="020B0604020202020204" pitchFamily="34" charset="0"/>
               <a:buChar char="•"/>
             </a:pPr>
-            <a:endParaRPr lang="en-US" sz="1200"/>
+            <a:endParaRPr lang="en-US" sz="1200" dirty="0"/>
           </a:p>
           <a:p>
             <a:pPr marL="171450" indent="-171450">
@@ -22695,11 +22557,11 @@
               <a:buChar char="•"/>
             </a:pPr>
             <a:r>
-              <a:rPr lang="en-US" sz="1200" err="1"/>
+              <a:rPr lang="en-US" sz="1200" dirty="0" err="1"/>
               <a:t>eBPF</a:t>
             </a:r>
             <a:r>
-              <a:rPr lang="en-US" sz="1200"/>
+              <a:rPr lang="en-US" sz="1200" dirty="0"/>
               <a:t> call does no harm in redo</a:t>
             </a:r>
           </a:p>
@@ -22708,7 +22570,7 @@
               <a:buFont typeface="Arial" panose="020B0604020202020204" pitchFamily="34" charset="0"/>
               <a:buChar char="•"/>
             </a:pPr>
-            <a:endParaRPr lang="en-US" sz="1200"/>
+            <a:endParaRPr lang="en-US" sz="1200" dirty="0"/>
           </a:p>
           <a:p>
             <a:pPr marL="171450" indent="-171450">
@@ -22716,44 +22578,44 @@
               <a:buChar char="•"/>
             </a:pPr>
             <a:r>
-              <a:rPr lang="en-US" sz="1200"/>
+              <a:rPr lang="en-US" sz="1200" dirty="0"/>
               <a:t>If server supports timeout retry/resend later, server will catch it after waiting for a while and resend</a:t>
             </a:r>
           </a:p>
           <a:p>
             <a:pPr lvl="1"/>
-            <a:endParaRPr lang="en-US" sz="1200"/>
+            <a:endParaRPr lang="en-US" sz="1200" dirty="0"/>
           </a:p>
           <a:p>
             <a:pPr lvl="1"/>
-            <a:endParaRPr lang="en-US" sz="1400"/>
-          </a:p>
-          <a:p>
-            <a:r>
-              <a:rPr lang="en-US" sz="1400"/>
+            <a:endParaRPr lang="en-US" sz="1400" dirty="0"/>
+          </a:p>
+          <a:p>
+            <a:r>
+              <a:rPr lang="en-US" sz="1400" dirty="0"/>
               <a:t>Observation/philosophy:  </a:t>
             </a:r>
           </a:p>
           <a:p>
             <a:pPr lvl="1"/>
             <a:r>
-              <a:rPr lang="en-US" sz="1200"/>
-              <a:t>Table 2 lagging behind real </a:t>
-            </a:r>
-            <a:r>
-              <a:rPr lang="en-US" sz="1200" err="1"/>
+              <a:rPr lang="en-US" sz="1200" dirty="0"/>
+              <a:t>Table 2 lagging behind (but could never be over-promising/ahead) real </a:t>
+            </a:r>
+            <a:r>
+              <a:rPr lang="en-US" sz="1200" dirty="0" err="1"/>
               <a:t>eBPF</a:t>
             </a:r>
             <a:r>
-              <a:rPr lang="en-US" sz="1200"/>
+              <a:rPr lang="en-US" sz="1200" dirty="0"/>
               <a:t> programming status is safer than it is ahead of real status. That’s why we only log to table 2 after </a:t>
             </a:r>
             <a:r>
-              <a:rPr lang="en-US" sz="1200" err="1"/>
+              <a:rPr lang="en-US" sz="1200" dirty="0" err="1"/>
               <a:t>eBPF</a:t>
             </a:r>
             <a:r>
-              <a:rPr lang="en-US" sz="1200"/>
+              <a:rPr lang="en-US" sz="1200" dirty="0"/>
               <a:t> sync call succeeded. </a:t>
             </a:r>
           </a:p>
@@ -22967,29 +22829,29 @@
           <a:lstStyle/>
           <a:p>
             <a:r>
-              <a:rPr lang="en-US"/>
+              <a:rPr lang="en-US" dirty="0"/>
               <a:t>The status reporting (Agent -&gt; Master) is not supported yet</a:t>
             </a:r>
           </a:p>
           <a:p>
             <a:pPr lvl="1"/>
             <a:r>
-              <a:rPr lang="en-US"/>
+              <a:rPr lang="en-US" dirty="0"/>
               <a:t>Reconciliation is started by Agent only</a:t>
             </a:r>
           </a:p>
           <a:p>
             <a:pPr lvl="1"/>
             <a:r>
-              <a:rPr lang="en-US"/>
+              <a:rPr lang="en-US" dirty="0"/>
               <a:t>After it is supported, we’ll use it to show status or relying on </a:t>
             </a:r>
             <a:r>
-              <a:rPr lang="en-US" err="1"/>
+              <a:rPr lang="en-US" dirty="0" err="1"/>
               <a:t>ArionMaster</a:t>
             </a:r>
             <a:r>
-              <a:rPr lang="en-US"/>
+              <a:rPr lang="en-US" dirty="0"/>
               <a:t> to retry</a:t>
             </a:r>
           </a:p>
@@ -22997,60 +22859,60 @@
             <a:pPr marL="0" indent="0">
               <a:buNone/>
             </a:pPr>
-            <a:endParaRPr lang="en-US"/>
-          </a:p>
-          <a:p>
+            <a:endParaRPr lang="en-US" dirty="0"/>
+          </a:p>
+          <a:p>
+            <a:r>
+              <a:rPr lang="en-US" dirty="0"/>
+              <a:t>Self-healing in eBpf is not supported</a:t>
+            </a:r>
+          </a:p>
+          <a:p>
+            <a:pPr lvl="1"/>
+            <a:r>
+              <a:rPr lang="en-US" dirty="0"/>
+              <a:t>It heavily relies on performance of eBpf dumping rules (or any other faster mechanism to achieve the same goal)</a:t>
+            </a:r>
+          </a:p>
+          <a:p>
+            <a:pPr lvl="1"/>
+            <a:r>
+              <a:rPr lang="en-US" dirty="0"/>
+              <a:t>The best location to put an authority version and self heal the ground truth of eBpf is in user space program of eBpf</a:t>
+            </a:r>
+          </a:p>
+          <a:p>
+            <a:pPr lvl="1"/>
             <a:r>
               <a:rPr lang="en-US"/>
-              <a:t>Self-healing in eBpf is not supported</a:t>
+              <a:t>Consider merging Agent with user space program of eBpf (like AF_XDP)</a:t>
+            </a:r>
+          </a:p>
+          <a:p>
+            <a:endParaRPr lang="en-US" dirty="0"/>
+          </a:p>
+          <a:p>
+            <a:r>
+              <a:rPr lang="en-US" strike="sngStrike" dirty="0"/>
+              <a:t>In Agent, race condition in a sequence of updating (or deletion) of the same neighbor id</a:t>
             </a:r>
           </a:p>
           <a:p>
             <a:pPr lvl="1"/>
             <a:r>
-              <a:rPr lang="en-US"/>
-              <a:t>It heavily relies on performance of eBpf dumping rules (or any other faster mechanism to achieve the same goal)</a:t>
+              <a:rPr lang="en-US" strike="sngStrike" dirty="0"/>
+              <a:t>Need to think through sequential tasks in the same worker thread</a:t>
             </a:r>
           </a:p>
           <a:p>
             <a:pPr lvl="1"/>
             <a:r>
-              <a:rPr lang="en-US"/>
-              <a:t>The best location to put an authority version and self heal the ground truth of eBpf is in user space program of eBpf</a:t>
-            </a:r>
-          </a:p>
-          <a:p>
-            <a:pPr lvl="1"/>
-            <a:r>
-              <a:rPr lang="en-US"/>
-              <a:t>Consider merging Agent with user space program of eBpf (like AF_XDP or XX_XDP)</a:t>
-            </a:r>
-          </a:p>
-          <a:p>
-            <a:endParaRPr lang="en-US"/>
-          </a:p>
-          <a:p>
-            <a:r>
-              <a:rPr lang="en-US" strike="sngStrike"/>
-              <a:t>In Agent, race condition in a sequence of updating (or deletion) of the same neighbor id</a:t>
-            </a:r>
-          </a:p>
-          <a:p>
-            <a:pPr lvl="1"/>
-            <a:r>
-              <a:rPr lang="en-US" strike="sngStrike"/>
-              <a:t>Need to think through sequential tasks in the same worker thread</a:t>
-            </a:r>
-          </a:p>
-          <a:p>
-            <a:pPr lvl="1"/>
-            <a:r>
-              <a:rPr lang="en-US" strike="sngStrike"/>
+              <a:rPr lang="en-US" strike="sngStrike" dirty="0"/>
               <a:t>And fault tolerance</a:t>
             </a:r>
           </a:p>
           <a:p>
-            <a:endParaRPr lang="en-US"/>
+            <a:endParaRPr lang="en-US" dirty="0"/>
           </a:p>
         </p:txBody>
       </p:sp>
@@ -32760,12 +32622,6 @@
 </file>
 
 <file path=customXml/item1.xml><?xml version="1.0" encoding="utf-8"?>
-<p:properties xmlns:p="http://schemas.microsoft.com/office/2006/metadata/properties" xmlns:xsi="http://www.w3.org/2001/XMLSchema-instance" xmlns:pc="http://schemas.microsoft.com/office/infopath/2007/PartnerControls">
-  <documentManagement/>
-</p:properties>
-</file>
-
-<file path=customXml/item2.xml><?xml version="1.0" encoding="utf-8"?>
 <ct:contentTypeSchema xmlns:ct="http://schemas.microsoft.com/office/2006/metadata/contentType" xmlns:ma="http://schemas.microsoft.com/office/2006/metadata/properties/metaAttributes" ct:_="" ma:_="" ma:contentTypeName="Document" ma:contentTypeID="0x0101003B8DCA3F9799F84EB786617034B87B4B" ma:contentTypeVersion="8" ma:contentTypeDescription="Create a new document." ma:contentTypeScope="" ma:versionID="8440f912e6145357c4e91939283b6f17">
   <xsd:schema xmlns:xsd="http://www.w3.org/2001/XMLSchema" xmlns:xs="http://www.w3.org/2001/XMLSchema" xmlns:p="http://schemas.microsoft.com/office/2006/metadata/properties" xmlns:ns2="35b0bf06-ef8c-497b-921c-5cf98f14bf1b" xmlns:ns3="84223b59-851b-4b03-9e37-5703e473df94" targetNamespace="http://schemas.microsoft.com/office/2006/metadata/properties" ma:root="true" ma:fieldsID="c83020f031b34d1b310e2c9459af3078" ns2:_="" ns3:_="">
     <xsd:import namespace="35b0bf06-ef8c-497b-921c-5cf98f14bf1b"/>
@@ -32956,7 +32812,7 @@
 </ct:contentTypeSchema>
 </file>
 
-<file path=customXml/item3.xml><?xml version="1.0" encoding="utf-8"?>
+<file path=customXml/item2.xml><?xml version="1.0" encoding="utf-8"?>
 <?mso-contentType ?>
 <FormTemplates xmlns="http://schemas.microsoft.com/sharepoint/v3/contenttype/forms">
   <Display>DocumentLibraryForm</Display>
@@ -32965,24 +32821,13 @@
 </FormTemplates>
 </file>
 
-<file path=customXml/itemProps1.xml><?xml version="1.0" encoding="utf-8"?>
-<ds:datastoreItem xmlns:ds="http://schemas.openxmlformats.org/officeDocument/2006/customXml" ds:itemID="{7153B77C-8669-490D-A1AF-B6547AA76D9B}">
-  <ds:schemaRefs>
-    <ds:schemaRef ds:uri="http://purl.org/dc/elements/1.1/"/>
-    <ds:schemaRef ds:uri="http://purl.org/dc/terms/"/>
-    <ds:schemaRef ds:uri="http://schemas.microsoft.com/office/2006/documentManagement/types"/>
-    <ds:schemaRef ds:uri="http://schemas.microsoft.com/office/2006/metadata/properties"/>
-    <ds:schemaRef ds:uri="35b0bf06-ef8c-497b-921c-5cf98f14bf1b"/>
-    <ds:schemaRef ds:uri="http://purl.org/dc/dcmitype/"/>
-    <ds:schemaRef ds:uri="http://schemas.openxmlformats.org/package/2006/metadata/core-properties"/>
-    <ds:schemaRef ds:uri="http://schemas.microsoft.com/office/infopath/2007/PartnerControls"/>
-    <ds:schemaRef ds:uri="84223b59-851b-4b03-9e37-5703e473df94"/>
-    <ds:schemaRef ds:uri="http://www.w3.org/XML/1998/namespace"/>
-  </ds:schemaRefs>
-</ds:datastoreItem>
+<file path=customXml/item3.xml><?xml version="1.0" encoding="utf-8"?>
+<p:properties xmlns:p="http://schemas.microsoft.com/office/2006/metadata/properties" xmlns:xsi="http://www.w3.org/2001/XMLSchema-instance" xmlns:pc="http://schemas.microsoft.com/office/infopath/2007/PartnerControls">
+  <documentManagement/>
+</p:properties>
 </file>
 
-<file path=customXml/itemProps2.xml><?xml version="1.0" encoding="utf-8"?>
+<file path=customXml/itemProps1.xml><?xml version="1.0" encoding="utf-8"?>
 <ds:datastoreItem xmlns:ds="http://schemas.openxmlformats.org/officeDocument/2006/customXml" ds:itemID="{65293F35-9906-43DD-B482-C73EF3D806CF}">
   <ds:schemaRefs>
     <ds:schemaRef ds:uri="35b0bf06-ef8c-497b-921c-5cf98f14bf1b"/>
@@ -33001,10 +32846,27 @@
 </ds:datastoreItem>
 </file>
 
-<file path=customXml/itemProps3.xml><?xml version="1.0" encoding="utf-8"?>
+<file path=customXml/itemProps2.xml><?xml version="1.0" encoding="utf-8"?>
 <ds:datastoreItem xmlns:ds="http://schemas.openxmlformats.org/officeDocument/2006/customXml" ds:itemID="{792D77E9-6185-4E29-B64B-7B8B7F07795F}">
   <ds:schemaRefs>
     <ds:schemaRef ds:uri="http://schemas.microsoft.com/sharepoint/v3/contenttype/forms"/>
   </ds:schemaRefs>
 </ds:datastoreItem>
+</file>
+
+<file path=customXml/itemProps3.xml><?xml version="1.0" encoding="utf-8"?>
+<ds:datastoreItem xmlns:ds="http://schemas.openxmlformats.org/officeDocument/2006/customXml" ds:itemID="{7153B77C-8669-490D-A1AF-B6547AA76D9B}">
+  <ds:schemaRefs>
+    <ds:schemaRef ds:uri="http://purl.org/dc/terms/"/>
+    <ds:schemaRef ds:uri="http://schemas.microsoft.com/office/infopath/2007/PartnerControls"/>
+    <ds:schemaRef ds:uri="http://purl.org/dc/elements/1.1/"/>
+    <ds:schemaRef ds:uri="http://schemas.microsoft.com/office/2006/metadata/properties"/>
+    <ds:schemaRef ds:uri="http://schemas.microsoft.com/office/2006/documentManagement/types"/>
+    <ds:schemaRef ds:uri="http://purl.org/dc/dcmitype/"/>
+    <ds:schemaRef ds:uri="http://schemas.openxmlformats.org/package/2006/metadata/core-properties"/>
+    <ds:schemaRef ds:uri="84223b59-851b-4b03-9e37-5703e473df94"/>
+    <ds:schemaRef ds:uri="35b0bf06-ef8c-497b-921c-5cf98f14bf1b"/>
+    <ds:schemaRef ds:uri="http://www.w3.org/XML/1998/namespace"/>
+  </ds:schemaRefs>
+</ds:datastoreItem>
 </file>
</xml_diff>